<commit_message>
Rough draft of poster
</commit_message>
<xml_diff>
--- a/Presentations/SURE_Poster_Design.pptx
+++ b/Presentations/SURE_Poster_Design.pptx
@@ -132,20 +132,6 @@
 </p:cmAuthorLst>
 </file>
 
-<file path=ppt/comments/comment1.xml><?xml version="1.0" encoding="utf-8"?>
-<p:cmLst xmlns:a="http://schemas.openxmlformats.org/drawingml/2006/main" xmlns:r="http://schemas.openxmlformats.org/officeDocument/2006/relationships" xmlns:p="http://schemas.openxmlformats.org/presentationml/2006/main">
-  <p:cm authorId="1" dt="2016-07-12T14:20:19.336" idx="4">
-    <p:pos x="4478" y="3883"/>
-    <p:text>How much of this do you think I should keep?</p:text>
-    <p:extLst>
-      <p:ext uri="{C676402C-5697-4E1C-873F-D02D1690AC5C}">
-        <p15:threadingInfo xmlns:p15="http://schemas.microsoft.com/office/powerpoint/2012/main" timeZoneBias="240"/>
-      </p:ext>
-    </p:extLst>
-  </p:cm>
-</p:cmLst>
-</file>
-
 <file path=ppt/slideLayouts/slideLayout1.xml><?xml version="1.0" encoding="utf-8"?>
 <p:sldLayout xmlns:a="http://schemas.openxmlformats.org/drawingml/2006/main" xmlns:r="http://schemas.openxmlformats.org/officeDocument/2006/relationships" xmlns:p="http://schemas.openxmlformats.org/presentationml/2006/main" type="title" preserve="1">
   <p:cSld name="Title Slide">
@@ -277,7 +263,7 @@
           <a:p>
             <a:fld id="{26F4659F-BCAD-4F49-8558-2B5CFF0DE5F8}" type="datetimeFigureOut">
               <a:rPr lang="en-US" smtClean="0"/>
-              <a:t>7/12/2016</a:t>
+              <a:t>7/15/2016</a:t>
             </a:fld>
             <a:endParaRPr lang="en-US"/>
           </a:p>
@@ -447,7 +433,7 @@
           <a:p>
             <a:fld id="{26F4659F-BCAD-4F49-8558-2B5CFF0DE5F8}" type="datetimeFigureOut">
               <a:rPr lang="en-US" smtClean="0"/>
-              <a:t>7/12/2016</a:t>
+              <a:t>7/15/2016</a:t>
             </a:fld>
             <a:endParaRPr lang="en-US"/>
           </a:p>
@@ -627,7 +613,7 @@
           <a:p>
             <a:fld id="{26F4659F-BCAD-4F49-8558-2B5CFF0DE5F8}" type="datetimeFigureOut">
               <a:rPr lang="en-US" smtClean="0"/>
-              <a:t>7/12/2016</a:t>
+              <a:t>7/15/2016</a:t>
             </a:fld>
             <a:endParaRPr lang="en-US"/>
           </a:p>
@@ -797,7 +783,7 @@
           <a:p>
             <a:fld id="{26F4659F-BCAD-4F49-8558-2B5CFF0DE5F8}" type="datetimeFigureOut">
               <a:rPr lang="en-US" smtClean="0"/>
-              <a:t>7/12/2016</a:t>
+              <a:t>7/15/2016</a:t>
             </a:fld>
             <a:endParaRPr lang="en-US"/>
           </a:p>
@@ -1041,7 +1027,7 @@
           <a:p>
             <a:fld id="{26F4659F-BCAD-4F49-8558-2B5CFF0DE5F8}" type="datetimeFigureOut">
               <a:rPr lang="en-US" smtClean="0"/>
-              <a:t>7/12/2016</a:t>
+              <a:t>7/15/2016</a:t>
             </a:fld>
             <a:endParaRPr lang="en-US"/>
           </a:p>
@@ -1273,7 +1259,7 @@
           <a:p>
             <a:fld id="{26F4659F-BCAD-4F49-8558-2B5CFF0DE5F8}" type="datetimeFigureOut">
               <a:rPr lang="en-US" smtClean="0"/>
-              <a:t>7/12/2016</a:t>
+              <a:t>7/15/2016</a:t>
             </a:fld>
             <a:endParaRPr lang="en-US"/>
           </a:p>
@@ -1640,7 +1626,7 @@
           <a:p>
             <a:fld id="{26F4659F-BCAD-4F49-8558-2B5CFF0DE5F8}" type="datetimeFigureOut">
               <a:rPr lang="en-US" smtClean="0"/>
-              <a:t>7/12/2016</a:t>
+              <a:t>7/15/2016</a:t>
             </a:fld>
             <a:endParaRPr lang="en-US"/>
           </a:p>
@@ -1758,7 +1744,7 @@
           <a:p>
             <a:fld id="{26F4659F-BCAD-4F49-8558-2B5CFF0DE5F8}" type="datetimeFigureOut">
               <a:rPr lang="en-US" smtClean="0"/>
-              <a:t>7/12/2016</a:t>
+              <a:t>7/15/2016</a:t>
             </a:fld>
             <a:endParaRPr lang="en-US"/>
           </a:p>
@@ -1853,7 +1839,7 @@
           <a:p>
             <a:fld id="{26F4659F-BCAD-4F49-8558-2B5CFF0DE5F8}" type="datetimeFigureOut">
               <a:rPr lang="en-US" smtClean="0"/>
-              <a:t>7/12/2016</a:t>
+              <a:t>7/15/2016</a:t>
             </a:fld>
             <a:endParaRPr lang="en-US"/>
           </a:p>
@@ -2130,7 +2116,7 @@
           <a:p>
             <a:fld id="{26F4659F-BCAD-4F49-8558-2B5CFF0DE5F8}" type="datetimeFigureOut">
               <a:rPr lang="en-US" smtClean="0"/>
-              <a:t>7/12/2016</a:t>
+              <a:t>7/15/2016</a:t>
             </a:fld>
             <a:endParaRPr lang="en-US"/>
           </a:p>
@@ -2387,7 +2373,7 @@
           <a:p>
             <a:fld id="{26F4659F-BCAD-4F49-8558-2B5CFF0DE5F8}" type="datetimeFigureOut">
               <a:rPr lang="en-US" smtClean="0"/>
-              <a:t>7/12/2016</a:t>
+              <a:t>7/15/2016</a:t>
             </a:fld>
             <a:endParaRPr lang="en-US"/>
           </a:p>
@@ -2600,7 +2586,7 @@
           <a:p>
             <a:fld id="{26F4659F-BCAD-4F49-8558-2B5CFF0DE5F8}" type="datetimeFigureOut">
               <a:rPr lang="en-US" smtClean="0"/>
-              <a:t>7/12/2016</a:t>
+              <a:t>7/15/2016</a:t>
             </a:fld>
             <a:endParaRPr lang="en-US"/>
           </a:p>
@@ -3036,18 +3022,11 @@
                 <a:latin typeface="Arial" panose="020B0604020202020204" pitchFamily="34" charset="0"/>
                 <a:cs typeface="Arial" panose="020B0604020202020204" pitchFamily="34" charset="0"/>
               </a:rPr>
-              <a:t>Simulations of Emission Lines from the Narrow Line Region in </a:t>
-            </a:r>
-            <a:r>
-              <a:rPr lang="en-US" sz="4400" b="1" dirty="0" err="1">
-                <a:solidFill>
-                  <a:srgbClr val="73000A"/>
-                </a:solidFill>
-                <a:latin typeface="Arial" panose="020B0604020202020204" pitchFamily="34" charset="0"/>
-                <a:cs typeface="Arial" panose="020B0604020202020204" pitchFamily="34" charset="0"/>
-              </a:rPr>
-              <a:t>Seyfert</a:t>
-            </a:r>
+              <a:t>Simulations of Emission Lines from the Narrow Line Region in Active Galaxies</a:t>
+            </a:r>
+          </a:p>
+          <a:p>
+            <a:pPr algn="ctr"/>
             <a:r>
               <a:rPr lang="en-US" sz="4400" b="1" dirty="0">
                 <a:solidFill>
@@ -3056,7 +3035,7 @@
                 <a:latin typeface="Arial" panose="020B0604020202020204" pitchFamily="34" charset="0"/>
                 <a:cs typeface="Arial" panose="020B0604020202020204" pitchFamily="34" charset="0"/>
               </a:rPr>
-              <a:t> Galaxies</a:t>
+              <a:t>Christopher Greene (Faculty Mentor: Dr. Chris Richardson)</a:t>
             </a:r>
           </a:p>
           <a:p>
@@ -3069,19 +3048,6 @@
                 <a:latin typeface="Arial" panose="020B0604020202020204" pitchFamily="34" charset="0"/>
                 <a:cs typeface="Arial" panose="020B0604020202020204" pitchFamily="34" charset="0"/>
               </a:rPr>
-              <a:t>Christopher Greene (Faculty Mentor: Dr. Chris Richardson)</a:t>
-            </a:r>
-          </a:p>
-          <a:p>
-            <a:pPr algn="ctr"/>
-            <a:r>
-              <a:rPr lang="en-US" sz="4400" b="1" dirty="0">
-                <a:solidFill>
-                  <a:srgbClr val="73000A"/>
-                </a:solidFill>
-                <a:latin typeface="Arial" panose="020B0604020202020204" pitchFamily="34" charset="0"/>
-                <a:cs typeface="Arial" panose="020B0604020202020204" pitchFamily="34" charset="0"/>
-              </a:rPr>
               <a:t>Department of Physics</a:t>
             </a:r>
           </a:p>
@@ -3089,14 +3055,14 @@
       </p:sp>
       <p:sp>
         <p:nvSpPr>
-          <p:cNvPr id="7" name="TextBox 6"/>
+          <p:cNvPr id="8" name="TextBox 7"/>
           <p:cNvSpPr txBox="1"/>
           <p:nvPr/>
         </p:nvSpPr>
         <p:spPr>
           <a:xfrm>
-            <a:off x="1039091" y="2892155"/>
-            <a:ext cx="10370128" cy="707886"/>
+            <a:off x="1156848" y="3619247"/>
+            <a:ext cx="14339454" cy="16650712"/>
           </a:xfrm>
           <a:prstGeom prst="rect">
             <a:avLst/>
@@ -3109,6 +3075,7 @@
           </a:bodyPr>
           <a:lstStyle/>
           <a:p>
+            <a:pPr algn="ctr"/>
             <a:r>
               <a:rPr lang="en-US" sz="4000" b="1" u="sng" dirty="0">
                 <a:solidFill>
@@ -3117,21 +3084,490 @@
                 <a:latin typeface="Arial" panose="020B0604020202020204" pitchFamily="34" charset="0"/>
                 <a:cs typeface="Arial" panose="020B0604020202020204" pitchFamily="34" charset="0"/>
               </a:rPr>
-              <a:t>Abstract</a:t>
-            </a:r>
-          </a:p>
-        </p:txBody>
-      </p:sp>
-      <p:sp>
-        <p:nvSpPr>
-          <p:cNvPr id="8" name="TextBox 7"/>
+              <a:t>Background</a:t>
+            </a:r>
+          </a:p>
+          <a:p>
+            <a:pPr marL="457200" indent="-457200">
+              <a:buFont typeface="Arial" panose="020B0604020202020204" pitchFamily="34" charset="0"/>
+              <a:buChar char="•"/>
+            </a:pPr>
+            <a:r>
+              <a:rPr lang="en-US" sz="2800" dirty="0">
+                <a:latin typeface="Arial" panose="020B0604020202020204" pitchFamily="34" charset="0"/>
+                <a:cs typeface="Arial" panose="020B0604020202020204" pitchFamily="34" charset="0"/>
+              </a:rPr>
+              <a:t>Study of Active Galactic Nuclei (AGN) allows us to understand more fully the processes involved in galaxy evolution. </a:t>
+            </a:r>
+          </a:p>
+          <a:p>
+            <a:pPr marL="457200" indent="-457200">
+              <a:buFont typeface="Arial" panose="020B0604020202020204" pitchFamily="34" charset="0"/>
+              <a:buChar char="•"/>
+            </a:pPr>
+            <a:r>
+              <a:rPr lang="en-US" sz="2800" dirty="0">
+                <a:latin typeface="Arial" panose="020B0604020202020204" pitchFamily="34" charset="0"/>
+                <a:cs typeface="Arial" panose="020B0604020202020204" pitchFamily="34" charset="0"/>
+              </a:rPr>
+              <a:t>Many researchers believe that some AGN are formed when two galaxies merge.</a:t>
+            </a:r>
+          </a:p>
+          <a:p>
+            <a:pPr marL="457200" indent="-457200">
+              <a:buFont typeface="Arial" panose="020B0604020202020204" pitchFamily="34" charset="0"/>
+              <a:buChar char="•"/>
+            </a:pPr>
+            <a:r>
+              <a:rPr lang="en-US" sz="2800" dirty="0">
+                <a:latin typeface="Arial" panose="020B0604020202020204" pitchFamily="34" charset="0"/>
+                <a:cs typeface="Arial" panose="020B0604020202020204" pitchFamily="34" charset="0"/>
+              </a:rPr>
+              <a:t>In about 4 billion years the Milky Way galaxy and the Andromeda galaxy will begin merging, studying AGN may tell us what will happen after the merger. </a:t>
+            </a:r>
+          </a:p>
+          <a:p>
+            <a:pPr marL="457200" indent="-457200">
+              <a:buFont typeface="Arial" panose="020B0604020202020204" pitchFamily="34" charset="0"/>
+              <a:buChar char="•"/>
+            </a:pPr>
+            <a:r>
+              <a:rPr lang="en-US" sz="2800" dirty="0">
+                <a:latin typeface="Arial" panose="020B0604020202020204" pitchFamily="34" charset="0"/>
+                <a:cs typeface="Arial" panose="020B0604020202020204" pitchFamily="34" charset="0"/>
+              </a:rPr>
+              <a:t>AGN are generally structured according to the width of the emission lines observed in each region.  </a:t>
+            </a:r>
+          </a:p>
+          <a:p>
+            <a:pPr marL="457200" indent="-457200">
+              <a:buFont typeface="Arial" panose="020B0604020202020204" pitchFamily="34" charset="0"/>
+              <a:buChar char="•"/>
+            </a:pPr>
+            <a:endParaRPr lang="en-US" sz="2800" dirty="0">
+              <a:latin typeface="Arial" panose="020B0604020202020204" pitchFamily="34" charset="0"/>
+              <a:cs typeface="Arial" panose="020B0604020202020204" pitchFamily="34" charset="0"/>
+            </a:endParaRPr>
+          </a:p>
+          <a:p>
+            <a:pPr marL="457200" indent="-457200">
+              <a:buFont typeface="Arial" panose="020B0604020202020204" pitchFamily="34" charset="0"/>
+              <a:buChar char="•"/>
+            </a:pPr>
+            <a:endParaRPr lang="en-US" sz="2800" dirty="0">
+              <a:latin typeface="Arial" panose="020B0604020202020204" pitchFamily="34" charset="0"/>
+              <a:cs typeface="Arial" panose="020B0604020202020204" pitchFamily="34" charset="0"/>
+            </a:endParaRPr>
+          </a:p>
+          <a:p>
+            <a:pPr marL="457200" indent="-457200">
+              <a:buFont typeface="Arial" panose="020B0604020202020204" pitchFamily="34" charset="0"/>
+              <a:buChar char="•"/>
+            </a:pPr>
+            <a:endParaRPr lang="en-US" sz="2800" dirty="0">
+              <a:latin typeface="Arial" panose="020B0604020202020204" pitchFamily="34" charset="0"/>
+              <a:cs typeface="Arial" panose="020B0604020202020204" pitchFamily="34" charset="0"/>
+            </a:endParaRPr>
+          </a:p>
+          <a:p>
+            <a:pPr marL="457200" indent="-457200">
+              <a:buFont typeface="Arial" panose="020B0604020202020204" pitchFamily="34" charset="0"/>
+              <a:buChar char="•"/>
+            </a:pPr>
+            <a:endParaRPr lang="en-US" sz="2800" dirty="0">
+              <a:latin typeface="Arial" panose="020B0604020202020204" pitchFamily="34" charset="0"/>
+              <a:cs typeface="Arial" panose="020B0604020202020204" pitchFamily="34" charset="0"/>
+            </a:endParaRPr>
+          </a:p>
+          <a:p>
+            <a:pPr marL="457200" indent="-457200">
+              <a:buFont typeface="Arial" panose="020B0604020202020204" pitchFamily="34" charset="0"/>
+              <a:buChar char="•"/>
+            </a:pPr>
+            <a:endParaRPr lang="en-US" sz="2800" dirty="0">
+              <a:latin typeface="Arial" panose="020B0604020202020204" pitchFamily="34" charset="0"/>
+              <a:cs typeface="Arial" panose="020B0604020202020204" pitchFamily="34" charset="0"/>
+            </a:endParaRPr>
+          </a:p>
+          <a:p>
+            <a:pPr marL="457200" indent="-457200">
+              <a:buFont typeface="Arial" panose="020B0604020202020204" pitchFamily="34" charset="0"/>
+              <a:buChar char="•"/>
+            </a:pPr>
+            <a:endParaRPr lang="en-US" sz="2800" dirty="0">
+              <a:latin typeface="Arial" panose="020B0604020202020204" pitchFamily="34" charset="0"/>
+              <a:cs typeface="Arial" panose="020B0604020202020204" pitchFamily="34" charset="0"/>
+            </a:endParaRPr>
+          </a:p>
+          <a:p>
+            <a:pPr marL="457200" indent="-457200">
+              <a:buFont typeface="Arial" panose="020B0604020202020204" pitchFamily="34" charset="0"/>
+              <a:buChar char="•"/>
+            </a:pPr>
+            <a:endParaRPr lang="en-US" sz="2800" dirty="0">
+              <a:latin typeface="Arial" panose="020B0604020202020204" pitchFamily="34" charset="0"/>
+              <a:cs typeface="Arial" panose="020B0604020202020204" pitchFamily="34" charset="0"/>
+            </a:endParaRPr>
+          </a:p>
+          <a:p>
+            <a:pPr marL="457200" indent="-457200">
+              <a:buFont typeface="Arial" panose="020B0604020202020204" pitchFamily="34" charset="0"/>
+              <a:buChar char="•"/>
+            </a:pPr>
+            <a:endParaRPr lang="en-US" sz="2800" dirty="0">
+              <a:latin typeface="Arial" panose="020B0604020202020204" pitchFamily="34" charset="0"/>
+              <a:cs typeface="Arial" panose="020B0604020202020204" pitchFamily="34" charset="0"/>
+            </a:endParaRPr>
+          </a:p>
+          <a:p>
+            <a:pPr marL="457200" indent="-457200">
+              <a:buFont typeface="Arial" panose="020B0604020202020204" pitchFamily="34" charset="0"/>
+              <a:buChar char="•"/>
+            </a:pPr>
+            <a:endParaRPr lang="en-US" sz="2800" dirty="0">
+              <a:latin typeface="Arial" panose="020B0604020202020204" pitchFamily="34" charset="0"/>
+              <a:cs typeface="Arial" panose="020B0604020202020204" pitchFamily="34" charset="0"/>
+            </a:endParaRPr>
+          </a:p>
+          <a:p>
+            <a:endParaRPr lang="en-US" sz="2800" dirty="0">
+              <a:latin typeface="Arial" panose="020B0604020202020204" pitchFamily="34" charset="0"/>
+              <a:cs typeface="Arial" panose="020B0604020202020204" pitchFamily="34" charset="0"/>
+            </a:endParaRPr>
+          </a:p>
+          <a:p>
+            <a:endParaRPr lang="en-US" sz="2800" dirty="0">
+              <a:latin typeface="Arial" panose="020B0604020202020204" pitchFamily="34" charset="0"/>
+              <a:cs typeface="Arial" panose="020B0604020202020204" pitchFamily="34" charset="0"/>
+            </a:endParaRPr>
+          </a:p>
+          <a:p>
+            <a:pPr marL="457200" indent="-457200">
+              <a:buFont typeface="Arial" panose="020B0604020202020204" pitchFamily="34" charset="0"/>
+              <a:buChar char="•"/>
+            </a:pPr>
+            <a:r>
+              <a:rPr lang="en-US" sz="2800" dirty="0">
+                <a:latin typeface="Arial" panose="020B0604020202020204" pitchFamily="34" charset="0"/>
+                <a:cs typeface="Arial" panose="020B0604020202020204" pitchFamily="34" charset="0"/>
+              </a:rPr>
+              <a:t>Lots of research on the Broad Line Region (BLR), where there are broad emission lines, but not as much on the Narrow Line Region (NLR), where there are narrow emission lines. </a:t>
+            </a:r>
+          </a:p>
+          <a:p>
+            <a:pPr marL="457200" indent="-457200">
+              <a:buFont typeface="Arial" panose="020B0604020202020204" pitchFamily="34" charset="0"/>
+              <a:buChar char="•"/>
+            </a:pPr>
+            <a:r>
+              <a:rPr lang="en-US" sz="2800" dirty="0">
+                <a:latin typeface="Arial" panose="020B0604020202020204" pitchFamily="34" charset="0"/>
+                <a:cs typeface="Arial" panose="020B0604020202020204" pitchFamily="34" charset="0"/>
+              </a:rPr>
+              <a:t>Emission lines from the ionization of different elements used to learn about the AGN, through simulations with programs such as CLOUDY and MAPPINGSIII.</a:t>
+            </a:r>
+          </a:p>
+          <a:p>
+            <a:pPr marL="457200" indent="-457200">
+              <a:buFont typeface="Arial" panose="020B0604020202020204" pitchFamily="34" charset="0"/>
+              <a:buChar char="•"/>
+            </a:pPr>
+            <a:r>
+              <a:rPr lang="en-US" sz="2800" dirty="0">
+                <a:latin typeface="Arial" panose="020B0604020202020204" pitchFamily="34" charset="0"/>
+                <a:cs typeface="Arial" panose="020B0604020202020204" pitchFamily="34" charset="0"/>
+              </a:rPr>
+              <a:t>Models of the incident radiation curve from the AGN in CLOUDY are computed from using the spectral slope indices </a:t>
+            </a:r>
+            <a:r>
+              <a:rPr lang="el-GR" sz="2800" dirty="0">
+                <a:latin typeface="Arial" panose="020B0604020202020204" pitchFamily="34" charset="0"/>
+                <a:cs typeface="Arial" panose="020B0604020202020204" pitchFamily="34" charset="0"/>
+              </a:rPr>
+              <a:t>α</a:t>
+            </a:r>
+            <a:r>
+              <a:rPr lang="en-US" sz="2800" baseline="-25000" dirty="0">
+                <a:latin typeface="Arial" panose="020B0604020202020204" pitchFamily="34" charset="0"/>
+                <a:cs typeface="Arial" panose="020B0604020202020204" pitchFamily="34" charset="0"/>
+              </a:rPr>
+              <a:t>x</a:t>
+            </a:r>
+            <a:r>
+              <a:rPr lang="en-US" sz="2800" dirty="0">
+                <a:latin typeface="Arial" panose="020B0604020202020204" pitchFamily="34" charset="0"/>
+                <a:cs typeface="Arial" panose="020B0604020202020204" pitchFamily="34" charset="0"/>
+              </a:rPr>
+              <a:t>, corresponding to the X-ray spectrum (10</a:t>
+            </a:r>
+            <a:r>
+              <a:rPr lang="en-US" sz="2800" baseline="30000" dirty="0">
+                <a:latin typeface="Arial" panose="020B0604020202020204" pitchFamily="34" charset="0"/>
+                <a:cs typeface="Arial" panose="020B0604020202020204" pitchFamily="34" charset="0"/>
+              </a:rPr>
+              <a:t>2</a:t>
+            </a:r>
+            <a:r>
+              <a:rPr lang="en-US" sz="2800" dirty="0">
+                <a:latin typeface="Arial" panose="020B0604020202020204" pitchFamily="34" charset="0"/>
+                <a:cs typeface="Arial" panose="020B0604020202020204" pitchFamily="34" charset="0"/>
+              </a:rPr>
+              <a:t> eV- 10</a:t>
+            </a:r>
+            <a:r>
+              <a:rPr lang="en-US" sz="2800" baseline="30000" dirty="0">
+                <a:latin typeface="Arial" panose="020B0604020202020204" pitchFamily="34" charset="0"/>
+                <a:cs typeface="Arial" panose="020B0604020202020204" pitchFamily="34" charset="0"/>
+              </a:rPr>
+              <a:t>5</a:t>
+            </a:r>
+            <a:r>
+              <a:rPr lang="en-US" sz="2800" dirty="0">
+                <a:latin typeface="Arial" panose="020B0604020202020204" pitchFamily="34" charset="0"/>
+                <a:cs typeface="Arial" panose="020B0604020202020204" pitchFamily="34" charset="0"/>
+              </a:rPr>
+              <a:t> eV), </a:t>
+            </a:r>
+            <a:r>
+              <a:rPr lang="el-GR" sz="2800" dirty="0">
+                <a:latin typeface="Arial" panose="020B0604020202020204" pitchFamily="34" charset="0"/>
+                <a:cs typeface="Arial" panose="020B0604020202020204" pitchFamily="34" charset="0"/>
+              </a:rPr>
+              <a:t>α</a:t>
+            </a:r>
+            <a:r>
+              <a:rPr lang="en-US" sz="2800" baseline="-25000" dirty="0" err="1">
+                <a:latin typeface="Arial" panose="020B0604020202020204" pitchFamily="34" charset="0"/>
+                <a:cs typeface="Arial" panose="020B0604020202020204" pitchFamily="34" charset="0"/>
+              </a:rPr>
+              <a:t>uv</a:t>
+            </a:r>
+            <a:r>
+              <a:rPr lang="en-US" sz="2800" dirty="0">
+                <a:latin typeface="Arial" panose="020B0604020202020204" pitchFamily="34" charset="0"/>
+                <a:cs typeface="Arial" panose="020B0604020202020204" pitchFamily="34" charset="0"/>
+              </a:rPr>
+              <a:t> corresponding to the ultraviolet spectrum (10</a:t>
+            </a:r>
+            <a:r>
+              <a:rPr lang="en-US" sz="2800" baseline="30000" dirty="0">
+                <a:latin typeface="Arial" panose="020B0604020202020204" pitchFamily="34" charset="0"/>
+                <a:cs typeface="Arial" panose="020B0604020202020204" pitchFamily="34" charset="0"/>
+              </a:rPr>
+              <a:t>1</a:t>
+            </a:r>
+            <a:r>
+              <a:rPr lang="en-US" sz="2800" dirty="0">
+                <a:latin typeface="Arial" panose="020B0604020202020204" pitchFamily="34" charset="0"/>
+                <a:cs typeface="Arial" panose="020B0604020202020204" pitchFamily="34" charset="0"/>
+              </a:rPr>
+              <a:t> eV-10</a:t>
+            </a:r>
+            <a:r>
+              <a:rPr lang="en-US" sz="2800" baseline="30000" dirty="0">
+                <a:latin typeface="Arial" panose="020B0604020202020204" pitchFamily="34" charset="0"/>
+                <a:cs typeface="Arial" panose="020B0604020202020204" pitchFamily="34" charset="0"/>
+              </a:rPr>
+              <a:t>2</a:t>
+            </a:r>
+            <a:r>
+              <a:rPr lang="en-US" sz="2800" dirty="0">
+                <a:latin typeface="Arial" panose="020B0604020202020204" pitchFamily="34" charset="0"/>
+                <a:cs typeface="Arial" panose="020B0604020202020204" pitchFamily="34" charset="0"/>
+              </a:rPr>
+              <a:t> eV), and </a:t>
+            </a:r>
+            <a:r>
+              <a:rPr lang="el-GR" sz="2800" dirty="0">
+                <a:latin typeface="Arial" panose="020B0604020202020204" pitchFamily="34" charset="0"/>
+                <a:cs typeface="Arial" panose="020B0604020202020204" pitchFamily="34" charset="0"/>
+              </a:rPr>
+              <a:t>α</a:t>
+            </a:r>
+            <a:r>
+              <a:rPr lang="en-US" sz="2800" baseline="-25000" dirty="0">
+                <a:latin typeface="Arial" panose="020B0604020202020204" pitchFamily="34" charset="0"/>
+                <a:cs typeface="Arial" panose="020B0604020202020204" pitchFamily="34" charset="0"/>
+              </a:rPr>
+              <a:t>ox</a:t>
+            </a:r>
+            <a:r>
+              <a:rPr lang="en-US" sz="2800" dirty="0">
+                <a:latin typeface="Arial" panose="020B0604020202020204" pitchFamily="34" charset="0"/>
+                <a:cs typeface="Arial" panose="020B0604020202020204" pitchFamily="34" charset="0"/>
+              </a:rPr>
+              <a:t> is the ratio of x-rays to optical light.</a:t>
+            </a:r>
+          </a:p>
+          <a:p>
+            <a:pPr marL="457200" indent="-457200">
+              <a:buFont typeface="Arial" panose="020B0604020202020204" pitchFamily="34" charset="0"/>
+              <a:buChar char="•"/>
+            </a:pPr>
+            <a:r>
+              <a:rPr lang="en-US" sz="2800" dirty="0">
+                <a:latin typeface="Arial" panose="020B0604020202020204" pitchFamily="34" charset="0"/>
+                <a:cs typeface="Arial" panose="020B0604020202020204" pitchFamily="34" charset="0"/>
+              </a:rPr>
+              <a:t>Research has shown that a correlation exists between </a:t>
+            </a:r>
+            <a:r>
+              <a:rPr lang="el-GR" sz="2800" dirty="0">
+                <a:latin typeface="Arial" panose="020B0604020202020204" pitchFamily="34" charset="0"/>
+                <a:cs typeface="Arial" panose="020B0604020202020204" pitchFamily="34" charset="0"/>
+              </a:rPr>
+              <a:t>α</a:t>
+            </a:r>
+            <a:r>
+              <a:rPr lang="en-US" sz="2800" baseline="-25000" dirty="0">
+                <a:latin typeface="Arial" panose="020B0604020202020204" pitchFamily="34" charset="0"/>
+                <a:cs typeface="Arial" panose="020B0604020202020204" pitchFamily="34" charset="0"/>
+              </a:rPr>
+              <a:t>x</a:t>
+            </a:r>
+            <a:r>
+              <a:rPr lang="en-US" sz="2800" dirty="0">
+                <a:latin typeface="Arial" panose="020B0604020202020204" pitchFamily="34" charset="0"/>
+                <a:cs typeface="Arial" panose="020B0604020202020204" pitchFamily="34" charset="0"/>
+              </a:rPr>
+              <a:t> and </a:t>
+            </a:r>
+            <a:r>
+              <a:rPr lang="el-GR" sz="2800" dirty="0">
+                <a:latin typeface="Arial" panose="020B0604020202020204" pitchFamily="34" charset="0"/>
+                <a:cs typeface="Arial" panose="020B0604020202020204" pitchFamily="34" charset="0"/>
+              </a:rPr>
+              <a:t>α</a:t>
+            </a:r>
+            <a:r>
+              <a:rPr lang="en-US" sz="2800" baseline="-25000" dirty="0" err="1">
+                <a:latin typeface="Arial" panose="020B0604020202020204" pitchFamily="34" charset="0"/>
+                <a:cs typeface="Arial" panose="020B0604020202020204" pitchFamily="34" charset="0"/>
+              </a:rPr>
+              <a:t>uv</a:t>
+            </a:r>
+            <a:r>
+              <a:rPr lang="en-US" sz="2800" dirty="0">
+                <a:latin typeface="Arial" panose="020B0604020202020204" pitchFamily="34" charset="0"/>
+                <a:cs typeface="Arial" panose="020B0604020202020204" pitchFamily="34" charset="0"/>
+              </a:rPr>
+              <a:t> and between </a:t>
+            </a:r>
+            <a:r>
+              <a:rPr lang="el-GR" sz="2800" dirty="0">
+                <a:latin typeface="Arial" panose="020B0604020202020204" pitchFamily="34" charset="0"/>
+                <a:cs typeface="Arial" panose="020B0604020202020204" pitchFamily="34" charset="0"/>
+              </a:rPr>
+              <a:t>α</a:t>
+            </a:r>
+            <a:r>
+              <a:rPr lang="en-US" sz="2800" baseline="-25000" dirty="0">
+                <a:latin typeface="Arial" panose="020B0604020202020204" pitchFamily="34" charset="0"/>
+                <a:cs typeface="Arial" panose="020B0604020202020204" pitchFamily="34" charset="0"/>
+              </a:rPr>
+              <a:t>x</a:t>
+            </a:r>
+            <a:r>
+              <a:rPr lang="en-US" sz="2800" dirty="0">
+                <a:latin typeface="Arial" panose="020B0604020202020204" pitchFamily="34" charset="0"/>
+                <a:cs typeface="Arial" panose="020B0604020202020204" pitchFamily="34" charset="0"/>
+              </a:rPr>
+              <a:t> and </a:t>
+            </a:r>
+            <a:r>
+              <a:rPr lang="el-GR" sz="2800" dirty="0">
+                <a:latin typeface="Arial" panose="020B0604020202020204" pitchFamily="34" charset="0"/>
+                <a:cs typeface="Arial" panose="020B0604020202020204" pitchFamily="34" charset="0"/>
+              </a:rPr>
+              <a:t>α</a:t>
+            </a:r>
+            <a:r>
+              <a:rPr lang="en-US" sz="2800" baseline="-25000" dirty="0">
+                <a:latin typeface="Arial" panose="020B0604020202020204" pitchFamily="34" charset="0"/>
+                <a:cs typeface="Arial" panose="020B0604020202020204" pitchFamily="34" charset="0"/>
+              </a:rPr>
+              <a:t>ox</a:t>
+            </a:r>
+            <a:r>
+              <a:rPr lang="en-US" sz="2800" baseline="30000" dirty="0">
+                <a:latin typeface="Arial" panose="020B0604020202020204" pitchFamily="34" charset="0"/>
+                <a:cs typeface="Arial" panose="020B0604020202020204" pitchFamily="34" charset="0"/>
+              </a:rPr>
+              <a:t>.</a:t>
+            </a:r>
+            <a:r>
+              <a:rPr lang="en-US" sz="2800" dirty="0">
+                <a:latin typeface="Arial" panose="020B0604020202020204" pitchFamily="34" charset="0"/>
+                <a:cs typeface="Arial" panose="020B0604020202020204" pitchFamily="34" charset="0"/>
+              </a:rPr>
+              <a:t> </a:t>
+            </a:r>
+          </a:p>
+          <a:p>
+            <a:pPr marL="457200" indent="-457200">
+              <a:buFont typeface="Arial" panose="020B0604020202020204" pitchFamily="34" charset="0"/>
+              <a:buChar char="•"/>
+            </a:pPr>
+            <a:r>
+              <a:rPr lang="en-US" sz="2800" dirty="0">
+                <a:latin typeface="Arial" panose="020B0604020202020204" pitchFamily="34" charset="0"/>
+                <a:cs typeface="Arial" panose="020B0604020202020204" pitchFamily="34" charset="0"/>
+              </a:rPr>
+              <a:t>This leads to the question:</a:t>
+            </a:r>
+          </a:p>
+          <a:p>
+            <a:pPr lvl="1"/>
+            <a:r>
+              <a:rPr lang="en-US" sz="3200" b="1" dirty="0">
+                <a:latin typeface="Arial" panose="020B0604020202020204" pitchFamily="34" charset="0"/>
+                <a:cs typeface="Arial" panose="020B0604020202020204" pitchFamily="34" charset="0"/>
+              </a:rPr>
+              <a:t>How does constraining the spectral indices with regression models of past data affect simulations of Emission Lines of the Narrow Line Region of an Active Galactic Nuclei?</a:t>
+            </a:r>
+          </a:p>
+          <a:p>
+            <a:pPr marL="342900" indent="-342900">
+              <a:buFont typeface="Arial" panose="020B0604020202020204" pitchFamily="34" charset="0"/>
+              <a:buChar char="•"/>
+            </a:pPr>
+            <a:endParaRPr lang="en-US" sz="2400" dirty="0">
+              <a:latin typeface="Arial" panose="020B0604020202020204" pitchFamily="34" charset="0"/>
+              <a:cs typeface="Arial" panose="020B0604020202020204" pitchFamily="34" charset="0"/>
+            </a:endParaRPr>
+          </a:p>
+          <a:p>
+            <a:pPr marL="342900" indent="-342900">
+              <a:buFont typeface="Arial" panose="020B0604020202020204" pitchFamily="34" charset="0"/>
+              <a:buChar char="•"/>
+            </a:pPr>
+            <a:endParaRPr lang="en-US" sz="2400" dirty="0">
+              <a:latin typeface="Arial" panose="020B0604020202020204" pitchFamily="34" charset="0"/>
+              <a:cs typeface="Arial" panose="020B0604020202020204" pitchFamily="34" charset="0"/>
+            </a:endParaRPr>
+          </a:p>
+          <a:p>
+            <a:pPr marL="342900" indent="-342900">
+              <a:buFont typeface="Arial" panose="020B0604020202020204" pitchFamily="34" charset="0"/>
+              <a:buChar char="•"/>
+            </a:pPr>
+            <a:endParaRPr lang="en-US" sz="2400" dirty="0">
+              <a:latin typeface="Arial" panose="020B0604020202020204" pitchFamily="34" charset="0"/>
+              <a:cs typeface="Arial" panose="020B0604020202020204" pitchFamily="34" charset="0"/>
+            </a:endParaRPr>
+          </a:p>
+        </p:txBody>
+      </p:sp>
+      <p:sp>
+        <p:nvSpPr>
+          <p:cNvPr id="10" name="TextBox 9"/>
           <p:cNvSpPr txBox="1"/>
           <p:nvPr/>
         </p:nvSpPr>
         <p:spPr>
           <a:xfrm>
-            <a:off x="1057989" y="6139104"/>
-            <a:ext cx="14339454" cy="17943374"/>
+            <a:off x="16914697" y="6560999"/>
+            <a:ext cx="13033818" cy="10002738"/>
           </a:xfrm>
           <a:prstGeom prst="rect">
             <a:avLst/>
@@ -3144,533 +3580,239 @@
           </a:bodyPr>
           <a:lstStyle/>
           <a:p>
-            <a:pPr algn="ctr"/>
-            <a:r>
-              <a:rPr lang="en-US" sz="4000" b="1" u="sng" dirty="0">
-                <a:solidFill>
-                  <a:srgbClr val="73000A"/>
-                </a:solidFill>
-                <a:latin typeface="Arial" panose="020B0604020202020204" pitchFamily="34" charset="0"/>
-                <a:cs typeface="Arial" panose="020B0604020202020204" pitchFamily="34" charset="0"/>
-              </a:rPr>
-              <a:t>Background</a:t>
-            </a:r>
-          </a:p>
-          <a:p>
-            <a:pPr marL="457200" indent="-457200">
-              <a:buFont typeface="Arial" panose="020B0604020202020204" pitchFamily="34" charset="0"/>
-              <a:buChar char="•"/>
-            </a:pPr>
-            <a:r>
-              <a:rPr lang="en-US" sz="2800" dirty="0">
-                <a:latin typeface="Arial" panose="020B0604020202020204" pitchFamily="34" charset="0"/>
-                <a:cs typeface="Arial" panose="020B0604020202020204" pitchFamily="34" charset="0"/>
-              </a:rPr>
-              <a:t>Study of Active Galactic Nuclei (AGN) allows us to understand more fully the processes involved in galactic evolution. </a:t>
-            </a:r>
-          </a:p>
-          <a:p>
-            <a:pPr marL="457200" indent="-457200">
-              <a:buFont typeface="Arial" panose="020B0604020202020204" pitchFamily="34" charset="0"/>
-              <a:buChar char="•"/>
-            </a:pPr>
-            <a:r>
-              <a:rPr lang="en-US" sz="2800" dirty="0">
-                <a:latin typeface="Arial" panose="020B0604020202020204" pitchFamily="34" charset="0"/>
-                <a:cs typeface="Arial" panose="020B0604020202020204" pitchFamily="34" charset="0"/>
-              </a:rPr>
-              <a:t>Many researchers believe that some AGN are formed when two galaxies merge.</a:t>
-            </a:r>
-          </a:p>
-          <a:p>
-            <a:pPr marL="457200" indent="-457200">
-              <a:buFont typeface="Arial" panose="020B0604020202020204" pitchFamily="34" charset="0"/>
-              <a:buChar char="•"/>
-            </a:pPr>
-            <a:r>
-              <a:rPr lang="en-US" sz="2800" dirty="0">
-                <a:latin typeface="Arial" panose="020B0604020202020204" pitchFamily="34" charset="0"/>
-                <a:cs typeface="Arial" panose="020B0604020202020204" pitchFamily="34" charset="0"/>
-              </a:rPr>
-              <a:t>In about 4 billion years the Milky Way galaxy and the Andromeda galaxy will begin merging, studying AGN may tell us what will happen after the merger. </a:t>
-            </a:r>
-          </a:p>
-          <a:p>
-            <a:pPr marL="457200" indent="-457200">
-              <a:buFont typeface="Arial" panose="020B0604020202020204" pitchFamily="34" charset="0"/>
-              <a:buChar char="•"/>
-            </a:pPr>
-            <a:r>
-              <a:rPr lang="en-US" sz="2800" dirty="0">
-                <a:latin typeface="Arial" panose="020B0604020202020204" pitchFamily="34" charset="0"/>
-                <a:cs typeface="Arial" panose="020B0604020202020204" pitchFamily="34" charset="0"/>
-              </a:rPr>
-              <a:t>AGN are generally structured according to the width of the emission lines observed in each region.  </a:t>
-            </a:r>
-          </a:p>
-          <a:p>
-            <a:pPr marL="457200" indent="-457200">
-              <a:buFont typeface="Arial" panose="020B0604020202020204" pitchFamily="34" charset="0"/>
-              <a:buChar char="•"/>
-            </a:pPr>
-            <a:endParaRPr lang="en-US" sz="2800" dirty="0">
-              <a:latin typeface="Arial" panose="020B0604020202020204" pitchFamily="34" charset="0"/>
-              <a:cs typeface="Arial" panose="020B0604020202020204" pitchFamily="34" charset="0"/>
-            </a:endParaRPr>
-          </a:p>
-          <a:p>
-            <a:pPr marL="457200" indent="-457200">
-              <a:buFont typeface="Arial" panose="020B0604020202020204" pitchFamily="34" charset="0"/>
-              <a:buChar char="•"/>
-            </a:pPr>
-            <a:endParaRPr lang="en-US" sz="2800" dirty="0">
-              <a:latin typeface="Arial" panose="020B0604020202020204" pitchFamily="34" charset="0"/>
-              <a:cs typeface="Arial" panose="020B0604020202020204" pitchFamily="34" charset="0"/>
-            </a:endParaRPr>
-          </a:p>
-          <a:p>
-            <a:pPr marL="457200" indent="-457200">
-              <a:buFont typeface="Arial" panose="020B0604020202020204" pitchFamily="34" charset="0"/>
-              <a:buChar char="•"/>
-            </a:pPr>
-            <a:endParaRPr lang="en-US" sz="2800" dirty="0">
-              <a:latin typeface="Arial" panose="020B0604020202020204" pitchFamily="34" charset="0"/>
-              <a:cs typeface="Arial" panose="020B0604020202020204" pitchFamily="34" charset="0"/>
-            </a:endParaRPr>
-          </a:p>
-          <a:p>
-            <a:pPr marL="457200" indent="-457200">
-              <a:buFont typeface="Arial" panose="020B0604020202020204" pitchFamily="34" charset="0"/>
-              <a:buChar char="•"/>
-            </a:pPr>
-            <a:endParaRPr lang="en-US" sz="2800" dirty="0">
-              <a:latin typeface="Arial" panose="020B0604020202020204" pitchFamily="34" charset="0"/>
-              <a:cs typeface="Arial" panose="020B0604020202020204" pitchFamily="34" charset="0"/>
-            </a:endParaRPr>
-          </a:p>
-          <a:p>
-            <a:pPr marL="457200" indent="-457200">
-              <a:buFont typeface="Arial" panose="020B0604020202020204" pitchFamily="34" charset="0"/>
-              <a:buChar char="•"/>
-            </a:pPr>
-            <a:endParaRPr lang="en-US" sz="2800" dirty="0">
-              <a:latin typeface="Arial" panose="020B0604020202020204" pitchFamily="34" charset="0"/>
-              <a:cs typeface="Arial" panose="020B0604020202020204" pitchFamily="34" charset="0"/>
-            </a:endParaRPr>
-          </a:p>
-          <a:p>
-            <a:pPr marL="457200" indent="-457200">
-              <a:buFont typeface="Arial" panose="020B0604020202020204" pitchFamily="34" charset="0"/>
-              <a:buChar char="•"/>
-            </a:pPr>
-            <a:endParaRPr lang="en-US" sz="2800" dirty="0">
-              <a:latin typeface="Arial" panose="020B0604020202020204" pitchFamily="34" charset="0"/>
-              <a:cs typeface="Arial" panose="020B0604020202020204" pitchFamily="34" charset="0"/>
-            </a:endParaRPr>
-          </a:p>
-          <a:p>
-            <a:pPr marL="457200" indent="-457200">
-              <a:buFont typeface="Arial" panose="020B0604020202020204" pitchFamily="34" charset="0"/>
-              <a:buChar char="•"/>
-            </a:pPr>
-            <a:endParaRPr lang="en-US" sz="2800" dirty="0">
-              <a:latin typeface="Arial" panose="020B0604020202020204" pitchFamily="34" charset="0"/>
-              <a:cs typeface="Arial" panose="020B0604020202020204" pitchFamily="34" charset="0"/>
-            </a:endParaRPr>
-          </a:p>
-          <a:p>
-            <a:pPr marL="457200" indent="-457200">
-              <a:buFont typeface="Arial" panose="020B0604020202020204" pitchFamily="34" charset="0"/>
-              <a:buChar char="•"/>
-            </a:pPr>
-            <a:endParaRPr lang="en-US" sz="2800" dirty="0">
-              <a:latin typeface="Arial" panose="020B0604020202020204" pitchFamily="34" charset="0"/>
-              <a:cs typeface="Arial" panose="020B0604020202020204" pitchFamily="34" charset="0"/>
-            </a:endParaRPr>
-          </a:p>
-          <a:p>
-            <a:pPr marL="457200" indent="-457200">
-              <a:buFont typeface="Arial" panose="020B0604020202020204" pitchFamily="34" charset="0"/>
-              <a:buChar char="•"/>
-            </a:pPr>
-            <a:endParaRPr lang="en-US" sz="2800" dirty="0">
-              <a:latin typeface="Arial" panose="020B0604020202020204" pitchFamily="34" charset="0"/>
-              <a:cs typeface="Arial" panose="020B0604020202020204" pitchFamily="34" charset="0"/>
-            </a:endParaRPr>
-          </a:p>
-          <a:p>
-            <a:pPr marL="457200" indent="-457200">
-              <a:buFont typeface="Arial" panose="020B0604020202020204" pitchFamily="34" charset="0"/>
-              <a:buChar char="•"/>
-            </a:pPr>
-            <a:endParaRPr lang="en-US" sz="2800" dirty="0">
-              <a:latin typeface="Arial" panose="020B0604020202020204" pitchFamily="34" charset="0"/>
-              <a:cs typeface="Arial" panose="020B0604020202020204" pitchFamily="34" charset="0"/>
-            </a:endParaRPr>
-          </a:p>
-          <a:p>
-            <a:pPr marL="457200" indent="-457200">
-              <a:buFont typeface="Arial" panose="020B0604020202020204" pitchFamily="34" charset="0"/>
-              <a:buChar char="•"/>
-            </a:pPr>
-            <a:endParaRPr lang="en-US" sz="2800" dirty="0">
-              <a:latin typeface="Arial" panose="020B0604020202020204" pitchFamily="34" charset="0"/>
-              <a:cs typeface="Arial" panose="020B0604020202020204" pitchFamily="34" charset="0"/>
-            </a:endParaRPr>
-          </a:p>
-          <a:p>
-            <a:endParaRPr lang="en-US" sz="2800" dirty="0">
-              <a:latin typeface="Arial" panose="020B0604020202020204" pitchFamily="34" charset="0"/>
-              <a:cs typeface="Arial" panose="020B0604020202020204" pitchFamily="34" charset="0"/>
-            </a:endParaRPr>
-          </a:p>
-          <a:p>
-            <a:pPr marL="457200" indent="-457200">
-              <a:buFont typeface="Arial" panose="020B0604020202020204" pitchFamily="34" charset="0"/>
-              <a:buChar char="•"/>
-            </a:pPr>
-            <a:endParaRPr lang="en-US" sz="2800" dirty="0">
-              <a:latin typeface="Arial" panose="020B0604020202020204" pitchFamily="34" charset="0"/>
-              <a:cs typeface="Arial" panose="020B0604020202020204" pitchFamily="34" charset="0"/>
-            </a:endParaRPr>
-          </a:p>
-          <a:p>
-            <a:pPr marL="457200" indent="-457200">
-              <a:buFont typeface="Arial" panose="020B0604020202020204" pitchFamily="34" charset="0"/>
-              <a:buChar char="•"/>
-            </a:pPr>
-            <a:r>
-              <a:rPr lang="en-US" sz="2800" dirty="0">
-                <a:latin typeface="Arial" panose="020B0604020202020204" pitchFamily="34" charset="0"/>
-                <a:cs typeface="Arial" panose="020B0604020202020204" pitchFamily="34" charset="0"/>
-              </a:rPr>
-              <a:t>Lots of research on the Broad Line Region (BLR), where there are broad emission lines, but not as much on the Narrow Line Region (NLR), where there are narrow emission lines. </a:t>
-            </a:r>
-          </a:p>
-          <a:p>
-            <a:pPr marL="457200" indent="-457200">
-              <a:buFont typeface="Arial" panose="020B0604020202020204" pitchFamily="34" charset="0"/>
-              <a:buChar char="•"/>
-            </a:pPr>
-            <a:r>
-              <a:rPr lang="en-US" sz="2800" dirty="0">
-                <a:latin typeface="Arial" panose="020B0604020202020204" pitchFamily="34" charset="0"/>
-                <a:cs typeface="Arial" panose="020B0604020202020204" pitchFamily="34" charset="0"/>
-              </a:rPr>
-              <a:t>Emission lines from the ionization of different elements used to learn about the AGN, through simulations with programs such as CLOUDY and MAPPINGSIII.</a:t>
-            </a:r>
-          </a:p>
-          <a:p>
-            <a:pPr marL="457200" indent="-457200">
-              <a:buFont typeface="Arial" panose="020B0604020202020204" pitchFamily="34" charset="0"/>
-              <a:buChar char="•"/>
-            </a:pPr>
-            <a:r>
-              <a:rPr lang="en-US" sz="2800" dirty="0">
-                <a:latin typeface="Arial" panose="020B0604020202020204" pitchFamily="34" charset="0"/>
-                <a:cs typeface="Arial" panose="020B0604020202020204" pitchFamily="34" charset="0"/>
-              </a:rPr>
-              <a:t>Models of the incident radiation curve from the accretion disk in Cloudy are computed from using the spectral slope indices </a:t>
-            </a:r>
-            <a:r>
-              <a:rPr lang="el-GR" sz="2800" dirty="0">
-                <a:latin typeface="Arial" panose="020B0604020202020204" pitchFamily="34" charset="0"/>
-                <a:cs typeface="Arial" panose="020B0604020202020204" pitchFamily="34" charset="0"/>
-              </a:rPr>
-              <a:t>α</a:t>
-            </a:r>
-            <a:r>
-              <a:rPr lang="en-US" sz="2800" baseline="-25000" dirty="0">
-                <a:latin typeface="Arial" panose="020B0604020202020204" pitchFamily="34" charset="0"/>
-                <a:cs typeface="Arial" panose="020B0604020202020204" pitchFamily="34" charset="0"/>
-              </a:rPr>
-              <a:t>x</a:t>
-            </a:r>
-            <a:r>
-              <a:rPr lang="en-US" sz="2800" dirty="0">
-                <a:latin typeface="Arial" panose="020B0604020202020204" pitchFamily="34" charset="0"/>
-                <a:cs typeface="Arial" panose="020B0604020202020204" pitchFamily="34" charset="0"/>
-              </a:rPr>
-              <a:t>, corresponding to the X-ray spectrum (10</a:t>
-            </a:r>
-            <a:r>
-              <a:rPr lang="en-US" sz="2800" baseline="30000" dirty="0">
-                <a:latin typeface="Arial" panose="020B0604020202020204" pitchFamily="34" charset="0"/>
-                <a:cs typeface="Arial" panose="020B0604020202020204" pitchFamily="34" charset="0"/>
-              </a:rPr>
-              <a:t>2</a:t>
-            </a:r>
-            <a:r>
-              <a:rPr lang="en-US" sz="2800" dirty="0">
-                <a:latin typeface="Arial" panose="020B0604020202020204" pitchFamily="34" charset="0"/>
-                <a:cs typeface="Arial" panose="020B0604020202020204" pitchFamily="34" charset="0"/>
-              </a:rPr>
-              <a:t> eV- 10</a:t>
-            </a:r>
-            <a:r>
-              <a:rPr lang="en-US" sz="2800" baseline="30000" dirty="0">
-                <a:latin typeface="Arial" panose="020B0604020202020204" pitchFamily="34" charset="0"/>
-                <a:cs typeface="Arial" panose="020B0604020202020204" pitchFamily="34" charset="0"/>
-              </a:rPr>
-              <a:t>5</a:t>
-            </a:r>
-            <a:r>
-              <a:rPr lang="en-US" sz="2800" dirty="0">
-                <a:latin typeface="Arial" panose="020B0604020202020204" pitchFamily="34" charset="0"/>
-                <a:cs typeface="Arial" panose="020B0604020202020204" pitchFamily="34" charset="0"/>
-              </a:rPr>
-              <a:t> eV), </a:t>
-            </a:r>
-            <a:r>
-              <a:rPr lang="el-GR" sz="2800" dirty="0">
-                <a:latin typeface="Arial" panose="020B0604020202020204" pitchFamily="34" charset="0"/>
-                <a:cs typeface="Arial" panose="020B0604020202020204" pitchFamily="34" charset="0"/>
-              </a:rPr>
-              <a:t>α</a:t>
-            </a:r>
-            <a:r>
-              <a:rPr lang="en-US" sz="2800" baseline="-25000" dirty="0" err="1">
-                <a:latin typeface="Arial" panose="020B0604020202020204" pitchFamily="34" charset="0"/>
-                <a:cs typeface="Arial" panose="020B0604020202020204" pitchFamily="34" charset="0"/>
-              </a:rPr>
-              <a:t>uv</a:t>
-            </a:r>
-            <a:r>
-              <a:rPr lang="en-US" sz="2800" dirty="0">
-                <a:latin typeface="Arial" panose="020B0604020202020204" pitchFamily="34" charset="0"/>
-                <a:cs typeface="Arial" panose="020B0604020202020204" pitchFamily="34" charset="0"/>
-              </a:rPr>
-              <a:t> corresponding to the ultraviolet spectrum (10</a:t>
-            </a:r>
-            <a:r>
-              <a:rPr lang="en-US" sz="2800" baseline="30000" dirty="0">
-                <a:latin typeface="Arial" panose="020B0604020202020204" pitchFamily="34" charset="0"/>
-                <a:cs typeface="Arial" panose="020B0604020202020204" pitchFamily="34" charset="0"/>
-              </a:rPr>
-              <a:t>1</a:t>
-            </a:r>
-            <a:r>
-              <a:rPr lang="en-US" sz="2800" dirty="0">
-                <a:latin typeface="Arial" panose="020B0604020202020204" pitchFamily="34" charset="0"/>
-                <a:cs typeface="Arial" panose="020B0604020202020204" pitchFamily="34" charset="0"/>
-              </a:rPr>
-              <a:t> eV-10</a:t>
-            </a:r>
-            <a:r>
-              <a:rPr lang="en-US" sz="2800" baseline="30000" dirty="0">
-                <a:latin typeface="Arial" panose="020B0604020202020204" pitchFamily="34" charset="0"/>
-                <a:cs typeface="Arial" panose="020B0604020202020204" pitchFamily="34" charset="0"/>
-              </a:rPr>
-              <a:t>2</a:t>
-            </a:r>
-            <a:r>
-              <a:rPr lang="en-US" sz="2800" dirty="0">
-                <a:latin typeface="Arial" panose="020B0604020202020204" pitchFamily="34" charset="0"/>
-                <a:cs typeface="Arial" panose="020B0604020202020204" pitchFamily="34" charset="0"/>
-              </a:rPr>
-              <a:t> eV), and </a:t>
-            </a:r>
-            <a:r>
-              <a:rPr lang="el-GR" sz="2800" dirty="0">
-                <a:latin typeface="Arial" panose="020B0604020202020204" pitchFamily="34" charset="0"/>
-                <a:cs typeface="Arial" panose="020B0604020202020204" pitchFamily="34" charset="0"/>
-              </a:rPr>
-              <a:t>α</a:t>
-            </a:r>
-            <a:r>
-              <a:rPr lang="en-US" sz="2800" baseline="-25000" dirty="0">
-                <a:latin typeface="Arial" panose="020B0604020202020204" pitchFamily="34" charset="0"/>
-                <a:cs typeface="Arial" panose="020B0604020202020204" pitchFamily="34" charset="0"/>
-              </a:rPr>
-              <a:t>ox</a:t>
-            </a:r>
-            <a:r>
-              <a:rPr lang="en-US" sz="2800" dirty="0">
-                <a:latin typeface="Arial" panose="020B0604020202020204" pitchFamily="34" charset="0"/>
-                <a:cs typeface="Arial" panose="020B0604020202020204" pitchFamily="34" charset="0"/>
-              </a:rPr>
-              <a:t> is the ratio of x-rays to optical light.</a:t>
-            </a:r>
-          </a:p>
-          <a:p>
-            <a:pPr marL="457200" indent="-457200">
-              <a:buFont typeface="Arial" panose="020B0604020202020204" pitchFamily="34" charset="0"/>
-              <a:buChar char="•"/>
-            </a:pPr>
-            <a:r>
-              <a:rPr lang="en-US" sz="2800" dirty="0">
-                <a:latin typeface="Arial" panose="020B0604020202020204" pitchFamily="34" charset="0"/>
-                <a:cs typeface="Arial" panose="020B0604020202020204" pitchFamily="34" charset="0"/>
-              </a:rPr>
-              <a:t>Research has shown that a correlation exists between </a:t>
-            </a:r>
-            <a:r>
-              <a:rPr lang="el-GR" sz="2800" dirty="0">
-                <a:latin typeface="Arial" panose="020B0604020202020204" pitchFamily="34" charset="0"/>
-                <a:cs typeface="Arial" panose="020B0604020202020204" pitchFamily="34" charset="0"/>
-              </a:rPr>
-              <a:t>α</a:t>
-            </a:r>
-            <a:r>
-              <a:rPr lang="en-US" sz="2800" baseline="-25000" dirty="0">
-                <a:latin typeface="Arial" panose="020B0604020202020204" pitchFamily="34" charset="0"/>
-                <a:cs typeface="Arial" panose="020B0604020202020204" pitchFamily="34" charset="0"/>
-              </a:rPr>
-              <a:t>x</a:t>
-            </a:r>
-            <a:r>
-              <a:rPr lang="en-US" sz="2800" dirty="0">
-                <a:latin typeface="Arial" panose="020B0604020202020204" pitchFamily="34" charset="0"/>
-                <a:cs typeface="Arial" panose="020B0604020202020204" pitchFamily="34" charset="0"/>
-              </a:rPr>
-              <a:t> and </a:t>
-            </a:r>
-            <a:r>
-              <a:rPr lang="el-GR" sz="2800" dirty="0">
-                <a:latin typeface="Arial" panose="020B0604020202020204" pitchFamily="34" charset="0"/>
-                <a:cs typeface="Arial" panose="020B0604020202020204" pitchFamily="34" charset="0"/>
-              </a:rPr>
-              <a:t>α</a:t>
-            </a:r>
-            <a:r>
-              <a:rPr lang="en-US" sz="2800" baseline="-25000" dirty="0" err="1">
-                <a:latin typeface="Arial" panose="020B0604020202020204" pitchFamily="34" charset="0"/>
-                <a:cs typeface="Arial" panose="020B0604020202020204" pitchFamily="34" charset="0"/>
-              </a:rPr>
-              <a:t>uv</a:t>
-            </a:r>
-            <a:r>
-              <a:rPr lang="en-US" sz="2800" dirty="0">
-                <a:latin typeface="Arial" panose="020B0604020202020204" pitchFamily="34" charset="0"/>
-                <a:cs typeface="Arial" panose="020B0604020202020204" pitchFamily="34" charset="0"/>
-              </a:rPr>
-              <a:t> and between </a:t>
-            </a:r>
-            <a:r>
-              <a:rPr lang="el-GR" sz="2800" dirty="0">
-                <a:latin typeface="Arial" panose="020B0604020202020204" pitchFamily="34" charset="0"/>
-                <a:cs typeface="Arial" panose="020B0604020202020204" pitchFamily="34" charset="0"/>
-              </a:rPr>
-              <a:t>α</a:t>
-            </a:r>
-            <a:r>
-              <a:rPr lang="en-US" sz="2800" baseline="-25000" dirty="0">
-                <a:latin typeface="Arial" panose="020B0604020202020204" pitchFamily="34" charset="0"/>
-                <a:cs typeface="Arial" panose="020B0604020202020204" pitchFamily="34" charset="0"/>
-              </a:rPr>
-              <a:t>x</a:t>
-            </a:r>
-            <a:r>
-              <a:rPr lang="en-US" sz="2800" dirty="0">
-                <a:latin typeface="Arial" panose="020B0604020202020204" pitchFamily="34" charset="0"/>
-                <a:cs typeface="Arial" panose="020B0604020202020204" pitchFamily="34" charset="0"/>
-              </a:rPr>
-              <a:t> and </a:t>
-            </a:r>
-            <a:r>
-              <a:rPr lang="el-GR" sz="2800" dirty="0">
-                <a:latin typeface="Arial" panose="020B0604020202020204" pitchFamily="34" charset="0"/>
-                <a:cs typeface="Arial" panose="020B0604020202020204" pitchFamily="34" charset="0"/>
-              </a:rPr>
-              <a:t>α</a:t>
-            </a:r>
-            <a:r>
-              <a:rPr lang="en-US" sz="2800" baseline="-25000" dirty="0">
-                <a:latin typeface="Arial" panose="020B0604020202020204" pitchFamily="34" charset="0"/>
-                <a:cs typeface="Arial" panose="020B0604020202020204" pitchFamily="34" charset="0"/>
-              </a:rPr>
-              <a:t>ox</a:t>
-            </a:r>
-            <a:r>
-              <a:rPr lang="en-US" sz="2800" baseline="30000" dirty="0">
-                <a:latin typeface="Arial" panose="020B0604020202020204" pitchFamily="34" charset="0"/>
-                <a:cs typeface="Arial" panose="020B0604020202020204" pitchFamily="34" charset="0"/>
-              </a:rPr>
-              <a:t>.</a:t>
-            </a:r>
-            <a:r>
-              <a:rPr lang="en-US" sz="2800" dirty="0">
-                <a:latin typeface="Arial" panose="020B0604020202020204" pitchFamily="34" charset="0"/>
-                <a:cs typeface="Arial" panose="020B0604020202020204" pitchFamily="34" charset="0"/>
-              </a:rPr>
-              <a:t> </a:t>
-            </a:r>
-          </a:p>
-          <a:p>
-            <a:pPr marL="457200" indent="-457200">
-              <a:buFont typeface="Arial" panose="020B0604020202020204" pitchFamily="34" charset="0"/>
-              <a:buChar char="•"/>
-            </a:pPr>
-            <a:r>
-              <a:rPr lang="en-US" sz="2800" dirty="0">
-                <a:latin typeface="Arial" panose="020B0604020202020204" pitchFamily="34" charset="0"/>
-                <a:cs typeface="Arial" panose="020B0604020202020204" pitchFamily="34" charset="0"/>
-              </a:rPr>
-              <a:t>This leads to the question:</a:t>
-            </a:r>
-          </a:p>
-          <a:p>
-            <a:pPr marL="457200" indent="-457200">
-              <a:buFont typeface="Arial" panose="020B0604020202020204" pitchFamily="34" charset="0"/>
-              <a:buChar char="•"/>
-            </a:pPr>
-            <a:endParaRPr lang="en-US" sz="2800" dirty="0">
-              <a:latin typeface="Arial" panose="020B0604020202020204" pitchFamily="34" charset="0"/>
-              <a:cs typeface="Arial" panose="020B0604020202020204" pitchFamily="34" charset="0"/>
-            </a:endParaRPr>
-          </a:p>
-          <a:p>
-            <a:pPr lvl="1"/>
-            <a:r>
-              <a:rPr lang="en-US" sz="3200" b="1" dirty="0">
-                <a:latin typeface="Arial" panose="020B0604020202020204" pitchFamily="34" charset="0"/>
-                <a:cs typeface="Arial" panose="020B0604020202020204" pitchFamily="34" charset="0"/>
-              </a:rPr>
-              <a:t>How does constraining the spectral indices with regression models of past data affect simulations of the Spectral Energy Distribution (SED) of the Narrow Line Region of an Active Galactic Nuclei?</a:t>
-            </a:r>
-          </a:p>
-          <a:p>
-            <a:pPr marL="342900" indent="-342900">
-              <a:buFont typeface="Arial" panose="020B0604020202020204" pitchFamily="34" charset="0"/>
-              <a:buChar char="•"/>
-            </a:pPr>
-            <a:endParaRPr lang="en-US" sz="2400" dirty="0">
-              <a:latin typeface="Arial" panose="020B0604020202020204" pitchFamily="34" charset="0"/>
-              <a:cs typeface="Arial" panose="020B0604020202020204" pitchFamily="34" charset="0"/>
-            </a:endParaRPr>
-          </a:p>
-          <a:p>
-            <a:pPr marL="342900" indent="-342900">
-              <a:buFont typeface="Arial" panose="020B0604020202020204" pitchFamily="34" charset="0"/>
-              <a:buChar char="•"/>
-            </a:pPr>
-            <a:endParaRPr lang="en-US" sz="2400" dirty="0">
-              <a:latin typeface="Arial" panose="020B0604020202020204" pitchFamily="34" charset="0"/>
-              <a:cs typeface="Arial" panose="020B0604020202020204" pitchFamily="34" charset="0"/>
-            </a:endParaRPr>
-          </a:p>
-          <a:p>
-            <a:pPr marL="342900" indent="-342900">
-              <a:buFont typeface="Arial" panose="020B0604020202020204" pitchFamily="34" charset="0"/>
-              <a:buChar char="•"/>
-            </a:pPr>
-            <a:endParaRPr lang="en-US" sz="2400" dirty="0">
-              <a:latin typeface="Arial" panose="020B0604020202020204" pitchFamily="34" charset="0"/>
-              <a:cs typeface="Arial" panose="020B0604020202020204" pitchFamily="34" charset="0"/>
-            </a:endParaRPr>
-          </a:p>
-        </p:txBody>
-      </p:sp>
-      <p:sp>
-        <p:nvSpPr>
-          <p:cNvPr id="10" name="TextBox 9"/>
+            <a:pPr marL="571500" indent="-571500">
+              <a:buFont typeface="Arial" panose="020B0604020202020204" pitchFamily="34" charset="0"/>
+              <a:buChar char="•"/>
+            </a:pPr>
+            <a:endParaRPr lang="en-US" sz="2800" dirty="0">
+              <a:latin typeface="Arial" panose="020B0604020202020204" pitchFamily="34" charset="0"/>
+              <a:cs typeface="Arial" panose="020B0604020202020204" pitchFamily="34" charset="0"/>
+            </a:endParaRPr>
+          </a:p>
+          <a:p>
+            <a:pPr marL="571500" indent="-571500">
+              <a:buFont typeface="Arial" panose="020B0604020202020204" pitchFamily="34" charset="0"/>
+              <a:buChar char="•"/>
+            </a:pPr>
+            <a:endParaRPr lang="en-US" sz="2800" dirty="0">
+              <a:latin typeface="Arial" panose="020B0604020202020204" pitchFamily="34" charset="0"/>
+              <a:cs typeface="Arial" panose="020B0604020202020204" pitchFamily="34" charset="0"/>
+            </a:endParaRPr>
+          </a:p>
+          <a:p>
+            <a:pPr marL="571500" indent="-571500">
+              <a:buFont typeface="Arial" panose="020B0604020202020204" pitchFamily="34" charset="0"/>
+              <a:buChar char="•"/>
+            </a:pPr>
+            <a:endParaRPr lang="en-US" sz="2800" b="1" dirty="0">
+              <a:latin typeface="Arial" panose="020B0604020202020204" pitchFamily="34" charset="0"/>
+              <a:cs typeface="Arial" panose="020B0604020202020204" pitchFamily="34" charset="0"/>
+            </a:endParaRPr>
+          </a:p>
+          <a:p>
+            <a:pPr marL="571500" indent="-571500">
+              <a:buFont typeface="Arial" panose="020B0604020202020204" pitchFamily="34" charset="0"/>
+              <a:buChar char="•"/>
+            </a:pPr>
+            <a:endParaRPr lang="en-US" sz="2800" dirty="0">
+              <a:latin typeface="Arial" panose="020B0604020202020204" pitchFamily="34" charset="0"/>
+              <a:cs typeface="Arial" panose="020B0604020202020204" pitchFamily="34" charset="0"/>
+            </a:endParaRPr>
+          </a:p>
+          <a:p>
+            <a:pPr marL="571500" indent="-571500">
+              <a:buFont typeface="Arial" panose="020B0604020202020204" pitchFamily="34" charset="0"/>
+              <a:buChar char="•"/>
+            </a:pPr>
+            <a:endParaRPr lang="en-US" sz="2800" dirty="0">
+              <a:latin typeface="Arial" panose="020B0604020202020204" pitchFamily="34" charset="0"/>
+              <a:cs typeface="Arial" panose="020B0604020202020204" pitchFamily="34" charset="0"/>
+            </a:endParaRPr>
+          </a:p>
+          <a:p>
+            <a:pPr marL="571500" indent="-571500">
+              <a:buFont typeface="Arial" panose="020B0604020202020204" pitchFamily="34" charset="0"/>
+              <a:buChar char="•"/>
+            </a:pPr>
+            <a:endParaRPr lang="en-US" sz="2800" dirty="0">
+              <a:latin typeface="Arial" panose="020B0604020202020204" pitchFamily="34" charset="0"/>
+              <a:cs typeface="Arial" panose="020B0604020202020204" pitchFamily="34" charset="0"/>
+            </a:endParaRPr>
+          </a:p>
+          <a:p>
+            <a:pPr marL="571500" indent="-571500">
+              <a:buFont typeface="Arial" panose="020B0604020202020204" pitchFamily="34" charset="0"/>
+              <a:buChar char="•"/>
+            </a:pPr>
+            <a:endParaRPr lang="en-US" sz="2800" dirty="0">
+              <a:latin typeface="Arial" panose="020B0604020202020204" pitchFamily="34" charset="0"/>
+              <a:cs typeface="Arial" panose="020B0604020202020204" pitchFamily="34" charset="0"/>
+            </a:endParaRPr>
+          </a:p>
+          <a:p>
+            <a:pPr marL="571500" indent="-571500">
+              <a:buFont typeface="Arial" panose="020B0604020202020204" pitchFamily="34" charset="0"/>
+              <a:buChar char="•"/>
+            </a:pPr>
+            <a:endParaRPr lang="en-US" sz="2800" dirty="0">
+              <a:latin typeface="Arial" panose="020B0604020202020204" pitchFamily="34" charset="0"/>
+              <a:cs typeface="Arial" panose="020B0604020202020204" pitchFamily="34" charset="0"/>
+            </a:endParaRPr>
+          </a:p>
+          <a:p>
+            <a:pPr marL="571500" indent="-571500">
+              <a:buFont typeface="Arial" panose="020B0604020202020204" pitchFamily="34" charset="0"/>
+              <a:buChar char="•"/>
+            </a:pPr>
+            <a:endParaRPr lang="en-US" sz="2800" dirty="0">
+              <a:latin typeface="Arial" panose="020B0604020202020204" pitchFamily="34" charset="0"/>
+              <a:cs typeface="Arial" panose="020B0604020202020204" pitchFamily="34" charset="0"/>
+            </a:endParaRPr>
+          </a:p>
+          <a:p>
+            <a:pPr marL="571500" indent="-571500">
+              <a:buFont typeface="Arial" panose="020B0604020202020204" pitchFamily="34" charset="0"/>
+              <a:buChar char="•"/>
+            </a:pPr>
+            <a:endParaRPr lang="en-US" sz="2800" dirty="0">
+              <a:latin typeface="Arial" panose="020B0604020202020204" pitchFamily="34" charset="0"/>
+              <a:cs typeface="Arial" panose="020B0604020202020204" pitchFamily="34" charset="0"/>
+            </a:endParaRPr>
+          </a:p>
+          <a:p>
+            <a:pPr marL="571500" indent="-571500">
+              <a:buFont typeface="Arial" panose="020B0604020202020204" pitchFamily="34" charset="0"/>
+              <a:buChar char="•"/>
+            </a:pPr>
+            <a:endParaRPr lang="en-US" sz="2800" dirty="0">
+              <a:latin typeface="Arial" panose="020B0604020202020204" pitchFamily="34" charset="0"/>
+              <a:cs typeface="Arial" panose="020B0604020202020204" pitchFamily="34" charset="0"/>
+            </a:endParaRPr>
+          </a:p>
+          <a:p>
+            <a:pPr marL="571500" indent="-571500">
+              <a:buFont typeface="Arial" panose="020B0604020202020204" pitchFamily="34" charset="0"/>
+              <a:buChar char="•"/>
+            </a:pPr>
+            <a:endParaRPr lang="en-US" sz="2800" dirty="0">
+              <a:latin typeface="Arial" panose="020B0604020202020204" pitchFamily="34" charset="0"/>
+              <a:cs typeface="Arial" panose="020B0604020202020204" pitchFamily="34" charset="0"/>
+            </a:endParaRPr>
+          </a:p>
+          <a:p>
+            <a:pPr marL="571500" indent="-571500">
+              <a:buFont typeface="Arial" panose="020B0604020202020204" pitchFamily="34" charset="0"/>
+              <a:buChar char="•"/>
+            </a:pPr>
+            <a:endParaRPr lang="en-US" sz="2800" dirty="0">
+              <a:latin typeface="Arial" panose="020B0604020202020204" pitchFamily="34" charset="0"/>
+              <a:cs typeface="Arial" panose="020B0604020202020204" pitchFamily="34" charset="0"/>
+            </a:endParaRPr>
+          </a:p>
+          <a:p>
+            <a:pPr marL="571500" indent="-571500">
+              <a:buFont typeface="Arial" panose="020B0604020202020204" pitchFamily="34" charset="0"/>
+              <a:buChar char="•"/>
+            </a:pPr>
+            <a:endParaRPr lang="en-US" sz="2800" dirty="0">
+              <a:latin typeface="Arial" panose="020B0604020202020204" pitchFamily="34" charset="0"/>
+              <a:cs typeface="Arial" panose="020B0604020202020204" pitchFamily="34" charset="0"/>
+            </a:endParaRPr>
+          </a:p>
+          <a:p>
+            <a:pPr marL="571500" indent="-571500">
+              <a:buFont typeface="Arial" panose="020B0604020202020204" pitchFamily="34" charset="0"/>
+              <a:buChar char="•"/>
+            </a:pPr>
+            <a:endParaRPr lang="en-US" sz="2800" dirty="0">
+              <a:latin typeface="Arial" panose="020B0604020202020204" pitchFamily="34" charset="0"/>
+              <a:cs typeface="Arial" panose="020B0604020202020204" pitchFamily="34" charset="0"/>
+            </a:endParaRPr>
+          </a:p>
+          <a:p>
+            <a:pPr marL="571500" indent="-571500">
+              <a:buFont typeface="Arial" panose="020B0604020202020204" pitchFamily="34" charset="0"/>
+              <a:buChar char="•"/>
+            </a:pPr>
+            <a:endParaRPr lang="en-US" sz="2800" dirty="0">
+              <a:latin typeface="Arial" panose="020B0604020202020204" pitchFamily="34" charset="0"/>
+              <a:cs typeface="Arial" panose="020B0604020202020204" pitchFamily="34" charset="0"/>
+            </a:endParaRPr>
+          </a:p>
+          <a:p>
+            <a:pPr marL="571500" indent="-571500">
+              <a:buFont typeface="Arial" panose="020B0604020202020204" pitchFamily="34" charset="0"/>
+              <a:buChar char="•"/>
+            </a:pPr>
+            <a:endParaRPr lang="en-US" sz="2800" dirty="0">
+              <a:latin typeface="Arial" panose="020B0604020202020204" pitchFamily="34" charset="0"/>
+              <a:cs typeface="Arial" panose="020B0604020202020204" pitchFamily="34" charset="0"/>
+            </a:endParaRPr>
+          </a:p>
+          <a:p>
+            <a:pPr marL="571500" indent="-571500">
+              <a:buFont typeface="Arial" panose="020B0604020202020204" pitchFamily="34" charset="0"/>
+              <a:buChar char="•"/>
+            </a:pPr>
+            <a:endParaRPr lang="en-US" sz="2800" dirty="0">
+              <a:latin typeface="Arial" panose="020B0604020202020204" pitchFamily="34" charset="0"/>
+              <a:cs typeface="Arial" panose="020B0604020202020204" pitchFamily="34" charset="0"/>
+            </a:endParaRPr>
+          </a:p>
+          <a:p>
+            <a:pPr marL="571500" indent="-571500">
+              <a:buFont typeface="Arial" panose="020B0604020202020204" pitchFamily="34" charset="0"/>
+              <a:buChar char="•"/>
+            </a:pPr>
+            <a:endParaRPr lang="en-US" sz="2800" dirty="0">
+              <a:latin typeface="Arial" panose="020B0604020202020204" pitchFamily="34" charset="0"/>
+              <a:cs typeface="Arial" panose="020B0604020202020204" pitchFamily="34" charset="0"/>
+            </a:endParaRPr>
+          </a:p>
+          <a:p>
+            <a:endParaRPr lang="en-US" sz="2800" dirty="0">
+              <a:latin typeface="Arial" panose="020B0604020202020204" pitchFamily="34" charset="0"/>
+              <a:cs typeface="Arial" panose="020B0604020202020204" pitchFamily="34" charset="0"/>
+            </a:endParaRPr>
+          </a:p>
+          <a:p>
+            <a:endParaRPr lang="en-US" sz="2800" dirty="0">
+              <a:latin typeface="Arial" panose="020B0604020202020204" pitchFamily="34" charset="0"/>
+              <a:cs typeface="Arial" panose="020B0604020202020204" pitchFamily="34" charset="0"/>
+            </a:endParaRPr>
+          </a:p>
+          <a:p>
+            <a:pPr marL="1028700" lvl="1" indent="-571500">
+              <a:buFont typeface="Arial" panose="020B0604020202020204" pitchFamily="34" charset="0"/>
+              <a:buChar char="•"/>
+            </a:pPr>
+            <a:endParaRPr lang="en-US" sz="2800" dirty="0">
+              <a:latin typeface="Arial" panose="020B0604020202020204" pitchFamily="34" charset="0"/>
+              <a:cs typeface="Arial" panose="020B0604020202020204" pitchFamily="34" charset="0"/>
+            </a:endParaRPr>
+          </a:p>
+          <a:p>
+            <a:pPr marL="1028700" lvl="1" indent="-571500">
+              <a:buFont typeface="Arial" panose="020B0604020202020204" pitchFamily="34" charset="0"/>
+              <a:buChar char="•"/>
+            </a:pPr>
+            <a:endParaRPr lang="en-US" sz="2800" dirty="0">
+              <a:latin typeface="Arial" panose="020B0604020202020204" pitchFamily="34" charset="0"/>
+              <a:cs typeface="Arial" panose="020B0604020202020204" pitchFamily="34" charset="0"/>
+            </a:endParaRPr>
+          </a:p>
+        </p:txBody>
+      </p:sp>
+      <p:sp>
+        <p:nvSpPr>
+          <p:cNvPr id="11" name="TextBox 10"/>
           <p:cNvSpPr txBox="1"/>
           <p:nvPr/>
         </p:nvSpPr>
         <p:spPr>
           <a:xfrm>
-            <a:off x="16914697" y="6560999"/>
-            <a:ext cx="13033818" cy="16896933"/>
+            <a:off x="16777131" y="2383679"/>
+            <a:ext cx="12438222" cy="33209091"/>
           </a:xfrm>
           <a:prstGeom prst="rect">
             <a:avLst/>
@@ -3683,457 +3825,15 @@
           </a:bodyPr>
           <a:lstStyle/>
           <a:p>
-            <a:endParaRPr lang="en-US" sz="2800" dirty="0">
-              <a:latin typeface="Arial" panose="020B0604020202020204" pitchFamily="34" charset="0"/>
-              <a:cs typeface="Arial" panose="020B0604020202020204" pitchFamily="34" charset="0"/>
-            </a:endParaRPr>
-          </a:p>
-          <a:p>
-            <a:pPr marL="571500" indent="-571500">
-              <a:buFont typeface="Arial" panose="020B0604020202020204" pitchFamily="34" charset="0"/>
-              <a:buChar char="•"/>
-            </a:pPr>
-            <a:endParaRPr lang="en-US" sz="2800" dirty="0">
-              <a:latin typeface="Arial" panose="020B0604020202020204" pitchFamily="34" charset="0"/>
-              <a:cs typeface="Arial" panose="020B0604020202020204" pitchFamily="34" charset="0"/>
-            </a:endParaRPr>
-          </a:p>
-          <a:p>
-            <a:pPr marL="571500" indent="-571500">
-              <a:buFont typeface="Arial" panose="020B0604020202020204" pitchFamily="34" charset="0"/>
-              <a:buChar char="•"/>
-            </a:pPr>
-            <a:r>
-              <a:rPr lang="en-US" sz="2800" dirty="0">
-                <a:latin typeface="Arial" panose="020B0604020202020204" pitchFamily="34" charset="0"/>
-                <a:cs typeface="Arial" panose="020B0604020202020204" pitchFamily="34" charset="0"/>
-              </a:rPr>
-              <a:t>The value of </a:t>
-            </a:r>
-            <a:r>
-              <a:rPr lang="el-GR" sz="2800" dirty="0">
-                <a:latin typeface="Arial" panose="020B0604020202020204" pitchFamily="34" charset="0"/>
-                <a:cs typeface="Arial" panose="020B0604020202020204" pitchFamily="34" charset="0"/>
-              </a:rPr>
-              <a:t>α</a:t>
-            </a:r>
-            <a:r>
-              <a:rPr lang="en-US" sz="2800" baseline="-25000" dirty="0">
-                <a:latin typeface="Arial" panose="020B0604020202020204" pitchFamily="34" charset="0"/>
-                <a:cs typeface="Arial" panose="020B0604020202020204" pitchFamily="34" charset="0"/>
-              </a:rPr>
-              <a:t>x </a:t>
-            </a:r>
-            <a:r>
-              <a:rPr lang="en-US" sz="2800" dirty="0">
-                <a:latin typeface="Arial" panose="020B0604020202020204" pitchFamily="34" charset="0"/>
-                <a:cs typeface="Arial" panose="020B0604020202020204" pitchFamily="34" charset="0"/>
-              </a:rPr>
-              <a:t>is varied according to the standard deviation of the mean, which is 0.51, and the value of </a:t>
-            </a:r>
-            <a:r>
-              <a:rPr lang="el-GR" sz="2800" dirty="0">
-                <a:latin typeface="Arial" panose="020B0604020202020204" pitchFamily="34" charset="0"/>
-                <a:cs typeface="Arial" panose="020B0604020202020204" pitchFamily="34" charset="0"/>
-              </a:rPr>
-              <a:t>α</a:t>
-            </a:r>
-            <a:r>
-              <a:rPr lang="en-US" sz="2800" baseline="-25000" dirty="0" err="1">
-                <a:latin typeface="Arial" panose="020B0604020202020204" pitchFamily="34" charset="0"/>
-                <a:cs typeface="Arial" panose="020B0604020202020204" pitchFamily="34" charset="0"/>
-              </a:rPr>
-              <a:t>uv</a:t>
-            </a:r>
-            <a:r>
-              <a:rPr lang="en-US" sz="2800" dirty="0">
-                <a:latin typeface="Arial" panose="020B0604020202020204" pitchFamily="34" charset="0"/>
-                <a:cs typeface="Arial" panose="020B0604020202020204" pitchFamily="34" charset="0"/>
-              </a:rPr>
-              <a:t> is changed accordingly. </a:t>
-            </a:r>
-          </a:p>
-          <a:p>
-            <a:pPr marL="571500" indent="-571500">
-              <a:buFont typeface="Arial" panose="020B0604020202020204" pitchFamily="34" charset="0"/>
-              <a:buChar char="•"/>
-            </a:pPr>
-            <a:endParaRPr lang="en-US" sz="2800" dirty="0">
-              <a:latin typeface="Arial" panose="020B0604020202020204" pitchFamily="34" charset="0"/>
-              <a:cs typeface="Arial" panose="020B0604020202020204" pitchFamily="34" charset="0"/>
-            </a:endParaRPr>
-          </a:p>
-          <a:p>
-            <a:pPr marL="571500" indent="-571500">
-              <a:buFont typeface="Arial" panose="020B0604020202020204" pitchFamily="34" charset="0"/>
-              <a:buChar char="•"/>
-            </a:pPr>
-            <a:endParaRPr lang="en-US" sz="2800" dirty="0">
-              <a:latin typeface="Arial" panose="020B0604020202020204" pitchFamily="34" charset="0"/>
-              <a:cs typeface="Arial" panose="020B0604020202020204" pitchFamily="34" charset="0"/>
-            </a:endParaRPr>
-          </a:p>
-          <a:p>
-            <a:pPr marL="571500" indent="-571500">
-              <a:buFont typeface="Arial" panose="020B0604020202020204" pitchFamily="34" charset="0"/>
-              <a:buChar char="•"/>
-            </a:pPr>
-            <a:endParaRPr lang="en-US" sz="2800" b="1" dirty="0">
-              <a:latin typeface="Arial" panose="020B0604020202020204" pitchFamily="34" charset="0"/>
-              <a:cs typeface="Arial" panose="020B0604020202020204" pitchFamily="34" charset="0"/>
-            </a:endParaRPr>
-          </a:p>
-          <a:p>
-            <a:pPr marL="571500" indent="-571500">
-              <a:buFont typeface="Arial" panose="020B0604020202020204" pitchFamily="34" charset="0"/>
-              <a:buChar char="•"/>
-            </a:pPr>
-            <a:endParaRPr lang="en-US" sz="2800" dirty="0">
-              <a:latin typeface="Arial" panose="020B0604020202020204" pitchFamily="34" charset="0"/>
-              <a:cs typeface="Arial" panose="020B0604020202020204" pitchFamily="34" charset="0"/>
-            </a:endParaRPr>
-          </a:p>
-          <a:p>
-            <a:pPr marL="571500" indent="-571500">
-              <a:buFont typeface="Arial" panose="020B0604020202020204" pitchFamily="34" charset="0"/>
-              <a:buChar char="•"/>
-            </a:pPr>
-            <a:endParaRPr lang="en-US" sz="2800" dirty="0">
-              <a:latin typeface="Arial" panose="020B0604020202020204" pitchFamily="34" charset="0"/>
-              <a:cs typeface="Arial" panose="020B0604020202020204" pitchFamily="34" charset="0"/>
-            </a:endParaRPr>
-          </a:p>
-          <a:p>
-            <a:pPr marL="571500" indent="-571500">
-              <a:buFont typeface="Arial" panose="020B0604020202020204" pitchFamily="34" charset="0"/>
-              <a:buChar char="•"/>
-            </a:pPr>
-            <a:endParaRPr lang="en-US" sz="2800" dirty="0">
-              <a:latin typeface="Arial" panose="020B0604020202020204" pitchFamily="34" charset="0"/>
-              <a:cs typeface="Arial" panose="020B0604020202020204" pitchFamily="34" charset="0"/>
-            </a:endParaRPr>
-          </a:p>
-          <a:p>
-            <a:pPr marL="571500" indent="-571500">
-              <a:buFont typeface="Arial" panose="020B0604020202020204" pitchFamily="34" charset="0"/>
-              <a:buChar char="•"/>
-            </a:pPr>
-            <a:endParaRPr lang="en-US" sz="2800" dirty="0">
-              <a:latin typeface="Arial" panose="020B0604020202020204" pitchFamily="34" charset="0"/>
-              <a:cs typeface="Arial" panose="020B0604020202020204" pitchFamily="34" charset="0"/>
-            </a:endParaRPr>
-          </a:p>
-          <a:p>
-            <a:pPr marL="571500" indent="-571500">
-              <a:buFont typeface="Arial" panose="020B0604020202020204" pitchFamily="34" charset="0"/>
-              <a:buChar char="•"/>
-            </a:pPr>
-            <a:endParaRPr lang="en-US" sz="2800" dirty="0">
-              <a:latin typeface="Arial" panose="020B0604020202020204" pitchFamily="34" charset="0"/>
-              <a:cs typeface="Arial" panose="020B0604020202020204" pitchFamily="34" charset="0"/>
-            </a:endParaRPr>
-          </a:p>
-          <a:p>
-            <a:pPr marL="571500" indent="-571500">
-              <a:buFont typeface="Arial" panose="020B0604020202020204" pitchFamily="34" charset="0"/>
-              <a:buChar char="•"/>
-            </a:pPr>
-            <a:endParaRPr lang="en-US" sz="2800" dirty="0">
-              <a:latin typeface="Arial" panose="020B0604020202020204" pitchFamily="34" charset="0"/>
-              <a:cs typeface="Arial" panose="020B0604020202020204" pitchFamily="34" charset="0"/>
-            </a:endParaRPr>
-          </a:p>
-          <a:p>
-            <a:pPr marL="571500" indent="-571500">
-              <a:buFont typeface="Arial" panose="020B0604020202020204" pitchFamily="34" charset="0"/>
-              <a:buChar char="•"/>
-            </a:pPr>
-            <a:endParaRPr lang="en-US" sz="2800" dirty="0">
-              <a:latin typeface="Arial" panose="020B0604020202020204" pitchFamily="34" charset="0"/>
-              <a:cs typeface="Arial" panose="020B0604020202020204" pitchFamily="34" charset="0"/>
-            </a:endParaRPr>
-          </a:p>
-          <a:p>
-            <a:pPr marL="571500" indent="-571500">
-              <a:buFont typeface="Arial" panose="020B0604020202020204" pitchFamily="34" charset="0"/>
-              <a:buChar char="•"/>
-            </a:pPr>
-            <a:endParaRPr lang="en-US" sz="2800" dirty="0">
-              <a:latin typeface="Arial" panose="020B0604020202020204" pitchFamily="34" charset="0"/>
-              <a:cs typeface="Arial" panose="020B0604020202020204" pitchFamily="34" charset="0"/>
-            </a:endParaRPr>
-          </a:p>
-          <a:p>
-            <a:pPr marL="571500" indent="-571500">
-              <a:buFont typeface="Arial" panose="020B0604020202020204" pitchFamily="34" charset="0"/>
-              <a:buChar char="•"/>
-            </a:pPr>
-            <a:endParaRPr lang="en-US" sz="2800" dirty="0">
-              <a:latin typeface="Arial" panose="020B0604020202020204" pitchFamily="34" charset="0"/>
-              <a:cs typeface="Arial" panose="020B0604020202020204" pitchFamily="34" charset="0"/>
-            </a:endParaRPr>
-          </a:p>
-          <a:p>
-            <a:pPr marL="571500" indent="-571500">
-              <a:buFont typeface="Arial" panose="020B0604020202020204" pitchFamily="34" charset="0"/>
-              <a:buChar char="•"/>
-            </a:pPr>
-            <a:endParaRPr lang="en-US" sz="2800" dirty="0">
-              <a:latin typeface="Arial" panose="020B0604020202020204" pitchFamily="34" charset="0"/>
-              <a:cs typeface="Arial" panose="020B0604020202020204" pitchFamily="34" charset="0"/>
-            </a:endParaRPr>
-          </a:p>
-          <a:p>
-            <a:pPr marL="571500" indent="-571500">
-              <a:buFont typeface="Arial" panose="020B0604020202020204" pitchFamily="34" charset="0"/>
-              <a:buChar char="•"/>
-            </a:pPr>
-            <a:endParaRPr lang="en-US" sz="2800" dirty="0">
-              <a:latin typeface="Arial" panose="020B0604020202020204" pitchFamily="34" charset="0"/>
-              <a:cs typeface="Arial" panose="020B0604020202020204" pitchFamily="34" charset="0"/>
-            </a:endParaRPr>
-          </a:p>
-          <a:p>
-            <a:pPr marL="571500" indent="-571500">
-              <a:buFont typeface="Arial" panose="020B0604020202020204" pitchFamily="34" charset="0"/>
-              <a:buChar char="•"/>
-            </a:pPr>
-            <a:endParaRPr lang="en-US" sz="2800" dirty="0">
-              <a:latin typeface="Arial" panose="020B0604020202020204" pitchFamily="34" charset="0"/>
-              <a:cs typeface="Arial" panose="020B0604020202020204" pitchFamily="34" charset="0"/>
-            </a:endParaRPr>
-          </a:p>
-          <a:p>
-            <a:pPr marL="571500" indent="-571500">
-              <a:buFont typeface="Arial" panose="020B0604020202020204" pitchFamily="34" charset="0"/>
-              <a:buChar char="•"/>
-            </a:pPr>
-            <a:endParaRPr lang="en-US" sz="2800" dirty="0">
-              <a:latin typeface="Arial" panose="020B0604020202020204" pitchFamily="34" charset="0"/>
-              <a:cs typeface="Arial" panose="020B0604020202020204" pitchFamily="34" charset="0"/>
-            </a:endParaRPr>
-          </a:p>
-          <a:p>
-            <a:pPr marL="571500" indent="-571500">
-              <a:buFont typeface="Arial" panose="020B0604020202020204" pitchFamily="34" charset="0"/>
-              <a:buChar char="•"/>
-            </a:pPr>
-            <a:endParaRPr lang="en-US" sz="2800" dirty="0">
-              <a:latin typeface="Arial" panose="020B0604020202020204" pitchFamily="34" charset="0"/>
-              <a:cs typeface="Arial" panose="020B0604020202020204" pitchFamily="34" charset="0"/>
-            </a:endParaRPr>
-          </a:p>
-          <a:p>
-            <a:pPr marL="571500" indent="-571500">
-              <a:buFont typeface="Arial" panose="020B0604020202020204" pitchFamily="34" charset="0"/>
-              <a:buChar char="•"/>
-            </a:pPr>
-            <a:endParaRPr lang="en-US" sz="2800" dirty="0">
-              <a:latin typeface="Arial" panose="020B0604020202020204" pitchFamily="34" charset="0"/>
-              <a:cs typeface="Arial" panose="020B0604020202020204" pitchFamily="34" charset="0"/>
-            </a:endParaRPr>
-          </a:p>
-          <a:p>
-            <a:pPr marL="571500" indent="-571500">
-              <a:buFont typeface="Arial" panose="020B0604020202020204" pitchFamily="34" charset="0"/>
-              <a:buChar char="•"/>
-            </a:pPr>
-            <a:endParaRPr lang="en-US" sz="2800" dirty="0">
-              <a:latin typeface="Arial" panose="020B0604020202020204" pitchFamily="34" charset="0"/>
-              <a:cs typeface="Arial" panose="020B0604020202020204" pitchFamily="34" charset="0"/>
-            </a:endParaRPr>
-          </a:p>
-          <a:p>
-            <a:endParaRPr lang="en-US" sz="2800" dirty="0">
-              <a:latin typeface="Arial" panose="020B0604020202020204" pitchFamily="34" charset="0"/>
-              <a:cs typeface="Arial" panose="020B0604020202020204" pitchFamily="34" charset="0"/>
-            </a:endParaRPr>
-          </a:p>
-          <a:p>
-            <a:pPr marL="571500" indent="-571500">
-              <a:buFont typeface="Arial" panose="020B0604020202020204" pitchFamily="34" charset="0"/>
-              <a:buChar char="•"/>
-            </a:pPr>
-            <a:endParaRPr lang="en-US" sz="2800" dirty="0">
-              <a:latin typeface="Arial" panose="020B0604020202020204" pitchFamily="34" charset="0"/>
-              <a:cs typeface="Arial" panose="020B0604020202020204" pitchFamily="34" charset="0"/>
-            </a:endParaRPr>
-          </a:p>
-          <a:p>
-            <a:pPr marL="571500" indent="-571500">
-              <a:buFont typeface="Arial" panose="020B0604020202020204" pitchFamily="34" charset="0"/>
-              <a:buChar char="•"/>
-            </a:pPr>
-            <a:endParaRPr lang="en-US" sz="2800" dirty="0">
-              <a:latin typeface="Arial" panose="020B0604020202020204" pitchFamily="34" charset="0"/>
-              <a:cs typeface="Arial" panose="020B0604020202020204" pitchFamily="34" charset="0"/>
-            </a:endParaRPr>
-          </a:p>
-          <a:p>
-            <a:pPr marL="571500" indent="-571500">
-              <a:buFont typeface="Arial" panose="020B0604020202020204" pitchFamily="34" charset="0"/>
-              <a:buChar char="•"/>
-            </a:pPr>
-            <a:r>
-              <a:rPr lang="en-US" sz="2800" dirty="0">
-                <a:latin typeface="Arial" panose="020B0604020202020204" pitchFamily="34" charset="0"/>
-                <a:cs typeface="Arial" panose="020B0604020202020204" pitchFamily="34" charset="0"/>
-              </a:rPr>
-              <a:t>The lines determining the boundaries between each region are</a:t>
-            </a:r>
-          </a:p>
-          <a:p>
-            <a:pPr marL="1028700" lvl="1" indent="-571500">
-              <a:buFont typeface="Arial" panose="020B0604020202020204" pitchFamily="34" charset="0"/>
-              <a:buChar char="•"/>
-            </a:pPr>
-            <a:r>
-              <a:rPr lang="en-US" sz="2800" dirty="0">
-                <a:latin typeface="Arial" panose="020B0604020202020204" pitchFamily="34" charset="0"/>
-                <a:cs typeface="Arial" panose="020B0604020202020204" pitchFamily="34" charset="0"/>
-              </a:rPr>
-              <a:t>For [N II] vs [O III]:</a:t>
-            </a:r>
-          </a:p>
-          <a:p>
-            <a:pPr lvl="2"/>
-            <a:endParaRPr lang="en-US" sz="2800" dirty="0">
-              <a:latin typeface="Arial" panose="020B0604020202020204" pitchFamily="34" charset="0"/>
-              <a:cs typeface="Arial" panose="020B0604020202020204" pitchFamily="34" charset="0"/>
-            </a:endParaRPr>
-          </a:p>
-          <a:p>
-            <a:pPr marL="1028700" lvl="1" indent="-571500">
-              <a:buFont typeface="Arial" panose="020B0604020202020204" pitchFamily="34" charset="0"/>
-              <a:buChar char="•"/>
-            </a:pPr>
-            <a:endParaRPr lang="en-US" sz="2800" dirty="0">
-              <a:latin typeface="Arial" panose="020B0604020202020204" pitchFamily="34" charset="0"/>
-              <a:cs typeface="Arial" panose="020B0604020202020204" pitchFamily="34" charset="0"/>
-            </a:endParaRPr>
-          </a:p>
-          <a:p>
-            <a:pPr marL="1028700" lvl="1" indent="-571500">
-              <a:buFont typeface="Arial" panose="020B0604020202020204" pitchFamily="34" charset="0"/>
-              <a:buChar char="•"/>
-            </a:pPr>
-            <a:r>
-              <a:rPr lang="en-US" sz="2800" dirty="0">
-                <a:latin typeface="Arial" panose="020B0604020202020204" pitchFamily="34" charset="0"/>
-                <a:cs typeface="Arial" panose="020B0604020202020204" pitchFamily="34" charset="0"/>
-              </a:rPr>
-              <a:t>For [O I] vs [O III]:</a:t>
-            </a:r>
-          </a:p>
-          <a:p>
-            <a:pPr marL="1485900" lvl="2" indent="-571500">
-              <a:buFont typeface="Arial" panose="020B0604020202020204" pitchFamily="34" charset="0"/>
-              <a:buChar char="•"/>
-            </a:pPr>
-            <a:endParaRPr lang="en-US" sz="2800" dirty="0">
-              <a:latin typeface="Arial" panose="020B0604020202020204" pitchFamily="34" charset="0"/>
-              <a:cs typeface="Arial" panose="020B0604020202020204" pitchFamily="34" charset="0"/>
-            </a:endParaRPr>
-          </a:p>
-          <a:p>
-            <a:pPr marL="1028700" lvl="1" indent="-571500">
-              <a:buFont typeface="Arial" panose="020B0604020202020204" pitchFamily="34" charset="0"/>
-              <a:buChar char="•"/>
-            </a:pPr>
-            <a:endParaRPr lang="en-US" sz="2800" dirty="0">
-              <a:latin typeface="Arial" panose="020B0604020202020204" pitchFamily="34" charset="0"/>
-              <a:cs typeface="Arial" panose="020B0604020202020204" pitchFamily="34" charset="0"/>
-            </a:endParaRPr>
-          </a:p>
-          <a:p>
-            <a:pPr marL="1028700" lvl="1" indent="-571500">
-              <a:buFont typeface="Arial" panose="020B0604020202020204" pitchFamily="34" charset="0"/>
-              <a:buChar char="•"/>
-            </a:pPr>
-            <a:r>
-              <a:rPr lang="en-US" sz="2800" dirty="0">
-                <a:latin typeface="Arial" panose="020B0604020202020204" pitchFamily="34" charset="0"/>
-                <a:cs typeface="Arial" panose="020B0604020202020204" pitchFamily="34" charset="0"/>
-              </a:rPr>
-              <a:t>For [S II] vs [O III]</a:t>
-            </a:r>
-          </a:p>
-          <a:p>
-            <a:pPr marL="1028700" lvl="1" indent="-571500">
-              <a:buFont typeface="Arial" panose="020B0604020202020204" pitchFamily="34" charset="0"/>
-              <a:buChar char="•"/>
-            </a:pPr>
-            <a:endParaRPr lang="en-US" sz="2800" dirty="0">
-              <a:latin typeface="Arial" panose="020B0604020202020204" pitchFamily="34" charset="0"/>
-              <a:cs typeface="Arial" panose="020B0604020202020204" pitchFamily="34" charset="0"/>
-            </a:endParaRPr>
-          </a:p>
-          <a:p>
-            <a:pPr marL="1028700" lvl="1" indent="-571500">
-              <a:buFont typeface="Arial" panose="020B0604020202020204" pitchFamily="34" charset="0"/>
-              <a:buChar char="•"/>
-            </a:pPr>
-            <a:endParaRPr lang="en-US" sz="2800" dirty="0">
-              <a:latin typeface="Arial" panose="020B0604020202020204" pitchFamily="34" charset="0"/>
-              <a:cs typeface="Arial" panose="020B0604020202020204" pitchFamily="34" charset="0"/>
-            </a:endParaRPr>
-          </a:p>
-          <a:p>
-            <a:pPr marL="1028700" lvl="1" indent="-571500">
-              <a:buFont typeface="Arial" panose="020B0604020202020204" pitchFamily="34" charset="0"/>
-              <a:buChar char="•"/>
-            </a:pPr>
-            <a:r>
-              <a:rPr lang="en-US" sz="2800" dirty="0">
-                <a:latin typeface="Arial" panose="020B0604020202020204" pitchFamily="34" charset="0"/>
-                <a:cs typeface="Arial" panose="020B0604020202020204" pitchFamily="34" charset="0"/>
-              </a:rPr>
-              <a:t>For [O II] vs [O III]</a:t>
-            </a:r>
-          </a:p>
-          <a:p>
-            <a:pPr marL="1028700" lvl="1" indent="-571500">
-              <a:buFont typeface="Arial" panose="020B0604020202020204" pitchFamily="34" charset="0"/>
-              <a:buChar char="•"/>
-            </a:pPr>
-            <a:endParaRPr lang="en-US" sz="2800" dirty="0">
-              <a:latin typeface="Arial" panose="020B0604020202020204" pitchFamily="34" charset="0"/>
-              <a:cs typeface="Arial" panose="020B0604020202020204" pitchFamily="34" charset="0"/>
-            </a:endParaRPr>
-          </a:p>
-          <a:p>
-            <a:pPr marL="1028700" lvl="1" indent="-571500">
-              <a:buFont typeface="Arial" panose="020B0604020202020204" pitchFamily="34" charset="0"/>
-              <a:buChar char="•"/>
-            </a:pPr>
-            <a:endParaRPr lang="en-US" sz="2800" dirty="0">
-              <a:latin typeface="Arial" panose="020B0604020202020204" pitchFamily="34" charset="0"/>
-              <a:cs typeface="Arial" panose="020B0604020202020204" pitchFamily="34" charset="0"/>
-            </a:endParaRPr>
-          </a:p>
-        </p:txBody>
-      </p:sp>
-      <p:sp>
-        <p:nvSpPr>
-          <p:cNvPr id="11" name="TextBox 10"/>
-          <p:cNvSpPr txBox="1"/>
-          <p:nvPr/>
-        </p:nvSpPr>
-        <p:spPr>
-          <a:xfrm>
-            <a:off x="17144924" y="8908158"/>
-            <a:ext cx="12438222" cy="3724096"/>
-          </a:xfrm>
-          <a:prstGeom prst="rect">
-            <a:avLst/>
-          </a:prstGeom>
-          <a:noFill/>
-        </p:spPr>
-        <p:txBody>
-          <a:bodyPr wrap="square" rtlCol="0">
-            <a:spAutoFit/>
-          </a:bodyPr>
-          <a:lstStyle/>
+            <a:pPr algn="ctr"/>
+            <a:endParaRPr lang="en-US" sz="4000" b="1" u="sng" dirty="0">
+              <a:solidFill>
+                <a:srgbClr val="73000A"/>
+              </a:solidFill>
+              <a:latin typeface="Arial" panose="020B0604020202020204" pitchFamily="34" charset="0"/>
+              <a:cs typeface="Arial" panose="020B0604020202020204" pitchFamily="34" charset="0"/>
+            </a:endParaRPr>
+          </a:p>
           <a:p>
             <a:pPr algn="ctr"/>
             <a:r>
@@ -4157,7 +3857,7 @@
                 <a:latin typeface="Arial" panose="020B0604020202020204" pitchFamily="34" charset="0"/>
                 <a:cs typeface="Arial" panose="020B0604020202020204" pitchFamily="34" charset="0"/>
               </a:rPr>
-              <a:t>Top three plots are Baldwin-Phillip-</a:t>
+              <a:t>The first plot is known as the Baldwin-Phillip-</a:t>
             </a:r>
             <a:r>
               <a:rPr lang="en-US" sz="2800" dirty="0" err="1">
@@ -4171,7 +3871,7 @@
                 <a:latin typeface="Arial" panose="020B0604020202020204" pitchFamily="34" charset="0"/>
                 <a:cs typeface="Arial" panose="020B0604020202020204" pitchFamily="34" charset="0"/>
               </a:rPr>
-              <a:t> (BPT) diagrams that are used to determine the excitation mechanism of the cloud. </a:t>
+              <a:t> (BPT) diagram. </a:t>
             </a:r>
           </a:p>
           <a:p>
@@ -4184,6 +3884,60 @@
                 <a:latin typeface="Arial" panose="020B0604020202020204" pitchFamily="34" charset="0"/>
                 <a:cs typeface="Arial" panose="020B0604020202020204" pitchFamily="34" charset="0"/>
               </a:rPr>
+              <a:t>The top three plots were introduced in </a:t>
+            </a:r>
+            <a:r>
+              <a:rPr lang="en-US" sz="2800" dirty="0" err="1">
+                <a:latin typeface="Arial" panose="020B0604020202020204" pitchFamily="34" charset="0"/>
+                <a:cs typeface="Arial" panose="020B0604020202020204" pitchFamily="34" charset="0"/>
+              </a:rPr>
+              <a:t>Osterbrock</a:t>
+            </a:r>
+            <a:r>
+              <a:rPr lang="en-US" sz="2800" dirty="0">
+                <a:latin typeface="Arial" panose="020B0604020202020204" pitchFamily="34" charset="0"/>
+                <a:cs typeface="Arial" panose="020B0604020202020204" pitchFamily="34" charset="0"/>
+              </a:rPr>
+              <a:t> &amp; </a:t>
+            </a:r>
+            <a:r>
+              <a:rPr lang="en-US" sz="2800" dirty="0" err="1">
+                <a:latin typeface="Arial" panose="020B0604020202020204" pitchFamily="34" charset="0"/>
+                <a:cs typeface="Arial" panose="020B0604020202020204" pitchFamily="34" charset="0"/>
+              </a:rPr>
+              <a:t>Veilleux</a:t>
+            </a:r>
+            <a:r>
+              <a:rPr lang="en-US" sz="2800" dirty="0">
+                <a:latin typeface="Arial" panose="020B0604020202020204" pitchFamily="34" charset="0"/>
+                <a:cs typeface="Arial" panose="020B0604020202020204" pitchFamily="34" charset="0"/>
+              </a:rPr>
+              <a:t> 1983 to categorize galaxies by atomic excitation mechanism. </a:t>
+            </a:r>
+          </a:p>
+          <a:p>
+            <a:pPr marL="571500" indent="-571500">
+              <a:buFont typeface="Arial" panose="020B0604020202020204" pitchFamily="34" charset="0"/>
+              <a:buChar char="•"/>
+            </a:pPr>
+            <a:r>
+              <a:rPr lang="en-US" sz="2800" dirty="0">
+                <a:latin typeface="Arial" panose="020B0604020202020204" pitchFamily="34" charset="0"/>
+                <a:cs typeface="Arial" panose="020B0604020202020204" pitchFamily="34" charset="0"/>
+              </a:rPr>
+              <a:t>Excitation mechanism diagnostics are empirically derived.</a:t>
+            </a:r>
+          </a:p>
+          <a:p>
+            <a:pPr marL="571500" indent="-571500">
+              <a:buFont typeface="Arial" panose="020B0604020202020204" pitchFamily="34" charset="0"/>
+              <a:buChar char="•"/>
+            </a:pPr>
+            <a:r>
+              <a:rPr lang="en-US" sz="2800" dirty="0">
+                <a:latin typeface="Arial" panose="020B0604020202020204" pitchFamily="34" charset="0"/>
+                <a:cs typeface="Arial" panose="020B0604020202020204" pitchFamily="34" charset="0"/>
+              </a:rPr>
               <a:t>Bottom three plots come from </a:t>
             </a:r>
             <a:r>
@@ -4228,6 +3982,743 @@
               </a:rPr>
               <a:t> et al. 2006 respectively. </a:t>
             </a:r>
+          </a:p>
+          <a:p>
+            <a:pPr marL="571500" indent="-571500">
+              <a:buFont typeface="Arial" panose="020B0604020202020204" pitchFamily="34" charset="0"/>
+              <a:buChar char="•"/>
+            </a:pPr>
+            <a:r>
+              <a:rPr lang="en-US" sz="2800" dirty="0">
+                <a:latin typeface="Arial" panose="020B0604020202020204" pitchFamily="34" charset="0"/>
+                <a:cs typeface="Arial" panose="020B0604020202020204" pitchFamily="34" charset="0"/>
+              </a:rPr>
+              <a:t>Red indicates that the galaxy is a </a:t>
+            </a:r>
+            <a:r>
+              <a:rPr lang="en-US" sz="2800" dirty="0" err="1">
+                <a:latin typeface="Arial" panose="020B0604020202020204" pitchFamily="34" charset="0"/>
+                <a:cs typeface="Arial" panose="020B0604020202020204" pitchFamily="34" charset="0"/>
+              </a:rPr>
+              <a:t>Seyfert</a:t>
+            </a:r>
+            <a:r>
+              <a:rPr lang="en-US" sz="2800" dirty="0">
+                <a:latin typeface="Arial" panose="020B0604020202020204" pitchFamily="34" charset="0"/>
+                <a:cs typeface="Arial" panose="020B0604020202020204" pitchFamily="34" charset="0"/>
+              </a:rPr>
+              <a:t>, while blue indicates star-forming galaxies, composite galaxies, and Low Ionization Nuclear Emission Line Region galaxies.  </a:t>
+            </a:r>
+          </a:p>
+          <a:p>
+            <a:pPr marL="571500" indent="-571500">
+              <a:buFont typeface="Arial" panose="020B0604020202020204" pitchFamily="34" charset="0"/>
+              <a:buChar char="•"/>
+            </a:pPr>
+            <a:r>
+              <a:rPr lang="en-US" sz="2800" dirty="0">
+                <a:latin typeface="Arial" panose="020B0604020202020204" pitchFamily="34" charset="0"/>
+                <a:cs typeface="Arial" panose="020B0604020202020204" pitchFamily="34" charset="0"/>
+              </a:rPr>
+              <a:t>Galaxies are separated based on the equations that set the boundary lines. </a:t>
+            </a:r>
+          </a:p>
+          <a:p>
+            <a:pPr marL="571500" indent="-571500">
+              <a:buFont typeface="Arial" panose="020B0604020202020204" pitchFamily="34" charset="0"/>
+              <a:buChar char="•"/>
+            </a:pPr>
+            <a:endParaRPr lang="en-US" sz="2800" dirty="0">
+              <a:latin typeface="Arial" panose="020B0604020202020204" pitchFamily="34" charset="0"/>
+              <a:cs typeface="Arial" panose="020B0604020202020204" pitchFamily="34" charset="0"/>
+            </a:endParaRPr>
+          </a:p>
+          <a:p>
+            <a:pPr marL="571500" indent="-571500">
+              <a:buFont typeface="Arial" panose="020B0604020202020204" pitchFamily="34" charset="0"/>
+              <a:buChar char="•"/>
+            </a:pPr>
+            <a:endParaRPr lang="en-US" sz="2800" dirty="0">
+              <a:latin typeface="Arial" panose="020B0604020202020204" pitchFamily="34" charset="0"/>
+              <a:cs typeface="Arial" panose="020B0604020202020204" pitchFamily="34" charset="0"/>
+            </a:endParaRPr>
+          </a:p>
+          <a:p>
+            <a:pPr marL="571500" indent="-571500">
+              <a:buFont typeface="Arial" panose="020B0604020202020204" pitchFamily="34" charset="0"/>
+              <a:buChar char="•"/>
+            </a:pPr>
+            <a:endParaRPr lang="en-US" sz="2800" dirty="0">
+              <a:latin typeface="Arial" panose="020B0604020202020204" pitchFamily="34" charset="0"/>
+              <a:cs typeface="Arial" panose="020B0604020202020204" pitchFamily="34" charset="0"/>
+            </a:endParaRPr>
+          </a:p>
+          <a:p>
+            <a:pPr marL="571500" indent="-571500">
+              <a:buFont typeface="Arial" panose="020B0604020202020204" pitchFamily="34" charset="0"/>
+              <a:buChar char="•"/>
+            </a:pPr>
+            <a:endParaRPr lang="en-US" sz="2800" dirty="0">
+              <a:latin typeface="Arial" panose="020B0604020202020204" pitchFamily="34" charset="0"/>
+              <a:cs typeface="Arial" panose="020B0604020202020204" pitchFamily="34" charset="0"/>
+            </a:endParaRPr>
+          </a:p>
+          <a:p>
+            <a:pPr marL="571500" indent="-571500">
+              <a:buFont typeface="Arial" panose="020B0604020202020204" pitchFamily="34" charset="0"/>
+              <a:buChar char="•"/>
+            </a:pPr>
+            <a:endParaRPr lang="en-US" sz="2800" dirty="0">
+              <a:latin typeface="Arial" panose="020B0604020202020204" pitchFamily="34" charset="0"/>
+              <a:cs typeface="Arial" panose="020B0604020202020204" pitchFamily="34" charset="0"/>
+            </a:endParaRPr>
+          </a:p>
+          <a:p>
+            <a:pPr marL="571500" indent="-571500">
+              <a:buFont typeface="Arial" panose="020B0604020202020204" pitchFamily="34" charset="0"/>
+              <a:buChar char="•"/>
+            </a:pPr>
+            <a:endParaRPr lang="en-US" sz="2800" dirty="0">
+              <a:latin typeface="Arial" panose="020B0604020202020204" pitchFamily="34" charset="0"/>
+              <a:cs typeface="Arial" panose="020B0604020202020204" pitchFamily="34" charset="0"/>
+            </a:endParaRPr>
+          </a:p>
+          <a:p>
+            <a:pPr marL="571500" indent="-571500">
+              <a:buFont typeface="Arial" panose="020B0604020202020204" pitchFamily="34" charset="0"/>
+              <a:buChar char="•"/>
+            </a:pPr>
+            <a:endParaRPr lang="en-US" sz="2800" dirty="0">
+              <a:latin typeface="Arial" panose="020B0604020202020204" pitchFamily="34" charset="0"/>
+              <a:cs typeface="Arial" panose="020B0604020202020204" pitchFamily="34" charset="0"/>
+            </a:endParaRPr>
+          </a:p>
+          <a:p>
+            <a:pPr marL="571500" indent="-571500">
+              <a:buFont typeface="Arial" panose="020B0604020202020204" pitchFamily="34" charset="0"/>
+              <a:buChar char="•"/>
+            </a:pPr>
+            <a:endParaRPr lang="en-US" sz="2800" dirty="0">
+              <a:latin typeface="Arial" panose="020B0604020202020204" pitchFamily="34" charset="0"/>
+              <a:cs typeface="Arial" panose="020B0604020202020204" pitchFamily="34" charset="0"/>
+            </a:endParaRPr>
+          </a:p>
+          <a:p>
+            <a:pPr marL="571500" indent="-571500">
+              <a:buFont typeface="Arial" panose="020B0604020202020204" pitchFamily="34" charset="0"/>
+              <a:buChar char="•"/>
+            </a:pPr>
+            <a:endParaRPr lang="en-US" sz="2800" dirty="0">
+              <a:latin typeface="Arial" panose="020B0604020202020204" pitchFamily="34" charset="0"/>
+              <a:cs typeface="Arial" panose="020B0604020202020204" pitchFamily="34" charset="0"/>
+            </a:endParaRPr>
+          </a:p>
+          <a:p>
+            <a:pPr marL="571500" indent="-571500">
+              <a:buFont typeface="Arial" panose="020B0604020202020204" pitchFamily="34" charset="0"/>
+              <a:buChar char="•"/>
+            </a:pPr>
+            <a:endParaRPr lang="en-US" sz="2800" dirty="0">
+              <a:latin typeface="Arial" panose="020B0604020202020204" pitchFamily="34" charset="0"/>
+              <a:cs typeface="Arial" panose="020B0604020202020204" pitchFamily="34" charset="0"/>
+            </a:endParaRPr>
+          </a:p>
+          <a:p>
+            <a:pPr marL="571500" indent="-571500">
+              <a:buFont typeface="Arial" panose="020B0604020202020204" pitchFamily="34" charset="0"/>
+              <a:buChar char="•"/>
+            </a:pPr>
+            <a:endParaRPr lang="en-US" sz="2800" dirty="0">
+              <a:latin typeface="Arial" panose="020B0604020202020204" pitchFamily="34" charset="0"/>
+              <a:cs typeface="Arial" panose="020B0604020202020204" pitchFamily="34" charset="0"/>
+            </a:endParaRPr>
+          </a:p>
+          <a:p>
+            <a:pPr marL="571500" indent="-571500">
+              <a:buFont typeface="Arial" panose="020B0604020202020204" pitchFamily="34" charset="0"/>
+              <a:buChar char="•"/>
+            </a:pPr>
+            <a:endParaRPr lang="en-US" sz="2800" dirty="0">
+              <a:latin typeface="Arial" panose="020B0604020202020204" pitchFamily="34" charset="0"/>
+              <a:cs typeface="Arial" panose="020B0604020202020204" pitchFamily="34" charset="0"/>
+            </a:endParaRPr>
+          </a:p>
+          <a:p>
+            <a:pPr marL="571500" indent="-571500">
+              <a:buFont typeface="Arial" panose="020B0604020202020204" pitchFamily="34" charset="0"/>
+              <a:buChar char="•"/>
+            </a:pPr>
+            <a:endParaRPr lang="en-US" sz="2800" dirty="0">
+              <a:latin typeface="Arial" panose="020B0604020202020204" pitchFamily="34" charset="0"/>
+              <a:cs typeface="Arial" panose="020B0604020202020204" pitchFamily="34" charset="0"/>
+            </a:endParaRPr>
+          </a:p>
+          <a:p>
+            <a:pPr marL="571500" indent="-571500">
+              <a:buFont typeface="Arial" panose="020B0604020202020204" pitchFamily="34" charset="0"/>
+              <a:buChar char="•"/>
+            </a:pPr>
+            <a:endParaRPr lang="en-US" sz="2800" dirty="0">
+              <a:latin typeface="Arial" panose="020B0604020202020204" pitchFamily="34" charset="0"/>
+              <a:cs typeface="Arial" panose="020B0604020202020204" pitchFamily="34" charset="0"/>
+            </a:endParaRPr>
+          </a:p>
+          <a:p>
+            <a:pPr marL="571500" indent="-571500">
+              <a:buFont typeface="Arial" panose="020B0604020202020204" pitchFamily="34" charset="0"/>
+              <a:buChar char="•"/>
+            </a:pPr>
+            <a:endParaRPr lang="en-US" sz="2800" dirty="0">
+              <a:latin typeface="Arial" panose="020B0604020202020204" pitchFamily="34" charset="0"/>
+              <a:cs typeface="Arial" panose="020B0604020202020204" pitchFamily="34" charset="0"/>
+            </a:endParaRPr>
+          </a:p>
+          <a:p>
+            <a:endParaRPr lang="en-US" sz="2800" dirty="0">
+              <a:latin typeface="Arial" panose="020B0604020202020204" pitchFamily="34" charset="0"/>
+              <a:cs typeface="Arial" panose="020B0604020202020204" pitchFamily="34" charset="0"/>
+            </a:endParaRPr>
+          </a:p>
+          <a:p>
+            <a:pPr marL="571500" indent="-571500">
+              <a:buFont typeface="Arial" panose="020B0604020202020204" pitchFamily="34" charset="0"/>
+              <a:buChar char="•"/>
+            </a:pPr>
+            <a:r>
+              <a:rPr lang="en-US" sz="2800" dirty="0">
+                <a:latin typeface="Arial" panose="020B0604020202020204" pitchFamily="34" charset="0"/>
+                <a:cs typeface="Arial" panose="020B0604020202020204" pitchFamily="34" charset="0"/>
+              </a:rPr>
+              <a:t>The black lines act as boundaries between the type of galaxy.  </a:t>
+            </a:r>
+          </a:p>
+          <a:p>
+            <a:pPr marL="1028700" lvl="1" indent="-571500">
+              <a:buFont typeface="Arial" panose="020B0604020202020204" pitchFamily="34" charset="0"/>
+              <a:buChar char="•"/>
+            </a:pPr>
+            <a:r>
+              <a:rPr lang="en-US" sz="2800" dirty="0">
+                <a:latin typeface="Arial" panose="020B0604020202020204" pitchFamily="34" charset="0"/>
+                <a:cs typeface="Arial" panose="020B0604020202020204" pitchFamily="34" charset="0"/>
+              </a:rPr>
+              <a:t>Star-Forming/Starburst galaxies are galaxies with high rates of star formation. </a:t>
+            </a:r>
+          </a:p>
+          <a:p>
+            <a:pPr marL="1028700" lvl="1" indent="-571500">
+              <a:buFont typeface="Arial" panose="020B0604020202020204" pitchFamily="34" charset="0"/>
+              <a:buChar char="•"/>
+            </a:pPr>
+            <a:r>
+              <a:rPr lang="en-US" sz="2800" dirty="0">
+                <a:latin typeface="Arial" panose="020B0604020202020204" pitchFamily="34" charset="0"/>
+                <a:cs typeface="Arial" panose="020B0604020202020204" pitchFamily="34" charset="0"/>
+              </a:rPr>
+              <a:t>Composite galaxies exhibit characteristics of both active galaxies and star-forming galaxies. </a:t>
+            </a:r>
+          </a:p>
+          <a:p>
+            <a:pPr marL="1028700" lvl="1" indent="-571500">
+              <a:buFont typeface="Arial" panose="020B0604020202020204" pitchFamily="34" charset="0"/>
+              <a:buChar char="•"/>
+            </a:pPr>
+            <a:r>
+              <a:rPr lang="en-US" sz="2800" dirty="0">
+                <a:latin typeface="Arial" panose="020B0604020202020204" pitchFamily="34" charset="0"/>
+                <a:cs typeface="Arial" panose="020B0604020202020204" pitchFamily="34" charset="0"/>
+              </a:rPr>
+              <a:t>Low Ionization Nuclear Emission Region (LINER) galaxies are characterized by emission lines of weakly ionized or neutral atoms.  </a:t>
+            </a:r>
+          </a:p>
+          <a:p>
+            <a:pPr marL="457200" indent="-457200">
+              <a:buFont typeface="Arial" panose="020B0604020202020204" pitchFamily="34" charset="0"/>
+              <a:buChar char="•"/>
+            </a:pPr>
+            <a:r>
+              <a:rPr lang="en-US" sz="2800" dirty="0">
+                <a:latin typeface="Arial" panose="020B0604020202020204" pitchFamily="34" charset="0"/>
+                <a:cs typeface="Arial" panose="020B0604020202020204" pitchFamily="34" charset="0"/>
+              </a:rPr>
+              <a:t>Markers indicate the model used.  </a:t>
+            </a:r>
+          </a:p>
+          <a:p>
+            <a:pPr marL="914400" lvl="1" indent="-457200">
+              <a:buFont typeface="Arial" panose="020B0604020202020204" pitchFamily="34" charset="0"/>
+              <a:buChar char="•"/>
+            </a:pPr>
+            <a:r>
+              <a:rPr lang="en-US" sz="2800" dirty="0">
+                <a:latin typeface="Arial" panose="020B0604020202020204" pitchFamily="34" charset="0"/>
+                <a:cs typeface="Arial" panose="020B0604020202020204" pitchFamily="34" charset="0"/>
+              </a:rPr>
+              <a:t>Red markers indicate our baseline SED, with lighter shades representing lower temperatures.</a:t>
+            </a:r>
+          </a:p>
+          <a:p>
+            <a:pPr marL="914400" lvl="1" indent="-457200">
+              <a:buFont typeface="Arial" panose="020B0604020202020204" pitchFamily="34" charset="0"/>
+              <a:buChar char="•"/>
+            </a:pPr>
+            <a:r>
+              <a:rPr lang="en-US" sz="2800" dirty="0">
+                <a:latin typeface="Arial" panose="020B0604020202020204" pitchFamily="34" charset="0"/>
+                <a:cs typeface="Arial" panose="020B0604020202020204" pitchFamily="34" charset="0"/>
+              </a:rPr>
+              <a:t>Blue markers indicate a SED with </a:t>
+            </a:r>
+            <a:r>
+              <a:rPr lang="el-GR" sz="2800" dirty="0">
+                <a:latin typeface="Arial" panose="020B0604020202020204" pitchFamily="34" charset="0"/>
+                <a:cs typeface="Arial" panose="020B0604020202020204" pitchFamily="34" charset="0"/>
+              </a:rPr>
+              <a:t>α</a:t>
+            </a:r>
+            <a:r>
+              <a:rPr lang="en-US" sz="2800" baseline="-25000" dirty="0">
+                <a:latin typeface="Arial" panose="020B0604020202020204" pitchFamily="34" charset="0"/>
+                <a:cs typeface="Arial" panose="020B0604020202020204" pitchFamily="34" charset="0"/>
+              </a:rPr>
+              <a:t>x </a:t>
+            </a:r>
+            <a:r>
+              <a:rPr lang="en-US" sz="2800" dirty="0">
+                <a:latin typeface="Arial" panose="020B0604020202020204" pitchFamily="34" charset="0"/>
+                <a:cs typeface="Arial" panose="020B0604020202020204" pitchFamily="34" charset="0"/>
+              </a:rPr>
+              <a:t>= -2.19, </a:t>
+            </a:r>
+            <a:r>
+              <a:rPr lang="el-GR" sz="2800" dirty="0">
+                <a:latin typeface="Arial" panose="020B0604020202020204" pitchFamily="34" charset="0"/>
+                <a:cs typeface="Arial" panose="020B0604020202020204" pitchFamily="34" charset="0"/>
+              </a:rPr>
+              <a:t>α</a:t>
+            </a:r>
+            <a:r>
+              <a:rPr lang="en-US" sz="2800" baseline="-25000" dirty="0" err="1">
+                <a:latin typeface="Arial" panose="020B0604020202020204" pitchFamily="34" charset="0"/>
+                <a:cs typeface="Arial" panose="020B0604020202020204" pitchFamily="34" charset="0"/>
+              </a:rPr>
+              <a:t>uv</a:t>
+            </a:r>
+            <a:r>
+              <a:rPr lang="en-US" sz="2800" baseline="-25000" dirty="0">
+                <a:latin typeface="Arial" panose="020B0604020202020204" pitchFamily="34" charset="0"/>
+                <a:cs typeface="Arial" panose="020B0604020202020204" pitchFamily="34" charset="0"/>
+              </a:rPr>
+              <a:t> </a:t>
+            </a:r>
+            <a:r>
+              <a:rPr lang="en-US" sz="2800" dirty="0">
+                <a:latin typeface="Arial" panose="020B0604020202020204" pitchFamily="34" charset="0"/>
+                <a:cs typeface="Arial" panose="020B0604020202020204" pitchFamily="34" charset="0"/>
+              </a:rPr>
+              <a:t>= -0.38, </a:t>
+            </a:r>
+            <a:r>
+              <a:rPr lang="el-GR" sz="2800" dirty="0">
+                <a:latin typeface="Arial" panose="020B0604020202020204" pitchFamily="34" charset="0"/>
+                <a:cs typeface="Arial" panose="020B0604020202020204" pitchFamily="34" charset="0"/>
+              </a:rPr>
+              <a:t>α</a:t>
+            </a:r>
+            <a:r>
+              <a:rPr lang="en-US" sz="2800" baseline="-25000" dirty="0">
+                <a:latin typeface="Arial" panose="020B0604020202020204" pitchFamily="34" charset="0"/>
+                <a:cs typeface="Arial" panose="020B0604020202020204" pitchFamily="34" charset="0"/>
+              </a:rPr>
+              <a:t>ox </a:t>
+            </a:r>
+            <a:r>
+              <a:rPr lang="en-US" sz="2800" dirty="0">
+                <a:latin typeface="Arial" panose="020B0604020202020204" pitchFamily="34" charset="0"/>
+                <a:cs typeface="Arial" panose="020B0604020202020204" pitchFamily="34" charset="0"/>
+              </a:rPr>
+              <a:t>=-1.42</a:t>
+            </a:r>
+          </a:p>
+          <a:p>
+            <a:pPr marL="914400" lvl="1" indent="-457200">
+              <a:buFont typeface="Arial" panose="020B0604020202020204" pitchFamily="34" charset="0"/>
+              <a:buChar char="•"/>
+            </a:pPr>
+            <a:r>
+              <a:rPr lang="en-US" sz="2800" dirty="0">
+                <a:latin typeface="Arial" panose="020B0604020202020204" pitchFamily="34" charset="0"/>
+                <a:cs typeface="Arial" panose="020B0604020202020204" pitchFamily="34" charset="0"/>
+              </a:rPr>
+              <a:t>Green markers indicate a SED with </a:t>
+            </a:r>
+            <a:r>
+              <a:rPr lang="el-GR" sz="2800" dirty="0">
+                <a:latin typeface="Arial" panose="020B0604020202020204" pitchFamily="34" charset="0"/>
+                <a:cs typeface="Arial" panose="020B0604020202020204" pitchFamily="34" charset="0"/>
+              </a:rPr>
+              <a:t>α</a:t>
+            </a:r>
+            <a:r>
+              <a:rPr lang="en-US" sz="2800" baseline="-25000" dirty="0">
+                <a:latin typeface="Arial" panose="020B0604020202020204" pitchFamily="34" charset="0"/>
+                <a:cs typeface="Arial" panose="020B0604020202020204" pitchFamily="34" charset="0"/>
+              </a:rPr>
+              <a:t>x </a:t>
+            </a:r>
+            <a:r>
+              <a:rPr lang="en-US" sz="2800" dirty="0">
+                <a:latin typeface="Arial" panose="020B0604020202020204" pitchFamily="34" charset="0"/>
+                <a:cs typeface="Arial" panose="020B0604020202020204" pitchFamily="34" charset="0"/>
+              </a:rPr>
+              <a:t>= -1.17 , </a:t>
+            </a:r>
+            <a:r>
+              <a:rPr lang="el-GR" sz="2800" dirty="0">
+                <a:latin typeface="Arial" panose="020B0604020202020204" pitchFamily="34" charset="0"/>
+                <a:cs typeface="Arial" panose="020B0604020202020204" pitchFamily="34" charset="0"/>
+              </a:rPr>
+              <a:t>α</a:t>
+            </a:r>
+            <a:r>
+              <a:rPr lang="en-US" sz="2800" baseline="-25000" dirty="0" err="1">
+                <a:latin typeface="Arial" panose="020B0604020202020204" pitchFamily="34" charset="0"/>
+                <a:cs typeface="Arial" panose="020B0604020202020204" pitchFamily="34" charset="0"/>
+              </a:rPr>
+              <a:t>uv</a:t>
+            </a:r>
+            <a:r>
+              <a:rPr lang="en-US" sz="2800" baseline="-25000" dirty="0">
+                <a:latin typeface="Arial" panose="020B0604020202020204" pitchFamily="34" charset="0"/>
+                <a:cs typeface="Arial" panose="020B0604020202020204" pitchFamily="34" charset="0"/>
+              </a:rPr>
+              <a:t> </a:t>
+            </a:r>
+            <a:r>
+              <a:rPr lang="en-US" sz="2800" dirty="0">
+                <a:latin typeface="Arial" panose="020B0604020202020204" pitchFamily="34" charset="0"/>
+                <a:cs typeface="Arial" panose="020B0604020202020204" pitchFamily="34" charset="0"/>
+              </a:rPr>
+              <a:t>= -0.73, </a:t>
+            </a:r>
+            <a:r>
+              <a:rPr lang="el-GR" sz="2800" dirty="0">
+                <a:latin typeface="Arial" panose="020B0604020202020204" pitchFamily="34" charset="0"/>
+                <a:cs typeface="Arial" panose="020B0604020202020204" pitchFamily="34" charset="0"/>
+              </a:rPr>
+              <a:t>α</a:t>
+            </a:r>
+            <a:r>
+              <a:rPr lang="en-US" sz="2800" baseline="-25000" dirty="0">
+                <a:latin typeface="Arial" panose="020B0604020202020204" pitchFamily="34" charset="0"/>
+                <a:cs typeface="Arial" panose="020B0604020202020204" pitchFamily="34" charset="0"/>
+              </a:rPr>
+              <a:t>ox </a:t>
+            </a:r>
+            <a:r>
+              <a:rPr lang="en-US" sz="2800" dirty="0">
+                <a:latin typeface="Arial" panose="020B0604020202020204" pitchFamily="34" charset="0"/>
+                <a:cs typeface="Arial" panose="020B0604020202020204" pitchFamily="34" charset="0"/>
+              </a:rPr>
+              <a:t>=-1.42</a:t>
+            </a:r>
+          </a:p>
+          <a:p>
+            <a:pPr marL="457200" indent="-457200">
+              <a:buFont typeface="Arial" panose="020B0604020202020204" pitchFamily="34" charset="0"/>
+              <a:buChar char="•"/>
+            </a:pPr>
+            <a:r>
+              <a:rPr lang="en-US" sz="2800" dirty="0">
+                <a:latin typeface="Arial" panose="020B0604020202020204" pitchFamily="34" charset="0"/>
+                <a:cs typeface="Arial" panose="020B0604020202020204" pitchFamily="34" charset="0"/>
+              </a:rPr>
+              <a:t>Most plots have little variation between models.  An interesting result is the zig-zag pattern based on temperature that shows up in many of the plots.</a:t>
+            </a:r>
+          </a:p>
+          <a:p>
+            <a:pPr marL="457200" indent="-457200">
+              <a:buFont typeface="Arial" panose="020B0604020202020204" pitchFamily="34" charset="0"/>
+              <a:buChar char="•"/>
+            </a:pPr>
+            <a:r>
+              <a:rPr lang="en-US" sz="2800" dirty="0">
+                <a:latin typeface="Arial" panose="020B0604020202020204" pitchFamily="34" charset="0"/>
+                <a:cs typeface="Arial" panose="020B0604020202020204" pitchFamily="34" charset="0"/>
+              </a:rPr>
+              <a:t>[O I] plots show largest variation, with higher temperature models coming close to crossing the LINER-</a:t>
+            </a:r>
+            <a:r>
+              <a:rPr lang="en-US" sz="2800" dirty="0" err="1">
+                <a:latin typeface="Arial" panose="020B0604020202020204" pitchFamily="34" charset="0"/>
+                <a:cs typeface="Arial" panose="020B0604020202020204" pitchFamily="34" charset="0"/>
+              </a:rPr>
+              <a:t>Seyfert</a:t>
+            </a:r>
+            <a:r>
+              <a:rPr lang="en-US" sz="2800" dirty="0">
+                <a:latin typeface="Arial" panose="020B0604020202020204" pitchFamily="34" charset="0"/>
+                <a:cs typeface="Arial" panose="020B0604020202020204" pitchFamily="34" charset="0"/>
+              </a:rPr>
+              <a:t> boundary. </a:t>
+            </a:r>
+          </a:p>
+          <a:p>
+            <a:pPr marL="457200" indent="-457200">
+              <a:buFont typeface="Arial" panose="020B0604020202020204" pitchFamily="34" charset="0"/>
+              <a:buChar char="•"/>
+            </a:pPr>
+            <a:r>
+              <a:rPr lang="en-US" sz="2800" dirty="0">
+                <a:latin typeface="Arial" panose="020B0604020202020204" pitchFamily="34" charset="0"/>
+                <a:cs typeface="Arial" panose="020B0604020202020204" pitchFamily="34" charset="0"/>
+              </a:rPr>
+              <a:t>Variation in [O I] may be a result of ionization parameter.  </a:t>
+            </a:r>
+          </a:p>
+          <a:p>
+            <a:pPr marL="457200" indent="-457200">
+              <a:buFont typeface="Arial" panose="020B0604020202020204" pitchFamily="34" charset="0"/>
+              <a:buChar char="•"/>
+            </a:pPr>
+            <a:endParaRPr lang="en-US" sz="2800" dirty="0">
+              <a:latin typeface="Arial" panose="020B0604020202020204" pitchFamily="34" charset="0"/>
+              <a:cs typeface="Arial" panose="020B0604020202020204" pitchFamily="34" charset="0"/>
+            </a:endParaRPr>
+          </a:p>
+          <a:p>
+            <a:pPr marL="914400" lvl="1" indent="-457200">
+              <a:buFont typeface="Arial" panose="020B0604020202020204" pitchFamily="34" charset="0"/>
+              <a:buChar char="•"/>
+            </a:pPr>
+            <a:endParaRPr lang="en-US" sz="2800" dirty="0">
+              <a:latin typeface="Arial" panose="020B0604020202020204" pitchFamily="34" charset="0"/>
+              <a:cs typeface="Arial" panose="020B0604020202020204" pitchFamily="34" charset="0"/>
+            </a:endParaRPr>
+          </a:p>
+          <a:p>
+            <a:pPr marL="914400" lvl="1" indent="-457200">
+              <a:buFont typeface="Arial" panose="020B0604020202020204" pitchFamily="34" charset="0"/>
+              <a:buChar char="•"/>
+            </a:pPr>
+            <a:endParaRPr lang="en-US" sz="2800" dirty="0">
+              <a:latin typeface="Arial" panose="020B0604020202020204" pitchFamily="34" charset="0"/>
+              <a:cs typeface="Arial" panose="020B0604020202020204" pitchFamily="34" charset="0"/>
+            </a:endParaRPr>
+          </a:p>
+          <a:p>
+            <a:pPr marL="914400" lvl="1" indent="-457200">
+              <a:buFont typeface="Arial" panose="020B0604020202020204" pitchFamily="34" charset="0"/>
+              <a:buChar char="•"/>
+            </a:pPr>
+            <a:endParaRPr lang="en-US" sz="2800" dirty="0">
+              <a:latin typeface="Arial" panose="020B0604020202020204" pitchFamily="34" charset="0"/>
+              <a:cs typeface="Arial" panose="020B0604020202020204" pitchFamily="34" charset="0"/>
+            </a:endParaRPr>
+          </a:p>
+          <a:p>
+            <a:pPr marL="914400" lvl="1" indent="-457200">
+              <a:buFont typeface="Arial" panose="020B0604020202020204" pitchFamily="34" charset="0"/>
+              <a:buChar char="•"/>
+            </a:pPr>
+            <a:endParaRPr lang="en-US" sz="2800" dirty="0">
+              <a:latin typeface="Arial" panose="020B0604020202020204" pitchFamily="34" charset="0"/>
+              <a:cs typeface="Arial" panose="020B0604020202020204" pitchFamily="34" charset="0"/>
+            </a:endParaRPr>
+          </a:p>
+          <a:p>
+            <a:pPr marL="914400" lvl="1" indent="-457200">
+              <a:buFont typeface="Arial" panose="020B0604020202020204" pitchFamily="34" charset="0"/>
+              <a:buChar char="•"/>
+            </a:pPr>
+            <a:endParaRPr lang="en-US" sz="2800" dirty="0">
+              <a:latin typeface="Arial" panose="020B0604020202020204" pitchFamily="34" charset="0"/>
+              <a:cs typeface="Arial" panose="020B0604020202020204" pitchFamily="34" charset="0"/>
+            </a:endParaRPr>
+          </a:p>
+          <a:p>
+            <a:pPr marL="914400" lvl="1" indent="-457200">
+              <a:buFont typeface="Arial" panose="020B0604020202020204" pitchFamily="34" charset="0"/>
+              <a:buChar char="•"/>
+            </a:pPr>
+            <a:endParaRPr lang="en-US" sz="2800" dirty="0">
+              <a:latin typeface="Arial" panose="020B0604020202020204" pitchFamily="34" charset="0"/>
+              <a:cs typeface="Arial" panose="020B0604020202020204" pitchFamily="34" charset="0"/>
+            </a:endParaRPr>
+          </a:p>
+          <a:p>
+            <a:pPr marL="914400" lvl="1" indent="-457200">
+              <a:buFont typeface="Arial" panose="020B0604020202020204" pitchFamily="34" charset="0"/>
+              <a:buChar char="•"/>
+            </a:pPr>
+            <a:endParaRPr lang="en-US" sz="2800" dirty="0">
+              <a:latin typeface="Arial" panose="020B0604020202020204" pitchFamily="34" charset="0"/>
+              <a:cs typeface="Arial" panose="020B0604020202020204" pitchFamily="34" charset="0"/>
+            </a:endParaRPr>
+          </a:p>
+          <a:p>
+            <a:pPr marL="914400" lvl="1" indent="-457200">
+              <a:buFont typeface="Arial" panose="020B0604020202020204" pitchFamily="34" charset="0"/>
+              <a:buChar char="•"/>
+            </a:pPr>
+            <a:endParaRPr lang="en-US" sz="2800" dirty="0">
+              <a:latin typeface="Arial" panose="020B0604020202020204" pitchFamily="34" charset="0"/>
+              <a:cs typeface="Arial" panose="020B0604020202020204" pitchFamily="34" charset="0"/>
+            </a:endParaRPr>
+          </a:p>
+          <a:p>
+            <a:pPr marL="914400" lvl="1" indent="-457200">
+              <a:buFont typeface="Arial" panose="020B0604020202020204" pitchFamily="34" charset="0"/>
+              <a:buChar char="•"/>
+            </a:pPr>
+            <a:endParaRPr lang="en-US" sz="2800" dirty="0">
+              <a:latin typeface="Arial" panose="020B0604020202020204" pitchFamily="34" charset="0"/>
+              <a:cs typeface="Arial" panose="020B0604020202020204" pitchFamily="34" charset="0"/>
+            </a:endParaRPr>
+          </a:p>
+          <a:p>
+            <a:pPr marL="914400" lvl="1" indent="-457200">
+              <a:buFont typeface="Arial" panose="020B0604020202020204" pitchFamily="34" charset="0"/>
+              <a:buChar char="•"/>
+            </a:pPr>
+            <a:endParaRPr lang="en-US" sz="2800" dirty="0">
+              <a:latin typeface="Arial" panose="020B0604020202020204" pitchFamily="34" charset="0"/>
+              <a:cs typeface="Arial" panose="020B0604020202020204" pitchFamily="34" charset="0"/>
+            </a:endParaRPr>
+          </a:p>
+          <a:p>
+            <a:pPr marL="914400" lvl="1" indent="-457200">
+              <a:buFont typeface="Arial" panose="020B0604020202020204" pitchFamily="34" charset="0"/>
+              <a:buChar char="•"/>
+            </a:pPr>
+            <a:endParaRPr lang="en-US" sz="2800" dirty="0">
+              <a:latin typeface="Arial" panose="020B0604020202020204" pitchFamily="34" charset="0"/>
+              <a:cs typeface="Arial" panose="020B0604020202020204" pitchFamily="34" charset="0"/>
+            </a:endParaRPr>
+          </a:p>
+          <a:p>
+            <a:pPr marL="914400" lvl="1" indent="-457200">
+              <a:buFont typeface="Arial" panose="020B0604020202020204" pitchFamily="34" charset="0"/>
+              <a:buChar char="•"/>
+            </a:pPr>
+            <a:endParaRPr lang="en-US" sz="2800" dirty="0">
+              <a:latin typeface="Arial" panose="020B0604020202020204" pitchFamily="34" charset="0"/>
+              <a:cs typeface="Arial" panose="020B0604020202020204" pitchFamily="34" charset="0"/>
+            </a:endParaRPr>
+          </a:p>
+          <a:p>
+            <a:endParaRPr lang="en-US" sz="2800" dirty="0">
+              <a:latin typeface="Arial" panose="020B0604020202020204" pitchFamily="34" charset="0"/>
+              <a:cs typeface="Arial" panose="020B0604020202020204" pitchFamily="34" charset="0"/>
+            </a:endParaRPr>
+          </a:p>
+          <a:p>
+            <a:endParaRPr lang="en-US" sz="2800" dirty="0">
+              <a:latin typeface="Arial" panose="020B0604020202020204" pitchFamily="34" charset="0"/>
+              <a:cs typeface="Arial" panose="020B0604020202020204" pitchFamily="34" charset="0"/>
+            </a:endParaRPr>
+          </a:p>
+          <a:p>
+            <a:pPr marL="457200" indent="-457200">
+              <a:buFont typeface="Arial" panose="020B0604020202020204" pitchFamily="34" charset="0"/>
+              <a:buChar char="•"/>
+            </a:pPr>
+            <a:r>
+              <a:rPr lang="en-US" sz="2800" dirty="0">
+                <a:latin typeface="Arial" panose="020B0604020202020204" pitchFamily="34" charset="0"/>
+                <a:cs typeface="Arial" panose="020B0604020202020204" pitchFamily="34" charset="0"/>
+              </a:rPr>
+              <a:t>Density diagnostic from Richardson et al. 2014.  </a:t>
+            </a:r>
+          </a:p>
+          <a:p>
+            <a:pPr marL="457200" indent="-457200">
+              <a:buFont typeface="Arial" panose="020B0604020202020204" pitchFamily="34" charset="0"/>
+              <a:buChar char="•"/>
+            </a:pPr>
+            <a:r>
+              <a:rPr lang="en-US" sz="2800" dirty="0">
+                <a:latin typeface="Arial" panose="020B0604020202020204" pitchFamily="34" charset="0"/>
+                <a:cs typeface="Arial" panose="020B0604020202020204" pitchFamily="34" charset="0"/>
+              </a:rPr>
+              <a:t>Emissions from elements at the same ionization level, but different wavelengths act as indicators of density. </a:t>
+            </a:r>
+          </a:p>
+          <a:p>
+            <a:pPr marL="457200" indent="-457200">
+              <a:buFont typeface="Arial" panose="020B0604020202020204" pitchFamily="34" charset="0"/>
+              <a:buChar char="•"/>
+            </a:pPr>
+            <a:r>
+              <a:rPr lang="en-US" sz="2800" dirty="0">
+                <a:latin typeface="Arial" panose="020B0604020202020204" pitchFamily="34" charset="0"/>
+                <a:cs typeface="Arial" panose="020B0604020202020204" pitchFamily="34" charset="0"/>
+              </a:rPr>
+              <a:t>[S II] 6716 / [S II] 6731 is insensitive to other factors and acts as a strong indicator of density. </a:t>
+            </a:r>
+          </a:p>
+          <a:p>
+            <a:pPr marL="457200" indent="-457200">
+              <a:buFont typeface="Arial" panose="020B0604020202020204" pitchFamily="34" charset="0"/>
+              <a:buChar char="•"/>
+            </a:pPr>
+            <a:r>
+              <a:rPr lang="en-US" sz="2800" dirty="0">
+                <a:latin typeface="Arial" panose="020B0604020202020204" pitchFamily="34" charset="0"/>
+                <a:cs typeface="Arial" panose="020B0604020202020204" pitchFamily="34" charset="0"/>
+              </a:rPr>
+              <a:t>Models show little variation outside of temperature.  </a:t>
+            </a:r>
+          </a:p>
+          <a:p>
+            <a:pPr marL="457200" indent="-457200">
+              <a:buFont typeface="Arial" panose="020B0604020202020204" pitchFamily="34" charset="0"/>
+              <a:buChar char="•"/>
+            </a:pPr>
+            <a:endParaRPr lang="en-US" sz="2800" dirty="0">
+              <a:latin typeface="Arial" panose="020B0604020202020204" pitchFamily="34" charset="0"/>
+              <a:cs typeface="Arial" panose="020B0604020202020204" pitchFamily="34" charset="0"/>
+            </a:endParaRPr>
+          </a:p>
+          <a:p>
+            <a:pPr marL="571500" indent="-571500">
+              <a:buFont typeface="Arial" panose="020B0604020202020204" pitchFamily="34" charset="0"/>
+              <a:buChar char="•"/>
+            </a:pPr>
+            <a:endParaRPr lang="en-US" sz="2800" dirty="0">
+              <a:latin typeface="Arial" panose="020B0604020202020204" pitchFamily="34" charset="0"/>
+              <a:cs typeface="Arial" panose="020B0604020202020204" pitchFamily="34" charset="0"/>
+            </a:endParaRPr>
+          </a:p>
+          <a:p>
+            <a:pPr marL="571500" indent="-571500">
+              <a:buFont typeface="Arial" panose="020B0604020202020204" pitchFamily="34" charset="0"/>
+              <a:buChar char="•"/>
+            </a:pPr>
+            <a:endParaRPr lang="en-US" sz="2800" dirty="0">
+              <a:latin typeface="Arial" panose="020B0604020202020204" pitchFamily="34" charset="0"/>
+              <a:cs typeface="Arial" panose="020B0604020202020204" pitchFamily="34" charset="0"/>
+            </a:endParaRPr>
+          </a:p>
+          <a:p>
+            <a:pPr marL="571500" indent="-571500">
+              <a:buFont typeface="Arial" panose="020B0604020202020204" pitchFamily="34" charset="0"/>
+              <a:buChar char="•"/>
+            </a:pPr>
+            <a:endParaRPr lang="en-US" sz="2800" dirty="0">
+              <a:latin typeface="Arial" panose="020B0604020202020204" pitchFamily="34" charset="0"/>
+              <a:cs typeface="Arial" panose="020B0604020202020204" pitchFamily="34" charset="0"/>
+            </a:endParaRPr>
+          </a:p>
+          <a:p>
+            <a:pPr marL="571500" indent="-571500">
+              <a:buFont typeface="Arial" panose="020B0604020202020204" pitchFamily="34" charset="0"/>
+              <a:buChar char="•"/>
+            </a:pPr>
+            <a:endParaRPr lang="en-US" sz="2800" dirty="0">
+              <a:latin typeface="Arial" panose="020B0604020202020204" pitchFamily="34" charset="0"/>
+              <a:cs typeface="Arial" panose="020B0604020202020204" pitchFamily="34" charset="0"/>
+            </a:endParaRPr>
           </a:p>
           <a:p>
             <a:pPr marL="571500" indent="-571500">
@@ -4283,44 +4774,14 @@
         </p:blipFill>
         <p:spPr>
           <a:xfrm>
-            <a:off x="3626530" y="9901073"/>
-            <a:ext cx="6748564" cy="4276006"/>
+            <a:off x="5497146" y="7333886"/>
+            <a:ext cx="5288870" cy="3351119"/>
           </a:xfrm>
           <a:prstGeom prst="rect">
             <a:avLst/>
           </a:prstGeom>
         </p:spPr>
       </p:pic>
-      <p:pic>
-        <p:nvPicPr>
-          <p:cNvPr id="18" name="Picture 17"/>
-          <p:cNvPicPr>
-            <a:picLocks noChangeAspect="1"/>
-          </p:cNvPicPr>
-          <p:nvPr/>
-        </p:nvPicPr>
-        <p:blipFill>
-          <a:blip r:embed="rId3">
-            <a:extLst>
-              <a:ext uri="{28A0092B-C50C-407E-A947-70E740481C1C}">
-                <a14:useLocalDpi xmlns:a14="http://schemas.microsoft.com/office/drawing/2010/main" val="0"/>
-              </a:ext>
-            </a:extLst>
-          </a:blip>
-          <a:stretch>
-            <a:fillRect/>
-          </a:stretch>
-        </p:blipFill>
-        <p:spPr>
-          <a:xfrm>
-            <a:off x="2795671" y="23860582"/>
-            <a:ext cx="8834955" cy="697979"/>
-          </a:xfrm>
-          <a:prstGeom prst="rect">
-            <a:avLst/>
-          </a:prstGeom>
-        </p:spPr>
-      </p:pic>
       <p:sp>
         <p:nvSpPr>
           <p:cNvPr id="21" name="TextBox 20"/>
@@ -4329,8 +4790,8 @@
         </p:nvSpPr>
         <p:spPr>
           <a:xfrm>
-            <a:off x="1736558" y="27475728"/>
-            <a:ext cx="11963400" cy="4770537"/>
+            <a:off x="1505878" y="26163874"/>
+            <a:ext cx="13200721" cy="5632311"/>
           </a:xfrm>
           <a:prstGeom prst="rect">
             <a:avLst/>
@@ -4354,6 +4815,16 @@
           </a:p>
           <a:p>
             <a:pPr algn="ctr"/>
+            <a:endParaRPr lang="en-US" sz="4000" b="1" u="sng" dirty="0">
+              <a:solidFill>
+                <a:srgbClr val="73000A"/>
+              </a:solidFill>
+              <a:latin typeface="Arial" panose="020B0604020202020204" pitchFamily="34" charset="0"/>
+              <a:cs typeface="Arial" panose="020B0604020202020204" pitchFamily="34" charset="0"/>
+            </a:endParaRPr>
+          </a:p>
+          <a:p>
+            <a:pPr algn="ctr"/>
             <a:r>
               <a:rPr lang="en-US" sz="4000" b="1" u="sng" dirty="0">
                 <a:solidFill>
@@ -4364,59 +4835,69 @@
               </a:rPr>
               <a:t>References</a:t>
             </a:r>
-          </a:p>
-          <a:p>
-            <a:r>
-              <a:rPr lang="en-US" sz="2800" dirty="0" err="1">
+            <a:endParaRPr lang="en-US" sz="2000" dirty="0">
+              <a:latin typeface="Arial" panose="020B0604020202020204" pitchFamily="34" charset="0"/>
+              <a:cs typeface="Arial" panose="020B0604020202020204" pitchFamily="34" charset="0"/>
+            </a:endParaRPr>
+          </a:p>
+          <a:p>
+            <a:endParaRPr lang="en-US" sz="2000" dirty="0">
+              <a:latin typeface="Arial" panose="020B0604020202020204" pitchFamily="34" charset="0"/>
+              <a:cs typeface="Arial" panose="020B0604020202020204" pitchFamily="34" charset="0"/>
+            </a:endParaRPr>
+          </a:p>
+          <a:p>
+            <a:r>
+              <a:rPr lang="en-US" sz="2000" dirty="0" err="1">
                 <a:latin typeface="Arial" panose="020B0604020202020204" pitchFamily="34" charset="0"/>
                 <a:cs typeface="Arial" panose="020B0604020202020204" pitchFamily="34" charset="0"/>
               </a:rPr>
               <a:t>Grupe</a:t>
             </a:r>
             <a:r>
-              <a:rPr lang="en-US" sz="2800" dirty="0">
+              <a:rPr lang="en-US" sz="2000" dirty="0">
                 <a:latin typeface="Arial" panose="020B0604020202020204" pitchFamily="34" charset="0"/>
                 <a:cs typeface="Arial" panose="020B0604020202020204" pitchFamily="34" charset="0"/>
               </a:rPr>
               <a:t>, D., </a:t>
             </a:r>
             <a:r>
-              <a:rPr lang="en-US" sz="2800" dirty="0" err="1">
+              <a:rPr lang="en-US" sz="2000" dirty="0" err="1">
                 <a:latin typeface="Arial" panose="020B0604020202020204" pitchFamily="34" charset="0"/>
                 <a:cs typeface="Arial" panose="020B0604020202020204" pitchFamily="34" charset="0"/>
               </a:rPr>
               <a:t>Komassa</a:t>
             </a:r>
             <a:r>
-              <a:rPr lang="en-US" sz="2800" dirty="0">
+              <a:rPr lang="en-US" sz="2000" dirty="0">
                 <a:latin typeface="Arial" panose="020B0604020202020204" pitchFamily="34" charset="0"/>
                 <a:cs typeface="Arial" panose="020B0604020202020204" pitchFamily="34" charset="0"/>
               </a:rPr>
               <a:t>, S., </a:t>
             </a:r>
             <a:r>
-              <a:rPr lang="en-US" sz="2800" dirty="0" err="1">
+              <a:rPr lang="en-US" sz="2000" dirty="0" err="1">
                 <a:latin typeface="Arial" panose="020B0604020202020204" pitchFamily="34" charset="0"/>
                 <a:cs typeface="Arial" panose="020B0604020202020204" pitchFamily="34" charset="0"/>
               </a:rPr>
               <a:t>Leighly</a:t>
             </a:r>
             <a:r>
-              <a:rPr lang="en-US" sz="2800" dirty="0">
+              <a:rPr lang="en-US" sz="2000" dirty="0">
                 <a:latin typeface="Arial" panose="020B0604020202020204" pitchFamily="34" charset="0"/>
                 <a:cs typeface="Arial" panose="020B0604020202020204" pitchFamily="34" charset="0"/>
               </a:rPr>
               <a:t>, K., Page, K., 2010, </a:t>
             </a:r>
             <a:r>
-              <a:rPr lang="en-US" sz="2800" dirty="0" err="1">
+              <a:rPr lang="en-US" sz="2000" dirty="0" err="1">
                 <a:latin typeface="Arial" panose="020B0604020202020204" pitchFamily="34" charset="0"/>
                 <a:cs typeface="Arial" panose="020B0604020202020204" pitchFamily="34" charset="0"/>
               </a:rPr>
               <a:t>ApJS</a:t>
             </a:r>
             <a:r>
-              <a:rPr lang="en-US" sz="2800" dirty="0">
+              <a:rPr lang="en-US" sz="2000" dirty="0">
                 <a:latin typeface="Arial" panose="020B0604020202020204" pitchFamily="34" charset="0"/>
                 <a:cs typeface="Arial" panose="020B0604020202020204" pitchFamily="34" charset="0"/>
               </a:rPr>
@@ -4425,35 +4906,35 @@
           </a:p>
           <a:p>
             <a:r>
-              <a:rPr lang="en-US" sz="2800" dirty="0">
+              <a:rPr lang="en-US" sz="2000" dirty="0">
                 <a:latin typeface="Arial" panose="020B0604020202020204" pitchFamily="34" charset="0"/>
                 <a:cs typeface="Arial" panose="020B0604020202020204" pitchFamily="34" charset="0"/>
               </a:rPr>
               <a:t>Groves, B., </a:t>
             </a:r>
             <a:r>
-              <a:rPr lang="en-US" sz="2800" dirty="0" err="1">
+              <a:rPr lang="en-US" sz="2000" dirty="0" err="1">
                 <a:latin typeface="Arial" panose="020B0604020202020204" pitchFamily="34" charset="0"/>
                 <a:cs typeface="Arial" panose="020B0604020202020204" pitchFamily="34" charset="0"/>
               </a:rPr>
               <a:t>Dopita</a:t>
             </a:r>
             <a:r>
-              <a:rPr lang="en-US" sz="2800" dirty="0">
+              <a:rPr lang="en-US" sz="2000" dirty="0">
                 <a:latin typeface="Arial" panose="020B0604020202020204" pitchFamily="34" charset="0"/>
                 <a:cs typeface="Arial" panose="020B0604020202020204" pitchFamily="34" charset="0"/>
               </a:rPr>
               <a:t>, Michael., Sutherland, R. 2004, </a:t>
             </a:r>
             <a:r>
-              <a:rPr lang="en-US" sz="2800" dirty="0" err="1">
+              <a:rPr lang="en-US" sz="2000" dirty="0" err="1">
                 <a:latin typeface="Arial" panose="020B0604020202020204" pitchFamily="34" charset="0"/>
                 <a:cs typeface="Arial" panose="020B0604020202020204" pitchFamily="34" charset="0"/>
               </a:rPr>
               <a:t>ApJS</a:t>
             </a:r>
             <a:r>
-              <a:rPr lang="en-US" sz="2800" dirty="0">
+              <a:rPr lang="en-US" sz="2000" dirty="0">
                 <a:latin typeface="Arial" panose="020B0604020202020204" pitchFamily="34" charset="0"/>
                 <a:cs typeface="Arial" panose="020B0604020202020204" pitchFamily="34" charset="0"/>
               </a:rPr>
@@ -4462,14 +4943,71 @@
           </a:p>
           <a:p>
             <a:r>
-              <a:rPr lang="en-US" sz="2800" dirty="0" err="1">
+              <a:rPr lang="en-US" sz="2000" dirty="0">
+                <a:latin typeface="Arial" panose="020B0604020202020204" pitchFamily="34" charset="0"/>
+                <a:cs typeface="Arial" panose="020B0604020202020204" pitchFamily="34" charset="0"/>
+              </a:rPr>
+              <a:t>Groves B. A., Heckman T.M., Kauffmann G., 2006, MNRAS, 371, 1559</a:t>
+            </a:r>
+          </a:p>
+          <a:p>
+            <a:r>
+              <a:rPr lang="es-ES" sz="2000" dirty="0" err="1">
+                <a:latin typeface="Arial" panose="020B0604020202020204" pitchFamily="34" charset="0"/>
+                <a:cs typeface="Arial" panose="020B0604020202020204" pitchFamily="34" charset="0"/>
+              </a:rPr>
+              <a:t>Kewley</a:t>
+            </a:r>
+            <a:r>
+              <a:rPr lang="es-ES" sz="2000" dirty="0">
+                <a:latin typeface="Arial" panose="020B0604020202020204" pitchFamily="34" charset="0"/>
+                <a:cs typeface="Arial" panose="020B0604020202020204" pitchFamily="34" charset="0"/>
+              </a:rPr>
+              <a:t>, L. J., &amp; </a:t>
+            </a:r>
+            <a:r>
+              <a:rPr lang="es-ES" sz="2000" dirty="0" err="1">
+                <a:latin typeface="Arial" panose="020B0604020202020204" pitchFamily="34" charset="0"/>
+                <a:cs typeface="Arial" panose="020B0604020202020204" pitchFamily="34" charset="0"/>
+              </a:rPr>
+              <a:t>Dopita</a:t>
+            </a:r>
+            <a:r>
+              <a:rPr lang="es-ES" sz="2000" dirty="0">
+                <a:latin typeface="Arial" panose="020B0604020202020204" pitchFamily="34" charset="0"/>
+                <a:cs typeface="Arial" panose="020B0604020202020204" pitchFamily="34" charset="0"/>
+              </a:rPr>
+              <a:t>, M. A. 2002, </a:t>
+            </a:r>
+            <a:r>
+              <a:rPr lang="es-ES" sz="2000" dirty="0" err="1">
+                <a:latin typeface="Arial" panose="020B0604020202020204" pitchFamily="34" charset="0"/>
+                <a:cs typeface="Arial" panose="020B0604020202020204" pitchFamily="34" charset="0"/>
+              </a:rPr>
+              <a:t>ApJS</a:t>
+            </a:r>
+            <a:r>
+              <a:rPr lang="es-ES" sz="2000" dirty="0">
+                <a:latin typeface="Arial" panose="020B0604020202020204" pitchFamily="34" charset="0"/>
+                <a:cs typeface="Arial" panose="020B0604020202020204" pitchFamily="34" charset="0"/>
+              </a:rPr>
+              <a:t>, 142, 35</a:t>
+            </a:r>
+            <a:endParaRPr lang="en-US" sz="2000" dirty="0">
+              <a:latin typeface="Arial" panose="020B0604020202020204" pitchFamily="34" charset="0"/>
+              <a:cs typeface="Arial" panose="020B0604020202020204" pitchFamily="34" charset="0"/>
+            </a:endParaRPr>
+          </a:p>
+          <a:p>
+            <a:r>
+              <a:rPr lang="en-US" sz="2000" dirty="0" err="1">
                 <a:latin typeface="Arial" panose="020B0604020202020204" pitchFamily="34" charset="0"/>
                 <a:cs typeface="Arial" panose="020B0604020202020204" pitchFamily="34" charset="0"/>
               </a:rPr>
               <a:t>Ryden</a:t>
             </a:r>
             <a:r>
-              <a:rPr lang="en-US" sz="2800" dirty="0">
+              <a:rPr lang="en-US" sz="2000" dirty="0">
                 <a:latin typeface="Arial" panose="020B0604020202020204" pitchFamily="34" charset="0"/>
                 <a:cs typeface="Arial" panose="020B0604020202020204" pitchFamily="34" charset="0"/>
               </a:rPr>
@@ -4478,56 +5016,56 @@
           </a:p>
           <a:p>
             <a:r>
-              <a:rPr lang="en-US" sz="2800" dirty="0" err="1">
+              <a:rPr lang="en-US" sz="2000" dirty="0" err="1">
                 <a:latin typeface="Arial" panose="020B0604020202020204" pitchFamily="34" charset="0"/>
                 <a:cs typeface="Arial" panose="020B0604020202020204" pitchFamily="34" charset="0"/>
               </a:rPr>
               <a:t>Ferland</a:t>
             </a:r>
             <a:r>
-              <a:rPr lang="en-US" sz="2800" dirty="0">
+              <a:rPr lang="en-US" sz="2000" dirty="0">
                 <a:latin typeface="Arial" panose="020B0604020202020204" pitchFamily="34" charset="0"/>
                 <a:cs typeface="Arial" panose="020B0604020202020204" pitchFamily="34" charset="0"/>
               </a:rPr>
               <a:t>, G. J.; Porter, R. L.; van Hoof, P. A. M.; Williams, R. J. R.; Abel, N. P.; </a:t>
             </a:r>
             <a:r>
-              <a:rPr lang="en-US" sz="2800" dirty="0" err="1">
+              <a:rPr lang="en-US" sz="2000" dirty="0" err="1">
                 <a:latin typeface="Arial" panose="020B0604020202020204" pitchFamily="34" charset="0"/>
                 <a:cs typeface="Arial" panose="020B0604020202020204" pitchFamily="34" charset="0"/>
               </a:rPr>
               <a:t>Lykins</a:t>
             </a:r>
             <a:r>
-              <a:rPr lang="en-US" sz="2800" dirty="0">
+              <a:rPr lang="en-US" sz="2000" dirty="0">
                 <a:latin typeface="Arial" panose="020B0604020202020204" pitchFamily="34" charset="0"/>
                 <a:cs typeface="Arial" panose="020B0604020202020204" pitchFamily="34" charset="0"/>
               </a:rPr>
               <a:t>, M. L.; Shaw, G.; </a:t>
             </a:r>
             <a:r>
-              <a:rPr lang="en-US" sz="2800" dirty="0" err="1">
+              <a:rPr lang="en-US" sz="2000" dirty="0" err="1">
                 <a:latin typeface="Arial" panose="020B0604020202020204" pitchFamily="34" charset="0"/>
                 <a:cs typeface="Arial" panose="020B0604020202020204" pitchFamily="34" charset="0"/>
               </a:rPr>
               <a:t>Henney</a:t>
             </a:r>
             <a:r>
-              <a:rPr lang="en-US" sz="2800" dirty="0">
+              <a:rPr lang="en-US" sz="2000" dirty="0">
                 <a:latin typeface="Arial" panose="020B0604020202020204" pitchFamily="34" charset="0"/>
                 <a:cs typeface="Arial" panose="020B0604020202020204" pitchFamily="34" charset="0"/>
               </a:rPr>
               <a:t>, W. J.; Stancil, P. C., 2013, </a:t>
             </a:r>
             <a:r>
-              <a:rPr lang="en-US" sz="2800" dirty="0" err="1">
+              <a:rPr lang="en-US" sz="2000" dirty="0" err="1">
                 <a:latin typeface="Arial" panose="020B0604020202020204" pitchFamily="34" charset="0"/>
                 <a:cs typeface="Arial" panose="020B0604020202020204" pitchFamily="34" charset="0"/>
               </a:rPr>
               <a:t>RevMexAA</a:t>
             </a:r>
             <a:r>
-              <a:rPr lang="en-US" sz="2800" dirty="0">
+              <a:rPr lang="en-US" sz="2000" dirty="0">
                 <a:latin typeface="Arial" panose="020B0604020202020204" pitchFamily="34" charset="0"/>
                 <a:cs typeface="Arial" panose="020B0604020202020204" pitchFamily="34" charset="0"/>
               </a:rPr>
@@ -4536,7 +5074,62 @@
           </a:p>
           <a:p>
             <a:r>
-              <a:rPr lang="en-US" sz="2800" dirty="0">
+              <a:rPr lang="en-US" sz="2000" dirty="0" err="1">
+                <a:latin typeface="Arial" panose="020B0604020202020204" pitchFamily="34" charset="0"/>
+                <a:cs typeface="Arial" panose="020B0604020202020204" pitchFamily="34" charset="0"/>
+              </a:rPr>
+              <a:t>Lamareille</a:t>
+            </a:r>
+            <a:r>
+              <a:rPr lang="en-US" sz="2000" dirty="0">
+                <a:latin typeface="Arial" panose="020B0604020202020204" pitchFamily="34" charset="0"/>
+                <a:cs typeface="Arial" panose="020B0604020202020204" pitchFamily="34" charset="0"/>
+              </a:rPr>
+              <a:t>, F. 2010, A&amp;A, 509, A53</a:t>
+            </a:r>
+          </a:p>
+          <a:p>
+            <a:r>
+              <a:rPr lang="de-DE" sz="2000" dirty="0">
+                <a:latin typeface="Arial" panose="020B0604020202020204" pitchFamily="34" charset="0"/>
+                <a:cs typeface="Arial" panose="020B0604020202020204" pitchFamily="34" charset="0"/>
+              </a:rPr>
+              <a:t>Richardson C. T., Allen J. T., Baldwin J. A., Hewett P. C., Ferland G. J., 2014, MNRAS, 437, 2376</a:t>
+            </a:r>
+          </a:p>
+          <a:p>
+            <a:r>
+              <a:rPr lang="en-US" sz="2000" dirty="0" err="1">
+                <a:latin typeface="Arial" panose="020B0604020202020204" pitchFamily="34" charset="0"/>
+                <a:cs typeface="Arial" panose="020B0604020202020204" pitchFamily="34" charset="0"/>
+              </a:rPr>
+              <a:t>Shirazi</a:t>
+            </a:r>
+            <a:r>
+              <a:rPr lang="en-US" sz="2000" dirty="0">
+                <a:latin typeface="Arial" panose="020B0604020202020204" pitchFamily="34" charset="0"/>
+                <a:cs typeface="Arial" panose="020B0604020202020204" pitchFamily="34" charset="0"/>
+              </a:rPr>
+              <a:t>, M., &amp; </a:t>
+            </a:r>
+            <a:r>
+              <a:rPr lang="en-US" sz="2000" dirty="0" err="1">
+                <a:latin typeface="Arial" panose="020B0604020202020204" pitchFamily="34" charset="0"/>
+                <a:cs typeface="Arial" panose="020B0604020202020204" pitchFamily="34" charset="0"/>
+              </a:rPr>
+              <a:t>Brinchmann</a:t>
+            </a:r>
+            <a:r>
+              <a:rPr lang="en-US" sz="2000" dirty="0">
+                <a:latin typeface="Arial" panose="020B0604020202020204" pitchFamily="34" charset="0"/>
+                <a:cs typeface="Arial" panose="020B0604020202020204" pitchFamily="34" charset="0"/>
+              </a:rPr>
+              <a:t>, J. 2012, MNRAS, 421, 1043</a:t>
+            </a:r>
+          </a:p>
+          <a:p>
+            <a:r>
+              <a:rPr lang="en-US" sz="2000" dirty="0">
                 <a:latin typeface="Arial" panose="020B0604020202020204" pitchFamily="34" charset="0"/>
                 <a:cs typeface="Arial" panose="020B0604020202020204" pitchFamily="34" charset="0"/>
               </a:rPr>
@@ -4553,7 +5146,7 @@
         </p:nvSpPr>
         <p:spPr>
           <a:xfrm>
-            <a:off x="32202791" y="24500990"/>
+            <a:off x="32217635" y="22478370"/>
             <a:ext cx="10025847" cy="7048083"/>
           </a:xfrm>
           <a:prstGeom prst="rect">
@@ -4589,7 +5182,7 @@
                 <a:latin typeface="Arial" panose="020B0604020202020204" pitchFamily="34" charset="0"/>
                 <a:cs typeface="Arial" panose="020B0604020202020204" pitchFamily="34" charset="0"/>
               </a:rPr>
-              <a:t>The residual plots appear to be random, indicating that our model is a good fit. </a:t>
+              <a:t>The lack of significant variation between our three models indicates that our regression is a good fit. </a:t>
             </a:r>
           </a:p>
           <a:p>
@@ -4602,37 +5195,15 @@
                 <a:latin typeface="Arial" panose="020B0604020202020204" pitchFamily="34" charset="0"/>
                 <a:cs typeface="Arial" panose="020B0604020202020204" pitchFamily="34" charset="0"/>
               </a:rPr>
-              <a:t>Our line ratios do not fall along the data as strongly as we would like, especially [O III]/H</a:t>
-            </a:r>
-            <a:r>
-              <a:rPr lang="el-GR" sz="2800" dirty="0">
-                <a:latin typeface="Arial" panose="020B0604020202020204" pitchFamily="34" charset="0"/>
-                <a:cs typeface="Arial" panose="020B0604020202020204" pitchFamily="34" charset="0"/>
-              </a:rPr>
-              <a:t>β</a:t>
-            </a:r>
-            <a:r>
-              <a:rPr lang="en-US" sz="2800" dirty="0">
-                <a:latin typeface="Arial" panose="020B0604020202020204" pitchFamily="34" charset="0"/>
-                <a:cs typeface="Arial" panose="020B0604020202020204" pitchFamily="34" charset="0"/>
-              </a:rPr>
-              <a:t> vs [O I]/H</a:t>
-            </a:r>
-            <a:r>
-              <a:rPr lang="el-GR" sz="2800" dirty="0">
-                <a:latin typeface="Arial" panose="020B0604020202020204" pitchFamily="34" charset="0"/>
-                <a:cs typeface="Arial" panose="020B0604020202020204" pitchFamily="34" charset="0"/>
-              </a:rPr>
-              <a:t>α</a:t>
-            </a:r>
-            <a:r>
-              <a:rPr lang="en-US" sz="2800" dirty="0">
-                <a:latin typeface="Arial" panose="020B0604020202020204" pitchFamily="34" charset="0"/>
-                <a:cs typeface="Arial" panose="020B0604020202020204" pitchFamily="34" charset="0"/>
-              </a:rPr>
-              <a:t>, indicating that we need to adjust the model.   </a:t>
-            </a:r>
-            <a:endParaRPr lang="en-US" sz="3200" dirty="0">
+              <a:t>This model does not act as a strong indicator of diagnostic ratios for emissions in the infrared spectrum.</a:t>
+            </a:r>
+          </a:p>
+          <a:p>
+            <a:pPr marL="457200" indent="-457200">
+              <a:buFont typeface="Arial" panose="020B0604020202020204" pitchFamily="34" charset="0"/>
+              <a:buChar char="•"/>
+            </a:pPr>
+            <a:endParaRPr lang="en-US" sz="2800" dirty="0">
               <a:latin typeface="Arial" panose="020B0604020202020204" pitchFamily="34" charset="0"/>
               <a:cs typeface="Arial" panose="020B0604020202020204" pitchFamily="34" charset="0"/>
             </a:endParaRPr>
@@ -4680,7 +5251,7 @@
                 <a:latin typeface="Arial" panose="020B0604020202020204" pitchFamily="34" charset="0"/>
                 <a:cs typeface="Arial" panose="020B0604020202020204" pitchFamily="34" charset="0"/>
               </a:rPr>
-              <a:t>Complete statistical analysis of our model, namely our chi square test. </a:t>
+              <a:t>Examine the physical cause of the zig-zag pattern in our simulated values through individual simulations of galaxies. </a:t>
             </a:r>
           </a:p>
           <a:p>
@@ -4693,7 +5264,7 @@
                 <a:latin typeface="Arial" panose="020B0604020202020204" pitchFamily="34" charset="0"/>
                 <a:cs typeface="Arial" panose="020B0604020202020204" pitchFamily="34" charset="0"/>
               </a:rPr>
-              <a:t>Consider using an isobaric (constant pressure) model as opposed to an isochoric (constant density) model to help match our produced line ratios to the data. </a:t>
+              <a:t>Examine the effects of ionization parameter variation on our model to determine if we can utilize it in determining LINER galaxies.   </a:t>
             </a:r>
           </a:p>
           <a:p>
@@ -4732,7 +5303,7 @@
         </p:nvSpPr>
         <p:spPr>
           <a:xfrm>
-            <a:off x="30524082" y="8015606"/>
+            <a:off x="30988197" y="8042944"/>
             <a:ext cx="10370126" cy="892552"/>
           </a:xfrm>
           <a:prstGeom prst="rect">
@@ -4771,7 +5342,7 @@
         </p:nvSpPr>
         <p:spPr>
           <a:xfrm>
-            <a:off x="3660095" y="14304173"/>
+            <a:off x="4774249" y="11040512"/>
             <a:ext cx="6734664" cy="369332"/>
           </a:xfrm>
           <a:prstGeom prst="rect">
@@ -4831,8 +5402,8 @@
         </p:nvSpPr>
         <p:spPr>
           <a:xfrm>
-            <a:off x="982430" y="22572095"/>
-            <a:ext cx="14339452" cy="5447645"/>
+            <a:off x="1151932" y="18831109"/>
+            <a:ext cx="14339452" cy="8894743"/>
           </a:xfrm>
           <a:prstGeom prst="rect">
             <a:avLst/>
@@ -5031,6 +5602,245 @@
               <a:buFont typeface="Arial" panose="020B0604020202020204" pitchFamily="34" charset="0"/>
               <a:buChar char="•"/>
             </a:pPr>
+            <a:r>
+              <a:rPr lang="en-US" sz="2800" dirty="0">
+                <a:solidFill>
+                  <a:prstClr val="black"/>
+                </a:solidFill>
+                <a:latin typeface="Arial" panose="020B0604020202020204" pitchFamily="34" charset="0"/>
+                <a:cs typeface="Arial" panose="020B0604020202020204" pitchFamily="34" charset="0"/>
+              </a:rPr>
+              <a:t>We also constrain the incident radiation curve by describing the elemental abundances, hydrogen density, and photon flux of the cloud.</a:t>
+            </a:r>
+          </a:p>
+          <a:p>
+            <a:pPr marL="457200" lvl="0" indent="-457200">
+              <a:buFont typeface="Arial" panose="020B0604020202020204" pitchFamily="34" charset="0"/>
+              <a:buChar char="•"/>
+            </a:pPr>
+            <a:r>
+              <a:rPr lang="en-US" sz="2800" dirty="0">
+                <a:solidFill>
+                  <a:prstClr val="black"/>
+                </a:solidFill>
+                <a:latin typeface="Arial" panose="020B0604020202020204" pitchFamily="34" charset="0"/>
+                <a:cs typeface="Arial" panose="020B0604020202020204" pitchFamily="34" charset="0"/>
+              </a:rPr>
+              <a:t>Stopping boundary condition for simulations is when the fraction of electron to total hydrogen densities falls below 0.01</a:t>
+            </a:r>
+          </a:p>
+          <a:p>
+            <a:pPr marL="457200" lvl="0" indent="-457200">
+              <a:buFont typeface="Arial" panose="020B0604020202020204" pitchFamily="34" charset="0"/>
+              <a:buChar char="•"/>
+            </a:pPr>
+            <a:r>
+              <a:rPr lang="en-US" sz="2800" dirty="0">
+                <a:latin typeface="Arial" panose="020B0604020202020204" pitchFamily="34" charset="0"/>
+                <a:cs typeface="Arial" panose="020B0604020202020204" pitchFamily="34" charset="0"/>
+              </a:rPr>
+              <a:t>We fit the values of </a:t>
+            </a:r>
+            <a:r>
+              <a:rPr lang="el-GR" sz="2800" dirty="0">
+                <a:latin typeface="Arial" panose="020B0604020202020204" pitchFamily="34" charset="0"/>
+                <a:cs typeface="Arial" panose="020B0604020202020204" pitchFamily="34" charset="0"/>
+              </a:rPr>
+              <a:t>α</a:t>
+            </a:r>
+            <a:r>
+              <a:rPr lang="en-US" sz="2800" baseline="-25000" dirty="0">
+                <a:latin typeface="Arial" panose="020B0604020202020204" pitchFamily="34" charset="0"/>
+                <a:cs typeface="Arial" panose="020B0604020202020204" pitchFamily="34" charset="0"/>
+              </a:rPr>
+              <a:t>x  </a:t>
+            </a:r>
+            <a:r>
+              <a:rPr lang="en-US" sz="2800" dirty="0">
+                <a:latin typeface="Arial" panose="020B0604020202020204" pitchFamily="34" charset="0"/>
+                <a:cs typeface="Arial" panose="020B0604020202020204" pitchFamily="34" charset="0"/>
+              </a:rPr>
+              <a:t>and </a:t>
+            </a:r>
+            <a:r>
+              <a:rPr lang="el-GR" sz="2800" dirty="0">
+                <a:latin typeface="Arial" panose="020B0604020202020204" pitchFamily="34" charset="0"/>
+                <a:cs typeface="Arial" panose="020B0604020202020204" pitchFamily="34" charset="0"/>
+              </a:rPr>
+              <a:t>α</a:t>
+            </a:r>
+            <a:r>
+              <a:rPr lang="en-US" sz="2800" baseline="-25000" dirty="0" err="1">
+                <a:latin typeface="Arial" panose="020B0604020202020204" pitchFamily="34" charset="0"/>
+                <a:cs typeface="Arial" panose="020B0604020202020204" pitchFamily="34" charset="0"/>
+              </a:rPr>
+              <a:t>uv</a:t>
+            </a:r>
+            <a:r>
+              <a:rPr lang="en-US" sz="2800" baseline="-25000" dirty="0">
+                <a:latin typeface="Arial" panose="020B0604020202020204" pitchFamily="34" charset="0"/>
+                <a:cs typeface="Arial" panose="020B0604020202020204" pitchFamily="34" charset="0"/>
+              </a:rPr>
+              <a:t> </a:t>
+            </a:r>
+            <a:r>
+              <a:rPr lang="en-US" sz="2800" dirty="0">
+                <a:latin typeface="Arial" panose="020B0604020202020204" pitchFamily="34" charset="0"/>
+                <a:cs typeface="Arial" panose="020B0604020202020204" pitchFamily="34" charset="0"/>
+              </a:rPr>
+              <a:t>using Ordinary Least Squares regression, producing the line:</a:t>
+            </a:r>
+          </a:p>
+          <a:p>
+            <a:r>
+              <a:rPr lang="en-US" sz="2800" dirty="0">
+                <a:latin typeface="Arial" panose="020B0604020202020204" pitchFamily="34" charset="0"/>
+                <a:cs typeface="Arial" panose="020B0604020202020204" pitchFamily="34" charset="0"/>
+              </a:rPr>
+              <a:t> </a:t>
+            </a:r>
+          </a:p>
+          <a:p>
+            <a:endParaRPr lang="en-US" sz="2800" dirty="0">
+              <a:latin typeface="Arial" panose="020B0604020202020204" pitchFamily="34" charset="0"/>
+              <a:cs typeface="Arial" panose="020B0604020202020204" pitchFamily="34" charset="0"/>
+            </a:endParaRPr>
+          </a:p>
+          <a:p>
+            <a:pPr marL="457200" indent="-457200">
+              <a:buFont typeface="Arial" panose="020B0604020202020204" pitchFamily="34" charset="0"/>
+              <a:buChar char="•"/>
+            </a:pPr>
+            <a:r>
+              <a:rPr lang="en-US" sz="2800" dirty="0">
+                <a:latin typeface="Arial" panose="020B0604020202020204" pitchFamily="34" charset="0"/>
+                <a:cs typeface="Arial" panose="020B0604020202020204" pitchFamily="34" charset="0"/>
+              </a:rPr>
+              <a:t>We run simulations varying </a:t>
+            </a:r>
+            <a:r>
+              <a:rPr lang="en-US" sz="2800" i="1" dirty="0">
+                <a:latin typeface="Arial" panose="020B0604020202020204" pitchFamily="34" charset="0"/>
+                <a:cs typeface="Arial" panose="020B0604020202020204" pitchFamily="34" charset="0"/>
+              </a:rPr>
+              <a:t>T</a:t>
+            </a:r>
+            <a:r>
+              <a:rPr lang="en-US" sz="2800" baseline="-25000" dirty="0">
+                <a:latin typeface="Arial" panose="020B0604020202020204" pitchFamily="34" charset="0"/>
+                <a:cs typeface="Arial" panose="020B0604020202020204" pitchFamily="34" charset="0"/>
+              </a:rPr>
+              <a:t>BB </a:t>
+            </a:r>
+            <a:r>
+              <a:rPr lang="en-US" sz="2800" dirty="0">
+                <a:latin typeface="Arial" panose="020B0604020202020204" pitchFamily="34" charset="0"/>
+                <a:cs typeface="Arial" panose="020B0604020202020204" pitchFamily="34" charset="0"/>
+              </a:rPr>
+              <a:t>between 10</a:t>
+            </a:r>
+            <a:r>
+              <a:rPr lang="en-US" sz="2800" baseline="30000" dirty="0">
+                <a:latin typeface="Arial" panose="020B0604020202020204" pitchFamily="34" charset="0"/>
+                <a:cs typeface="Arial" panose="020B0604020202020204" pitchFamily="34" charset="0"/>
+              </a:rPr>
+              <a:t>4 </a:t>
+            </a:r>
+            <a:r>
+              <a:rPr lang="en-US" sz="2800" dirty="0">
+                <a:latin typeface="Arial" panose="020B0604020202020204" pitchFamily="34" charset="0"/>
+                <a:cs typeface="Arial" panose="020B0604020202020204" pitchFamily="34" charset="0"/>
+              </a:rPr>
+              <a:t>K and 10</a:t>
+            </a:r>
+            <a:r>
+              <a:rPr lang="en-US" sz="2800" baseline="30000" dirty="0">
+                <a:latin typeface="Arial" panose="020B0604020202020204" pitchFamily="34" charset="0"/>
+                <a:cs typeface="Arial" panose="020B0604020202020204" pitchFamily="34" charset="0"/>
+              </a:rPr>
+              <a:t>7 </a:t>
+            </a:r>
+            <a:r>
+              <a:rPr lang="en-US" sz="2800" dirty="0">
+                <a:latin typeface="Arial" panose="020B0604020202020204" pitchFamily="34" charset="0"/>
+                <a:cs typeface="Arial" panose="020B0604020202020204" pitchFamily="34" charset="0"/>
+              </a:rPr>
+              <a:t>K</a:t>
+            </a:r>
+          </a:p>
+          <a:p>
+            <a:pPr marL="457200" indent="-457200">
+              <a:buFont typeface="Arial" panose="020B0604020202020204" pitchFamily="34" charset="0"/>
+              <a:buChar char="•"/>
+            </a:pPr>
+            <a:r>
+              <a:rPr lang="en-US" sz="2800" dirty="0">
+                <a:latin typeface="Arial" panose="020B0604020202020204" pitchFamily="34" charset="0"/>
+                <a:cs typeface="Arial" panose="020B0604020202020204" pitchFamily="34" charset="0"/>
+              </a:rPr>
+              <a:t>The value of </a:t>
+            </a:r>
+            <a:r>
+              <a:rPr lang="el-GR" sz="2800" dirty="0">
+                <a:latin typeface="Arial" panose="020B0604020202020204" pitchFamily="34" charset="0"/>
+                <a:cs typeface="Arial" panose="020B0604020202020204" pitchFamily="34" charset="0"/>
+              </a:rPr>
+              <a:t>α</a:t>
+            </a:r>
+            <a:r>
+              <a:rPr lang="en-US" sz="2800" baseline="-25000" dirty="0">
+                <a:latin typeface="Arial" panose="020B0604020202020204" pitchFamily="34" charset="0"/>
+                <a:cs typeface="Arial" panose="020B0604020202020204" pitchFamily="34" charset="0"/>
+              </a:rPr>
+              <a:t>x </a:t>
+            </a:r>
+            <a:r>
+              <a:rPr lang="en-US" sz="2800" dirty="0">
+                <a:latin typeface="Arial" panose="020B0604020202020204" pitchFamily="34" charset="0"/>
+                <a:cs typeface="Arial" panose="020B0604020202020204" pitchFamily="34" charset="0"/>
+              </a:rPr>
+              <a:t>is varied according to the standard deviation of the mean, 0.51, and the value of </a:t>
+            </a:r>
+            <a:r>
+              <a:rPr lang="el-GR" sz="2800" dirty="0">
+                <a:latin typeface="Arial" panose="020B0604020202020204" pitchFamily="34" charset="0"/>
+                <a:cs typeface="Arial" panose="020B0604020202020204" pitchFamily="34" charset="0"/>
+              </a:rPr>
+              <a:t>α</a:t>
+            </a:r>
+            <a:r>
+              <a:rPr lang="en-US" sz="2800" baseline="-25000" dirty="0" err="1">
+                <a:latin typeface="Arial" panose="020B0604020202020204" pitchFamily="34" charset="0"/>
+                <a:cs typeface="Arial" panose="020B0604020202020204" pitchFamily="34" charset="0"/>
+              </a:rPr>
+              <a:t>uv</a:t>
+            </a:r>
+            <a:r>
+              <a:rPr lang="en-US" sz="2800" dirty="0">
+                <a:latin typeface="Arial" panose="020B0604020202020204" pitchFamily="34" charset="0"/>
+                <a:cs typeface="Arial" panose="020B0604020202020204" pitchFamily="34" charset="0"/>
+              </a:rPr>
+              <a:t> is changed accordingly. </a:t>
+            </a:r>
+          </a:p>
+          <a:p>
+            <a:pPr marL="457200" indent="-457200">
+              <a:buFont typeface="Arial" panose="020B0604020202020204" pitchFamily="34" charset="0"/>
+              <a:buChar char="•"/>
+            </a:pPr>
+            <a:r>
+              <a:rPr lang="en-US" sz="2800" dirty="0">
+                <a:latin typeface="Arial" panose="020B0604020202020204" pitchFamily="34" charset="0"/>
+                <a:cs typeface="Arial" panose="020B0604020202020204" pitchFamily="34" charset="0"/>
+              </a:rPr>
+              <a:t>Optical data obtained via the Sloan Digital Sky Survey (SDSS)</a:t>
+            </a:r>
+          </a:p>
+          <a:p>
+            <a:pPr marL="457200" lvl="0" indent="-457200">
+              <a:buFont typeface="Arial" panose="020B0604020202020204" pitchFamily="34" charset="0"/>
+              <a:buChar char="•"/>
+            </a:pPr>
             <a:endParaRPr lang="en-US" sz="2800" dirty="0">
               <a:solidFill>
                 <a:prstClr val="black"/>
@@ -5039,90 +5849,6 @@
               <a:cs typeface="Arial" panose="020B0604020202020204" pitchFamily="34" charset="0"/>
             </a:endParaRPr>
           </a:p>
-          <a:p>
-            <a:pPr marL="571500" indent="-571500">
-              <a:buFont typeface="Arial" panose="020B0604020202020204" pitchFamily="34" charset="0"/>
-              <a:buChar char="•"/>
-            </a:pPr>
-            <a:r>
-              <a:rPr lang="en-US" sz="2800" dirty="0">
-                <a:latin typeface="Arial" panose="020B0604020202020204" pitchFamily="34" charset="0"/>
-                <a:cs typeface="Arial" panose="020B0604020202020204" pitchFamily="34" charset="0"/>
-              </a:rPr>
-              <a:t>We fit the values of </a:t>
-            </a:r>
-            <a:r>
-              <a:rPr lang="el-GR" sz="2800" dirty="0">
-                <a:latin typeface="Arial" panose="020B0604020202020204" pitchFamily="34" charset="0"/>
-                <a:cs typeface="Arial" panose="020B0604020202020204" pitchFamily="34" charset="0"/>
-              </a:rPr>
-              <a:t>α</a:t>
-            </a:r>
-            <a:r>
-              <a:rPr lang="en-US" sz="2800" baseline="-25000" dirty="0">
-                <a:latin typeface="Arial" panose="020B0604020202020204" pitchFamily="34" charset="0"/>
-                <a:cs typeface="Arial" panose="020B0604020202020204" pitchFamily="34" charset="0"/>
-              </a:rPr>
-              <a:t>x  </a:t>
-            </a:r>
-            <a:r>
-              <a:rPr lang="en-US" sz="2800" dirty="0">
-                <a:latin typeface="Arial" panose="020B0604020202020204" pitchFamily="34" charset="0"/>
-                <a:cs typeface="Arial" panose="020B0604020202020204" pitchFamily="34" charset="0"/>
-              </a:rPr>
-              <a:t>and </a:t>
-            </a:r>
-            <a:r>
-              <a:rPr lang="el-GR" sz="2800" dirty="0">
-                <a:latin typeface="Arial" panose="020B0604020202020204" pitchFamily="34" charset="0"/>
-                <a:cs typeface="Arial" panose="020B0604020202020204" pitchFamily="34" charset="0"/>
-              </a:rPr>
-              <a:t>α</a:t>
-            </a:r>
-            <a:r>
-              <a:rPr lang="en-US" sz="2800" baseline="-25000" dirty="0" err="1">
-                <a:latin typeface="Arial" panose="020B0604020202020204" pitchFamily="34" charset="0"/>
-                <a:cs typeface="Arial" panose="020B0604020202020204" pitchFamily="34" charset="0"/>
-              </a:rPr>
-              <a:t>uv</a:t>
-            </a:r>
-            <a:r>
-              <a:rPr lang="en-US" sz="2800" baseline="-25000" dirty="0">
-                <a:latin typeface="Arial" panose="020B0604020202020204" pitchFamily="34" charset="0"/>
-                <a:cs typeface="Arial" panose="020B0604020202020204" pitchFamily="34" charset="0"/>
-              </a:rPr>
-              <a:t> </a:t>
-            </a:r>
-            <a:r>
-              <a:rPr lang="en-US" sz="2800" dirty="0">
-                <a:latin typeface="Arial" panose="020B0604020202020204" pitchFamily="34" charset="0"/>
-                <a:cs typeface="Arial" panose="020B0604020202020204" pitchFamily="34" charset="0"/>
-              </a:rPr>
-              <a:t>using Ordinary Least Squares regression, producing the line:</a:t>
-            </a:r>
-          </a:p>
-          <a:p>
-            <a:r>
-              <a:rPr lang="en-US" sz="2800" dirty="0">
-                <a:latin typeface="Arial" panose="020B0604020202020204" pitchFamily="34" charset="0"/>
-                <a:cs typeface="Arial" panose="020B0604020202020204" pitchFamily="34" charset="0"/>
-              </a:rPr>
-              <a:t> </a:t>
-            </a:r>
-          </a:p>
-          <a:p>
-            <a:pPr marL="457200" lvl="0" indent="-457200">
-              <a:buFont typeface="Arial" panose="020B0604020202020204" pitchFamily="34" charset="0"/>
-              <a:buChar char="•"/>
-            </a:pPr>
-            <a:endParaRPr lang="en-US" sz="2800" dirty="0">
-              <a:solidFill>
-                <a:prstClr val="black"/>
-              </a:solidFill>
-              <a:latin typeface="Arial" panose="020B0604020202020204" pitchFamily="34" charset="0"/>
-              <a:cs typeface="Arial" panose="020B0604020202020204" pitchFamily="34" charset="0"/>
-            </a:endParaRPr>
-          </a:p>
         </p:txBody>
       </p:sp>
       <p:sp>
@@ -5133,7 +5859,7 @@
         </p:nvSpPr>
         <p:spPr>
           <a:xfrm>
-            <a:off x="32202790" y="30184162"/>
+            <a:off x="32231778" y="29522442"/>
             <a:ext cx="10290434" cy="1446550"/>
           </a:xfrm>
           <a:prstGeom prst="rect">
@@ -5185,8 +5911,8 @@
         </p:nvCxnSpPr>
         <p:spPr>
           <a:xfrm flipH="1" flipV="1">
-            <a:off x="15960341" y="6298532"/>
-            <a:ext cx="18288" cy="24688800"/>
+            <a:off x="15857466" y="2892155"/>
+            <a:ext cx="121163" cy="28095177"/>
           </a:xfrm>
           <a:prstGeom prst="line">
             <a:avLst/>
@@ -5220,8 +5946,8 @@
         </p:nvCxnSpPr>
         <p:spPr>
           <a:xfrm flipH="1" flipV="1">
-            <a:off x="30608745" y="6390787"/>
-            <a:ext cx="18288" cy="24688800"/>
+            <a:off x="30597578" y="2892155"/>
+            <a:ext cx="29455" cy="28187432"/>
           </a:xfrm>
           <a:prstGeom prst="line">
             <a:avLst/>
@@ -5256,7 +5982,7 @@
           <p:nvPr/>
         </p:nvPicPr>
         <p:blipFill>
-          <a:blip r:embed="rId4">
+          <a:blip r:embed="rId3">
             <a:extLst>
               <a:ext uri="{28A0092B-C50C-407E-A947-70E740481C1C}">
                 <a14:useLocalDpi xmlns:a14="http://schemas.microsoft.com/office/drawing/2010/main" val="0"/>
@@ -5286,7 +6012,7 @@
           <p:nvPr/>
         </p:nvPicPr>
         <p:blipFill>
-          <a:blip r:embed="rId5">
+          <a:blip r:embed="rId4">
             <a:extLst>
               <a:ext uri="{28A0092B-C50C-407E-A947-70E740481C1C}">
                 <a14:useLocalDpi xmlns:a14="http://schemas.microsoft.com/office/drawing/2010/main" val="0"/>
@@ -5316,7 +6042,7 @@
           <p:nvPr/>
         </p:nvPicPr>
         <p:blipFill>
-          <a:blip r:embed="rId6">
+          <a:blip r:embed="rId5">
             <a:extLst>
               <a:ext uri="{28A0092B-C50C-407E-A947-70E740481C1C}">
                 <a14:useLocalDpi xmlns:a14="http://schemas.microsoft.com/office/drawing/2010/main" val="0"/>
@@ -5337,9 +6063,238 @@
           </a:prstGeom>
         </p:spPr>
       </p:pic>
+      <p:sp>
+        <p:nvSpPr>
+          <p:cNvPr id="5" name="TextBox 4"/>
+          <p:cNvSpPr txBox="1"/>
+          <p:nvPr/>
+        </p:nvSpPr>
+        <p:spPr>
+          <a:xfrm>
+            <a:off x="32296537" y="20908412"/>
+            <a:ext cx="9515294" cy="954107"/>
+          </a:xfrm>
+          <a:prstGeom prst="rect">
+            <a:avLst/>
+          </a:prstGeom>
+          <a:noFill/>
+        </p:spPr>
+        <p:txBody>
+          <a:bodyPr wrap="square" rtlCol="0">
+            <a:spAutoFit/>
+          </a:bodyPr>
+          <a:lstStyle/>
+          <a:p>
+            <a:pPr marL="457200" indent="-457200">
+              <a:buFont typeface="Arial" panose="020B0604020202020204" pitchFamily="34" charset="0"/>
+              <a:buChar char="•"/>
+            </a:pPr>
+            <a:r>
+              <a:rPr lang="en-US" sz="2800" dirty="0">
+                <a:latin typeface="Arial" panose="020B0604020202020204" pitchFamily="34" charset="0"/>
+                <a:cs typeface="Arial" panose="020B0604020202020204" pitchFamily="34" charset="0"/>
+              </a:rPr>
+              <a:t>Abundance diagnostic plots for Infrared emissions. </a:t>
+            </a:r>
+          </a:p>
+          <a:p>
+            <a:pPr marL="457200" indent="-457200">
+              <a:buFont typeface="Arial" panose="020B0604020202020204" pitchFamily="34" charset="0"/>
+              <a:buChar char="•"/>
+            </a:pPr>
+            <a:r>
+              <a:rPr lang="en-US" sz="2800" dirty="0">
+                <a:latin typeface="Arial" panose="020B0604020202020204" pitchFamily="34" charset="0"/>
+                <a:cs typeface="Arial" panose="020B0604020202020204" pitchFamily="34" charset="0"/>
+              </a:rPr>
+              <a:t>Models seem to under predict the data.   </a:t>
+            </a:r>
+          </a:p>
+        </p:txBody>
+      </p:sp>
+      <p:sp>
+        <p:nvSpPr>
+          <p:cNvPr id="6" name="TextBox 5"/>
+          <p:cNvSpPr txBox="1"/>
+          <p:nvPr/>
+        </p:nvSpPr>
+        <p:spPr>
+          <a:xfrm>
+            <a:off x="32215502" y="9619376"/>
+            <a:ext cx="10322986" cy="5693866"/>
+          </a:xfrm>
+          <a:prstGeom prst="rect">
+            <a:avLst/>
+          </a:prstGeom>
+          <a:noFill/>
+        </p:spPr>
+        <p:txBody>
+          <a:bodyPr wrap="square" rtlCol="0">
+            <a:spAutoFit/>
+          </a:bodyPr>
+          <a:lstStyle/>
+          <a:p>
+            <a:pPr marL="457200" indent="-457200">
+              <a:buFont typeface="Arial" panose="020B0604020202020204" pitchFamily="34" charset="0"/>
+              <a:buChar char="•"/>
+            </a:pPr>
+            <a:r>
+              <a:rPr lang="en-US" sz="2800" dirty="0">
+                <a:latin typeface="Arial" panose="020B0604020202020204" pitchFamily="34" charset="0"/>
+                <a:cs typeface="Arial" panose="020B0604020202020204" pitchFamily="34" charset="0"/>
+              </a:rPr>
+              <a:t>Diagnostic plots for elemental abundances in the optical spectrum derived from different elements at the same ionization level.  </a:t>
+            </a:r>
+          </a:p>
+          <a:p>
+            <a:pPr marL="457200" indent="-457200">
+              <a:buFont typeface="Arial" panose="020B0604020202020204" pitchFamily="34" charset="0"/>
+              <a:buChar char="•"/>
+            </a:pPr>
+            <a:r>
+              <a:rPr lang="en-US" sz="2800" dirty="0">
+                <a:latin typeface="Arial" panose="020B0604020202020204" pitchFamily="34" charset="0"/>
+                <a:cs typeface="Arial" panose="020B0604020202020204" pitchFamily="34" charset="0"/>
+              </a:rPr>
+              <a:t>[O III]/[</a:t>
+            </a:r>
+            <a:r>
+              <a:rPr lang="en-US" sz="2800" dirty="0" err="1">
+                <a:latin typeface="Arial" panose="020B0604020202020204" pitchFamily="34" charset="0"/>
+                <a:cs typeface="Arial" panose="020B0604020202020204" pitchFamily="34" charset="0"/>
+              </a:rPr>
+              <a:t>Ar</a:t>
+            </a:r>
+            <a:r>
+              <a:rPr lang="en-US" sz="2800" dirty="0">
+                <a:latin typeface="Arial" panose="020B0604020202020204" pitchFamily="34" charset="0"/>
+                <a:cs typeface="Arial" panose="020B0604020202020204" pitchFamily="34" charset="0"/>
+              </a:rPr>
+              <a:t> III] vs [Ne III / H</a:t>
+            </a:r>
+            <a:r>
+              <a:rPr lang="el-GR" sz="2800" dirty="0">
+                <a:latin typeface="Arial" panose="020B0604020202020204" pitchFamily="34" charset="0"/>
+                <a:cs typeface="Arial" panose="020B0604020202020204" pitchFamily="34" charset="0"/>
+              </a:rPr>
+              <a:t>α</a:t>
+            </a:r>
+            <a:r>
+              <a:rPr lang="en-US" sz="2800" dirty="0">
+                <a:latin typeface="Arial" panose="020B0604020202020204" pitchFamily="34" charset="0"/>
+                <a:cs typeface="Arial" panose="020B0604020202020204" pitchFamily="34" charset="0"/>
+              </a:rPr>
+              <a:t>] compares elements with high ionization potentials.  </a:t>
+            </a:r>
+          </a:p>
+          <a:p>
+            <a:pPr marL="457200" indent="-457200">
+              <a:buFont typeface="Arial" panose="020B0604020202020204" pitchFamily="34" charset="0"/>
+              <a:buChar char="•"/>
+            </a:pPr>
+            <a:r>
+              <a:rPr lang="en-US" sz="2800" dirty="0">
+                <a:latin typeface="Arial" panose="020B0604020202020204" pitchFamily="34" charset="0"/>
+                <a:cs typeface="Arial" panose="020B0604020202020204" pitchFamily="34" charset="0"/>
+              </a:rPr>
+              <a:t>[He I] depends linearly on Helium abundance.  </a:t>
+            </a:r>
+          </a:p>
+          <a:p>
+            <a:pPr marL="457200" indent="-457200">
+              <a:buFont typeface="Arial" panose="020B0604020202020204" pitchFamily="34" charset="0"/>
+              <a:buChar char="•"/>
+            </a:pPr>
+            <a:r>
+              <a:rPr lang="en-US" sz="2800" dirty="0">
+                <a:latin typeface="Arial" panose="020B0604020202020204" pitchFamily="34" charset="0"/>
+                <a:cs typeface="Arial" panose="020B0604020202020204" pitchFamily="34" charset="0"/>
+              </a:rPr>
+              <a:t>[O II] / [N II] affected weakly by ionization parameter and density, allowing it to act as a strong abundance diagnostic. </a:t>
+            </a:r>
+          </a:p>
+          <a:p>
+            <a:pPr marL="457200" indent="-457200">
+              <a:buFont typeface="Arial" panose="020B0604020202020204" pitchFamily="34" charset="0"/>
+              <a:buChar char="•"/>
+            </a:pPr>
+            <a:r>
+              <a:rPr lang="en-US" sz="2800" dirty="0">
+                <a:latin typeface="Arial" panose="020B0604020202020204" pitchFamily="34" charset="0"/>
+                <a:cs typeface="Arial" panose="020B0604020202020204" pitchFamily="34" charset="0"/>
+              </a:rPr>
+              <a:t>[O III] 4636 + [O III] 4959 + [O III] 5007/ H</a:t>
+            </a:r>
+            <a:r>
+              <a:rPr lang="el-GR" sz="2800" dirty="0">
+                <a:latin typeface="Arial" panose="020B0604020202020204" pitchFamily="34" charset="0"/>
+                <a:cs typeface="Arial" panose="020B0604020202020204" pitchFamily="34" charset="0"/>
+              </a:rPr>
+              <a:t>β</a:t>
+            </a:r>
+            <a:r>
+              <a:rPr lang="en-US" sz="2800" dirty="0">
+                <a:latin typeface="Arial" panose="020B0604020202020204" pitchFamily="34" charset="0"/>
+                <a:cs typeface="Arial" panose="020B0604020202020204" pitchFamily="34" charset="0"/>
+              </a:rPr>
+              <a:t> is insensitive to ionization and geometrical factors and increases with decreasing oxygen abundance</a:t>
+            </a:r>
+          </a:p>
+          <a:p>
+            <a:pPr marL="457200" indent="-457200">
+              <a:buFont typeface="Arial" panose="020B0604020202020204" pitchFamily="34" charset="0"/>
+              <a:buChar char="•"/>
+            </a:pPr>
+            <a:r>
+              <a:rPr lang="en-US" sz="2800" dirty="0">
+                <a:latin typeface="Arial" panose="020B0604020202020204" pitchFamily="34" charset="0"/>
+                <a:cs typeface="Arial" panose="020B0604020202020204" pitchFamily="34" charset="0"/>
+              </a:rPr>
+              <a:t>Our simulations show little variation between models.</a:t>
+            </a:r>
+          </a:p>
+          <a:p>
+            <a:pPr marL="457200" indent="-457200">
+              <a:buFont typeface="Arial" panose="020B0604020202020204" pitchFamily="34" charset="0"/>
+              <a:buChar char="•"/>
+            </a:pPr>
+            <a:endParaRPr lang="en-US" sz="2800" dirty="0"/>
+          </a:p>
+        </p:txBody>
+      </p:sp>
       <p:pic>
         <p:nvPicPr>
-          <p:cNvPr id="2" name="Picture 1"/>
+          <p:cNvPr id="13" name="Picture 12"/>
+          <p:cNvPicPr>
+            <a:picLocks noChangeAspect="1"/>
+          </p:cNvPicPr>
+          <p:nvPr/>
+        </p:nvPicPr>
+        <p:blipFill>
+          <a:blip r:embed="rId6">
+            <a:extLst>
+              <a:ext uri="{28A0092B-C50C-407E-A947-70E740481C1C}">
+                <a14:useLocalDpi xmlns:a14="http://schemas.microsoft.com/office/drawing/2010/main" val="0"/>
+              </a:ext>
+            </a:extLst>
+          </a:blip>
+          <a:stretch>
+            <a:fillRect/>
+          </a:stretch>
+        </p:blipFill>
+        <p:spPr>
+          <a:xfrm>
+            <a:off x="4785135" y="24500990"/>
+            <a:ext cx="6334125" cy="476250"/>
+          </a:xfrm>
+          <a:prstGeom prst="rect">
+            <a:avLst/>
+          </a:prstGeom>
+        </p:spPr>
+      </p:pic>
+      <p:pic>
+        <p:nvPicPr>
+          <p:cNvPr id="19" name="Picture 18"/>
           <p:cNvPicPr>
             <a:picLocks noChangeAspect="1"/>
           </p:cNvPicPr>
@@ -5359,8 +6314,8 @@
         </p:blipFill>
         <p:spPr>
           <a:xfrm>
-            <a:off x="17431779" y="11559895"/>
-            <a:ext cx="11655877" cy="5857887"/>
+            <a:off x="3295166" y="20140016"/>
+            <a:ext cx="8858250" cy="676275"/>
           </a:xfrm>
           <a:prstGeom prst="rect">
             <a:avLst/>
@@ -5369,7 +6324,7 @@
       </p:pic>
       <p:pic>
         <p:nvPicPr>
-          <p:cNvPr id="14" name="Picture 13"/>
+          <p:cNvPr id="36" name="Picture 35"/>
           <p:cNvPicPr>
             <a:picLocks noChangeAspect="1"/>
           </p:cNvPicPr>
@@ -5389,8 +6344,8 @@
         </p:blipFill>
         <p:spPr>
           <a:xfrm>
-            <a:off x="32202790" y="6469519"/>
-            <a:ext cx="10245316" cy="5148982"/>
+            <a:off x="31306677" y="14964998"/>
+            <a:ext cx="11786183" cy="5907823"/>
           </a:xfrm>
           <a:prstGeom prst="rect">
             <a:avLst/>
@@ -5399,7 +6354,7 @@
       </p:pic>
       <p:pic>
         <p:nvPicPr>
-          <p:cNvPr id="15" name="Picture 14"/>
+          <p:cNvPr id="38" name="Picture 37"/>
           <p:cNvPicPr>
             <a:picLocks noChangeAspect="1"/>
           </p:cNvPicPr>
@@ -5419,8 +6374,8 @@
         </p:blipFill>
         <p:spPr>
           <a:xfrm>
-            <a:off x="32170238" y="13004701"/>
-            <a:ext cx="10058400" cy="5055044"/>
+            <a:off x="16914697" y="22783800"/>
+            <a:ext cx="11585912" cy="5807437"/>
           </a:xfrm>
           <a:prstGeom prst="rect">
             <a:avLst/>
@@ -5429,7 +6384,7 @@
       </p:pic>
       <p:pic>
         <p:nvPicPr>
-          <p:cNvPr id="17" name="Picture 16"/>
+          <p:cNvPr id="39" name="Picture 38"/>
           <p:cNvPicPr>
             <a:picLocks noChangeAspect="1"/>
           </p:cNvPicPr>
@@ -5449,8 +6404,8 @@
         </p:blipFill>
         <p:spPr>
           <a:xfrm>
-            <a:off x="4140051" y="27226276"/>
-            <a:ext cx="6685294" cy="498903"/>
+            <a:off x="16537189" y="8500966"/>
+            <a:ext cx="13030918" cy="6531746"/>
           </a:xfrm>
           <a:prstGeom prst="rect">
             <a:avLst/>
@@ -5459,7 +6414,7 @@
       </p:pic>
       <p:pic>
         <p:nvPicPr>
-          <p:cNvPr id="26" name="Picture 25"/>
+          <p:cNvPr id="40" name="Picture 39"/>
           <p:cNvPicPr>
             <a:picLocks noChangeAspect="1"/>
           </p:cNvPicPr>
@@ -5479,98 +6434,8 @@
         </p:blipFill>
         <p:spPr>
           <a:xfrm>
-            <a:off x="19609087" y="18642932"/>
-            <a:ext cx="6329120" cy="730283"/>
-          </a:xfrm>
-          <a:prstGeom prst="rect">
-            <a:avLst/>
-          </a:prstGeom>
-        </p:spPr>
-      </p:pic>
-      <p:pic>
-        <p:nvPicPr>
-          <p:cNvPr id="27" name="Picture 26"/>
-          <p:cNvPicPr>
-            <a:picLocks noChangeAspect="1"/>
-          </p:cNvPicPr>
-          <p:nvPr/>
-        </p:nvPicPr>
-        <p:blipFill>
-          <a:blip r:embed="rId12">
-            <a:extLst>
-              <a:ext uri="{28A0092B-C50C-407E-A947-70E740481C1C}">
-                <a14:useLocalDpi xmlns:a14="http://schemas.microsoft.com/office/drawing/2010/main" val="0"/>
-              </a:ext>
-            </a:extLst>
-          </a:blip>
-          <a:stretch>
-            <a:fillRect/>
-          </a:stretch>
-        </p:blipFill>
-        <p:spPr>
-          <a:xfrm>
-            <a:off x="19609087" y="19770855"/>
-            <a:ext cx="5471116" cy="828957"/>
-          </a:xfrm>
-          <a:prstGeom prst="rect">
-            <a:avLst/>
-          </a:prstGeom>
-        </p:spPr>
-      </p:pic>
-      <p:pic>
-        <p:nvPicPr>
-          <p:cNvPr id="32" name="Picture 31"/>
-          <p:cNvPicPr>
-            <a:picLocks noChangeAspect="1"/>
-          </p:cNvPicPr>
-          <p:nvPr/>
-        </p:nvPicPr>
-        <p:blipFill>
-          <a:blip r:embed="rId13">
-            <a:extLst>
-              <a:ext uri="{28A0092B-C50C-407E-A947-70E740481C1C}">
-                <a14:useLocalDpi xmlns:a14="http://schemas.microsoft.com/office/drawing/2010/main" val="0"/>
-              </a:ext>
-            </a:extLst>
-          </a:blip>
-          <a:stretch>
-            <a:fillRect/>
-          </a:stretch>
-        </p:blipFill>
-        <p:spPr>
-          <a:xfrm>
-            <a:off x="19609087" y="21105493"/>
-            <a:ext cx="5461678" cy="821305"/>
-          </a:xfrm>
-          <a:prstGeom prst="rect">
-            <a:avLst/>
-          </a:prstGeom>
-        </p:spPr>
-      </p:pic>
-      <p:pic>
-        <p:nvPicPr>
-          <p:cNvPr id="33" name="Picture 32"/>
-          <p:cNvPicPr>
-            <a:picLocks noChangeAspect="1"/>
-          </p:cNvPicPr>
-          <p:nvPr/>
-        </p:nvPicPr>
-        <p:blipFill>
-          <a:blip r:embed="rId14">
-            <a:extLst>
-              <a:ext uri="{28A0092B-C50C-407E-A947-70E740481C1C}">
-                <a14:useLocalDpi xmlns:a14="http://schemas.microsoft.com/office/drawing/2010/main" val="0"/>
-              </a:ext>
-            </a:extLst>
-          </a:blip>
-          <a:stretch>
-            <a:fillRect/>
-          </a:stretch>
-        </p:blipFill>
-        <p:spPr>
-          <a:xfrm>
-            <a:off x="19609087" y="22800230"/>
-            <a:ext cx="4774913" cy="657702"/>
+            <a:off x="31577009" y="3497348"/>
+            <a:ext cx="11197371" cy="5612681"/>
           </a:xfrm>
           <a:prstGeom prst="rect">
             <a:avLst/>

</xml_diff>

<commit_message>
Revised draft of poster.
</commit_message>
<xml_diff>
--- a/Presentations/SURE_Poster_Design.pptx
+++ b/Presentations/SURE_Poster_Design.pptx
@@ -263,7 +263,7 @@
           <a:p>
             <a:fld id="{26F4659F-BCAD-4F49-8558-2B5CFF0DE5F8}" type="datetimeFigureOut">
               <a:rPr lang="en-US" smtClean="0"/>
-              <a:t>7/15/2016</a:t>
+              <a:t>7/16/2016</a:t>
             </a:fld>
             <a:endParaRPr lang="en-US"/>
           </a:p>
@@ -433,7 +433,7 @@
           <a:p>
             <a:fld id="{26F4659F-BCAD-4F49-8558-2B5CFF0DE5F8}" type="datetimeFigureOut">
               <a:rPr lang="en-US" smtClean="0"/>
-              <a:t>7/15/2016</a:t>
+              <a:t>7/16/2016</a:t>
             </a:fld>
             <a:endParaRPr lang="en-US"/>
           </a:p>
@@ -613,7 +613,7 @@
           <a:p>
             <a:fld id="{26F4659F-BCAD-4F49-8558-2B5CFF0DE5F8}" type="datetimeFigureOut">
               <a:rPr lang="en-US" smtClean="0"/>
-              <a:t>7/15/2016</a:t>
+              <a:t>7/16/2016</a:t>
             </a:fld>
             <a:endParaRPr lang="en-US"/>
           </a:p>
@@ -783,7 +783,7 @@
           <a:p>
             <a:fld id="{26F4659F-BCAD-4F49-8558-2B5CFF0DE5F8}" type="datetimeFigureOut">
               <a:rPr lang="en-US" smtClean="0"/>
-              <a:t>7/15/2016</a:t>
+              <a:t>7/16/2016</a:t>
             </a:fld>
             <a:endParaRPr lang="en-US"/>
           </a:p>
@@ -1027,7 +1027,7 @@
           <a:p>
             <a:fld id="{26F4659F-BCAD-4F49-8558-2B5CFF0DE5F8}" type="datetimeFigureOut">
               <a:rPr lang="en-US" smtClean="0"/>
-              <a:t>7/15/2016</a:t>
+              <a:t>7/16/2016</a:t>
             </a:fld>
             <a:endParaRPr lang="en-US"/>
           </a:p>
@@ -1259,7 +1259,7 @@
           <a:p>
             <a:fld id="{26F4659F-BCAD-4F49-8558-2B5CFF0DE5F8}" type="datetimeFigureOut">
               <a:rPr lang="en-US" smtClean="0"/>
-              <a:t>7/15/2016</a:t>
+              <a:t>7/16/2016</a:t>
             </a:fld>
             <a:endParaRPr lang="en-US"/>
           </a:p>
@@ -1626,7 +1626,7 @@
           <a:p>
             <a:fld id="{26F4659F-BCAD-4F49-8558-2B5CFF0DE5F8}" type="datetimeFigureOut">
               <a:rPr lang="en-US" smtClean="0"/>
-              <a:t>7/15/2016</a:t>
+              <a:t>7/16/2016</a:t>
             </a:fld>
             <a:endParaRPr lang="en-US"/>
           </a:p>
@@ -1744,7 +1744,7 @@
           <a:p>
             <a:fld id="{26F4659F-BCAD-4F49-8558-2B5CFF0DE5F8}" type="datetimeFigureOut">
               <a:rPr lang="en-US" smtClean="0"/>
-              <a:t>7/15/2016</a:t>
+              <a:t>7/16/2016</a:t>
             </a:fld>
             <a:endParaRPr lang="en-US"/>
           </a:p>
@@ -1839,7 +1839,7 @@
           <a:p>
             <a:fld id="{26F4659F-BCAD-4F49-8558-2B5CFF0DE5F8}" type="datetimeFigureOut">
               <a:rPr lang="en-US" smtClean="0"/>
-              <a:t>7/15/2016</a:t>
+              <a:t>7/16/2016</a:t>
             </a:fld>
             <a:endParaRPr lang="en-US"/>
           </a:p>
@@ -2116,7 +2116,7 @@
           <a:p>
             <a:fld id="{26F4659F-BCAD-4F49-8558-2B5CFF0DE5F8}" type="datetimeFigureOut">
               <a:rPr lang="en-US" smtClean="0"/>
-              <a:t>7/15/2016</a:t>
+              <a:t>7/16/2016</a:t>
             </a:fld>
             <a:endParaRPr lang="en-US"/>
           </a:p>
@@ -2373,7 +2373,7 @@
           <a:p>
             <a:fld id="{26F4659F-BCAD-4F49-8558-2B5CFF0DE5F8}" type="datetimeFigureOut">
               <a:rPr lang="en-US" smtClean="0"/>
-              <a:t>7/15/2016</a:t>
+              <a:t>7/16/2016</a:t>
             </a:fld>
             <a:endParaRPr lang="en-US"/>
           </a:p>
@@ -2586,7 +2586,7 @@
           <a:p>
             <a:fld id="{26F4659F-BCAD-4F49-8558-2B5CFF0DE5F8}" type="datetimeFigureOut">
               <a:rPr lang="en-US" smtClean="0"/>
-              <a:t>7/15/2016</a:t>
+              <a:t>7/16/2016</a:t>
             </a:fld>
             <a:endParaRPr lang="en-US"/>
           </a:p>
@@ -3062,7 +3062,7 @@
         <p:spPr>
           <a:xfrm>
             <a:off x="1156848" y="3619247"/>
-            <a:ext cx="14339454" cy="16650712"/>
+            <a:ext cx="14339454" cy="16096714"/>
           </a:xfrm>
           <a:prstGeom prst="rect">
             <a:avLst/>
@@ -3093,11 +3093,11 @@
               <a:buChar char="•"/>
             </a:pPr>
             <a:r>
-              <a:rPr lang="en-US" sz="2800" dirty="0">
-                <a:latin typeface="Arial" panose="020B0604020202020204" pitchFamily="34" charset="0"/>
-                <a:cs typeface="Arial" panose="020B0604020202020204" pitchFamily="34" charset="0"/>
-              </a:rPr>
-              <a:t>Study of Active Galactic Nuclei (AGN) allows us to understand more fully the processes involved in galaxy evolution. </a:t>
+              <a:rPr lang="en-US" sz="2600" dirty="0">
+                <a:latin typeface="Arial" panose="020B0604020202020204" pitchFamily="34" charset="0"/>
+                <a:cs typeface="Arial" panose="020B0604020202020204" pitchFamily="34" charset="0"/>
+              </a:rPr>
+              <a:t>Active Galactic Nuclei (AGN) are supermassive black holes in the centers of galaxies whose accretion disks and magnetic fields produce more light than all the stars in the galaxy combined. </a:t>
             </a:r>
           </a:p>
           <a:p>
@@ -3106,7 +3106,20 @@
               <a:buChar char="•"/>
             </a:pPr>
             <a:r>
-              <a:rPr lang="en-US" sz="2800" dirty="0">
+              <a:rPr lang="en-US" sz="2600" dirty="0">
+                <a:latin typeface="Arial" panose="020B0604020202020204" pitchFamily="34" charset="0"/>
+                <a:cs typeface="Arial" panose="020B0604020202020204" pitchFamily="34" charset="0"/>
+              </a:rPr>
+              <a:t>Study of AGN allows us to understand more fully the processes involved in galaxy evolution. </a:t>
+            </a:r>
+          </a:p>
+          <a:p>
+            <a:pPr marL="457200" indent="-457200">
+              <a:buFont typeface="Arial" panose="020B0604020202020204" pitchFamily="34" charset="0"/>
+              <a:buChar char="•"/>
+            </a:pPr>
+            <a:r>
+              <a:rPr lang="en-US" sz="2600" dirty="0">
                 <a:latin typeface="Arial" panose="020B0604020202020204" pitchFamily="34" charset="0"/>
                 <a:cs typeface="Arial" panose="020B0604020202020204" pitchFamily="34" charset="0"/>
               </a:rPr>
@@ -3119,7 +3132,7 @@
               <a:buChar char="•"/>
             </a:pPr>
             <a:r>
-              <a:rPr lang="en-US" sz="2800" dirty="0">
+              <a:rPr lang="en-US" sz="2600" dirty="0">
                 <a:latin typeface="Arial" panose="020B0604020202020204" pitchFamily="34" charset="0"/>
                 <a:cs typeface="Arial" panose="020B0604020202020204" pitchFamily="34" charset="0"/>
               </a:rPr>
@@ -3132,7 +3145,7 @@
               <a:buChar char="•"/>
             </a:pPr>
             <a:r>
-              <a:rPr lang="en-US" sz="2800" dirty="0">
+              <a:rPr lang="en-US" sz="2600" dirty="0">
                 <a:latin typeface="Arial" panose="020B0604020202020204" pitchFamily="34" charset="0"/>
                 <a:cs typeface="Arial" panose="020B0604020202020204" pitchFamily="34" charset="0"/>
               </a:rPr>
@@ -3144,7 +3157,7 @@
               <a:buFont typeface="Arial" panose="020B0604020202020204" pitchFamily="34" charset="0"/>
               <a:buChar char="•"/>
             </a:pPr>
-            <a:endParaRPr lang="en-US" sz="2800" dirty="0">
+            <a:endParaRPr lang="en-US" sz="2600" dirty="0">
               <a:latin typeface="Arial" panose="020B0604020202020204" pitchFamily="34" charset="0"/>
               <a:cs typeface="Arial" panose="020B0604020202020204" pitchFamily="34" charset="0"/>
             </a:endParaRPr>
@@ -3154,7 +3167,7 @@
               <a:buFont typeface="Arial" panose="020B0604020202020204" pitchFamily="34" charset="0"/>
               <a:buChar char="•"/>
             </a:pPr>
-            <a:endParaRPr lang="en-US" sz="2800" dirty="0">
+            <a:endParaRPr lang="en-US" sz="2600" dirty="0">
               <a:latin typeface="Arial" panose="020B0604020202020204" pitchFamily="34" charset="0"/>
               <a:cs typeface="Arial" panose="020B0604020202020204" pitchFamily="34" charset="0"/>
             </a:endParaRPr>
@@ -3164,7 +3177,7 @@
               <a:buFont typeface="Arial" panose="020B0604020202020204" pitchFamily="34" charset="0"/>
               <a:buChar char="•"/>
             </a:pPr>
-            <a:endParaRPr lang="en-US" sz="2800" dirty="0">
+            <a:endParaRPr lang="en-US" sz="2600" dirty="0">
               <a:latin typeface="Arial" panose="020B0604020202020204" pitchFamily="34" charset="0"/>
               <a:cs typeface="Arial" panose="020B0604020202020204" pitchFamily="34" charset="0"/>
             </a:endParaRPr>
@@ -3174,7 +3187,7 @@
               <a:buFont typeface="Arial" panose="020B0604020202020204" pitchFamily="34" charset="0"/>
               <a:buChar char="•"/>
             </a:pPr>
-            <a:endParaRPr lang="en-US" sz="2800" dirty="0">
+            <a:endParaRPr lang="en-US" sz="2600" dirty="0">
               <a:latin typeface="Arial" panose="020B0604020202020204" pitchFamily="34" charset="0"/>
               <a:cs typeface="Arial" panose="020B0604020202020204" pitchFamily="34" charset="0"/>
             </a:endParaRPr>
@@ -3184,7 +3197,7 @@
               <a:buFont typeface="Arial" panose="020B0604020202020204" pitchFamily="34" charset="0"/>
               <a:buChar char="•"/>
             </a:pPr>
-            <a:endParaRPr lang="en-US" sz="2800" dirty="0">
+            <a:endParaRPr lang="en-US" sz="2600" dirty="0">
               <a:latin typeface="Arial" panose="020B0604020202020204" pitchFamily="34" charset="0"/>
               <a:cs typeface="Arial" panose="020B0604020202020204" pitchFamily="34" charset="0"/>
             </a:endParaRPr>
@@ -3194,7 +3207,7 @@
               <a:buFont typeface="Arial" panose="020B0604020202020204" pitchFamily="34" charset="0"/>
               <a:buChar char="•"/>
             </a:pPr>
-            <a:endParaRPr lang="en-US" sz="2800" dirty="0">
+            <a:endParaRPr lang="en-US" sz="2600" dirty="0">
               <a:latin typeface="Arial" panose="020B0604020202020204" pitchFamily="34" charset="0"/>
               <a:cs typeface="Arial" panose="020B0604020202020204" pitchFamily="34" charset="0"/>
             </a:endParaRPr>
@@ -3204,7 +3217,7 @@
               <a:buFont typeface="Arial" panose="020B0604020202020204" pitchFamily="34" charset="0"/>
               <a:buChar char="•"/>
             </a:pPr>
-            <a:endParaRPr lang="en-US" sz="2800" dirty="0">
+            <a:endParaRPr lang="en-US" sz="2600" dirty="0">
               <a:latin typeface="Arial" panose="020B0604020202020204" pitchFamily="34" charset="0"/>
               <a:cs typeface="Arial" panose="020B0604020202020204" pitchFamily="34" charset="0"/>
             </a:endParaRPr>
@@ -3214,7 +3227,7 @@
               <a:buFont typeface="Arial" panose="020B0604020202020204" pitchFamily="34" charset="0"/>
               <a:buChar char="•"/>
             </a:pPr>
-            <a:endParaRPr lang="en-US" sz="2800" dirty="0">
+            <a:endParaRPr lang="en-US" sz="2600" dirty="0">
               <a:latin typeface="Arial" panose="020B0604020202020204" pitchFamily="34" charset="0"/>
               <a:cs typeface="Arial" panose="020B0604020202020204" pitchFamily="34" charset="0"/>
             </a:endParaRPr>
@@ -3224,19 +3237,19 @@
               <a:buFont typeface="Arial" panose="020B0604020202020204" pitchFamily="34" charset="0"/>
               <a:buChar char="•"/>
             </a:pPr>
-            <a:endParaRPr lang="en-US" sz="2800" dirty="0">
-              <a:latin typeface="Arial" panose="020B0604020202020204" pitchFamily="34" charset="0"/>
-              <a:cs typeface="Arial" panose="020B0604020202020204" pitchFamily="34" charset="0"/>
-            </a:endParaRPr>
-          </a:p>
-          <a:p>
-            <a:endParaRPr lang="en-US" sz="2800" dirty="0">
-              <a:latin typeface="Arial" panose="020B0604020202020204" pitchFamily="34" charset="0"/>
-              <a:cs typeface="Arial" panose="020B0604020202020204" pitchFamily="34" charset="0"/>
-            </a:endParaRPr>
-          </a:p>
-          <a:p>
-            <a:endParaRPr lang="en-US" sz="2800" dirty="0">
+            <a:endParaRPr lang="en-US" sz="2600" dirty="0">
+              <a:latin typeface="Arial" panose="020B0604020202020204" pitchFamily="34" charset="0"/>
+              <a:cs typeface="Arial" panose="020B0604020202020204" pitchFamily="34" charset="0"/>
+            </a:endParaRPr>
+          </a:p>
+          <a:p>
+            <a:endParaRPr lang="en-US" sz="2600" dirty="0">
+              <a:latin typeface="Arial" panose="020B0604020202020204" pitchFamily="34" charset="0"/>
+              <a:cs typeface="Arial" panose="020B0604020202020204" pitchFamily="34" charset="0"/>
+            </a:endParaRPr>
+          </a:p>
+          <a:p>
+            <a:endParaRPr lang="en-US" sz="2600" dirty="0">
               <a:latin typeface="Arial" panose="020B0604020202020204" pitchFamily="34" charset="0"/>
               <a:cs typeface="Arial" panose="020B0604020202020204" pitchFamily="34" charset="0"/>
             </a:endParaRPr>
@@ -3247,11 +3260,25 @@
               <a:buChar char="•"/>
             </a:pPr>
             <a:r>
-              <a:rPr lang="en-US" sz="2800" dirty="0">
-                <a:latin typeface="Arial" panose="020B0604020202020204" pitchFamily="34" charset="0"/>
-                <a:cs typeface="Arial" panose="020B0604020202020204" pitchFamily="34" charset="0"/>
-              </a:rPr>
-              <a:t>Lots of research on the Broad Line Region (BLR), where there are broad emission lines, but not as much on the Narrow Line Region (NLR), where there are narrow emission lines. </a:t>
+              <a:rPr lang="en-US" sz="2600" dirty="0">
+                <a:latin typeface="Arial" panose="020B0604020202020204" pitchFamily="34" charset="0"/>
+                <a:cs typeface="Arial" panose="020B0604020202020204" pitchFamily="34" charset="0"/>
+              </a:rPr>
+              <a:t>Lots of research on the Broad Line Region (BLR), where there are broad emission lines, but not as much on the Narrow Line Region (NLR) (</a:t>
+            </a:r>
+            <a:r>
+              <a:rPr lang="en-US" sz="2600" dirty="0" err="1">
+                <a:latin typeface="Arial" panose="020B0604020202020204" pitchFamily="34" charset="0"/>
+                <a:cs typeface="Arial" panose="020B0604020202020204" pitchFamily="34" charset="0"/>
+              </a:rPr>
+              <a:t>Grupe</a:t>
+            </a:r>
+            <a:r>
+              <a:rPr lang="en-US" sz="2600" dirty="0">
+                <a:latin typeface="Arial" panose="020B0604020202020204" pitchFamily="34" charset="0"/>
+                <a:cs typeface="Arial" panose="020B0604020202020204" pitchFamily="34" charset="0"/>
+              </a:rPr>
+              <a:t> et al. 2010), where there are narrow emission lines. </a:t>
             </a:r>
           </a:p>
           <a:p>
@@ -3260,11 +3287,25 @@
               <a:buChar char="•"/>
             </a:pPr>
             <a:r>
-              <a:rPr lang="en-US" sz="2800" dirty="0">
-                <a:latin typeface="Arial" panose="020B0604020202020204" pitchFamily="34" charset="0"/>
-                <a:cs typeface="Arial" panose="020B0604020202020204" pitchFamily="34" charset="0"/>
-              </a:rPr>
-              <a:t>Emission lines from the ionization of different elements used to learn about the AGN, through simulations with programs such as CLOUDY and MAPPINGSIII.</a:t>
+              <a:rPr lang="en-US" sz="2600" dirty="0">
+                <a:latin typeface="Arial" panose="020B0604020202020204" pitchFamily="34" charset="0"/>
+                <a:cs typeface="Arial" panose="020B0604020202020204" pitchFamily="34" charset="0"/>
+              </a:rPr>
+              <a:t>Emission lines from the ionization of different elements used to learn about the AGN, through simulations with programs such as CLOUDY (</a:t>
+            </a:r>
+            <a:r>
+              <a:rPr lang="en-US" sz="2600" dirty="0" err="1">
+                <a:latin typeface="Arial" panose="020B0604020202020204" pitchFamily="34" charset="0"/>
+                <a:cs typeface="Arial" panose="020B0604020202020204" pitchFamily="34" charset="0"/>
+              </a:rPr>
+              <a:t>Ferland</a:t>
+            </a:r>
+            <a:r>
+              <a:rPr lang="en-US" sz="2600" dirty="0">
+                <a:latin typeface="Arial" panose="020B0604020202020204" pitchFamily="34" charset="0"/>
+                <a:cs typeface="Arial" panose="020B0604020202020204" pitchFamily="34" charset="0"/>
+              </a:rPr>
+              <a:t> et al. 2013 )and MAPPINGSIII (Allen et al. 2008).</a:t>
             </a:r>
           </a:p>
           <a:p>
@@ -3273,126 +3314,126 @@
               <a:buChar char="•"/>
             </a:pPr>
             <a:r>
-              <a:rPr lang="en-US" sz="2800" dirty="0">
+              <a:rPr lang="en-US" sz="2600" dirty="0">
                 <a:latin typeface="Arial" panose="020B0604020202020204" pitchFamily="34" charset="0"/>
                 <a:cs typeface="Arial" panose="020B0604020202020204" pitchFamily="34" charset="0"/>
               </a:rPr>
               <a:t>Models of the incident radiation curve from the AGN in CLOUDY are computed from using the spectral slope indices </a:t>
             </a:r>
             <a:r>
-              <a:rPr lang="el-GR" sz="2800" dirty="0">
+              <a:rPr lang="el-GR" sz="2600" dirty="0">
                 <a:latin typeface="Arial" panose="020B0604020202020204" pitchFamily="34" charset="0"/>
                 <a:cs typeface="Arial" panose="020B0604020202020204" pitchFamily="34" charset="0"/>
               </a:rPr>
               <a:t>α</a:t>
             </a:r>
             <a:r>
-              <a:rPr lang="en-US" sz="2800" baseline="-25000" dirty="0">
+              <a:rPr lang="en-US" sz="2600" baseline="-25000" dirty="0">
                 <a:latin typeface="Arial" panose="020B0604020202020204" pitchFamily="34" charset="0"/>
                 <a:cs typeface="Arial" panose="020B0604020202020204" pitchFamily="34" charset="0"/>
               </a:rPr>
               <a:t>x</a:t>
             </a:r>
             <a:r>
-              <a:rPr lang="en-US" sz="2800" dirty="0">
+              <a:rPr lang="en-US" sz="2600" dirty="0">
                 <a:latin typeface="Arial" panose="020B0604020202020204" pitchFamily="34" charset="0"/>
                 <a:cs typeface="Arial" panose="020B0604020202020204" pitchFamily="34" charset="0"/>
               </a:rPr>
               <a:t>, corresponding to the X-ray spectrum (10</a:t>
             </a:r>
             <a:r>
-              <a:rPr lang="en-US" sz="2800" baseline="30000" dirty="0">
+              <a:rPr lang="en-US" sz="2600" baseline="30000" dirty="0">
                 <a:latin typeface="Arial" panose="020B0604020202020204" pitchFamily="34" charset="0"/>
                 <a:cs typeface="Arial" panose="020B0604020202020204" pitchFamily="34" charset="0"/>
               </a:rPr>
               <a:t>2</a:t>
             </a:r>
             <a:r>
-              <a:rPr lang="en-US" sz="2800" dirty="0">
+              <a:rPr lang="en-US" sz="2600" dirty="0">
                 <a:latin typeface="Arial" panose="020B0604020202020204" pitchFamily="34" charset="0"/>
                 <a:cs typeface="Arial" panose="020B0604020202020204" pitchFamily="34" charset="0"/>
               </a:rPr>
               <a:t> eV- 10</a:t>
             </a:r>
             <a:r>
-              <a:rPr lang="en-US" sz="2800" baseline="30000" dirty="0">
+              <a:rPr lang="en-US" sz="2600" baseline="30000" dirty="0">
                 <a:latin typeface="Arial" panose="020B0604020202020204" pitchFamily="34" charset="0"/>
                 <a:cs typeface="Arial" panose="020B0604020202020204" pitchFamily="34" charset="0"/>
               </a:rPr>
               <a:t>5</a:t>
             </a:r>
             <a:r>
-              <a:rPr lang="en-US" sz="2800" dirty="0">
+              <a:rPr lang="en-US" sz="2600" dirty="0">
                 <a:latin typeface="Arial" panose="020B0604020202020204" pitchFamily="34" charset="0"/>
                 <a:cs typeface="Arial" panose="020B0604020202020204" pitchFamily="34" charset="0"/>
               </a:rPr>
               <a:t> eV), </a:t>
             </a:r>
             <a:r>
-              <a:rPr lang="el-GR" sz="2800" dirty="0">
+              <a:rPr lang="el-GR" sz="2600" dirty="0">
                 <a:latin typeface="Arial" panose="020B0604020202020204" pitchFamily="34" charset="0"/>
                 <a:cs typeface="Arial" panose="020B0604020202020204" pitchFamily="34" charset="0"/>
               </a:rPr>
               <a:t>α</a:t>
             </a:r>
             <a:r>
-              <a:rPr lang="en-US" sz="2800" baseline="-25000" dirty="0" err="1">
+              <a:rPr lang="en-US" sz="2600" baseline="-25000" dirty="0" err="1">
                 <a:latin typeface="Arial" panose="020B0604020202020204" pitchFamily="34" charset="0"/>
                 <a:cs typeface="Arial" panose="020B0604020202020204" pitchFamily="34" charset="0"/>
               </a:rPr>
               <a:t>uv</a:t>
             </a:r>
             <a:r>
-              <a:rPr lang="en-US" sz="2800" dirty="0">
+              <a:rPr lang="en-US" sz="2600" dirty="0">
                 <a:latin typeface="Arial" panose="020B0604020202020204" pitchFamily="34" charset="0"/>
                 <a:cs typeface="Arial" panose="020B0604020202020204" pitchFamily="34" charset="0"/>
               </a:rPr>
               <a:t> corresponding to the ultraviolet spectrum (10</a:t>
             </a:r>
             <a:r>
-              <a:rPr lang="en-US" sz="2800" baseline="30000" dirty="0">
+              <a:rPr lang="en-US" sz="2600" baseline="30000" dirty="0">
                 <a:latin typeface="Arial" panose="020B0604020202020204" pitchFamily="34" charset="0"/>
                 <a:cs typeface="Arial" panose="020B0604020202020204" pitchFamily="34" charset="0"/>
               </a:rPr>
               <a:t>1</a:t>
             </a:r>
             <a:r>
-              <a:rPr lang="en-US" sz="2800" dirty="0">
+              <a:rPr lang="en-US" sz="2600" dirty="0">
                 <a:latin typeface="Arial" panose="020B0604020202020204" pitchFamily="34" charset="0"/>
                 <a:cs typeface="Arial" panose="020B0604020202020204" pitchFamily="34" charset="0"/>
               </a:rPr>
               <a:t> eV-10</a:t>
             </a:r>
             <a:r>
-              <a:rPr lang="en-US" sz="2800" baseline="30000" dirty="0">
+              <a:rPr lang="en-US" sz="2600" baseline="30000" dirty="0">
                 <a:latin typeface="Arial" panose="020B0604020202020204" pitchFamily="34" charset="0"/>
                 <a:cs typeface="Arial" panose="020B0604020202020204" pitchFamily="34" charset="0"/>
               </a:rPr>
               <a:t>2</a:t>
             </a:r>
             <a:r>
-              <a:rPr lang="en-US" sz="2800" dirty="0">
+              <a:rPr lang="en-US" sz="2600" dirty="0">
                 <a:latin typeface="Arial" panose="020B0604020202020204" pitchFamily="34" charset="0"/>
                 <a:cs typeface="Arial" panose="020B0604020202020204" pitchFamily="34" charset="0"/>
               </a:rPr>
               <a:t> eV), and </a:t>
             </a:r>
             <a:r>
-              <a:rPr lang="el-GR" sz="2800" dirty="0">
+              <a:rPr lang="el-GR" sz="2600" dirty="0">
                 <a:latin typeface="Arial" panose="020B0604020202020204" pitchFamily="34" charset="0"/>
                 <a:cs typeface="Arial" panose="020B0604020202020204" pitchFamily="34" charset="0"/>
               </a:rPr>
               <a:t>α</a:t>
             </a:r>
             <a:r>
-              <a:rPr lang="en-US" sz="2800" baseline="-25000" dirty="0">
+              <a:rPr lang="en-US" sz="2600" baseline="-25000" dirty="0">
                 <a:latin typeface="Arial" panose="020B0604020202020204" pitchFamily="34" charset="0"/>
                 <a:cs typeface="Arial" panose="020B0604020202020204" pitchFamily="34" charset="0"/>
               </a:rPr>
               <a:t>ox</a:t>
             </a:r>
             <a:r>
-              <a:rPr lang="en-US" sz="2800" dirty="0">
+              <a:rPr lang="en-US" sz="2600" dirty="0">
                 <a:latin typeface="Arial" panose="020B0604020202020204" pitchFamily="34" charset="0"/>
                 <a:cs typeface="Arial" panose="020B0604020202020204" pitchFamily="34" charset="0"/>
               </a:rPr>
@@ -3405,98 +3446,98 @@
               <a:buChar char="•"/>
             </a:pPr>
             <a:r>
-              <a:rPr lang="en-US" sz="2800" dirty="0">
+              <a:rPr lang="en-US" sz="2600" dirty="0">
                 <a:latin typeface="Arial" panose="020B0604020202020204" pitchFamily="34" charset="0"/>
                 <a:cs typeface="Arial" panose="020B0604020202020204" pitchFamily="34" charset="0"/>
               </a:rPr>
               <a:t>Research has shown that a correlation exists between </a:t>
             </a:r>
             <a:r>
-              <a:rPr lang="el-GR" sz="2800" dirty="0">
+              <a:rPr lang="el-GR" sz="2600" dirty="0">
                 <a:latin typeface="Arial" panose="020B0604020202020204" pitchFamily="34" charset="0"/>
                 <a:cs typeface="Arial" panose="020B0604020202020204" pitchFamily="34" charset="0"/>
               </a:rPr>
               <a:t>α</a:t>
             </a:r>
             <a:r>
-              <a:rPr lang="en-US" sz="2800" baseline="-25000" dirty="0">
+              <a:rPr lang="en-US" sz="2600" baseline="-25000" dirty="0">
                 <a:latin typeface="Arial" panose="020B0604020202020204" pitchFamily="34" charset="0"/>
                 <a:cs typeface="Arial" panose="020B0604020202020204" pitchFamily="34" charset="0"/>
               </a:rPr>
               <a:t>x</a:t>
             </a:r>
             <a:r>
-              <a:rPr lang="en-US" sz="2800" dirty="0">
+              <a:rPr lang="en-US" sz="2600" dirty="0">
                 <a:latin typeface="Arial" panose="020B0604020202020204" pitchFamily="34" charset="0"/>
                 <a:cs typeface="Arial" panose="020B0604020202020204" pitchFamily="34" charset="0"/>
               </a:rPr>
               <a:t> and </a:t>
             </a:r>
             <a:r>
-              <a:rPr lang="el-GR" sz="2800" dirty="0">
+              <a:rPr lang="el-GR" sz="2600" dirty="0">
                 <a:latin typeface="Arial" panose="020B0604020202020204" pitchFamily="34" charset="0"/>
                 <a:cs typeface="Arial" panose="020B0604020202020204" pitchFamily="34" charset="0"/>
               </a:rPr>
               <a:t>α</a:t>
             </a:r>
             <a:r>
-              <a:rPr lang="en-US" sz="2800" baseline="-25000" dirty="0" err="1">
+              <a:rPr lang="en-US" sz="2600" baseline="-25000" dirty="0" err="1">
                 <a:latin typeface="Arial" panose="020B0604020202020204" pitchFamily="34" charset="0"/>
                 <a:cs typeface="Arial" panose="020B0604020202020204" pitchFamily="34" charset="0"/>
               </a:rPr>
               <a:t>uv</a:t>
             </a:r>
             <a:r>
-              <a:rPr lang="en-US" sz="2800" dirty="0">
+              <a:rPr lang="en-US" sz="2600" dirty="0">
                 <a:latin typeface="Arial" panose="020B0604020202020204" pitchFamily="34" charset="0"/>
                 <a:cs typeface="Arial" panose="020B0604020202020204" pitchFamily="34" charset="0"/>
               </a:rPr>
               <a:t> and between </a:t>
             </a:r>
             <a:r>
-              <a:rPr lang="el-GR" sz="2800" dirty="0">
+              <a:rPr lang="el-GR" sz="2600" dirty="0">
                 <a:latin typeface="Arial" panose="020B0604020202020204" pitchFamily="34" charset="0"/>
                 <a:cs typeface="Arial" panose="020B0604020202020204" pitchFamily="34" charset="0"/>
               </a:rPr>
               <a:t>α</a:t>
             </a:r>
             <a:r>
-              <a:rPr lang="en-US" sz="2800" baseline="-25000" dirty="0">
+              <a:rPr lang="en-US" sz="2600" baseline="-25000" dirty="0">
                 <a:latin typeface="Arial" panose="020B0604020202020204" pitchFamily="34" charset="0"/>
                 <a:cs typeface="Arial" panose="020B0604020202020204" pitchFamily="34" charset="0"/>
               </a:rPr>
               <a:t>x</a:t>
             </a:r>
             <a:r>
-              <a:rPr lang="en-US" sz="2800" dirty="0">
+              <a:rPr lang="en-US" sz="2600" dirty="0">
                 <a:latin typeface="Arial" panose="020B0604020202020204" pitchFamily="34" charset="0"/>
                 <a:cs typeface="Arial" panose="020B0604020202020204" pitchFamily="34" charset="0"/>
               </a:rPr>
               <a:t> and </a:t>
             </a:r>
             <a:r>
-              <a:rPr lang="el-GR" sz="2800" dirty="0">
+              <a:rPr lang="el-GR" sz="2600" dirty="0">
                 <a:latin typeface="Arial" panose="020B0604020202020204" pitchFamily="34" charset="0"/>
                 <a:cs typeface="Arial" panose="020B0604020202020204" pitchFamily="34" charset="0"/>
               </a:rPr>
               <a:t>α</a:t>
             </a:r>
             <a:r>
-              <a:rPr lang="en-US" sz="2800" baseline="-25000" dirty="0">
+              <a:rPr lang="en-US" sz="2600" baseline="-25000" dirty="0">
                 <a:latin typeface="Arial" panose="020B0604020202020204" pitchFamily="34" charset="0"/>
                 <a:cs typeface="Arial" panose="020B0604020202020204" pitchFamily="34" charset="0"/>
               </a:rPr>
               <a:t>ox</a:t>
             </a:r>
             <a:r>
-              <a:rPr lang="en-US" sz="2800" baseline="30000" dirty="0">
+              <a:rPr lang="en-US" sz="2600" baseline="30000" dirty="0">
                 <a:latin typeface="Arial" panose="020B0604020202020204" pitchFamily="34" charset="0"/>
                 <a:cs typeface="Arial" panose="020B0604020202020204" pitchFamily="34" charset="0"/>
               </a:rPr>
               <a:t>.</a:t>
             </a:r>
             <a:r>
-              <a:rPr lang="en-US" sz="2800" dirty="0">
+              <a:rPr lang="en-US" sz="2600" dirty="0">
                 <a:latin typeface="Arial" panose="020B0604020202020204" pitchFamily="34" charset="0"/>
                 <a:cs typeface="Arial" panose="020B0604020202020204" pitchFamily="34" charset="0"/>
               </a:rPr>
@@ -3509,7 +3550,7 @@
               <a:buChar char="•"/>
             </a:pPr>
             <a:r>
-              <a:rPr lang="en-US" sz="2800" dirty="0">
+              <a:rPr lang="en-US" sz="2600" dirty="0">
                 <a:latin typeface="Arial" panose="020B0604020202020204" pitchFamily="34" charset="0"/>
                 <a:cs typeface="Arial" panose="020B0604020202020204" pitchFamily="34" charset="0"/>
               </a:rPr>
@@ -3811,8 +3852,8 @@
         </p:nvSpPr>
         <p:spPr>
           <a:xfrm>
-            <a:off x="16777131" y="2383679"/>
-            <a:ext cx="12438222" cy="33209091"/>
+            <a:off x="16295068" y="2383679"/>
+            <a:ext cx="14091807" cy="33239869"/>
           </a:xfrm>
           <a:prstGeom prst="rect">
             <a:avLst/>
@@ -3853,21 +3894,34 @@
               <a:buChar char="•"/>
             </a:pPr>
             <a:r>
-              <a:rPr lang="en-US" sz="2800" dirty="0">
+              <a:rPr lang="en-US" sz="2600" dirty="0">
+                <a:latin typeface="Arial" panose="020B0604020202020204" pitchFamily="34" charset="0"/>
+                <a:cs typeface="Arial" panose="020B0604020202020204" pitchFamily="34" charset="0"/>
+              </a:rPr>
+              <a:t>We examine emission line ratios as they allow us to study the effects of AGN density, metallicity, excitation mechanism, ionization parameter, and constrain the SED. </a:t>
+            </a:r>
+          </a:p>
+          <a:p>
+            <a:pPr marL="571500" indent="-571500">
+              <a:buFont typeface="Arial" panose="020B0604020202020204" pitchFamily="34" charset="0"/>
+              <a:buChar char="•"/>
+            </a:pPr>
+            <a:r>
+              <a:rPr lang="en-US" sz="2600" dirty="0">
                 <a:latin typeface="Arial" panose="020B0604020202020204" pitchFamily="34" charset="0"/>
                 <a:cs typeface="Arial" panose="020B0604020202020204" pitchFamily="34" charset="0"/>
               </a:rPr>
               <a:t>The first plot is known as the Baldwin-Phillip-</a:t>
             </a:r>
             <a:r>
-              <a:rPr lang="en-US" sz="2800" dirty="0" err="1">
+              <a:rPr lang="en-US" sz="2600" dirty="0" err="1">
                 <a:latin typeface="Arial" panose="020B0604020202020204" pitchFamily="34" charset="0"/>
                 <a:cs typeface="Arial" panose="020B0604020202020204" pitchFamily="34" charset="0"/>
               </a:rPr>
               <a:t>Terlevich</a:t>
             </a:r>
             <a:r>
-              <a:rPr lang="en-US" sz="2800" dirty="0">
+              <a:rPr lang="en-US" sz="2600" dirty="0">
                 <a:latin typeface="Arial" panose="020B0604020202020204" pitchFamily="34" charset="0"/>
                 <a:cs typeface="Arial" panose="020B0604020202020204" pitchFamily="34" charset="0"/>
               </a:rPr>
@@ -3880,39 +3934,94 @@
               <a:buChar char="•"/>
             </a:pPr>
             <a:r>
-              <a:rPr lang="en-US" sz="2800" dirty="0">
+              <a:rPr lang="en-US" sz="2600" dirty="0">
                 <a:latin typeface="Arial" panose="020B0604020202020204" pitchFamily="34" charset="0"/>
                 <a:cs typeface="Arial" panose="020B0604020202020204" pitchFamily="34" charset="0"/>
               </a:rPr>
               <a:t>The top three plots were introduced in </a:t>
             </a:r>
             <a:r>
-              <a:rPr lang="en-US" sz="2800" dirty="0" err="1">
+              <a:rPr lang="en-US" sz="2600" dirty="0" err="1">
                 <a:latin typeface="Arial" panose="020B0604020202020204" pitchFamily="34" charset="0"/>
                 <a:cs typeface="Arial" panose="020B0604020202020204" pitchFamily="34" charset="0"/>
               </a:rPr>
               <a:t>Osterbrock</a:t>
             </a:r>
             <a:r>
-              <a:rPr lang="en-US" sz="2800" dirty="0">
+              <a:rPr lang="en-US" sz="2600" dirty="0">
                 <a:latin typeface="Arial" panose="020B0604020202020204" pitchFamily="34" charset="0"/>
                 <a:cs typeface="Arial" panose="020B0604020202020204" pitchFamily="34" charset="0"/>
               </a:rPr>
               <a:t> &amp; </a:t>
             </a:r>
             <a:r>
-              <a:rPr lang="en-US" sz="2800" dirty="0" err="1">
+              <a:rPr lang="en-US" sz="2600" dirty="0" err="1">
                 <a:latin typeface="Arial" panose="020B0604020202020204" pitchFamily="34" charset="0"/>
                 <a:cs typeface="Arial" panose="020B0604020202020204" pitchFamily="34" charset="0"/>
               </a:rPr>
               <a:t>Veilleux</a:t>
             </a:r>
             <a:r>
-              <a:rPr lang="en-US" sz="2800" dirty="0">
-                <a:latin typeface="Arial" panose="020B0604020202020204" pitchFamily="34" charset="0"/>
-                <a:cs typeface="Arial" panose="020B0604020202020204" pitchFamily="34" charset="0"/>
-              </a:rPr>
-              <a:t> 1983 to categorize galaxies by atomic excitation mechanism. </a:t>
+              <a:rPr lang="en-US" sz="2600" dirty="0">
+                <a:latin typeface="Arial" panose="020B0604020202020204" pitchFamily="34" charset="0"/>
+                <a:cs typeface="Arial" panose="020B0604020202020204" pitchFamily="34" charset="0"/>
+              </a:rPr>
+              <a:t> 1983 to categorize galaxies by atomic excitation mechanism which are empirically derived. </a:t>
+            </a:r>
+          </a:p>
+          <a:p>
+            <a:pPr marL="1028700" lvl="1" indent="-571500">
+              <a:buFont typeface="Arial" panose="020B0604020202020204" pitchFamily="34" charset="0"/>
+              <a:buChar char="•"/>
+            </a:pPr>
+            <a:r>
+              <a:rPr lang="en-US" sz="2600" dirty="0">
+                <a:latin typeface="Arial" panose="020B0604020202020204" pitchFamily="34" charset="0"/>
+                <a:cs typeface="Arial" panose="020B0604020202020204" pitchFamily="34" charset="0"/>
+              </a:rPr>
+              <a:t>Bottom three plots come from </a:t>
+            </a:r>
+            <a:r>
+              <a:rPr lang="en-US" sz="2600" dirty="0" err="1">
+                <a:latin typeface="Arial" panose="020B0604020202020204" pitchFamily="34" charset="0"/>
+                <a:cs typeface="Arial" panose="020B0604020202020204" pitchFamily="34" charset="0"/>
+              </a:rPr>
+              <a:t>Lamareille</a:t>
+            </a:r>
+            <a:r>
+              <a:rPr lang="en-US" sz="2600" dirty="0">
+                <a:latin typeface="Arial" panose="020B0604020202020204" pitchFamily="34" charset="0"/>
+                <a:cs typeface="Arial" panose="020B0604020202020204" pitchFamily="34" charset="0"/>
+              </a:rPr>
+              <a:t> 2010, </a:t>
+            </a:r>
+            <a:r>
+              <a:rPr lang="en-US" sz="2600" dirty="0" err="1">
+                <a:latin typeface="Arial" panose="020B0604020202020204" pitchFamily="34" charset="0"/>
+                <a:cs typeface="Arial" panose="020B0604020202020204" pitchFamily="34" charset="0"/>
+              </a:rPr>
+              <a:t>Shirazi</a:t>
+            </a:r>
+            <a:r>
+              <a:rPr lang="en-US" sz="2600" dirty="0">
+                <a:latin typeface="Arial" panose="020B0604020202020204" pitchFamily="34" charset="0"/>
+                <a:cs typeface="Arial" panose="020B0604020202020204" pitchFamily="34" charset="0"/>
+              </a:rPr>
+              <a:t> et al. 2012, and </a:t>
+            </a:r>
+            <a:r>
+              <a:rPr lang="en-US" sz="2600" dirty="0" err="1">
+                <a:latin typeface="Arial" panose="020B0604020202020204" pitchFamily="34" charset="0"/>
+                <a:cs typeface="Arial" panose="020B0604020202020204" pitchFamily="34" charset="0"/>
+              </a:rPr>
+              <a:t>Kewley</a:t>
+            </a:r>
+            <a:r>
+              <a:rPr lang="en-US" sz="2600" dirty="0">
+                <a:latin typeface="Arial" panose="020B0604020202020204" pitchFamily="34" charset="0"/>
+                <a:cs typeface="Arial" panose="020B0604020202020204" pitchFamily="34" charset="0"/>
+              </a:rPr>
+              <a:t> et al. 2006 respectively. </a:t>
             </a:r>
           </a:p>
           <a:p>
@@ -3921,11 +4030,50 @@
               <a:buChar char="•"/>
             </a:pPr>
             <a:r>
-              <a:rPr lang="en-US" sz="2800" dirty="0">
-                <a:latin typeface="Arial" panose="020B0604020202020204" pitchFamily="34" charset="0"/>
-                <a:cs typeface="Arial" panose="020B0604020202020204" pitchFamily="34" charset="0"/>
-              </a:rPr>
-              <a:t>Excitation mechanism diagnostics are empirically derived.</a:t>
+              <a:rPr lang="en-US" sz="2600" dirty="0">
+                <a:latin typeface="Arial" panose="020B0604020202020204" pitchFamily="34" charset="0"/>
+                <a:cs typeface="Arial" panose="020B0604020202020204" pitchFamily="34" charset="0"/>
+              </a:rPr>
+              <a:t>The black lines act as boundaries between the type of galaxy.  </a:t>
+            </a:r>
+          </a:p>
+          <a:p>
+            <a:pPr marL="1028700" lvl="1" indent="-571500">
+              <a:buFont typeface="Arial" panose="020B0604020202020204" pitchFamily="34" charset="0"/>
+              <a:buChar char="•"/>
+            </a:pPr>
+            <a:r>
+              <a:rPr lang="en-US" sz="2600" dirty="0">
+                <a:latin typeface="Arial" panose="020B0604020202020204" pitchFamily="34" charset="0"/>
+                <a:cs typeface="Arial" panose="020B0604020202020204" pitchFamily="34" charset="0"/>
+              </a:rPr>
+              <a:t>Star-Forming/Starburst galaxies are galaxies with high rates of star formation. </a:t>
+            </a:r>
+          </a:p>
+          <a:p>
+            <a:pPr marL="1028700" lvl="1" indent="-571500">
+              <a:buFont typeface="Arial" panose="020B0604020202020204" pitchFamily="34" charset="0"/>
+              <a:buChar char="•"/>
+            </a:pPr>
+            <a:r>
+              <a:rPr lang="en-US" sz="2600" dirty="0">
+                <a:latin typeface="Arial" panose="020B0604020202020204" pitchFamily="34" charset="0"/>
+                <a:cs typeface="Arial" panose="020B0604020202020204" pitchFamily="34" charset="0"/>
+              </a:rPr>
+              <a:t>Composite galaxies exhibit characteristics of both active galaxies and star-forming galaxies. </a:t>
+            </a:r>
+          </a:p>
+          <a:p>
+            <a:pPr marL="1028700" lvl="1" indent="-571500">
+              <a:buFont typeface="Arial" panose="020B0604020202020204" pitchFamily="34" charset="0"/>
+              <a:buChar char="•"/>
+            </a:pPr>
+            <a:r>
+              <a:rPr lang="en-US" sz="2600" dirty="0">
+                <a:latin typeface="Arial" panose="020B0604020202020204" pitchFamily="34" charset="0"/>
+                <a:cs typeface="Arial" panose="020B0604020202020204" pitchFamily="34" charset="0"/>
+              </a:rPr>
+              <a:t>Low Ionization Nuclear Emission Region (LINER) galaxies are characterized by emission lines of weakly ionized or neutral atoms.  </a:t>
             </a:r>
           </a:p>
           <a:p>
@@ -3934,53 +4082,25 @@
               <a:buChar char="•"/>
             </a:pPr>
             <a:r>
-              <a:rPr lang="en-US" sz="2800" dirty="0">
-                <a:latin typeface="Arial" panose="020B0604020202020204" pitchFamily="34" charset="0"/>
-                <a:cs typeface="Arial" panose="020B0604020202020204" pitchFamily="34" charset="0"/>
-              </a:rPr>
-              <a:t>Bottom three plots come from </a:t>
-            </a:r>
-            <a:r>
-              <a:rPr lang="en-US" sz="2800" dirty="0" err="1">
-                <a:latin typeface="Arial" panose="020B0604020202020204" pitchFamily="34" charset="0"/>
-                <a:cs typeface="Arial" panose="020B0604020202020204" pitchFamily="34" charset="0"/>
-              </a:rPr>
-              <a:t>Lamareille</a:t>
-            </a:r>
-            <a:r>
-              <a:rPr lang="en-US" sz="2800" dirty="0">
-                <a:latin typeface="Arial" panose="020B0604020202020204" pitchFamily="34" charset="0"/>
-                <a:cs typeface="Arial" panose="020B0604020202020204" pitchFamily="34" charset="0"/>
-              </a:rPr>
-              <a:t> 2010, </a:t>
-            </a:r>
-            <a:r>
-              <a:rPr lang="en-US" sz="2800" dirty="0" err="1">
-                <a:latin typeface="Arial" panose="020B0604020202020204" pitchFamily="34" charset="0"/>
-                <a:cs typeface="Arial" panose="020B0604020202020204" pitchFamily="34" charset="0"/>
-              </a:rPr>
-              <a:t>Shirazi</a:t>
-            </a:r>
-            <a:r>
-              <a:rPr lang="en-US" sz="2800" dirty="0">
-                <a:latin typeface="Arial" panose="020B0604020202020204" pitchFamily="34" charset="0"/>
-                <a:cs typeface="Arial" panose="020B0604020202020204" pitchFamily="34" charset="0"/>
-              </a:rPr>
-              <a:t> et al. 2012, and </a:t>
-            </a:r>
-            <a:r>
-              <a:rPr lang="en-US" sz="2800" dirty="0" err="1">
-                <a:latin typeface="Arial" panose="020B0604020202020204" pitchFamily="34" charset="0"/>
-                <a:cs typeface="Arial" panose="020B0604020202020204" pitchFamily="34" charset="0"/>
-              </a:rPr>
-              <a:t>Kewley</a:t>
-            </a:r>
-            <a:r>
-              <a:rPr lang="en-US" sz="2800" dirty="0">
-                <a:latin typeface="Arial" panose="020B0604020202020204" pitchFamily="34" charset="0"/>
-                <a:cs typeface="Arial" panose="020B0604020202020204" pitchFamily="34" charset="0"/>
-              </a:rPr>
-              <a:t> et al. 2006 respectively. </a:t>
+              <a:rPr lang="en-US" sz="2600" dirty="0">
+                <a:latin typeface="Arial" panose="020B0604020202020204" pitchFamily="34" charset="0"/>
+                <a:cs typeface="Arial" panose="020B0604020202020204" pitchFamily="34" charset="0"/>
+              </a:rPr>
+              <a:t>Red indicates that the galaxy is a </a:t>
+            </a:r>
+            <a:r>
+              <a:rPr lang="en-US" sz="2600" dirty="0" err="1">
+                <a:latin typeface="Arial" panose="020B0604020202020204" pitchFamily="34" charset="0"/>
+                <a:cs typeface="Arial" panose="020B0604020202020204" pitchFamily="34" charset="0"/>
+              </a:rPr>
+              <a:t>Seyfert</a:t>
+            </a:r>
+            <a:r>
+              <a:rPr lang="en-US" sz="2600" dirty="0">
+                <a:latin typeface="Arial" panose="020B0604020202020204" pitchFamily="34" charset="0"/>
+                <a:cs typeface="Arial" panose="020B0604020202020204" pitchFamily="34" charset="0"/>
+              </a:rPr>
+              <a:t>, while blue indicates star-forming galaxies, composite galaxies, and LINERS.  </a:t>
             </a:r>
           </a:p>
           <a:p>
@@ -3989,42 +4109,443 @@
               <a:buChar char="•"/>
             </a:pPr>
             <a:r>
-              <a:rPr lang="en-US" sz="2800" dirty="0">
-                <a:latin typeface="Arial" panose="020B0604020202020204" pitchFamily="34" charset="0"/>
-                <a:cs typeface="Arial" panose="020B0604020202020204" pitchFamily="34" charset="0"/>
-              </a:rPr>
-              <a:t>Red indicates that the galaxy is a </a:t>
-            </a:r>
-            <a:r>
-              <a:rPr lang="en-US" sz="2800" dirty="0" err="1">
+              <a:rPr lang="en-US" sz="2600" dirty="0">
+                <a:latin typeface="Arial" panose="020B0604020202020204" pitchFamily="34" charset="0"/>
+                <a:cs typeface="Arial" panose="020B0604020202020204" pitchFamily="34" charset="0"/>
+              </a:rPr>
+              <a:t>Galaxies are separated based on the equations that set the boundary lines. </a:t>
+            </a:r>
+          </a:p>
+          <a:p>
+            <a:pPr marL="571500" indent="-571500">
+              <a:buFont typeface="Arial" panose="020B0604020202020204" pitchFamily="34" charset="0"/>
+              <a:buChar char="•"/>
+            </a:pPr>
+            <a:endParaRPr lang="en-US" sz="2600" dirty="0">
+              <a:latin typeface="Arial" panose="020B0604020202020204" pitchFamily="34" charset="0"/>
+              <a:cs typeface="Arial" panose="020B0604020202020204" pitchFamily="34" charset="0"/>
+            </a:endParaRPr>
+          </a:p>
+          <a:p>
+            <a:pPr marL="571500" indent="-571500">
+              <a:buFont typeface="Arial" panose="020B0604020202020204" pitchFamily="34" charset="0"/>
+              <a:buChar char="•"/>
+            </a:pPr>
+            <a:endParaRPr lang="en-US" sz="2600" dirty="0">
+              <a:latin typeface="Arial" panose="020B0604020202020204" pitchFamily="34" charset="0"/>
+              <a:cs typeface="Arial" panose="020B0604020202020204" pitchFamily="34" charset="0"/>
+            </a:endParaRPr>
+          </a:p>
+          <a:p>
+            <a:pPr marL="571500" indent="-571500">
+              <a:buFont typeface="Arial" panose="020B0604020202020204" pitchFamily="34" charset="0"/>
+              <a:buChar char="•"/>
+            </a:pPr>
+            <a:endParaRPr lang="en-US" sz="2600" dirty="0">
+              <a:latin typeface="Arial" panose="020B0604020202020204" pitchFamily="34" charset="0"/>
+              <a:cs typeface="Arial" panose="020B0604020202020204" pitchFamily="34" charset="0"/>
+            </a:endParaRPr>
+          </a:p>
+          <a:p>
+            <a:pPr marL="571500" indent="-571500">
+              <a:buFont typeface="Arial" panose="020B0604020202020204" pitchFamily="34" charset="0"/>
+              <a:buChar char="•"/>
+            </a:pPr>
+            <a:endParaRPr lang="en-US" sz="2600" dirty="0">
+              <a:latin typeface="Arial" panose="020B0604020202020204" pitchFamily="34" charset="0"/>
+              <a:cs typeface="Arial" panose="020B0604020202020204" pitchFamily="34" charset="0"/>
+            </a:endParaRPr>
+          </a:p>
+          <a:p>
+            <a:pPr marL="571500" indent="-571500">
+              <a:buFont typeface="Arial" panose="020B0604020202020204" pitchFamily="34" charset="0"/>
+              <a:buChar char="•"/>
+            </a:pPr>
+            <a:endParaRPr lang="en-US" sz="2600" dirty="0">
+              <a:latin typeface="Arial" panose="020B0604020202020204" pitchFamily="34" charset="0"/>
+              <a:cs typeface="Arial" panose="020B0604020202020204" pitchFamily="34" charset="0"/>
+            </a:endParaRPr>
+          </a:p>
+          <a:p>
+            <a:pPr marL="571500" indent="-571500">
+              <a:buFont typeface="Arial" panose="020B0604020202020204" pitchFamily="34" charset="0"/>
+              <a:buChar char="•"/>
+            </a:pPr>
+            <a:endParaRPr lang="en-US" sz="2600" dirty="0">
+              <a:latin typeface="Arial" panose="020B0604020202020204" pitchFamily="34" charset="0"/>
+              <a:cs typeface="Arial" panose="020B0604020202020204" pitchFamily="34" charset="0"/>
+            </a:endParaRPr>
+          </a:p>
+          <a:p>
+            <a:pPr marL="571500" indent="-571500">
+              <a:buFont typeface="Arial" panose="020B0604020202020204" pitchFamily="34" charset="0"/>
+              <a:buChar char="•"/>
+            </a:pPr>
+            <a:endParaRPr lang="en-US" sz="2600" dirty="0">
+              <a:latin typeface="Arial" panose="020B0604020202020204" pitchFamily="34" charset="0"/>
+              <a:cs typeface="Arial" panose="020B0604020202020204" pitchFamily="34" charset="0"/>
+            </a:endParaRPr>
+          </a:p>
+          <a:p>
+            <a:pPr marL="571500" indent="-571500">
+              <a:buFont typeface="Arial" panose="020B0604020202020204" pitchFamily="34" charset="0"/>
+              <a:buChar char="•"/>
+            </a:pPr>
+            <a:endParaRPr lang="en-US" sz="2600" dirty="0">
+              <a:latin typeface="Arial" panose="020B0604020202020204" pitchFamily="34" charset="0"/>
+              <a:cs typeface="Arial" panose="020B0604020202020204" pitchFamily="34" charset="0"/>
+            </a:endParaRPr>
+          </a:p>
+          <a:p>
+            <a:pPr marL="571500" indent="-571500">
+              <a:buFont typeface="Arial" panose="020B0604020202020204" pitchFamily="34" charset="0"/>
+              <a:buChar char="•"/>
+            </a:pPr>
+            <a:endParaRPr lang="en-US" sz="2600" dirty="0">
+              <a:latin typeface="Arial" panose="020B0604020202020204" pitchFamily="34" charset="0"/>
+              <a:cs typeface="Arial" panose="020B0604020202020204" pitchFamily="34" charset="0"/>
+            </a:endParaRPr>
+          </a:p>
+          <a:p>
+            <a:pPr marL="571500" indent="-571500">
+              <a:buFont typeface="Arial" panose="020B0604020202020204" pitchFamily="34" charset="0"/>
+              <a:buChar char="•"/>
+            </a:pPr>
+            <a:endParaRPr lang="en-US" sz="2600" dirty="0">
+              <a:latin typeface="Arial" panose="020B0604020202020204" pitchFamily="34" charset="0"/>
+              <a:cs typeface="Arial" panose="020B0604020202020204" pitchFamily="34" charset="0"/>
+            </a:endParaRPr>
+          </a:p>
+          <a:p>
+            <a:pPr marL="571500" indent="-571500">
+              <a:buFont typeface="Arial" panose="020B0604020202020204" pitchFamily="34" charset="0"/>
+              <a:buChar char="•"/>
+            </a:pPr>
+            <a:endParaRPr lang="en-US" sz="2600" dirty="0">
+              <a:latin typeface="Arial" panose="020B0604020202020204" pitchFamily="34" charset="0"/>
+              <a:cs typeface="Arial" panose="020B0604020202020204" pitchFamily="34" charset="0"/>
+            </a:endParaRPr>
+          </a:p>
+          <a:p>
+            <a:pPr marL="571500" indent="-571500">
+              <a:buFont typeface="Arial" panose="020B0604020202020204" pitchFamily="34" charset="0"/>
+              <a:buChar char="•"/>
+            </a:pPr>
+            <a:endParaRPr lang="en-US" sz="2600" dirty="0">
+              <a:latin typeface="Arial" panose="020B0604020202020204" pitchFamily="34" charset="0"/>
+              <a:cs typeface="Arial" panose="020B0604020202020204" pitchFamily="34" charset="0"/>
+            </a:endParaRPr>
+          </a:p>
+          <a:p>
+            <a:pPr marL="571500" indent="-571500">
+              <a:buFont typeface="Arial" panose="020B0604020202020204" pitchFamily="34" charset="0"/>
+              <a:buChar char="•"/>
+            </a:pPr>
+            <a:endParaRPr lang="en-US" sz="2600" dirty="0">
+              <a:latin typeface="Arial" panose="020B0604020202020204" pitchFamily="34" charset="0"/>
+              <a:cs typeface="Arial" panose="020B0604020202020204" pitchFamily="34" charset="0"/>
+            </a:endParaRPr>
+          </a:p>
+          <a:p>
+            <a:pPr marL="571500" indent="-571500">
+              <a:buFont typeface="Arial" panose="020B0604020202020204" pitchFamily="34" charset="0"/>
+              <a:buChar char="•"/>
+            </a:pPr>
+            <a:endParaRPr lang="en-US" sz="2600" dirty="0">
+              <a:latin typeface="Arial" panose="020B0604020202020204" pitchFamily="34" charset="0"/>
+              <a:cs typeface="Arial" panose="020B0604020202020204" pitchFamily="34" charset="0"/>
+            </a:endParaRPr>
+          </a:p>
+          <a:p>
+            <a:pPr marL="571500" indent="-571500">
+              <a:buFont typeface="Arial" panose="020B0604020202020204" pitchFamily="34" charset="0"/>
+              <a:buChar char="•"/>
+            </a:pPr>
+            <a:endParaRPr lang="en-US" sz="2600" dirty="0">
+              <a:latin typeface="Arial" panose="020B0604020202020204" pitchFamily="34" charset="0"/>
+              <a:cs typeface="Arial" panose="020B0604020202020204" pitchFamily="34" charset="0"/>
+            </a:endParaRPr>
+          </a:p>
+          <a:p>
+            <a:endParaRPr lang="en-US" sz="2600" dirty="0">
+              <a:latin typeface="Arial" panose="020B0604020202020204" pitchFamily="34" charset="0"/>
+              <a:cs typeface="Arial" panose="020B0604020202020204" pitchFamily="34" charset="0"/>
+            </a:endParaRPr>
+          </a:p>
+          <a:p>
+            <a:pPr marL="457200" indent="-457200">
+              <a:buFont typeface="Arial" panose="020B0604020202020204" pitchFamily="34" charset="0"/>
+              <a:buChar char="•"/>
+            </a:pPr>
+            <a:endParaRPr lang="en-US" sz="2600" dirty="0">
+              <a:latin typeface="Arial" panose="020B0604020202020204" pitchFamily="34" charset="0"/>
+              <a:cs typeface="Arial" panose="020B0604020202020204" pitchFamily="34" charset="0"/>
+            </a:endParaRPr>
+          </a:p>
+          <a:p>
+            <a:pPr marL="457200" indent="-457200">
+              <a:buFont typeface="Arial" panose="020B0604020202020204" pitchFamily="34" charset="0"/>
+              <a:buChar char="•"/>
+            </a:pPr>
+            <a:endParaRPr lang="en-US" sz="2600" dirty="0">
+              <a:latin typeface="Arial" panose="020B0604020202020204" pitchFamily="34" charset="0"/>
+              <a:cs typeface="Arial" panose="020B0604020202020204" pitchFamily="34" charset="0"/>
+            </a:endParaRPr>
+          </a:p>
+          <a:p>
+            <a:pPr marL="457200" indent="-457200">
+              <a:buFont typeface="Arial" panose="020B0604020202020204" pitchFamily="34" charset="0"/>
+              <a:buChar char="•"/>
+            </a:pPr>
+            <a:endParaRPr lang="en-US" sz="2600" dirty="0">
+              <a:latin typeface="Arial" panose="020B0604020202020204" pitchFamily="34" charset="0"/>
+              <a:cs typeface="Arial" panose="020B0604020202020204" pitchFamily="34" charset="0"/>
+            </a:endParaRPr>
+          </a:p>
+          <a:p>
+            <a:pPr marL="457200" indent="-457200">
+              <a:buFont typeface="Arial" panose="020B0604020202020204" pitchFamily="34" charset="0"/>
+              <a:buChar char="•"/>
+            </a:pPr>
+            <a:endParaRPr lang="en-US" sz="2600" dirty="0">
+              <a:latin typeface="Arial" panose="020B0604020202020204" pitchFamily="34" charset="0"/>
+              <a:cs typeface="Arial" panose="020B0604020202020204" pitchFamily="34" charset="0"/>
+            </a:endParaRPr>
+          </a:p>
+          <a:p>
+            <a:pPr marL="457200" indent="-457200">
+              <a:buFont typeface="Arial" panose="020B0604020202020204" pitchFamily="34" charset="0"/>
+              <a:buChar char="•"/>
+            </a:pPr>
+            <a:r>
+              <a:rPr lang="en-US" sz="2600" dirty="0">
+                <a:latin typeface="Arial" panose="020B0604020202020204" pitchFamily="34" charset="0"/>
+                <a:cs typeface="Arial" panose="020B0604020202020204" pitchFamily="34" charset="0"/>
+              </a:rPr>
+              <a:t>Markers indicate the model used.  </a:t>
+            </a:r>
+          </a:p>
+          <a:p>
+            <a:pPr marL="914400" lvl="1" indent="-457200">
+              <a:buFont typeface="Arial" panose="020B0604020202020204" pitchFamily="34" charset="0"/>
+              <a:buChar char="•"/>
+            </a:pPr>
+            <a:r>
+              <a:rPr lang="en-US" sz="2600" dirty="0">
+                <a:latin typeface="Arial" panose="020B0604020202020204" pitchFamily="34" charset="0"/>
+                <a:cs typeface="Arial" panose="020B0604020202020204" pitchFamily="34" charset="0"/>
+              </a:rPr>
+              <a:t>Red markers indicate our baseline SED, with lighter shades representing lower temperatures.</a:t>
+            </a:r>
+          </a:p>
+          <a:p>
+            <a:pPr marL="914400" lvl="1" indent="-457200">
+              <a:buFont typeface="Arial" panose="020B0604020202020204" pitchFamily="34" charset="0"/>
+              <a:buChar char="•"/>
+            </a:pPr>
+            <a:r>
+              <a:rPr lang="en-US" sz="2600" dirty="0">
+                <a:latin typeface="Arial" panose="020B0604020202020204" pitchFamily="34" charset="0"/>
+                <a:cs typeface="Arial" panose="020B0604020202020204" pitchFamily="34" charset="0"/>
+              </a:rPr>
+              <a:t>Blue markers indicate a SED with </a:t>
+            </a:r>
+            <a:r>
+              <a:rPr lang="el-GR" sz="2600" dirty="0">
+                <a:latin typeface="Arial" panose="020B0604020202020204" pitchFamily="34" charset="0"/>
+                <a:cs typeface="Arial" panose="020B0604020202020204" pitchFamily="34" charset="0"/>
+              </a:rPr>
+              <a:t>α</a:t>
+            </a:r>
+            <a:r>
+              <a:rPr lang="en-US" sz="2600" baseline="-25000" dirty="0">
+                <a:latin typeface="Arial" panose="020B0604020202020204" pitchFamily="34" charset="0"/>
+                <a:cs typeface="Arial" panose="020B0604020202020204" pitchFamily="34" charset="0"/>
+              </a:rPr>
+              <a:t>x </a:t>
+            </a:r>
+            <a:r>
+              <a:rPr lang="en-US" sz="2600" dirty="0">
+                <a:latin typeface="Arial" panose="020B0604020202020204" pitchFamily="34" charset="0"/>
+                <a:cs typeface="Arial" panose="020B0604020202020204" pitchFamily="34" charset="0"/>
+              </a:rPr>
+              <a:t>= -2.19, </a:t>
+            </a:r>
+            <a:r>
+              <a:rPr lang="el-GR" sz="2600" dirty="0">
+                <a:latin typeface="Arial" panose="020B0604020202020204" pitchFamily="34" charset="0"/>
+                <a:cs typeface="Arial" panose="020B0604020202020204" pitchFamily="34" charset="0"/>
+              </a:rPr>
+              <a:t>α</a:t>
+            </a:r>
+            <a:r>
+              <a:rPr lang="en-US" sz="2600" baseline="-25000" dirty="0" err="1">
+                <a:latin typeface="Arial" panose="020B0604020202020204" pitchFamily="34" charset="0"/>
+                <a:cs typeface="Arial" panose="020B0604020202020204" pitchFamily="34" charset="0"/>
+              </a:rPr>
+              <a:t>uv</a:t>
+            </a:r>
+            <a:r>
+              <a:rPr lang="en-US" sz="2600" baseline="-25000" dirty="0">
+                <a:latin typeface="Arial" panose="020B0604020202020204" pitchFamily="34" charset="0"/>
+                <a:cs typeface="Arial" panose="020B0604020202020204" pitchFamily="34" charset="0"/>
+              </a:rPr>
+              <a:t> </a:t>
+            </a:r>
+            <a:r>
+              <a:rPr lang="en-US" sz="2600" dirty="0">
+                <a:latin typeface="Arial" panose="020B0604020202020204" pitchFamily="34" charset="0"/>
+                <a:cs typeface="Arial" panose="020B0604020202020204" pitchFamily="34" charset="0"/>
+              </a:rPr>
+              <a:t>= -0.38, </a:t>
+            </a:r>
+            <a:r>
+              <a:rPr lang="el-GR" sz="2600" dirty="0">
+                <a:latin typeface="Arial" panose="020B0604020202020204" pitchFamily="34" charset="0"/>
+                <a:cs typeface="Arial" panose="020B0604020202020204" pitchFamily="34" charset="0"/>
+              </a:rPr>
+              <a:t>α</a:t>
+            </a:r>
+            <a:r>
+              <a:rPr lang="en-US" sz="2600" baseline="-25000" dirty="0">
+                <a:latin typeface="Arial" panose="020B0604020202020204" pitchFamily="34" charset="0"/>
+                <a:cs typeface="Arial" panose="020B0604020202020204" pitchFamily="34" charset="0"/>
+              </a:rPr>
+              <a:t>ox </a:t>
+            </a:r>
+            <a:r>
+              <a:rPr lang="en-US" sz="2600" dirty="0">
+                <a:latin typeface="Arial" panose="020B0604020202020204" pitchFamily="34" charset="0"/>
+                <a:cs typeface="Arial" panose="020B0604020202020204" pitchFamily="34" charset="0"/>
+              </a:rPr>
+              <a:t>=-1.42</a:t>
+            </a:r>
+          </a:p>
+          <a:p>
+            <a:pPr marL="914400" lvl="1" indent="-457200">
+              <a:buFont typeface="Arial" panose="020B0604020202020204" pitchFamily="34" charset="0"/>
+              <a:buChar char="•"/>
+            </a:pPr>
+            <a:r>
+              <a:rPr lang="en-US" sz="2600" dirty="0">
+                <a:latin typeface="Arial" panose="020B0604020202020204" pitchFamily="34" charset="0"/>
+                <a:cs typeface="Arial" panose="020B0604020202020204" pitchFamily="34" charset="0"/>
+              </a:rPr>
+              <a:t>Green markers indicate a SED with </a:t>
+            </a:r>
+            <a:r>
+              <a:rPr lang="el-GR" sz="2600" dirty="0">
+                <a:latin typeface="Arial" panose="020B0604020202020204" pitchFamily="34" charset="0"/>
+                <a:cs typeface="Arial" panose="020B0604020202020204" pitchFamily="34" charset="0"/>
+              </a:rPr>
+              <a:t>α</a:t>
+            </a:r>
+            <a:r>
+              <a:rPr lang="en-US" sz="2600" baseline="-25000" dirty="0">
+                <a:latin typeface="Arial" panose="020B0604020202020204" pitchFamily="34" charset="0"/>
+                <a:cs typeface="Arial" panose="020B0604020202020204" pitchFamily="34" charset="0"/>
+              </a:rPr>
+              <a:t>x </a:t>
+            </a:r>
+            <a:r>
+              <a:rPr lang="en-US" sz="2600" dirty="0">
+                <a:latin typeface="Arial" panose="020B0604020202020204" pitchFamily="34" charset="0"/>
+                <a:cs typeface="Arial" panose="020B0604020202020204" pitchFamily="34" charset="0"/>
+              </a:rPr>
+              <a:t>= -1.17 , </a:t>
+            </a:r>
+            <a:r>
+              <a:rPr lang="el-GR" sz="2600" dirty="0">
+                <a:latin typeface="Arial" panose="020B0604020202020204" pitchFamily="34" charset="0"/>
+                <a:cs typeface="Arial" panose="020B0604020202020204" pitchFamily="34" charset="0"/>
+              </a:rPr>
+              <a:t>α</a:t>
+            </a:r>
+            <a:r>
+              <a:rPr lang="en-US" sz="2600" baseline="-25000" dirty="0" err="1">
+                <a:latin typeface="Arial" panose="020B0604020202020204" pitchFamily="34" charset="0"/>
+                <a:cs typeface="Arial" panose="020B0604020202020204" pitchFamily="34" charset="0"/>
+              </a:rPr>
+              <a:t>uv</a:t>
+            </a:r>
+            <a:r>
+              <a:rPr lang="en-US" sz="2600" baseline="-25000" dirty="0">
+                <a:latin typeface="Arial" panose="020B0604020202020204" pitchFamily="34" charset="0"/>
+                <a:cs typeface="Arial" panose="020B0604020202020204" pitchFamily="34" charset="0"/>
+              </a:rPr>
+              <a:t> </a:t>
+            </a:r>
+            <a:r>
+              <a:rPr lang="en-US" sz="2600" dirty="0">
+                <a:latin typeface="Arial" panose="020B0604020202020204" pitchFamily="34" charset="0"/>
+                <a:cs typeface="Arial" panose="020B0604020202020204" pitchFamily="34" charset="0"/>
+              </a:rPr>
+              <a:t>= -0.73, </a:t>
+            </a:r>
+            <a:r>
+              <a:rPr lang="el-GR" sz="2600" dirty="0">
+                <a:latin typeface="Arial" panose="020B0604020202020204" pitchFamily="34" charset="0"/>
+                <a:cs typeface="Arial" panose="020B0604020202020204" pitchFamily="34" charset="0"/>
+              </a:rPr>
+              <a:t>α</a:t>
+            </a:r>
+            <a:r>
+              <a:rPr lang="en-US" sz="2600" baseline="-25000" dirty="0">
+                <a:latin typeface="Arial" panose="020B0604020202020204" pitchFamily="34" charset="0"/>
+                <a:cs typeface="Arial" panose="020B0604020202020204" pitchFamily="34" charset="0"/>
+              </a:rPr>
+              <a:t>ox </a:t>
+            </a:r>
+            <a:r>
+              <a:rPr lang="en-US" sz="2600" dirty="0">
+                <a:latin typeface="Arial" panose="020B0604020202020204" pitchFamily="34" charset="0"/>
+                <a:cs typeface="Arial" panose="020B0604020202020204" pitchFamily="34" charset="0"/>
+              </a:rPr>
+              <a:t>=-1.42</a:t>
+            </a:r>
+          </a:p>
+          <a:p>
+            <a:pPr marL="457200" indent="-457200">
+              <a:buFont typeface="Arial" panose="020B0604020202020204" pitchFamily="34" charset="0"/>
+              <a:buChar char="•"/>
+            </a:pPr>
+            <a:r>
+              <a:rPr lang="en-US" sz="2600" dirty="0">
+                <a:latin typeface="Arial" panose="020B0604020202020204" pitchFamily="34" charset="0"/>
+                <a:cs typeface="Arial" panose="020B0604020202020204" pitchFamily="34" charset="0"/>
+              </a:rPr>
+              <a:t>Most plots have little variation between models.  An interesting result is the zig-zag pattern based on temperature that shows up in many of the plots.</a:t>
+            </a:r>
+          </a:p>
+          <a:p>
+            <a:pPr marL="457200" indent="-457200">
+              <a:buFont typeface="Arial" panose="020B0604020202020204" pitchFamily="34" charset="0"/>
+              <a:buChar char="•"/>
+            </a:pPr>
+            <a:r>
+              <a:rPr lang="en-US" sz="2600" dirty="0">
+                <a:latin typeface="Arial" panose="020B0604020202020204" pitchFamily="34" charset="0"/>
+                <a:cs typeface="Arial" panose="020B0604020202020204" pitchFamily="34" charset="0"/>
+              </a:rPr>
+              <a:t>[O I] plots show largest variation, with higher temperature models coming close to crossing the LINER-</a:t>
+            </a:r>
+            <a:r>
+              <a:rPr lang="en-US" sz="2600" dirty="0" err="1">
                 <a:latin typeface="Arial" panose="020B0604020202020204" pitchFamily="34" charset="0"/>
                 <a:cs typeface="Arial" panose="020B0604020202020204" pitchFamily="34" charset="0"/>
               </a:rPr>
               <a:t>Seyfert</a:t>
             </a:r>
             <a:r>
-              <a:rPr lang="en-US" sz="2800" dirty="0">
-                <a:latin typeface="Arial" panose="020B0604020202020204" pitchFamily="34" charset="0"/>
-                <a:cs typeface="Arial" panose="020B0604020202020204" pitchFamily="34" charset="0"/>
-              </a:rPr>
-              <a:t>, while blue indicates star-forming galaxies, composite galaxies, and Low Ionization Nuclear Emission Line Region galaxies.  </a:t>
-            </a:r>
-          </a:p>
-          <a:p>
-            <a:pPr marL="571500" indent="-571500">
-              <a:buFont typeface="Arial" panose="020B0604020202020204" pitchFamily="34" charset="0"/>
-              <a:buChar char="•"/>
-            </a:pPr>
-            <a:r>
-              <a:rPr lang="en-US" sz="2800" dirty="0">
-                <a:latin typeface="Arial" panose="020B0604020202020204" pitchFamily="34" charset="0"/>
-                <a:cs typeface="Arial" panose="020B0604020202020204" pitchFamily="34" charset="0"/>
-              </a:rPr>
-              <a:t>Galaxies are separated based on the equations that set the boundary lines. </a:t>
-            </a:r>
-          </a:p>
-          <a:p>
-            <a:pPr marL="571500" indent="-571500">
+              <a:rPr lang="en-US" sz="2600" dirty="0">
+                <a:latin typeface="Arial" panose="020B0604020202020204" pitchFamily="34" charset="0"/>
+                <a:cs typeface="Arial" panose="020B0604020202020204" pitchFamily="34" charset="0"/>
+              </a:rPr>
+              <a:t> boundary, which may be a result of ionization parameter, and requires more examination.  </a:t>
+            </a:r>
+          </a:p>
+          <a:p>
+            <a:pPr marL="457200" indent="-457200">
               <a:buFont typeface="Arial" panose="020B0604020202020204" pitchFamily="34" charset="0"/>
               <a:buChar char="•"/>
             </a:pPr>
@@ -4034,7 +4555,7 @@
             </a:endParaRPr>
           </a:p>
           <a:p>
-            <a:pPr marL="571500" indent="-571500">
+            <a:pPr marL="914400" lvl="1" indent="-457200">
               <a:buFont typeface="Arial" panose="020B0604020202020204" pitchFamily="34" charset="0"/>
               <a:buChar char="•"/>
             </a:pPr>
@@ -4044,7 +4565,7 @@
             </a:endParaRPr>
           </a:p>
           <a:p>
-            <a:pPr marL="571500" indent="-571500">
+            <a:pPr marL="914400" lvl="1" indent="-457200">
               <a:buFont typeface="Arial" panose="020B0604020202020204" pitchFamily="34" charset="0"/>
               <a:buChar char="•"/>
             </a:pPr>
@@ -4054,7 +4575,7 @@
             </a:endParaRPr>
           </a:p>
           <a:p>
-            <a:pPr marL="571500" indent="-571500">
+            <a:pPr marL="914400" lvl="1" indent="-457200">
               <a:buFont typeface="Arial" panose="020B0604020202020204" pitchFamily="34" charset="0"/>
               <a:buChar char="•"/>
             </a:pPr>
@@ -4064,7 +4585,7 @@
             </a:endParaRPr>
           </a:p>
           <a:p>
-            <a:pPr marL="571500" indent="-571500">
+            <a:pPr marL="914400" lvl="1" indent="-457200">
               <a:buFont typeface="Arial" panose="020B0604020202020204" pitchFamily="34" charset="0"/>
               <a:buChar char="•"/>
             </a:pPr>
@@ -4074,7 +4595,7 @@
             </a:endParaRPr>
           </a:p>
           <a:p>
-            <a:pPr marL="571500" indent="-571500">
+            <a:pPr marL="914400" lvl="1" indent="-457200">
               <a:buFont typeface="Arial" panose="020B0604020202020204" pitchFamily="34" charset="0"/>
               <a:buChar char="•"/>
             </a:pPr>
@@ -4084,7 +4605,7 @@
             </a:endParaRPr>
           </a:p>
           <a:p>
-            <a:pPr marL="571500" indent="-571500">
+            <a:pPr marL="914400" lvl="1" indent="-457200">
               <a:buFont typeface="Arial" panose="020B0604020202020204" pitchFamily="34" charset="0"/>
               <a:buChar char="•"/>
             </a:pPr>
@@ -4094,7 +4615,7 @@
             </a:endParaRPr>
           </a:p>
           <a:p>
-            <a:pPr marL="571500" indent="-571500">
+            <a:pPr marL="914400" lvl="1" indent="-457200">
               <a:buFont typeface="Arial" panose="020B0604020202020204" pitchFamily="34" charset="0"/>
               <a:buChar char="•"/>
             </a:pPr>
@@ -4104,7 +4625,7 @@
             </a:endParaRPr>
           </a:p>
           <a:p>
-            <a:pPr marL="571500" indent="-571500">
+            <a:pPr marL="914400" lvl="1" indent="-457200">
               <a:buFont typeface="Arial" panose="020B0604020202020204" pitchFamily="34" charset="0"/>
               <a:buChar char="•"/>
             </a:pPr>
@@ -4114,7 +4635,7 @@
             </a:endParaRPr>
           </a:p>
           <a:p>
-            <a:pPr marL="571500" indent="-571500">
+            <a:pPr marL="914400" lvl="1" indent="-457200">
               <a:buFont typeface="Arial" panose="020B0604020202020204" pitchFamily="34" charset="0"/>
               <a:buChar char="•"/>
             </a:pPr>
@@ -4124,7 +4645,7 @@
             </a:endParaRPr>
           </a:p>
           <a:p>
-            <a:pPr marL="571500" indent="-571500">
+            <a:pPr marL="914400" lvl="1" indent="-457200">
               <a:buFont typeface="Arial" panose="020B0604020202020204" pitchFamily="34" charset="0"/>
               <a:buChar char="•"/>
             </a:pPr>
@@ -4134,7 +4655,7 @@
             </a:endParaRPr>
           </a:p>
           <a:p>
-            <a:pPr marL="571500" indent="-571500">
+            <a:pPr marL="914400" lvl="1" indent="-457200">
               <a:buFont typeface="Arial" panose="020B0604020202020204" pitchFamily="34" charset="0"/>
               <a:buChar char="•"/>
             </a:pPr>
@@ -4144,7 +4665,7 @@
             </a:endParaRPr>
           </a:p>
           <a:p>
-            <a:pPr marL="571500" indent="-571500">
+            <a:pPr marL="914400" lvl="1" indent="-457200">
               <a:buFont typeface="Arial" panose="020B0604020202020204" pitchFamily="34" charset="0"/>
               <a:buChar char="•"/>
             </a:pPr>
@@ -4154,287 +4675,36 @@
             </a:endParaRPr>
           </a:p>
           <a:p>
-            <a:pPr marL="571500" indent="-571500">
-              <a:buFont typeface="Arial" panose="020B0604020202020204" pitchFamily="34" charset="0"/>
-              <a:buChar char="•"/>
-            </a:pPr>
             <a:endParaRPr lang="en-US" sz="2800" dirty="0">
               <a:latin typeface="Arial" panose="020B0604020202020204" pitchFamily="34" charset="0"/>
               <a:cs typeface="Arial" panose="020B0604020202020204" pitchFamily="34" charset="0"/>
             </a:endParaRPr>
           </a:p>
           <a:p>
-            <a:pPr marL="571500" indent="-571500">
-              <a:buFont typeface="Arial" panose="020B0604020202020204" pitchFamily="34" charset="0"/>
-              <a:buChar char="•"/>
-            </a:pPr>
             <a:endParaRPr lang="en-US" sz="2800" dirty="0">
               <a:latin typeface="Arial" panose="020B0604020202020204" pitchFamily="34" charset="0"/>
               <a:cs typeface="Arial" panose="020B0604020202020204" pitchFamily="34" charset="0"/>
             </a:endParaRPr>
           </a:p>
           <a:p>
-            <a:endParaRPr lang="en-US" sz="2800" dirty="0">
-              <a:latin typeface="Arial" panose="020B0604020202020204" pitchFamily="34" charset="0"/>
-              <a:cs typeface="Arial" panose="020B0604020202020204" pitchFamily="34" charset="0"/>
-            </a:endParaRPr>
-          </a:p>
-          <a:p>
-            <a:pPr marL="571500" indent="-571500">
-              <a:buFont typeface="Arial" panose="020B0604020202020204" pitchFamily="34" charset="0"/>
-              <a:buChar char="•"/>
-            </a:pPr>
-            <a:r>
-              <a:rPr lang="en-US" sz="2800" dirty="0">
-                <a:latin typeface="Arial" panose="020B0604020202020204" pitchFamily="34" charset="0"/>
-                <a:cs typeface="Arial" panose="020B0604020202020204" pitchFamily="34" charset="0"/>
-              </a:rPr>
-              <a:t>The black lines act as boundaries between the type of galaxy.  </a:t>
-            </a:r>
-          </a:p>
-          <a:p>
-            <a:pPr marL="1028700" lvl="1" indent="-571500">
-              <a:buFont typeface="Arial" panose="020B0604020202020204" pitchFamily="34" charset="0"/>
-              <a:buChar char="•"/>
-            </a:pPr>
-            <a:r>
-              <a:rPr lang="en-US" sz="2800" dirty="0">
-                <a:latin typeface="Arial" panose="020B0604020202020204" pitchFamily="34" charset="0"/>
-                <a:cs typeface="Arial" panose="020B0604020202020204" pitchFamily="34" charset="0"/>
-              </a:rPr>
-              <a:t>Star-Forming/Starburst galaxies are galaxies with high rates of star formation. </a:t>
-            </a:r>
-          </a:p>
-          <a:p>
-            <a:pPr marL="1028700" lvl="1" indent="-571500">
-              <a:buFont typeface="Arial" panose="020B0604020202020204" pitchFamily="34" charset="0"/>
-              <a:buChar char="•"/>
-            </a:pPr>
-            <a:r>
-              <a:rPr lang="en-US" sz="2800" dirty="0">
-                <a:latin typeface="Arial" panose="020B0604020202020204" pitchFamily="34" charset="0"/>
-                <a:cs typeface="Arial" panose="020B0604020202020204" pitchFamily="34" charset="0"/>
-              </a:rPr>
-              <a:t>Composite galaxies exhibit characteristics of both active galaxies and star-forming galaxies. </a:t>
-            </a:r>
-          </a:p>
-          <a:p>
-            <a:pPr marL="1028700" lvl="1" indent="-571500">
-              <a:buFont typeface="Arial" panose="020B0604020202020204" pitchFamily="34" charset="0"/>
-              <a:buChar char="•"/>
-            </a:pPr>
-            <a:r>
-              <a:rPr lang="en-US" sz="2800" dirty="0">
-                <a:latin typeface="Arial" panose="020B0604020202020204" pitchFamily="34" charset="0"/>
-                <a:cs typeface="Arial" panose="020B0604020202020204" pitchFamily="34" charset="0"/>
-              </a:rPr>
-              <a:t>Low Ionization Nuclear Emission Region (LINER) galaxies are characterized by emission lines of weakly ionized or neutral atoms.  </a:t>
-            </a:r>
-          </a:p>
-          <a:p>
             <a:pPr marL="457200" indent="-457200">
               <a:buFont typeface="Arial" panose="020B0604020202020204" pitchFamily="34" charset="0"/>
               <a:buChar char="•"/>
             </a:pPr>
-            <a:r>
-              <a:rPr lang="en-US" sz="2800" dirty="0">
-                <a:latin typeface="Arial" panose="020B0604020202020204" pitchFamily="34" charset="0"/>
-                <a:cs typeface="Arial" panose="020B0604020202020204" pitchFamily="34" charset="0"/>
-              </a:rPr>
-              <a:t>Markers indicate the model used.  </a:t>
-            </a:r>
-          </a:p>
-          <a:p>
-            <a:pPr marL="914400" lvl="1" indent="-457200">
-              <a:buFont typeface="Arial" panose="020B0604020202020204" pitchFamily="34" charset="0"/>
-              <a:buChar char="•"/>
-            </a:pPr>
-            <a:r>
-              <a:rPr lang="en-US" sz="2800" dirty="0">
-                <a:latin typeface="Arial" panose="020B0604020202020204" pitchFamily="34" charset="0"/>
-                <a:cs typeface="Arial" panose="020B0604020202020204" pitchFamily="34" charset="0"/>
-              </a:rPr>
-              <a:t>Red markers indicate our baseline SED, with lighter shades representing lower temperatures.</a:t>
-            </a:r>
-          </a:p>
-          <a:p>
-            <a:pPr marL="914400" lvl="1" indent="-457200">
-              <a:buFont typeface="Arial" panose="020B0604020202020204" pitchFamily="34" charset="0"/>
-              <a:buChar char="•"/>
-            </a:pPr>
-            <a:r>
-              <a:rPr lang="en-US" sz="2800" dirty="0">
-                <a:latin typeface="Arial" panose="020B0604020202020204" pitchFamily="34" charset="0"/>
-                <a:cs typeface="Arial" panose="020B0604020202020204" pitchFamily="34" charset="0"/>
-              </a:rPr>
-              <a:t>Blue markers indicate a SED with </a:t>
-            </a:r>
-            <a:r>
-              <a:rPr lang="el-GR" sz="2800" dirty="0">
-                <a:latin typeface="Arial" panose="020B0604020202020204" pitchFamily="34" charset="0"/>
-                <a:cs typeface="Arial" panose="020B0604020202020204" pitchFamily="34" charset="0"/>
-              </a:rPr>
-              <a:t>α</a:t>
-            </a:r>
-            <a:r>
-              <a:rPr lang="en-US" sz="2800" baseline="-25000" dirty="0">
-                <a:latin typeface="Arial" panose="020B0604020202020204" pitchFamily="34" charset="0"/>
-                <a:cs typeface="Arial" panose="020B0604020202020204" pitchFamily="34" charset="0"/>
-              </a:rPr>
-              <a:t>x </a:t>
-            </a:r>
-            <a:r>
-              <a:rPr lang="en-US" sz="2800" dirty="0">
-                <a:latin typeface="Arial" panose="020B0604020202020204" pitchFamily="34" charset="0"/>
-                <a:cs typeface="Arial" panose="020B0604020202020204" pitchFamily="34" charset="0"/>
-              </a:rPr>
-              <a:t>= -2.19, </a:t>
-            </a:r>
-            <a:r>
-              <a:rPr lang="el-GR" sz="2800" dirty="0">
-                <a:latin typeface="Arial" panose="020B0604020202020204" pitchFamily="34" charset="0"/>
-                <a:cs typeface="Arial" panose="020B0604020202020204" pitchFamily="34" charset="0"/>
-              </a:rPr>
-              <a:t>α</a:t>
-            </a:r>
-            <a:r>
-              <a:rPr lang="en-US" sz="2800" baseline="-25000" dirty="0" err="1">
-                <a:latin typeface="Arial" panose="020B0604020202020204" pitchFamily="34" charset="0"/>
-                <a:cs typeface="Arial" panose="020B0604020202020204" pitchFamily="34" charset="0"/>
-              </a:rPr>
-              <a:t>uv</a:t>
-            </a:r>
-            <a:r>
-              <a:rPr lang="en-US" sz="2800" baseline="-25000" dirty="0">
-                <a:latin typeface="Arial" panose="020B0604020202020204" pitchFamily="34" charset="0"/>
-                <a:cs typeface="Arial" panose="020B0604020202020204" pitchFamily="34" charset="0"/>
-              </a:rPr>
-              <a:t> </a:t>
-            </a:r>
-            <a:r>
-              <a:rPr lang="en-US" sz="2800" dirty="0">
-                <a:latin typeface="Arial" panose="020B0604020202020204" pitchFamily="34" charset="0"/>
-                <a:cs typeface="Arial" panose="020B0604020202020204" pitchFamily="34" charset="0"/>
-              </a:rPr>
-              <a:t>= -0.38, </a:t>
-            </a:r>
-            <a:r>
-              <a:rPr lang="el-GR" sz="2800" dirty="0">
-                <a:latin typeface="Arial" panose="020B0604020202020204" pitchFamily="34" charset="0"/>
-                <a:cs typeface="Arial" panose="020B0604020202020204" pitchFamily="34" charset="0"/>
-              </a:rPr>
-              <a:t>α</a:t>
-            </a:r>
-            <a:r>
-              <a:rPr lang="en-US" sz="2800" baseline="-25000" dirty="0">
-                <a:latin typeface="Arial" panose="020B0604020202020204" pitchFamily="34" charset="0"/>
-                <a:cs typeface="Arial" panose="020B0604020202020204" pitchFamily="34" charset="0"/>
-              </a:rPr>
-              <a:t>ox </a:t>
-            </a:r>
-            <a:r>
-              <a:rPr lang="en-US" sz="2800" dirty="0">
-                <a:latin typeface="Arial" panose="020B0604020202020204" pitchFamily="34" charset="0"/>
-                <a:cs typeface="Arial" panose="020B0604020202020204" pitchFamily="34" charset="0"/>
-              </a:rPr>
-              <a:t>=-1.42</a:t>
-            </a:r>
-          </a:p>
-          <a:p>
-            <a:pPr marL="914400" lvl="1" indent="-457200">
-              <a:buFont typeface="Arial" panose="020B0604020202020204" pitchFamily="34" charset="0"/>
-              <a:buChar char="•"/>
-            </a:pPr>
-            <a:r>
-              <a:rPr lang="en-US" sz="2800" dirty="0">
-                <a:latin typeface="Arial" panose="020B0604020202020204" pitchFamily="34" charset="0"/>
-                <a:cs typeface="Arial" panose="020B0604020202020204" pitchFamily="34" charset="0"/>
-              </a:rPr>
-              <a:t>Green markers indicate a SED with </a:t>
-            </a:r>
-            <a:r>
-              <a:rPr lang="el-GR" sz="2800" dirty="0">
-                <a:latin typeface="Arial" panose="020B0604020202020204" pitchFamily="34" charset="0"/>
-                <a:cs typeface="Arial" panose="020B0604020202020204" pitchFamily="34" charset="0"/>
-              </a:rPr>
-              <a:t>α</a:t>
-            </a:r>
-            <a:r>
-              <a:rPr lang="en-US" sz="2800" baseline="-25000" dirty="0">
-                <a:latin typeface="Arial" panose="020B0604020202020204" pitchFamily="34" charset="0"/>
-                <a:cs typeface="Arial" panose="020B0604020202020204" pitchFamily="34" charset="0"/>
-              </a:rPr>
-              <a:t>x </a:t>
-            </a:r>
-            <a:r>
-              <a:rPr lang="en-US" sz="2800" dirty="0">
-                <a:latin typeface="Arial" panose="020B0604020202020204" pitchFamily="34" charset="0"/>
-                <a:cs typeface="Arial" panose="020B0604020202020204" pitchFamily="34" charset="0"/>
-              </a:rPr>
-              <a:t>= -1.17 , </a:t>
-            </a:r>
-            <a:r>
-              <a:rPr lang="el-GR" sz="2800" dirty="0">
-                <a:latin typeface="Arial" panose="020B0604020202020204" pitchFamily="34" charset="0"/>
-                <a:cs typeface="Arial" panose="020B0604020202020204" pitchFamily="34" charset="0"/>
-              </a:rPr>
-              <a:t>α</a:t>
-            </a:r>
-            <a:r>
-              <a:rPr lang="en-US" sz="2800" baseline="-25000" dirty="0" err="1">
-                <a:latin typeface="Arial" panose="020B0604020202020204" pitchFamily="34" charset="0"/>
-                <a:cs typeface="Arial" panose="020B0604020202020204" pitchFamily="34" charset="0"/>
-              </a:rPr>
-              <a:t>uv</a:t>
-            </a:r>
-            <a:r>
-              <a:rPr lang="en-US" sz="2800" baseline="-25000" dirty="0">
-                <a:latin typeface="Arial" panose="020B0604020202020204" pitchFamily="34" charset="0"/>
-                <a:cs typeface="Arial" panose="020B0604020202020204" pitchFamily="34" charset="0"/>
-              </a:rPr>
-              <a:t> </a:t>
-            </a:r>
-            <a:r>
-              <a:rPr lang="en-US" sz="2800" dirty="0">
-                <a:latin typeface="Arial" panose="020B0604020202020204" pitchFamily="34" charset="0"/>
-                <a:cs typeface="Arial" panose="020B0604020202020204" pitchFamily="34" charset="0"/>
-              </a:rPr>
-              <a:t>= -0.73, </a:t>
-            </a:r>
-            <a:r>
-              <a:rPr lang="el-GR" sz="2800" dirty="0">
-                <a:latin typeface="Arial" panose="020B0604020202020204" pitchFamily="34" charset="0"/>
-                <a:cs typeface="Arial" panose="020B0604020202020204" pitchFamily="34" charset="0"/>
-              </a:rPr>
-              <a:t>α</a:t>
-            </a:r>
-            <a:r>
-              <a:rPr lang="en-US" sz="2800" baseline="-25000" dirty="0">
-                <a:latin typeface="Arial" panose="020B0604020202020204" pitchFamily="34" charset="0"/>
-                <a:cs typeface="Arial" panose="020B0604020202020204" pitchFamily="34" charset="0"/>
-              </a:rPr>
-              <a:t>ox </a:t>
-            </a:r>
-            <a:r>
-              <a:rPr lang="en-US" sz="2800" dirty="0">
-                <a:latin typeface="Arial" panose="020B0604020202020204" pitchFamily="34" charset="0"/>
-                <a:cs typeface="Arial" panose="020B0604020202020204" pitchFamily="34" charset="0"/>
-              </a:rPr>
-              <a:t>=-1.42</a:t>
-            </a:r>
+            <a:endParaRPr lang="en-US" sz="2600" dirty="0">
+              <a:latin typeface="Arial" panose="020B0604020202020204" pitchFamily="34" charset="0"/>
+              <a:cs typeface="Arial" panose="020B0604020202020204" pitchFamily="34" charset="0"/>
+            </a:endParaRPr>
           </a:p>
           <a:p>
             <a:pPr marL="457200" indent="-457200">
               <a:buFont typeface="Arial" panose="020B0604020202020204" pitchFamily="34" charset="0"/>
               <a:buChar char="•"/>
             </a:pPr>
-            <a:r>
-              <a:rPr lang="en-US" sz="2800" dirty="0">
-                <a:latin typeface="Arial" panose="020B0604020202020204" pitchFamily="34" charset="0"/>
-                <a:cs typeface="Arial" panose="020B0604020202020204" pitchFamily="34" charset="0"/>
-              </a:rPr>
-              <a:t>Most plots have little variation between models.  An interesting result is the zig-zag pattern based on temperature that shows up in many of the plots.</a:t>
-            </a:r>
+            <a:endParaRPr lang="en-US" sz="2600" dirty="0">
+              <a:latin typeface="Arial" panose="020B0604020202020204" pitchFamily="34" charset="0"/>
+              <a:cs typeface="Arial" panose="020B0604020202020204" pitchFamily="34" charset="0"/>
+            </a:endParaRPr>
           </a:p>
           <a:p>
             <a:pPr marL="457200" indent="-457200">
@@ -4442,25 +4712,39 @@
               <a:buChar char="•"/>
             </a:pPr>
             <a:r>
-              <a:rPr lang="en-US" sz="2800" dirty="0">
-                <a:latin typeface="Arial" panose="020B0604020202020204" pitchFamily="34" charset="0"/>
-                <a:cs typeface="Arial" panose="020B0604020202020204" pitchFamily="34" charset="0"/>
-              </a:rPr>
-              <a:t>[O I] plots show largest variation, with higher temperature models coming close to crossing the LINER-</a:t>
-            </a:r>
-            <a:r>
-              <a:rPr lang="en-US" sz="2800" dirty="0" err="1">
-                <a:latin typeface="Arial" panose="020B0604020202020204" pitchFamily="34" charset="0"/>
-                <a:cs typeface="Arial" panose="020B0604020202020204" pitchFamily="34" charset="0"/>
-              </a:rPr>
-              <a:t>Seyfert</a:t>
-            </a:r>
-            <a:r>
-              <a:rPr lang="en-US" sz="2800" dirty="0">
-                <a:latin typeface="Arial" panose="020B0604020202020204" pitchFamily="34" charset="0"/>
-                <a:cs typeface="Arial" panose="020B0604020202020204" pitchFamily="34" charset="0"/>
-              </a:rPr>
-              <a:t> boundary. </a:t>
+              <a:rPr lang="en-US" sz="2600" dirty="0">
+                <a:latin typeface="Arial" panose="020B0604020202020204" pitchFamily="34" charset="0"/>
+                <a:cs typeface="Arial" panose="020B0604020202020204" pitchFamily="34" charset="0"/>
+              </a:rPr>
+              <a:t>Density diagnostic from </a:t>
+            </a:r>
+            <a:r>
+              <a:rPr lang="en-US" sz="2600" dirty="0" err="1">
+                <a:latin typeface="Arial" panose="020B0604020202020204" pitchFamily="34" charset="0"/>
+                <a:cs typeface="Arial" panose="020B0604020202020204" pitchFamily="34" charset="0"/>
+              </a:rPr>
+              <a:t>Ferland</a:t>
+            </a:r>
+            <a:r>
+              <a:rPr lang="en-US" sz="2600" dirty="0">
+                <a:latin typeface="Arial" panose="020B0604020202020204" pitchFamily="34" charset="0"/>
+                <a:cs typeface="Arial" panose="020B0604020202020204" pitchFamily="34" charset="0"/>
+              </a:rPr>
+              <a:t> &amp; </a:t>
+            </a:r>
+            <a:r>
+              <a:rPr lang="en-US" sz="2600" dirty="0" err="1">
+                <a:latin typeface="Arial" panose="020B0604020202020204" pitchFamily="34" charset="0"/>
+                <a:cs typeface="Arial" panose="020B0604020202020204" pitchFamily="34" charset="0"/>
+              </a:rPr>
+              <a:t>Osterbrock</a:t>
+            </a:r>
+            <a:r>
+              <a:rPr lang="en-US" sz="2600" dirty="0">
+                <a:latin typeface="Arial" panose="020B0604020202020204" pitchFamily="34" charset="0"/>
+                <a:cs typeface="Arial" panose="020B0604020202020204" pitchFamily="34" charset="0"/>
+              </a:rPr>
+              <a:t> 1989.  </a:t>
             </a:r>
           </a:p>
           <a:p>
@@ -4469,11 +4753,11 @@
               <a:buChar char="•"/>
             </a:pPr>
             <a:r>
-              <a:rPr lang="en-US" sz="2800" dirty="0">
-                <a:latin typeface="Arial" panose="020B0604020202020204" pitchFamily="34" charset="0"/>
-                <a:cs typeface="Arial" panose="020B0604020202020204" pitchFamily="34" charset="0"/>
-              </a:rPr>
-              <a:t>Variation in [O I] may be a result of ionization parameter.  </a:t>
+              <a:rPr lang="en-US" sz="2600" dirty="0">
+                <a:latin typeface="Arial" panose="020B0604020202020204" pitchFamily="34" charset="0"/>
+                <a:cs typeface="Arial" panose="020B0604020202020204" pitchFamily="34" charset="0"/>
+              </a:rPr>
+              <a:t>Emissions from elements at the same ionization level, but different wavelengths act as indicators of density. </a:t>
             </a:r>
           </a:p>
           <a:p>
@@ -4481,142 +4765,13 @@
               <a:buFont typeface="Arial" panose="020B0604020202020204" pitchFamily="34" charset="0"/>
               <a:buChar char="•"/>
             </a:pPr>
-            <a:endParaRPr lang="en-US" sz="2800" dirty="0">
-              <a:latin typeface="Arial" panose="020B0604020202020204" pitchFamily="34" charset="0"/>
-              <a:cs typeface="Arial" panose="020B0604020202020204" pitchFamily="34" charset="0"/>
-            </a:endParaRPr>
-          </a:p>
-          <a:p>
-            <a:pPr marL="914400" lvl="1" indent="-457200">
-              <a:buFont typeface="Arial" panose="020B0604020202020204" pitchFamily="34" charset="0"/>
-              <a:buChar char="•"/>
-            </a:pPr>
-            <a:endParaRPr lang="en-US" sz="2800" dirty="0">
-              <a:latin typeface="Arial" panose="020B0604020202020204" pitchFamily="34" charset="0"/>
-              <a:cs typeface="Arial" panose="020B0604020202020204" pitchFamily="34" charset="0"/>
-            </a:endParaRPr>
-          </a:p>
-          <a:p>
-            <a:pPr marL="914400" lvl="1" indent="-457200">
-              <a:buFont typeface="Arial" panose="020B0604020202020204" pitchFamily="34" charset="0"/>
-              <a:buChar char="•"/>
-            </a:pPr>
-            <a:endParaRPr lang="en-US" sz="2800" dirty="0">
-              <a:latin typeface="Arial" panose="020B0604020202020204" pitchFamily="34" charset="0"/>
-              <a:cs typeface="Arial" panose="020B0604020202020204" pitchFamily="34" charset="0"/>
-            </a:endParaRPr>
-          </a:p>
-          <a:p>
-            <a:pPr marL="914400" lvl="1" indent="-457200">
-              <a:buFont typeface="Arial" panose="020B0604020202020204" pitchFamily="34" charset="0"/>
-              <a:buChar char="•"/>
-            </a:pPr>
-            <a:endParaRPr lang="en-US" sz="2800" dirty="0">
-              <a:latin typeface="Arial" panose="020B0604020202020204" pitchFamily="34" charset="0"/>
-              <a:cs typeface="Arial" panose="020B0604020202020204" pitchFamily="34" charset="0"/>
-            </a:endParaRPr>
-          </a:p>
-          <a:p>
-            <a:pPr marL="914400" lvl="1" indent="-457200">
-              <a:buFont typeface="Arial" panose="020B0604020202020204" pitchFamily="34" charset="0"/>
-              <a:buChar char="•"/>
-            </a:pPr>
-            <a:endParaRPr lang="en-US" sz="2800" dirty="0">
-              <a:latin typeface="Arial" panose="020B0604020202020204" pitchFamily="34" charset="0"/>
-              <a:cs typeface="Arial" panose="020B0604020202020204" pitchFamily="34" charset="0"/>
-            </a:endParaRPr>
-          </a:p>
-          <a:p>
-            <a:pPr marL="914400" lvl="1" indent="-457200">
-              <a:buFont typeface="Arial" panose="020B0604020202020204" pitchFamily="34" charset="0"/>
-              <a:buChar char="•"/>
-            </a:pPr>
-            <a:endParaRPr lang="en-US" sz="2800" dirty="0">
-              <a:latin typeface="Arial" panose="020B0604020202020204" pitchFamily="34" charset="0"/>
-              <a:cs typeface="Arial" panose="020B0604020202020204" pitchFamily="34" charset="0"/>
-            </a:endParaRPr>
-          </a:p>
-          <a:p>
-            <a:pPr marL="914400" lvl="1" indent="-457200">
-              <a:buFont typeface="Arial" panose="020B0604020202020204" pitchFamily="34" charset="0"/>
-              <a:buChar char="•"/>
-            </a:pPr>
-            <a:endParaRPr lang="en-US" sz="2800" dirty="0">
-              <a:latin typeface="Arial" panose="020B0604020202020204" pitchFamily="34" charset="0"/>
-              <a:cs typeface="Arial" panose="020B0604020202020204" pitchFamily="34" charset="0"/>
-            </a:endParaRPr>
-          </a:p>
-          <a:p>
-            <a:pPr marL="914400" lvl="1" indent="-457200">
-              <a:buFont typeface="Arial" panose="020B0604020202020204" pitchFamily="34" charset="0"/>
-              <a:buChar char="•"/>
-            </a:pPr>
-            <a:endParaRPr lang="en-US" sz="2800" dirty="0">
-              <a:latin typeface="Arial" panose="020B0604020202020204" pitchFamily="34" charset="0"/>
-              <a:cs typeface="Arial" panose="020B0604020202020204" pitchFamily="34" charset="0"/>
-            </a:endParaRPr>
-          </a:p>
-          <a:p>
-            <a:pPr marL="914400" lvl="1" indent="-457200">
-              <a:buFont typeface="Arial" panose="020B0604020202020204" pitchFamily="34" charset="0"/>
-              <a:buChar char="•"/>
-            </a:pPr>
-            <a:endParaRPr lang="en-US" sz="2800" dirty="0">
-              <a:latin typeface="Arial" panose="020B0604020202020204" pitchFamily="34" charset="0"/>
-              <a:cs typeface="Arial" panose="020B0604020202020204" pitchFamily="34" charset="0"/>
-            </a:endParaRPr>
-          </a:p>
-          <a:p>
-            <a:pPr marL="914400" lvl="1" indent="-457200">
-              <a:buFont typeface="Arial" panose="020B0604020202020204" pitchFamily="34" charset="0"/>
-              <a:buChar char="•"/>
-            </a:pPr>
-            <a:endParaRPr lang="en-US" sz="2800" dirty="0">
-              <a:latin typeface="Arial" panose="020B0604020202020204" pitchFamily="34" charset="0"/>
-              <a:cs typeface="Arial" panose="020B0604020202020204" pitchFamily="34" charset="0"/>
-            </a:endParaRPr>
-          </a:p>
-          <a:p>
-            <a:pPr marL="914400" lvl="1" indent="-457200">
-              <a:buFont typeface="Arial" panose="020B0604020202020204" pitchFamily="34" charset="0"/>
-              <a:buChar char="•"/>
-            </a:pPr>
-            <a:endParaRPr lang="en-US" sz="2800" dirty="0">
-              <a:latin typeface="Arial" panose="020B0604020202020204" pitchFamily="34" charset="0"/>
-              <a:cs typeface="Arial" panose="020B0604020202020204" pitchFamily="34" charset="0"/>
-            </a:endParaRPr>
-          </a:p>
-          <a:p>
-            <a:pPr marL="914400" lvl="1" indent="-457200">
-              <a:buFont typeface="Arial" panose="020B0604020202020204" pitchFamily="34" charset="0"/>
-              <a:buChar char="•"/>
-            </a:pPr>
-            <a:endParaRPr lang="en-US" sz="2800" dirty="0">
-              <a:latin typeface="Arial" panose="020B0604020202020204" pitchFamily="34" charset="0"/>
-              <a:cs typeface="Arial" panose="020B0604020202020204" pitchFamily="34" charset="0"/>
-            </a:endParaRPr>
-          </a:p>
-          <a:p>
-            <a:pPr marL="914400" lvl="1" indent="-457200">
-              <a:buFont typeface="Arial" panose="020B0604020202020204" pitchFamily="34" charset="0"/>
-              <a:buChar char="•"/>
-            </a:pPr>
-            <a:endParaRPr lang="en-US" sz="2800" dirty="0">
-              <a:latin typeface="Arial" panose="020B0604020202020204" pitchFamily="34" charset="0"/>
-              <a:cs typeface="Arial" panose="020B0604020202020204" pitchFamily="34" charset="0"/>
-            </a:endParaRPr>
-          </a:p>
-          <a:p>
-            <a:endParaRPr lang="en-US" sz="2800" dirty="0">
-              <a:latin typeface="Arial" panose="020B0604020202020204" pitchFamily="34" charset="0"/>
-              <a:cs typeface="Arial" panose="020B0604020202020204" pitchFamily="34" charset="0"/>
-            </a:endParaRPr>
-          </a:p>
-          <a:p>
-            <a:endParaRPr lang="en-US" sz="2800" dirty="0">
-              <a:latin typeface="Arial" panose="020B0604020202020204" pitchFamily="34" charset="0"/>
-              <a:cs typeface="Arial" panose="020B0604020202020204" pitchFamily="34" charset="0"/>
-            </a:endParaRPr>
+            <a:r>
+              <a:rPr lang="en-US" sz="2600" dirty="0">
+                <a:latin typeface="Arial" panose="020B0604020202020204" pitchFamily="34" charset="0"/>
+                <a:cs typeface="Arial" panose="020B0604020202020204" pitchFamily="34" charset="0"/>
+              </a:rPr>
+              <a:t>[O III] 4363 / [O III] 5007 is sensitive to electron temperature.  </a:t>
+            </a:r>
           </a:p>
           <a:p>
             <a:pPr marL="457200" indent="-457200">
@@ -4624,11 +4779,11 @@
               <a:buChar char="•"/>
             </a:pPr>
             <a:r>
-              <a:rPr lang="en-US" sz="2800" dirty="0">
-                <a:latin typeface="Arial" panose="020B0604020202020204" pitchFamily="34" charset="0"/>
-                <a:cs typeface="Arial" panose="020B0604020202020204" pitchFamily="34" charset="0"/>
-              </a:rPr>
-              <a:t>Density diagnostic from Richardson et al. 2014.  </a:t>
+              <a:rPr lang="en-US" sz="2600" dirty="0">
+                <a:latin typeface="Arial" panose="020B0604020202020204" pitchFamily="34" charset="0"/>
+                <a:cs typeface="Arial" panose="020B0604020202020204" pitchFamily="34" charset="0"/>
+              </a:rPr>
+              <a:t>[S II] 6716 / [S II] 6731 is insensitive to other factors and acts as a strong indicator of density. </a:t>
             </a:r>
           </a:p>
           <a:p>
@@ -4637,33 +4792,7 @@
               <a:buChar char="•"/>
             </a:pPr>
             <a:r>
-              <a:rPr lang="en-US" sz="2800" dirty="0">
-                <a:latin typeface="Arial" panose="020B0604020202020204" pitchFamily="34" charset="0"/>
-                <a:cs typeface="Arial" panose="020B0604020202020204" pitchFamily="34" charset="0"/>
-              </a:rPr>
-              <a:t>Emissions from elements at the same ionization level, but different wavelengths act as indicators of density. </a:t>
-            </a:r>
-          </a:p>
-          <a:p>
-            <a:pPr marL="457200" indent="-457200">
-              <a:buFont typeface="Arial" panose="020B0604020202020204" pitchFamily="34" charset="0"/>
-              <a:buChar char="•"/>
-            </a:pPr>
-            <a:r>
-              <a:rPr lang="en-US" sz="2800" dirty="0">
-                <a:latin typeface="Arial" panose="020B0604020202020204" pitchFamily="34" charset="0"/>
-                <a:cs typeface="Arial" panose="020B0604020202020204" pitchFamily="34" charset="0"/>
-              </a:rPr>
-              <a:t>[S II] 6716 / [S II] 6731 is insensitive to other factors and acts as a strong indicator of density. </a:t>
-            </a:r>
-          </a:p>
-          <a:p>
-            <a:pPr marL="457200" indent="-457200">
-              <a:buFont typeface="Arial" panose="020B0604020202020204" pitchFamily="34" charset="0"/>
-              <a:buChar char="•"/>
-            </a:pPr>
-            <a:r>
-              <a:rPr lang="en-US" sz="2800" dirty="0">
+              <a:rPr lang="en-US" sz="2600" dirty="0">
                 <a:latin typeface="Arial" panose="020B0604020202020204" pitchFamily="34" charset="0"/>
                 <a:cs typeface="Arial" panose="020B0604020202020204" pitchFamily="34" charset="0"/>
               </a:rPr>
@@ -4774,8 +4903,8 @@
         </p:blipFill>
         <p:spPr>
           <a:xfrm>
-            <a:off x="5497146" y="7333886"/>
-            <a:ext cx="5288870" cy="3351119"/>
+            <a:off x="4579183" y="7527742"/>
+            <a:ext cx="6602199" cy="4183267"/>
           </a:xfrm>
           <a:prstGeom prst="rect">
             <a:avLst/>
@@ -4790,8 +4919,8 @@
         </p:nvSpPr>
         <p:spPr>
           <a:xfrm>
-            <a:off x="1505878" y="26163874"/>
-            <a:ext cx="13200721" cy="5632311"/>
+            <a:off x="1147014" y="25776617"/>
+            <a:ext cx="13605813" cy="7171194"/>
           </a:xfrm>
           <a:prstGeom prst="rect">
             <a:avLst/>
@@ -4848,10 +4977,47 @@
           </a:p>
           <a:p>
             <a:r>
+              <a:rPr lang="en-US" sz="2000" dirty="0">
+                <a:latin typeface="Arial" panose="020B0604020202020204" pitchFamily="34" charset="0"/>
+                <a:cs typeface="Arial" panose="020B0604020202020204" pitchFamily="34" charset="0"/>
+              </a:rPr>
+              <a:t>Baldwin J. A., </a:t>
+            </a:r>
+            <a:r>
               <a:rPr lang="en-US" sz="2000" dirty="0" err="1">
                 <a:latin typeface="Arial" panose="020B0604020202020204" pitchFamily="34" charset="0"/>
                 <a:cs typeface="Arial" panose="020B0604020202020204" pitchFamily="34" charset="0"/>
               </a:rPr>
+              <a:t>PhillipsM.M</a:t>
+            </a:r>
+            <a:r>
+              <a:rPr lang="en-US" sz="2000" dirty="0">
+                <a:latin typeface="Arial" panose="020B0604020202020204" pitchFamily="34" charset="0"/>
+                <a:cs typeface="Arial" panose="020B0604020202020204" pitchFamily="34" charset="0"/>
+              </a:rPr>
+              <a:t>., </a:t>
+            </a:r>
+            <a:r>
+              <a:rPr lang="en-US" sz="2000" dirty="0" err="1">
+                <a:latin typeface="Arial" panose="020B0604020202020204" pitchFamily="34" charset="0"/>
+                <a:cs typeface="Arial" panose="020B0604020202020204" pitchFamily="34" charset="0"/>
+              </a:rPr>
+              <a:t>Telervich</a:t>
+            </a:r>
+            <a:r>
+              <a:rPr lang="en-US" sz="2000" dirty="0">
+                <a:latin typeface="Arial" panose="020B0604020202020204" pitchFamily="34" charset="0"/>
+                <a:cs typeface="Arial" panose="020B0604020202020204" pitchFamily="34" charset="0"/>
+              </a:rPr>
+              <a:t> R., 1981, PASP, 93, 5 </a:t>
+            </a:r>
+          </a:p>
+          <a:p>
+            <a:r>
+              <a:rPr lang="en-US" sz="2000" dirty="0" err="1">
+                <a:latin typeface="Arial" panose="020B0604020202020204" pitchFamily="34" charset="0"/>
+                <a:cs typeface="Arial" panose="020B0604020202020204" pitchFamily="34" charset="0"/>
+              </a:rPr>
               <a:t>Grupe</a:t>
             </a:r>
             <a:r>
@@ -5078,6 +5244,36 @@
                 <a:latin typeface="Arial" panose="020B0604020202020204" pitchFamily="34" charset="0"/>
                 <a:cs typeface="Arial" panose="020B0604020202020204" pitchFamily="34" charset="0"/>
               </a:rPr>
+              <a:t>OsterbrockD</a:t>
+            </a:r>
+            <a:r>
+              <a:rPr lang="en-US" sz="2000" dirty="0">
+                <a:latin typeface="Arial" panose="020B0604020202020204" pitchFamily="34" charset="0"/>
+                <a:cs typeface="Arial" panose="020B0604020202020204" pitchFamily="34" charset="0"/>
+              </a:rPr>
+              <a:t>. E., </a:t>
+            </a:r>
+            <a:r>
+              <a:rPr lang="en-US" sz="2000" dirty="0" err="1">
+                <a:latin typeface="Arial" panose="020B0604020202020204" pitchFamily="34" charset="0"/>
+                <a:cs typeface="Arial" panose="020B0604020202020204" pitchFamily="34" charset="0"/>
+              </a:rPr>
+              <a:t>FerlandG</a:t>
+            </a:r>
+            <a:r>
+              <a:rPr lang="en-US" sz="2000" dirty="0">
+                <a:latin typeface="Arial" panose="020B0604020202020204" pitchFamily="34" charset="0"/>
+                <a:cs typeface="Arial" panose="020B0604020202020204" pitchFamily="34" charset="0"/>
+              </a:rPr>
+              <a:t>. J., 2006, Astrophysics of Gaseous Nebulae and Active Galactic Nuclei. University Science Books, California </a:t>
+            </a:r>
+          </a:p>
+          <a:p>
+            <a:r>
+              <a:rPr lang="en-US" sz="2000" dirty="0" err="1">
+                <a:latin typeface="Arial" panose="020B0604020202020204" pitchFamily="34" charset="0"/>
+                <a:cs typeface="Arial" panose="020B0604020202020204" pitchFamily="34" charset="0"/>
+              </a:rPr>
               <a:t>Lamareille</a:t>
             </a:r>
             <a:r>
@@ -5090,6 +5286,15 @@
           </a:p>
           <a:p>
             <a:r>
+              <a:rPr lang="en-US" sz="2000" dirty="0">
+                <a:latin typeface="Arial" panose="020B0604020202020204" pitchFamily="34" charset="0"/>
+                <a:cs typeface="Arial" panose="020B0604020202020204" pitchFamily="34" charset="0"/>
+              </a:rPr>
+              <a:t>Peterson, B. M. 1993, PASP, 105, 247</a:t>
+            </a:r>
+          </a:p>
+          <a:p>
+            <a:r>
               <a:rPr lang="de-DE" sz="2000" dirty="0">
                 <a:latin typeface="Arial" panose="020B0604020202020204" pitchFamily="34" charset="0"/>
                 <a:cs typeface="Arial" panose="020B0604020202020204" pitchFamily="34" charset="0"/>
@@ -5125,6 +5330,50 @@
                 <a:cs typeface="Arial" panose="020B0604020202020204" pitchFamily="34" charset="0"/>
               </a:rPr>
               <a:t>, J. 2012, MNRAS, 421, 1043</a:t>
+            </a:r>
+          </a:p>
+          <a:p>
+            <a:r>
+              <a:rPr lang="en-US" sz="2000" dirty="0" err="1">
+                <a:latin typeface="Arial" panose="020B0604020202020204" pitchFamily="34" charset="0"/>
+                <a:cs typeface="Arial" panose="020B0604020202020204" pitchFamily="34" charset="0"/>
+              </a:rPr>
+              <a:t>Veilleux</a:t>
+            </a:r>
+            <a:r>
+              <a:rPr lang="en-US" sz="2000" dirty="0">
+                <a:latin typeface="Arial" panose="020B0604020202020204" pitchFamily="34" charset="0"/>
+                <a:cs typeface="Arial" panose="020B0604020202020204" pitchFamily="34" charset="0"/>
+              </a:rPr>
+              <a:t> S., </a:t>
+            </a:r>
+            <a:r>
+              <a:rPr lang="en-US" sz="2000" dirty="0" err="1">
+                <a:latin typeface="Arial" panose="020B0604020202020204" pitchFamily="34" charset="0"/>
+                <a:cs typeface="Arial" panose="020B0604020202020204" pitchFamily="34" charset="0"/>
+              </a:rPr>
+              <a:t>Osterbrock</a:t>
+            </a:r>
+            <a:r>
+              <a:rPr lang="en-US" sz="2000" dirty="0">
+                <a:latin typeface="Arial" panose="020B0604020202020204" pitchFamily="34" charset="0"/>
+                <a:cs typeface="Arial" panose="020B0604020202020204" pitchFamily="34" charset="0"/>
+              </a:rPr>
+              <a:t> D. E., 1987, </a:t>
+            </a:r>
+            <a:r>
+              <a:rPr lang="en-US" sz="2000" dirty="0" err="1">
+                <a:latin typeface="Arial" panose="020B0604020202020204" pitchFamily="34" charset="0"/>
+                <a:cs typeface="Arial" panose="020B0604020202020204" pitchFamily="34" charset="0"/>
+              </a:rPr>
+              <a:t>ApJS</a:t>
+            </a:r>
+            <a:r>
+              <a:rPr lang="en-US" sz="2000" dirty="0">
+                <a:latin typeface="Arial" panose="020B0604020202020204" pitchFamily="34" charset="0"/>
+                <a:cs typeface="Arial" panose="020B0604020202020204" pitchFamily="34" charset="0"/>
+              </a:rPr>
+              <a:t>, 63, 295 (VO87)</a:t>
             </a:r>
           </a:p>
           <a:p>
@@ -5146,8 +5395,8 @@
         </p:nvSpPr>
         <p:spPr>
           <a:xfrm>
-            <a:off x="32217635" y="22478370"/>
-            <a:ext cx="10025847" cy="7048083"/>
+            <a:off x="31065296" y="22972179"/>
+            <a:ext cx="11709083" cy="7078861"/>
           </a:xfrm>
           <a:prstGeom prst="rect">
             <a:avLst/>
@@ -5178,7 +5427,7 @@
               <a:buChar char="•"/>
             </a:pPr>
             <a:r>
-              <a:rPr lang="en-US" sz="2800" dirty="0">
+              <a:rPr lang="en-US" sz="2600" dirty="0">
                 <a:latin typeface="Arial" panose="020B0604020202020204" pitchFamily="34" charset="0"/>
                 <a:cs typeface="Arial" panose="020B0604020202020204" pitchFamily="34" charset="0"/>
               </a:rPr>
@@ -5191,11 +5440,24 @@
               <a:buChar char="•"/>
             </a:pPr>
             <a:r>
-              <a:rPr lang="en-US" sz="2800" dirty="0">
+              <a:rPr lang="en-US" sz="2600" dirty="0">
                 <a:latin typeface="Arial" panose="020B0604020202020204" pitchFamily="34" charset="0"/>
                 <a:cs typeface="Arial" panose="020B0604020202020204" pitchFamily="34" charset="0"/>
               </a:rPr>
               <a:t>This model does not act as a strong indicator of diagnostic ratios for emissions in the infrared spectrum.</a:t>
+            </a:r>
+          </a:p>
+          <a:p>
+            <a:pPr marL="457200" indent="-457200">
+              <a:buFont typeface="Arial" panose="020B0604020202020204" pitchFamily="34" charset="0"/>
+              <a:buChar char="•"/>
+            </a:pPr>
+            <a:r>
+              <a:rPr lang="en-US" sz="2600" dirty="0">
+                <a:latin typeface="Arial" panose="020B0604020202020204" pitchFamily="34" charset="0"/>
+                <a:cs typeface="Arial" panose="020B0604020202020204" pitchFamily="34" charset="0"/>
+              </a:rPr>
+              <a:t>The under-prediction of the IR plots may be a result of simulation parameters preventing enough of each element from being produced. </a:t>
             </a:r>
           </a:p>
           <a:p>
@@ -5247,7 +5509,7 @@
               <a:buChar char="•"/>
             </a:pPr>
             <a:r>
-              <a:rPr lang="en-US" sz="2800" dirty="0">
+              <a:rPr lang="en-US" sz="2600" dirty="0">
                 <a:latin typeface="Arial" panose="020B0604020202020204" pitchFamily="34" charset="0"/>
                 <a:cs typeface="Arial" panose="020B0604020202020204" pitchFamily="34" charset="0"/>
               </a:rPr>
@@ -5260,7 +5522,7 @@
               <a:buChar char="•"/>
             </a:pPr>
             <a:r>
-              <a:rPr lang="en-US" sz="2800" dirty="0">
+              <a:rPr lang="en-US" sz="2600" dirty="0">
                 <a:latin typeface="Arial" panose="020B0604020202020204" pitchFamily="34" charset="0"/>
                 <a:cs typeface="Arial" panose="020B0604020202020204" pitchFamily="34" charset="0"/>
               </a:rPr>
@@ -5272,7 +5534,7 @@
               <a:buFont typeface="Arial" panose="020B0604020202020204" pitchFamily="34" charset="0"/>
               <a:buChar char="•"/>
             </a:pPr>
-            <a:endParaRPr lang="en-US" sz="3200" dirty="0">
+            <a:endParaRPr lang="en-US" sz="2600" dirty="0">
               <a:latin typeface="Arial" panose="020B0604020202020204" pitchFamily="34" charset="0"/>
               <a:cs typeface="Arial" panose="020B0604020202020204" pitchFamily="34" charset="0"/>
             </a:endParaRPr>
@@ -5342,7 +5604,7 @@
         </p:nvSpPr>
         <p:spPr>
           <a:xfrm>
-            <a:off x="4774249" y="11040512"/>
+            <a:off x="4708874" y="11754815"/>
             <a:ext cx="6734664" cy="369332"/>
           </a:xfrm>
           <a:prstGeom prst="rect">
@@ -5402,8 +5664,8 @@
         </p:nvSpPr>
         <p:spPr>
           <a:xfrm>
-            <a:off x="1151932" y="18831109"/>
-            <a:ext cx="14339452" cy="8894743"/>
+            <a:off x="1156848" y="18831109"/>
+            <a:ext cx="14334536" cy="8340745"/>
           </a:xfrm>
           <a:prstGeom prst="rect">
             <a:avLst/>
@@ -5434,7 +5696,7 @@
               <a:buChar char="•"/>
             </a:pPr>
             <a:r>
-              <a:rPr lang="en-US" sz="2800" dirty="0">
+              <a:rPr lang="en-US" sz="2600" dirty="0">
                 <a:solidFill>
                   <a:prstClr val="black"/>
                 </a:solidFill>
@@ -5442,6 +5704,412 @@
                 <a:cs typeface="Arial" panose="020B0604020202020204" pitchFamily="34" charset="0"/>
               </a:rPr>
               <a:t>We set up the incident radiation curve from: </a:t>
+            </a:r>
+          </a:p>
+          <a:p>
+            <a:pPr marL="457200" lvl="0" indent="-457200">
+              <a:buFont typeface="Arial" panose="020B0604020202020204" pitchFamily="34" charset="0"/>
+              <a:buChar char="•"/>
+            </a:pPr>
+            <a:endParaRPr lang="en-US" sz="2600" dirty="0">
+              <a:solidFill>
+                <a:prstClr val="black"/>
+              </a:solidFill>
+              <a:latin typeface="Arial" panose="020B0604020202020204" pitchFamily="34" charset="0"/>
+              <a:cs typeface="Arial" panose="020B0604020202020204" pitchFamily="34" charset="0"/>
+            </a:endParaRPr>
+          </a:p>
+          <a:p>
+            <a:pPr marL="457200" lvl="0" indent="-457200">
+              <a:buFont typeface="Arial" panose="020B0604020202020204" pitchFamily="34" charset="0"/>
+              <a:buChar char="•"/>
+            </a:pPr>
+            <a:endParaRPr lang="en-US" sz="2600" dirty="0">
+              <a:solidFill>
+                <a:prstClr val="black"/>
+              </a:solidFill>
+              <a:latin typeface="Arial" panose="020B0604020202020204" pitchFamily="34" charset="0"/>
+              <a:cs typeface="Arial" panose="020B0604020202020204" pitchFamily="34" charset="0"/>
+            </a:endParaRPr>
+          </a:p>
+          <a:p>
+            <a:pPr marL="457200" lvl="0" indent="-457200">
+              <a:buFont typeface="Arial" panose="020B0604020202020204" pitchFamily="34" charset="0"/>
+              <a:buChar char="•"/>
+            </a:pPr>
+            <a:endParaRPr lang="en-US" sz="2600" dirty="0">
+              <a:solidFill>
+                <a:prstClr val="black"/>
+              </a:solidFill>
+              <a:latin typeface="Arial" panose="020B0604020202020204" pitchFamily="34" charset="0"/>
+              <a:cs typeface="Arial" panose="020B0604020202020204" pitchFamily="34" charset="0"/>
+            </a:endParaRPr>
+          </a:p>
+          <a:p>
+            <a:pPr marL="457200" indent="-457200">
+              <a:buFont typeface="Arial" panose="020B0604020202020204" pitchFamily="34" charset="0"/>
+              <a:buChar char="•"/>
+            </a:pPr>
+            <a:r>
+              <a:rPr lang="en-US" sz="2600" dirty="0">
+                <a:solidFill>
+                  <a:prstClr val="black"/>
+                </a:solidFill>
+                <a:latin typeface="Arial" panose="020B0604020202020204" pitchFamily="34" charset="0"/>
+                <a:cs typeface="Arial" panose="020B0604020202020204" pitchFamily="34" charset="0"/>
+              </a:rPr>
+              <a:t>For baseline curve, the blackbody temperature </a:t>
+            </a:r>
+            <a:r>
+              <a:rPr lang="en-US" sz="2600" i="1" dirty="0">
+                <a:latin typeface="Arial" panose="020B0604020202020204" pitchFamily="34" charset="0"/>
+                <a:cs typeface="Arial" panose="020B0604020202020204" pitchFamily="34" charset="0"/>
+              </a:rPr>
+              <a:t>T</a:t>
+            </a:r>
+            <a:r>
+              <a:rPr lang="en-US" sz="2600" baseline="-25000" dirty="0">
+                <a:latin typeface="Arial" panose="020B0604020202020204" pitchFamily="34" charset="0"/>
+                <a:cs typeface="Arial" panose="020B0604020202020204" pitchFamily="34" charset="0"/>
+              </a:rPr>
+              <a:t>BB </a:t>
+            </a:r>
+            <a:r>
+              <a:rPr lang="en-US" sz="2600" dirty="0">
+                <a:latin typeface="Arial" panose="020B0604020202020204" pitchFamily="34" charset="0"/>
+                <a:cs typeface="Arial" panose="020B0604020202020204" pitchFamily="34" charset="0"/>
+              </a:rPr>
+              <a:t> is set to 10</a:t>
+            </a:r>
+            <a:r>
+              <a:rPr lang="en-US" sz="2600" baseline="30000" dirty="0">
+                <a:latin typeface="Arial" panose="020B0604020202020204" pitchFamily="34" charset="0"/>
+                <a:cs typeface="Arial" panose="020B0604020202020204" pitchFamily="34" charset="0"/>
+              </a:rPr>
+              <a:t>6</a:t>
+            </a:r>
+            <a:r>
+              <a:rPr lang="en-US" sz="2600" dirty="0">
+                <a:latin typeface="Arial" panose="020B0604020202020204" pitchFamily="34" charset="0"/>
+                <a:cs typeface="Arial" panose="020B0604020202020204" pitchFamily="34" charset="0"/>
+              </a:rPr>
+              <a:t> K based on the mean value of past research, </a:t>
+            </a:r>
+            <a:r>
+              <a:rPr lang="el-GR" sz="2600" dirty="0">
+                <a:latin typeface="Arial" panose="020B0604020202020204" pitchFamily="34" charset="0"/>
+                <a:cs typeface="Arial" panose="020B0604020202020204" pitchFamily="34" charset="0"/>
+              </a:rPr>
+              <a:t>α</a:t>
+            </a:r>
+            <a:r>
+              <a:rPr lang="en-US" sz="2600" baseline="-25000" dirty="0">
+                <a:latin typeface="Arial" panose="020B0604020202020204" pitchFamily="34" charset="0"/>
+                <a:cs typeface="Arial" panose="020B0604020202020204" pitchFamily="34" charset="0"/>
+              </a:rPr>
+              <a:t>x</a:t>
+            </a:r>
+            <a:r>
+              <a:rPr lang="en-US" sz="2600" dirty="0">
+                <a:latin typeface="Arial" panose="020B0604020202020204" pitchFamily="34" charset="0"/>
+                <a:cs typeface="Arial" panose="020B0604020202020204" pitchFamily="34" charset="0"/>
+              </a:rPr>
+              <a:t> = -1.59, </a:t>
+            </a:r>
+            <a:r>
+              <a:rPr lang="el-GR" sz="2600" dirty="0">
+                <a:latin typeface="Arial" panose="020B0604020202020204" pitchFamily="34" charset="0"/>
+                <a:cs typeface="Arial" panose="020B0604020202020204" pitchFamily="34" charset="0"/>
+              </a:rPr>
+              <a:t>α</a:t>
+            </a:r>
+            <a:r>
+              <a:rPr lang="en-US" sz="2600" baseline="-25000" dirty="0" err="1">
+                <a:latin typeface="Arial" panose="020B0604020202020204" pitchFamily="34" charset="0"/>
+                <a:cs typeface="Arial" panose="020B0604020202020204" pitchFamily="34" charset="0"/>
+              </a:rPr>
+              <a:t>uv</a:t>
+            </a:r>
+            <a:r>
+              <a:rPr lang="en-US" sz="2600" dirty="0">
+                <a:latin typeface="Arial" panose="020B0604020202020204" pitchFamily="34" charset="0"/>
+                <a:cs typeface="Arial" panose="020B0604020202020204" pitchFamily="34" charset="0"/>
+              </a:rPr>
+              <a:t> = -0.6, </a:t>
+            </a:r>
+            <a:r>
+              <a:rPr lang="el-GR" sz="2600" dirty="0">
+                <a:latin typeface="Arial" panose="020B0604020202020204" pitchFamily="34" charset="0"/>
+                <a:cs typeface="Arial" panose="020B0604020202020204" pitchFamily="34" charset="0"/>
+              </a:rPr>
+              <a:t>α</a:t>
+            </a:r>
+            <a:r>
+              <a:rPr lang="en-US" sz="2600" baseline="-25000" dirty="0">
+                <a:latin typeface="Arial" panose="020B0604020202020204" pitchFamily="34" charset="0"/>
+                <a:cs typeface="Arial" panose="020B0604020202020204" pitchFamily="34" charset="0"/>
+              </a:rPr>
+              <a:t>ox</a:t>
+            </a:r>
+            <a:r>
+              <a:rPr lang="en-US" sz="2600" dirty="0">
+                <a:latin typeface="Arial" panose="020B0604020202020204" pitchFamily="34" charset="0"/>
+                <a:cs typeface="Arial" panose="020B0604020202020204" pitchFamily="34" charset="0"/>
+              </a:rPr>
+              <a:t> = -1.42 (</a:t>
+            </a:r>
+            <a:r>
+              <a:rPr lang="en-US" sz="2600" dirty="0" err="1">
+                <a:latin typeface="Arial" panose="020B0604020202020204" pitchFamily="34" charset="0"/>
+                <a:cs typeface="Arial" panose="020B0604020202020204" pitchFamily="34" charset="0"/>
+              </a:rPr>
+              <a:t>Grupe</a:t>
+            </a:r>
+            <a:r>
+              <a:rPr lang="en-US" sz="2600" dirty="0">
+                <a:latin typeface="Arial" panose="020B0604020202020204" pitchFamily="34" charset="0"/>
+                <a:cs typeface="Arial" panose="020B0604020202020204" pitchFamily="34" charset="0"/>
+              </a:rPr>
+              <a:t> et al. 2010).  </a:t>
+            </a:r>
+          </a:p>
+          <a:p>
+            <a:pPr marL="457200" lvl="0" indent="-457200">
+              <a:buFont typeface="Arial" panose="020B0604020202020204" pitchFamily="34" charset="0"/>
+              <a:buChar char="•"/>
+            </a:pPr>
+            <a:r>
+              <a:rPr lang="en-US" sz="2600" dirty="0">
+                <a:solidFill>
+                  <a:prstClr val="black"/>
+                </a:solidFill>
+                <a:latin typeface="Arial" panose="020B0604020202020204" pitchFamily="34" charset="0"/>
+                <a:cs typeface="Arial" panose="020B0604020202020204" pitchFamily="34" charset="0"/>
+              </a:rPr>
+              <a:t>We also constrain the incident radiation curve by describing the elemental abundances, hydrogen density, and photon flux of the cloud, derived from Groves et al 2004.</a:t>
+            </a:r>
+          </a:p>
+          <a:p>
+            <a:pPr marL="457200" lvl="0" indent="-457200">
+              <a:buFont typeface="Arial" panose="020B0604020202020204" pitchFamily="34" charset="0"/>
+              <a:buChar char="•"/>
+            </a:pPr>
+            <a:r>
+              <a:rPr lang="en-US" sz="2600" dirty="0">
+                <a:solidFill>
+                  <a:prstClr val="black"/>
+                </a:solidFill>
+                <a:latin typeface="Arial" panose="020B0604020202020204" pitchFamily="34" charset="0"/>
+                <a:cs typeface="Arial" panose="020B0604020202020204" pitchFamily="34" charset="0"/>
+              </a:rPr>
+              <a:t>Stopping boundary condition for simulations is when the fraction of electron to total hydrogen densities falls below 0.01 which allows us to simulate deep enough into the cloud to produce the required emissions. </a:t>
+            </a:r>
+          </a:p>
+          <a:p>
+            <a:pPr marL="457200" lvl="0" indent="-457200">
+              <a:buFont typeface="Arial" panose="020B0604020202020204" pitchFamily="34" charset="0"/>
+              <a:buChar char="•"/>
+            </a:pPr>
+            <a:r>
+              <a:rPr lang="en-US" sz="2600" dirty="0">
+                <a:latin typeface="Arial" panose="020B0604020202020204" pitchFamily="34" charset="0"/>
+                <a:cs typeface="Arial" panose="020B0604020202020204" pitchFamily="34" charset="0"/>
+              </a:rPr>
+              <a:t>We fit the values of </a:t>
+            </a:r>
+            <a:r>
+              <a:rPr lang="el-GR" sz="2600" dirty="0">
+                <a:latin typeface="Arial" panose="020B0604020202020204" pitchFamily="34" charset="0"/>
+                <a:cs typeface="Arial" panose="020B0604020202020204" pitchFamily="34" charset="0"/>
+              </a:rPr>
+              <a:t>α</a:t>
+            </a:r>
+            <a:r>
+              <a:rPr lang="en-US" sz="2600" baseline="-25000" dirty="0">
+                <a:latin typeface="Arial" panose="020B0604020202020204" pitchFamily="34" charset="0"/>
+                <a:cs typeface="Arial" panose="020B0604020202020204" pitchFamily="34" charset="0"/>
+              </a:rPr>
+              <a:t>x  </a:t>
+            </a:r>
+            <a:r>
+              <a:rPr lang="en-US" sz="2600" dirty="0">
+                <a:latin typeface="Arial" panose="020B0604020202020204" pitchFamily="34" charset="0"/>
+                <a:cs typeface="Arial" panose="020B0604020202020204" pitchFamily="34" charset="0"/>
+              </a:rPr>
+              <a:t>and </a:t>
+            </a:r>
+            <a:r>
+              <a:rPr lang="el-GR" sz="2600" dirty="0">
+                <a:latin typeface="Arial" panose="020B0604020202020204" pitchFamily="34" charset="0"/>
+                <a:cs typeface="Arial" panose="020B0604020202020204" pitchFamily="34" charset="0"/>
+              </a:rPr>
+              <a:t>α</a:t>
+            </a:r>
+            <a:r>
+              <a:rPr lang="en-US" sz="2600" baseline="-25000" dirty="0" err="1">
+                <a:latin typeface="Arial" panose="020B0604020202020204" pitchFamily="34" charset="0"/>
+                <a:cs typeface="Arial" panose="020B0604020202020204" pitchFamily="34" charset="0"/>
+              </a:rPr>
+              <a:t>uv</a:t>
+            </a:r>
+            <a:r>
+              <a:rPr lang="en-US" sz="2600" baseline="-25000" dirty="0">
+                <a:latin typeface="Arial" panose="020B0604020202020204" pitchFamily="34" charset="0"/>
+                <a:cs typeface="Arial" panose="020B0604020202020204" pitchFamily="34" charset="0"/>
+              </a:rPr>
+              <a:t> </a:t>
+            </a:r>
+            <a:r>
+              <a:rPr lang="en-US" sz="2600" dirty="0">
+                <a:latin typeface="Arial" panose="020B0604020202020204" pitchFamily="34" charset="0"/>
+                <a:cs typeface="Arial" panose="020B0604020202020204" pitchFamily="34" charset="0"/>
+              </a:rPr>
+              <a:t>using Ordinary Least Squares regression, producing the line:</a:t>
+            </a:r>
+          </a:p>
+          <a:p>
+            <a:r>
+              <a:rPr lang="en-US" sz="2600" dirty="0">
+                <a:latin typeface="Arial" panose="020B0604020202020204" pitchFamily="34" charset="0"/>
+                <a:cs typeface="Arial" panose="020B0604020202020204" pitchFamily="34" charset="0"/>
+              </a:rPr>
+              <a:t> </a:t>
+            </a:r>
+          </a:p>
+          <a:p>
+            <a:endParaRPr lang="en-US" sz="2600" dirty="0">
+              <a:latin typeface="Arial" panose="020B0604020202020204" pitchFamily="34" charset="0"/>
+              <a:cs typeface="Arial" panose="020B0604020202020204" pitchFamily="34" charset="0"/>
+            </a:endParaRPr>
+          </a:p>
+          <a:p>
+            <a:pPr marL="457200" indent="-457200">
+              <a:buFont typeface="Arial" panose="020B0604020202020204" pitchFamily="34" charset="0"/>
+              <a:buChar char="•"/>
+            </a:pPr>
+            <a:r>
+              <a:rPr lang="en-US" sz="2600" dirty="0">
+                <a:latin typeface="Arial" panose="020B0604020202020204" pitchFamily="34" charset="0"/>
+                <a:cs typeface="Arial" panose="020B0604020202020204" pitchFamily="34" charset="0"/>
+              </a:rPr>
+              <a:t>We run simulations varying </a:t>
+            </a:r>
+            <a:r>
+              <a:rPr lang="en-US" sz="2600" i="1" dirty="0">
+                <a:latin typeface="Arial" panose="020B0604020202020204" pitchFamily="34" charset="0"/>
+                <a:cs typeface="Arial" panose="020B0604020202020204" pitchFamily="34" charset="0"/>
+              </a:rPr>
+              <a:t>T</a:t>
+            </a:r>
+            <a:r>
+              <a:rPr lang="en-US" sz="2600" baseline="-25000" dirty="0">
+                <a:latin typeface="Arial" panose="020B0604020202020204" pitchFamily="34" charset="0"/>
+                <a:cs typeface="Arial" panose="020B0604020202020204" pitchFamily="34" charset="0"/>
+              </a:rPr>
+              <a:t>BB </a:t>
+            </a:r>
+            <a:r>
+              <a:rPr lang="en-US" sz="2600" dirty="0">
+                <a:latin typeface="Arial" panose="020B0604020202020204" pitchFamily="34" charset="0"/>
+                <a:cs typeface="Arial" panose="020B0604020202020204" pitchFamily="34" charset="0"/>
+              </a:rPr>
+              <a:t>between 10</a:t>
+            </a:r>
+            <a:r>
+              <a:rPr lang="en-US" sz="2600" baseline="30000" dirty="0">
+                <a:latin typeface="Arial" panose="020B0604020202020204" pitchFamily="34" charset="0"/>
+                <a:cs typeface="Arial" panose="020B0604020202020204" pitchFamily="34" charset="0"/>
+              </a:rPr>
+              <a:t>4 </a:t>
+            </a:r>
+            <a:r>
+              <a:rPr lang="en-US" sz="2600" dirty="0">
+                <a:latin typeface="Arial" panose="020B0604020202020204" pitchFamily="34" charset="0"/>
+                <a:cs typeface="Arial" panose="020B0604020202020204" pitchFamily="34" charset="0"/>
+              </a:rPr>
+              <a:t>K and 10</a:t>
+            </a:r>
+            <a:r>
+              <a:rPr lang="en-US" sz="2600" baseline="30000" dirty="0">
+                <a:latin typeface="Arial" panose="020B0604020202020204" pitchFamily="34" charset="0"/>
+                <a:cs typeface="Arial" panose="020B0604020202020204" pitchFamily="34" charset="0"/>
+              </a:rPr>
+              <a:t>7 </a:t>
+            </a:r>
+            <a:r>
+              <a:rPr lang="en-US" sz="2600" dirty="0">
+                <a:latin typeface="Arial" panose="020B0604020202020204" pitchFamily="34" charset="0"/>
+                <a:cs typeface="Arial" panose="020B0604020202020204" pitchFamily="34" charset="0"/>
+              </a:rPr>
+              <a:t>K</a:t>
+            </a:r>
+          </a:p>
+          <a:p>
+            <a:pPr marL="457200" indent="-457200">
+              <a:buFont typeface="Arial" panose="020B0604020202020204" pitchFamily="34" charset="0"/>
+              <a:buChar char="•"/>
+            </a:pPr>
+            <a:r>
+              <a:rPr lang="en-US" sz="2600" dirty="0">
+                <a:latin typeface="Arial" panose="020B0604020202020204" pitchFamily="34" charset="0"/>
+                <a:cs typeface="Arial" panose="020B0604020202020204" pitchFamily="34" charset="0"/>
+              </a:rPr>
+              <a:t>The value of </a:t>
+            </a:r>
+            <a:r>
+              <a:rPr lang="el-GR" sz="2600" dirty="0">
+                <a:latin typeface="Arial" panose="020B0604020202020204" pitchFamily="34" charset="0"/>
+                <a:cs typeface="Arial" panose="020B0604020202020204" pitchFamily="34" charset="0"/>
+              </a:rPr>
+              <a:t>α</a:t>
+            </a:r>
+            <a:r>
+              <a:rPr lang="en-US" sz="2600" baseline="-25000" dirty="0">
+                <a:latin typeface="Arial" panose="020B0604020202020204" pitchFamily="34" charset="0"/>
+                <a:cs typeface="Arial" panose="020B0604020202020204" pitchFamily="34" charset="0"/>
+              </a:rPr>
+              <a:t>x </a:t>
+            </a:r>
+            <a:r>
+              <a:rPr lang="en-US" sz="2600" dirty="0">
+                <a:latin typeface="Arial" panose="020B0604020202020204" pitchFamily="34" charset="0"/>
+                <a:cs typeface="Arial" panose="020B0604020202020204" pitchFamily="34" charset="0"/>
+              </a:rPr>
+              <a:t>is varied according to the standard deviation of the mean, 0.51, and the value of </a:t>
+            </a:r>
+            <a:r>
+              <a:rPr lang="el-GR" sz="2600" dirty="0">
+                <a:latin typeface="Arial" panose="020B0604020202020204" pitchFamily="34" charset="0"/>
+                <a:cs typeface="Arial" panose="020B0604020202020204" pitchFamily="34" charset="0"/>
+              </a:rPr>
+              <a:t>α</a:t>
+            </a:r>
+            <a:r>
+              <a:rPr lang="en-US" sz="2600" baseline="-25000" dirty="0" err="1">
+                <a:latin typeface="Arial" panose="020B0604020202020204" pitchFamily="34" charset="0"/>
+                <a:cs typeface="Arial" panose="020B0604020202020204" pitchFamily="34" charset="0"/>
+              </a:rPr>
+              <a:t>uv</a:t>
+            </a:r>
+            <a:r>
+              <a:rPr lang="en-US" sz="2600" dirty="0">
+                <a:latin typeface="Arial" panose="020B0604020202020204" pitchFamily="34" charset="0"/>
+                <a:cs typeface="Arial" panose="020B0604020202020204" pitchFamily="34" charset="0"/>
+              </a:rPr>
+              <a:t> is changed accordingly. </a:t>
+            </a:r>
+          </a:p>
+          <a:p>
+            <a:pPr marL="457200" indent="-457200">
+              <a:buFont typeface="Arial" panose="020B0604020202020204" pitchFamily="34" charset="0"/>
+              <a:buChar char="•"/>
+            </a:pPr>
+            <a:r>
+              <a:rPr lang="en-US" sz="2600" dirty="0">
+                <a:latin typeface="Arial" panose="020B0604020202020204" pitchFamily="34" charset="0"/>
+                <a:cs typeface="Arial" panose="020B0604020202020204" pitchFamily="34" charset="0"/>
+              </a:rPr>
+              <a:t>Optical data obtained via the Sloan Digital Sky Survey (SDSS)</a:t>
             </a:r>
           </a:p>
           <a:p>
@@ -5457,398 +6125,6 @@
               <a:cs typeface="Arial" panose="020B0604020202020204" pitchFamily="34" charset="0"/>
             </a:endParaRPr>
           </a:p>
-          <a:p>
-            <a:pPr marL="457200" lvl="0" indent="-457200">
-              <a:buFont typeface="Arial" panose="020B0604020202020204" pitchFamily="34" charset="0"/>
-              <a:buChar char="•"/>
-            </a:pPr>
-            <a:endParaRPr lang="en-US" sz="2800" dirty="0">
-              <a:solidFill>
-                <a:prstClr val="black"/>
-              </a:solidFill>
-              <a:latin typeface="Arial" panose="020B0604020202020204" pitchFamily="34" charset="0"/>
-              <a:cs typeface="Arial" panose="020B0604020202020204" pitchFamily="34" charset="0"/>
-            </a:endParaRPr>
-          </a:p>
-          <a:p>
-            <a:pPr marL="457200" lvl="0" indent="-457200">
-              <a:buFont typeface="Arial" panose="020B0604020202020204" pitchFamily="34" charset="0"/>
-              <a:buChar char="•"/>
-            </a:pPr>
-            <a:endParaRPr lang="en-US" sz="2800" dirty="0">
-              <a:solidFill>
-                <a:prstClr val="black"/>
-              </a:solidFill>
-              <a:latin typeface="Arial" panose="020B0604020202020204" pitchFamily="34" charset="0"/>
-              <a:cs typeface="Arial" panose="020B0604020202020204" pitchFamily="34" charset="0"/>
-            </a:endParaRPr>
-          </a:p>
-          <a:p>
-            <a:pPr marL="457200" indent="-457200">
-              <a:buFont typeface="Arial" panose="020B0604020202020204" pitchFamily="34" charset="0"/>
-              <a:buChar char="•"/>
-            </a:pPr>
-            <a:r>
-              <a:rPr lang="en-US" sz="2800" dirty="0">
-                <a:solidFill>
-                  <a:prstClr val="black"/>
-                </a:solidFill>
-                <a:latin typeface="Arial" panose="020B0604020202020204" pitchFamily="34" charset="0"/>
-                <a:cs typeface="Arial" panose="020B0604020202020204" pitchFamily="34" charset="0"/>
-              </a:rPr>
-              <a:t>For baseline curve, the blackbody temperature </a:t>
-            </a:r>
-            <a:r>
-              <a:rPr lang="en-US" sz="2800" i="1" dirty="0">
-                <a:latin typeface="Arial" panose="020B0604020202020204" pitchFamily="34" charset="0"/>
-                <a:cs typeface="Arial" panose="020B0604020202020204" pitchFamily="34" charset="0"/>
-              </a:rPr>
-              <a:t>T</a:t>
-            </a:r>
-            <a:r>
-              <a:rPr lang="en-US" sz="2800" baseline="-25000" dirty="0">
-                <a:latin typeface="Arial" panose="020B0604020202020204" pitchFamily="34" charset="0"/>
-                <a:cs typeface="Arial" panose="020B0604020202020204" pitchFamily="34" charset="0"/>
-              </a:rPr>
-              <a:t>BB </a:t>
-            </a:r>
-            <a:r>
-              <a:rPr lang="en-US" sz="2800" dirty="0">
-                <a:latin typeface="Arial" panose="020B0604020202020204" pitchFamily="34" charset="0"/>
-                <a:cs typeface="Arial" panose="020B0604020202020204" pitchFamily="34" charset="0"/>
-              </a:rPr>
-              <a:t> is set to 10</a:t>
-            </a:r>
-            <a:r>
-              <a:rPr lang="en-US" sz="2800" baseline="30000" dirty="0">
-                <a:latin typeface="Arial" panose="020B0604020202020204" pitchFamily="34" charset="0"/>
-                <a:cs typeface="Arial" panose="020B0604020202020204" pitchFamily="34" charset="0"/>
-              </a:rPr>
-              <a:t>6</a:t>
-            </a:r>
-            <a:r>
-              <a:rPr lang="en-US" sz="2800" dirty="0">
-                <a:latin typeface="Arial" panose="020B0604020202020204" pitchFamily="34" charset="0"/>
-                <a:cs typeface="Arial" panose="020B0604020202020204" pitchFamily="34" charset="0"/>
-              </a:rPr>
-              <a:t> K, </a:t>
-            </a:r>
-            <a:r>
-              <a:rPr lang="el-GR" sz="2800" dirty="0">
-                <a:latin typeface="Arial" panose="020B0604020202020204" pitchFamily="34" charset="0"/>
-                <a:cs typeface="Arial" panose="020B0604020202020204" pitchFamily="34" charset="0"/>
-              </a:rPr>
-              <a:t>α</a:t>
-            </a:r>
-            <a:r>
-              <a:rPr lang="en-US" sz="2800" baseline="-25000" dirty="0">
-                <a:latin typeface="Arial" panose="020B0604020202020204" pitchFamily="34" charset="0"/>
-                <a:cs typeface="Arial" panose="020B0604020202020204" pitchFamily="34" charset="0"/>
-              </a:rPr>
-              <a:t>x</a:t>
-            </a:r>
-            <a:r>
-              <a:rPr lang="en-US" sz="2800" dirty="0">
-                <a:latin typeface="Arial" panose="020B0604020202020204" pitchFamily="34" charset="0"/>
-                <a:cs typeface="Arial" panose="020B0604020202020204" pitchFamily="34" charset="0"/>
-              </a:rPr>
-              <a:t> = -1.59, </a:t>
-            </a:r>
-            <a:r>
-              <a:rPr lang="el-GR" sz="2800" dirty="0">
-                <a:latin typeface="Arial" panose="020B0604020202020204" pitchFamily="34" charset="0"/>
-                <a:cs typeface="Arial" panose="020B0604020202020204" pitchFamily="34" charset="0"/>
-              </a:rPr>
-              <a:t>α</a:t>
-            </a:r>
-            <a:r>
-              <a:rPr lang="en-US" sz="2800" baseline="-25000" dirty="0" err="1">
-                <a:latin typeface="Arial" panose="020B0604020202020204" pitchFamily="34" charset="0"/>
-                <a:cs typeface="Arial" panose="020B0604020202020204" pitchFamily="34" charset="0"/>
-              </a:rPr>
-              <a:t>uv</a:t>
-            </a:r>
-            <a:r>
-              <a:rPr lang="en-US" sz="2800" dirty="0">
-                <a:latin typeface="Arial" panose="020B0604020202020204" pitchFamily="34" charset="0"/>
-                <a:cs typeface="Arial" panose="020B0604020202020204" pitchFamily="34" charset="0"/>
-              </a:rPr>
-              <a:t> = -0.6, </a:t>
-            </a:r>
-            <a:r>
-              <a:rPr lang="el-GR" sz="2800" dirty="0">
-                <a:latin typeface="Arial" panose="020B0604020202020204" pitchFamily="34" charset="0"/>
-                <a:cs typeface="Arial" panose="020B0604020202020204" pitchFamily="34" charset="0"/>
-              </a:rPr>
-              <a:t>α</a:t>
-            </a:r>
-            <a:r>
-              <a:rPr lang="en-US" sz="2800" baseline="-25000" dirty="0">
-                <a:latin typeface="Arial" panose="020B0604020202020204" pitchFamily="34" charset="0"/>
-                <a:cs typeface="Arial" panose="020B0604020202020204" pitchFamily="34" charset="0"/>
-              </a:rPr>
-              <a:t>ox</a:t>
-            </a:r>
-            <a:r>
-              <a:rPr lang="en-US" sz="2800" dirty="0">
-                <a:latin typeface="Arial" panose="020B0604020202020204" pitchFamily="34" charset="0"/>
-                <a:cs typeface="Arial" panose="020B0604020202020204" pitchFamily="34" charset="0"/>
-              </a:rPr>
-              <a:t> = -1.42.  </a:t>
-            </a:r>
-          </a:p>
-          <a:p>
-            <a:pPr marL="457200" lvl="0" indent="-457200">
-              <a:buFont typeface="Arial" panose="020B0604020202020204" pitchFamily="34" charset="0"/>
-              <a:buChar char="•"/>
-            </a:pPr>
-            <a:r>
-              <a:rPr lang="en-US" sz="2800" dirty="0">
-                <a:solidFill>
-                  <a:prstClr val="black"/>
-                </a:solidFill>
-                <a:latin typeface="Arial" panose="020B0604020202020204" pitchFamily="34" charset="0"/>
-                <a:cs typeface="Arial" panose="020B0604020202020204" pitchFamily="34" charset="0"/>
-              </a:rPr>
-              <a:t>We also constrain the incident radiation curve by describing the elemental abundances, hydrogen density, and photon flux of the cloud.</a:t>
-            </a:r>
-          </a:p>
-          <a:p>
-            <a:pPr marL="457200" lvl="0" indent="-457200">
-              <a:buFont typeface="Arial" panose="020B0604020202020204" pitchFamily="34" charset="0"/>
-              <a:buChar char="•"/>
-            </a:pPr>
-            <a:r>
-              <a:rPr lang="en-US" sz="2800" dirty="0">
-                <a:solidFill>
-                  <a:prstClr val="black"/>
-                </a:solidFill>
-                <a:latin typeface="Arial" panose="020B0604020202020204" pitchFamily="34" charset="0"/>
-                <a:cs typeface="Arial" panose="020B0604020202020204" pitchFamily="34" charset="0"/>
-              </a:rPr>
-              <a:t>Stopping boundary condition for simulations is when the fraction of electron to total hydrogen densities falls below 0.01</a:t>
-            </a:r>
-          </a:p>
-          <a:p>
-            <a:pPr marL="457200" lvl="0" indent="-457200">
-              <a:buFont typeface="Arial" panose="020B0604020202020204" pitchFamily="34" charset="0"/>
-              <a:buChar char="•"/>
-            </a:pPr>
-            <a:r>
-              <a:rPr lang="en-US" sz="2800" dirty="0">
-                <a:latin typeface="Arial" panose="020B0604020202020204" pitchFamily="34" charset="0"/>
-                <a:cs typeface="Arial" panose="020B0604020202020204" pitchFamily="34" charset="0"/>
-              </a:rPr>
-              <a:t>We fit the values of </a:t>
-            </a:r>
-            <a:r>
-              <a:rPr lang="el-GR" sz="2800" dirty="0">
-                <a:latin typeface="Arial" panose="020B0604020202020204" pitchFamily="34" charset="0"/>
-                <a:cs typeface="Arial" panose="020B0604020202020204" pitchFamily="34" charset="0"/>
-              </a:rPr>
-              <a:t>α</a:t>
-            </a:r>
-            <a:r>
-              <a:rPr lang="en-US" sz="2800" baseline="-25000" dirty="0">
-                <a:latin typeface="Arial" panose="020B0604020202020204" pitchFamily="34" charset="0"/>
-                <a:cs typeface="Arial" panose="020B0604020202020204" pitchFamily="34" charset="0"/>
-              </a:rPr>
-              <a:t>x  </a:t>
-            </a:r>
-            <a:r>
-              <a:rPr lang="en-US" sz="2800" dirty="0">
-                <a:latin typeface="Arial" panose="020B0604020202020204" pitchFamily="34" charset="0"/>
-                <a:cs typeface="Arial" panose="020B0604020202020204" pitchFamily="34" charset="0"/>
-              </a:rPr>
-              <a:t>and </a:t>
-            </a:r>
-            <a:r>
-              <a:rPr lang="el-GR" sz="2800" dirty="0">
-                <a:latin typeface="Arial" panose="020B0604020202020204" pitchFamily="34" charset="0"/>
-                <a:cs typeface="Arial" panose="020B0604020202020204" pitchFamily="34" charset="0"/>
-              </a:rPr>
-              <a:t>α</a:t>
-            </a:r>
-            <a:r>
-              <a:rPr lang="en-US" sz="2800" baseline="-25000" dirty="0" err="1">
-                <a:latin typeface="Arial" panose="020B0604020202020204" pitchFamily="34" charset="0"/>
-                <a:cs typeface="Arial" panose="020B0604020202020204" pitchFamily="34" charset="0"/>
-              </a:rPr>
-              <a:t>uv</a:t>
-            </a:r>
-            <a:r>
-              <a:rPr lang="en-US" sz="2800" baseline="-25000" dirty="0">
-                <a:latin typeface="Arial" panose="020B0604020202020204" pitchFamily="34" charset="0"/>
-                <a:cs typeface="Arial" panose="020B0604020202020204" pitchFamily="34" charset="0"/>
-              </a:rPr>
-              <a:t> </a:t>
-            </a:r>
-            <a:r>
-              <a:rPr lang="en-US" sz="2800" dirty="0">
-                <a:latin typeface="Arial" panose="020B0604020202020204" pitchFamily="34" charset="0"/>
-                <a:cs typeface="Arial" panose="020B0604020202020204" pitchFamily="34" charset="0"/>
-              </a:rPr>
-              <a:t>using Ordinary Least Squares regression, producing the line:</a:t>
-            </a:r>
-          </a:p>
-          <a:p>
-            <a:r>
-              <a:rPr lang="en-US" sz="2800" dirty="0">
-                <a:latin typeface="Arial" panose="020B0604020202020204" pitchFamily="34" charset="0"/>
-                <a:cs typeface="Arial" panose="020B0604020202020204" pitchFamily="34" charset="0"/>
-              </a:rPr>
-              <a:t> </a:t>
-            </a:r>
-          </a:p>
-          <a:p>
-            <a:endParaRPr lang="en-US" sz="2800" dirty="0">
-              <a:latin typeface="Arial" panose="020B0604020202020204" pitchFamily="34" charset="0"/>
-              <a:cs typeface="Arial" panose="020B0604020202020204" pitchFamily="34" charset="0"/>
-            </a:endParaRPr>
-          </a:p>
-          <a:p>
-            <a:pPr marL="457200" indent="-457200">
-              <a:buFont typeface="Arial" panose="020B0604020202020204" pitchFamily="34" charset="0"/>
-              <a:buChar char="•"/>
-            </a:pPr>
-            <a:r>
-              <a:rPr lang="en-US" sz="2800" dirty="0">
-                <a:latin typeface="Arial" panose="020B0604020202020204" pitchFamily="34" charset="0"/>
-                <a:cs typeface="Arial" panose="020B0604020202020204" pitchFamily="34" charset="0"/>
-              </a:rPr>
-              <a:t>We run simulations varying </a:t>
-            </a:r>
-            <a:r>
-              <a:rPr lang="en-US" sz="2800" i="1" dirty="0">
-                <a:latin typeface="Arial" panose="020B0604020202020204" pitchFamily="34" charset="0"/>
-                <a:cs typeface="Arial" panose="020B0604020202020204" pitchFamily="34" charset="0"/>
-              </a:rPr>
-              <a:t>T</a:t>
-            </a:r>
-            <a:r>
-              <a:rPr lang="en-US" sz="2800" baseline="-25000" dirty="0">
-                <a:latin typeface="Arial" panose="020B0604020202020204" pitchFamily="34" charset="0"/>
-                <a:cs typeface="Arial" panose="020B0604020202020204" pitchFamily="34" charset="0"/>
-              </a:rPr>
-              <a:t>BB </a:t>
-            </a:r>
-            <a:r>
-              <a:rPr lang="en-US" sz="2800" dirty="0">
-                <a:latin typeface="Arial" panose="020B0604020202020204" pitchFamily="34" charset="0"/>
-                <a:cs typeface="Arial" panose="020B0604020202020204" pitchFamily="34" charset="0"/>
-              </a:rPr>
-              <a:t>between 10</a:t>
-            </a:r>
-            <a:r>
-              <a:rPr lang="en-US" sz="2800" baseline="30000" dirty="0">
-                <a:latin typeface="Arial" panose="020B0604020202020204" pitchFamily="34" charset="0"/>
-                <a:cs typeface="Arial" panose="020B0604020202020204" pitchFamily="34" charset="0"/>
-              </a:rPr>
-              <a:t>4 </a:t>
-            </a:r>
-            <a:r>
-              <a:rPr lang="en-US" sz="2800" dirty="0">
-                <a:latin typeface="Arial" panose="020B0604020202020204" pitchFamily="34" charset="0"/>
-                <a:cs typeface="Arial" panose="020B0604020202020204" pitchFamily="34" charset="0"/>
-              </a:rPr>
-              <a:t>K and 10</a:t>
-            </a:r>
-            <a:r>
-              <a:rPr lang="en-US" sz="2800" baseline="30000" dirty="0">
-                <a:latin typeface="Arial" panose="020B0604020202020204" pitchFamily="34" charset="0"/>
-                <a:cs typeface="Arial" panose="020B0604020202020204" pitchFamily="34" charset="0"/>
-              </a:rPr>
-              <a:t>7 </a:t>
-            </a:r>
-            <a:r>
-              <a:rPr lang="en-US" sz="2800" dirty="0">
-                <a:latin typeface="Arial" panose="020B0604020202020204" pitchFamily="34" charset="0"/>
-                <a:cs typeface="Arial" panose="020B0604020202020204" pitchFamily="34" charset="0"/>
-              </a:rPr>
-              <a:t>K</a:t>
-            </a:r>
-          </a:p>
-          <a:p>
-            <a:pPr marL="457200" indent="-457200">
-              <a:buFont typeface="Arial" panose="020B0604020202020204" pitchFamily="34" charset="0"/>
-              <a:buChar char="•"/>
-            </a:pPr>
-            <a:r>
-              <a:rPr lang="en-US" sz="2800" dirty="0">
-                <a:latin typeface="Arial" panose="020B0604020202020204" pitchFamily="34" charset="0"/>
-                <a:cs typeface="Arial" panose="020B0604020202020204" pitchFamily="34" charset="0"/>
-              </a:rPr>
-              <a:t>The value of </a:t>
-            </a:r>
-            <a:r>
-              <a:rPr lang="el-GR" sz="2800" dirty="0">
-                <a:latin typeface="Arial" panose="020B0604020202020204" pitchFamily="34" charset="0"/>
-                <a:cs typeface="Arial" panose="020B0604020202020204" pitchFamily="34" charset="0"/>
-              </a:rPr>
-              <a:t>α</a:t>
-            </a:r>
-            <a:r>
-              <a:rPr lang="en-US" sz="2800" baseline="-25000" dirty="0">
-                <a:latin typeface="Arial" panose="020B0604020202020204" pitchFamily="34" charset="0"/>
-                <a:cs typeface="Arial" panose="020B0604020202020204" pitchFamily="34" charset="0"/>
-              </a:rPr>
-              <a:t>x </a:t>
-            </a:r>
-            <a:r>
-              <a:rPr lang="en-US" sz="2800" dirty="0">
-                <a:latin typeface="Arial" panose="020B0604020202020204" pitchFamily="34" charset="0"/>
-                <a:cs typeface="Arial" panose="020B0604020202020204" pitchFamily="34" charset="0"/>
-              </a:rPr>
-              <a:t>is varied according to the standard deviation of the mean, 0.51, and the value of </a:t>
-            </a:r>
-            <a:r>
-              <a:rPr lang="el-GR" sz="2800" dirty="0">
-                <a:latin typeface="Arial" panose="020B0604020202020204" pitchFamily="34" charset="0"/>
-                <a:cs typeface="Arial" panose="020B0604020202020204" pitchFamily="34" charset="0"/>
-              </a:rPr>
-              <a:t>α</a:t>
-            </a:r>
-            <a:r>
-              <a:rPr lang="en-US" sz="2800" baseline="-25000" dirty="0" err="1">
-                <a:latin typeface="Arial" panose="020B0604020202020204" pitchFamily="34" charset="0"/>
-                <a:cs typeface="Arial" panose="020B0604020202020204" pitchFamily="34" charset="0"/>
-              </a:rPr>
-              <a:t>uv</a:t>
-            </a:r>
-            <a:r>
-              <a:rPr lang="en-US" sz="2800" dirty="0">
-                <a:latin typeface="Arial" panose="020B0604020202020204" pitchFamily="34" charset="0"/>
-                <a:cs typeface="Arial" panose="020B0604020202020204" pitchFamily="34" charset="0"/>
-              </a:rPr>
-              <a:t> is changed accordingly. </a:t>
-            </a:r>
-          </a:p>
-          <a:p>
-            <a:pPr marL="457200" indent="-457200">
-              <a:buFont typeface="Arial" panose="020B0604020202020204" pitchFamily="34" charset="0"/>
-              <a:buChar char="•"/>
-            </a:pPr>
-            <a:r>
-              <a:rPr lang="en-US" sz="2800" dirty="0">
-                <a:latin typeface="Arial" panose="020B0604020202020204" pitchFamily="34" charset="0"/>
-                <a:cs typeface="Arial" panose="020B0604020202020204" pitchFamily="34" charset="0"/>
-              </a:rPr>
-              <a:t>Optical data obtained via the Sloan Digital Sky Survey (SDSS)</a:t>
-            </a:r>
-          </a:p>
-          <a:p>
-            <a:pPr marL="457200" lvl="0" indent="-457200">
-              <a:buFont typeface="Arial" panose="020B0604020202020204" pitchFamily="34" charset="0"/>
-              <a:buChar char="•"/>
-            </a:pPr>
-            <a:endParaRPr lang="en-US" sz="2800" dirty="0">
-              <a:solidFill>
-                <a:prstClr val="black"/>
-              </a:solidFill>
-              <a:latin typeface="Arial" panose="020B0604020202020204" pitchFamily="34" charset="0"/>
-              <a:cs typeface="Arial" panose="020B0604020202020204" pitchFamily="34" charset="0"/>
-            </a:endParaRPr>
-          </a:p>
         </p:txBody>
       </p:sp>
       <p:sp>
@@ -5859,8 +6135,8 @@
         </p:nvSpPr>
         <p:spPr>
           <a:xfrm>
-            <a:off x="32231778" y="29522442"/>
-            <a:ext cx="10290434" cy="1446550"/>
+            <a:off x="31191379" y="29393059"/>
+            <a:ext cx="11456916" cy="1446550"/>
           </a:xfrm>
           <a:prstGeom prst="rect">
             <a:avLst/>
@@ -5891,15 +6167,12 @@
                 <a:latin typeface="Arial" panose="020B0604020202020204" pitchFamily="34" charset="0"/>
                 <a:cs typeface="Arial" panose="020B0604020202020204" pitchFamily="34" charset="0"/>
               </a:rPr>
-              <a:t>I would like to thank the Elon College Fellows program and my research mentor Dr. Chris Richardson</a:t>
-            </a:r>
-            <a:r>
-              <a:rPr lang="en-US" sz="2000" dirty="0">
-                <a:latin typeface="Arial" panose="020B0604020202020204" pitchFamily="34" charset="0"/>
-                <a:cs typeface="Arial" panose="020B0604020202020204" pitchFamily="34" charset="0"/>
-              </a:rPr>
-              <a:t>.  </a:t>
-            </a:r>
+              <a:t>I would like to thank the Elon College Fellows program, my research mentor Dr. Chris Richardson, and the Elon Department of Undergraduate Research.  </a:t>
+            </a:r>
+            <a:endParaRPr lang="en-US" sz="2000" dirty="0">
+              <a:latin typeface="Arial" panose="020B0604020202020204" pitchFamily="34" charset="0"/>
+              <a:cs typeface="Arial" panose="020B0604020202020204" pitchFamily="34" charset="0"/>
+            </a:endParaRPr>
           </a:p>
         </p:txBody>
       </p:sp>
@@ -5910,9 +6183,9 @@
           <p:nvPr/>
         </p:nvCxnSpPr>
         <p:spPr>
-          <a:xfrm flipH="1" flipV="1">
-            <a:off x="15857466" y="2892155"/>
-            <a:ext cx="121163" cy="28095177"/>
+          <a:xfrm flipV="1">
+            <a:off x="15845330" y="2892157"/>
+            <a:ext cx="12137" cy="28904028"/>
           </a:xfrm>
           <a:prstGeom prst="line">
             <a:avLst/>
@@ -5946,8 +6219,8 @@
         </p:nvCxnSpPr>
         <p:spPr>
           <a:xfrm flipH="1" flipV="1">
-            <a:off x="30597578" y="2892155"/>
-            <a:ext cx="29455" cy="28187432"/>
+            <a:off x="30597579" y="2892155"/>
+            <a:ext cx="154726" cy="28904030"/>
           </a:xfrm>
           <a:prstGeom prst="line">
             <a:avLst/>
@@ -6071,8 +6344,8 @@
         </p:nvSpPr>
         <p:spPr>
           <a:xfrm>
-            <a:off x="32296537" y="20908412"/>
-            <a:ext cx="9515294" cy="954107"/>
+            <a:off x="31065296" y="21214114"/>
+            <a:ext cx="10735097" cy="1692771"/>
           </a:xfrm>
           <a:prstGeom prst="rect">
             <a:avLst/>
@@ -6090,11 +6363,11 @@
               <a:buChar char="•"/>
             </a:pPr>
             <a:r>
-              <a:rPr lang="en-US" sz="2800" dirty="0">
-                <a:latin typeface="Arial" panose="020B0604020202020204" pitchFamily="34" charset="0"/>
-                <a:cs typeface="Arial" panose="020B0604020202020204" pitchFamily="34" charset="0"/>
-              </a:rPr>
-              <a:t>Abundance diagnostic plots for Infrared emissions. </a:t>
+              <a:rPr lang="en-US" sz="2600" dirty="0">
+                <a:latin typeface="Arial" panose="020B0604020202020204" pitchFamily="34" charset="0"/>
+                <a:cs typeface="Arial" panose="020B0604020202020204" pitchFamily="34" charset="0"/>
+              </a:rPr>
+              <a:t>Abundance diagnostic plots for Infrared emissions.</a:t>
             </a:r>
           </a:p>
           <a:p>
@@ -6103,7 +6376,20 @@
               <a:buChar char="•"/>
             </a:pPr>
             <a:r>
-              <a:rPr lang="en-US" sz="2800" dirty="0">
+              <a:rPr lang="en-US" sz="2600" dirty="0">
+                <a:latin typeface="Arial" panose="020B0604020202020204" pitchFamily="34" charset="0"/>
+                <a:cs typeface="Arial" panose="020B0604020202020204" pitchFamily="34" charset="0"/>
+              </a:rPr>
+              <a:t>Both ratios act as a strong abundance indicator and have strong ionization potentials  </a:t>
+            </a:r>
+          </a:p>
+          <a:p>
+            <a:pPr marL="457200" indent="-457200">
+              <a:buFont typeface="Arial" panose="020B0604020202020204" pitchFamily="34" charset="0"/>
+              <a:buChar char="•"/>
+            </a:pPr>
+            <a:r>
+              <a:rPr lang="en-US" sz="2600" dirty="0">
                 <a:latin typeface="Arial" panose="020B0604020202020204" pitchFamily="34" charset="0"/>
                 <a:cs typeface="Arial" panose="020B0604020202020204" pitchFamily="34" charset="0"/>
               </a:rPr>
@@ -6120,8 +6406,8 @@
         </p:nvSpPr>
         <p:spPr>
           <a:xfrm>
-            <a:off x="32215502" y="9619376"/>
-            <a:ext cx="10322986" cy="5693866"/>
+            <a:off x="30963009" y="9619376"/>
+            <a:ext cx="11811371" cy="5724644"/>
           </a:xfrm>
           <a:prstGeom prst="rect">
             <a:avLst/>
@@ -6138,8 +6424,38 @@
               <a:buFont typeface="Arial" panose="020B0604020202020204" pitchFamily="34" charset="0"/>
               <a:buChar char="•"/>
             </a:pPr>
-            <a:r>
-              <a:rPr lang="en-US" sz="2800" dirty="0">
+            <a:endParaRPr lang="en-US" sz="2600" dirty="0">
+              <a:latin typeface="Arial" panose="020B0604020202020204" pitchFamily="34" charset="0"/>
+              <a:cs typeface="Arial" panose="020B0604020202020204" pitchFamily="34" charset="0"/>
+            </a:endParaRPr>
+          </a:p>
+          <a:p>
+            <a:pPr marL="457200" indent="-457200">
+              <a:buFont typeface="Arial" panose="020B0604020202020204" pitchFamily="34" charset="0"/>
+              <a:buChar char="•"/>
+            </a:pPr>
+            <a:endParaRPr lang="en-US" sz="2600" dirty="0">
+              <a:latin typeface="Arial" panose="020B0604020202020204" pitchFamily="34" charset="0"/>
+              <a:cs typeface="Arial" panose="020B0604020202020204" pitchFamily="34" charset="0"/>
+            </a:endParaRPr>
+          </a:p>
+          <a:p>
+            <a:pPr marL="457200" indent="-457200">
+              <a:buFont typeface="Arial" panose="020B0604020202020204" pitchFamily="34" charset="0"/>
+              <a:buChar char="•"/>
+            </a:pPr>
+            <a:endParaRPr lang="en-US" sz="2600" dirty="0">
+              <a:latin typeface="Arial" panose="020B0604020202020204" pitchFamily="34" charset="0"/>
+              <a:cs typeface="Arial" panose="020B0604020202020204" pitchFamily="34" charset="0"/>
+            </a:endParaRPr>
+          </a:p>
+          <a:p>
+            <a:pPr marL="457200" indent="-457200">
+              <a:buFont typeface="Arial" panose="020B0604020202020204" pitchFamily="34" charset="0"/>
+              <a:buChar char="•"/>
+            </a:pPr>
+            <a:r>
+              <a:rPr lang="en-US" sz="2600" dirty="0">
                 <a:latin typeface="Arial" panose="020B0604020202020204" pitchFamily="34" charset="0"/>
                 <a:cs typeface="Arial" panose="020B0604020202020204" pitchFamily="34" charset="0"/>
               </a:rPr>
@@ -6152,39 +6468,39 @@
               <a:buChar char="•"/>
             </a:pPr>
             <a:r>
-              <a:rPr lang="en-US" sz="2800" dirty="0">
+              <a:rPr lang="en-US" sz="2600" dirty="0">
                 <a:latin typeface="Arial" panose="020B0604020202020204" pitchFamily="34" charset="0"/>
                 <a:cs typeface="Arial" panose="020B0604020202020204" pitchFamily="34" charset="0"/>
               </a:rPr>
               <a:t>[O III]/[</a:t>
             </a:r>
             <a:r>
-              <a:rPr lang="en-US" sz="2800" dirty="0" err="1">
+              <a:rPr lang="en-US" sz="2600" dirty="0" err="1">
                 <a:latin typeface="Arial" panose="020B0604020202020204" pitchFamily="34" charset="0"/>
                 <a:cs typeface="Arial" panose="020B0604020202020204" pitchFamily="34" charset="0"/>
               </a:rPr>
               <a:t>Ar</a:t>
             </a:r>
             <a:r>
-              <a:rPr lang="en-US" sz="2800" dirty="0">
+              <a:rPr lang="en-US" sz="2600" dirty="0">
                 <a:latin typeface="Arial" panose="020B0604020202020204" pitchFamily="34" charset="0"/>
                 <a:cs typeface="Arial" panose="020B0604020202020204" pitchFamily="34" charset="0"/>
               </a:rPr>
               <a:t> III] vs [Ne III / H</a:t>
             </a:r>
             <a:r>
-              <a:rPr lang="el-GR" sz="2800" dirty="0">
+              <a:rPr lang="el-GR" sz="2600" dirty="0">
                 <a:latin typeface="Arial" panose="020B0604020202020204" pitchFamily="34" charset="0"/>
                 <a:cs typeface="Arial" panose="020B0604020202020204" pitchFamily="34" charset="0"/>
               </a:rPr>
               <a:t>α</a:t>
             </a:r>
             <a:r>
-              <a:rPr lang="en-US" sz="2800" dirty="0">
-                <a:latin typeface="Arial" panose="020B0604020202020204" pitchFamily="34" charset="0"/>
-                <a:cs typeface="Arial" panose="020B0604020202020204" pitchFamily="34" charset="0"/>
-              </a:rPr>
-              <a:t>] compares elements with high ionization potentials.  </a:t>
+              <a:rPr lang="en-US" sz="2600" dirty="0">
+                <a:latin typeface="Arial" panose="020B0604020202020204" pitchFamily="34" charset="0"/>
+                <a:cs typeface="Arial" panose="020B0604020202020204" pitchFamily="34" charset="0"/>
+              </a:rPr>
+              <a:t>] compares elements with high ionization potentials.  [Ne III] is also sensitive to ionization parameter</a:t>
             </a:r>
           </a:p>
           <a:p>
@@ -6193,11 +6509,11 @@
               <a:buChar char="•"/>
             </a:pPr>
             <a:r>
-              <a:rPr lang="en-US" sz="2800" dirty="0">
-                <a:latin typeface="Arial" panose="020B0604020202020204" pitchFamily="34" charset="0"/>
-                <a:cs typeface="Arial" panose="020B0604020202020204" pitchFamily="34" charset="0"/>
-              </a:rPr>
-              <a:t>[He I] depends linearly on Helium abundance.  </a:t>
+              <a:rPr lang="en-US" sz="2600" dirty="0">
+                <a:latin typeface="Arial" panose="020B0604020202020204" pitchFamily="34" charset="0"/>
+                <a:cs typeface="Arial" panose="020B0604020202020204" pitchFamily="34" charset="0"/>
+              </a:rPr>
+              <a:t>[He I] / H-beta depends linearly on Helium abundance.  </a:t>
             </a:r>
           </a:p>
           <a:p>
@@ -6206,7 +6522,7 @@
               <a:buChar char="•"/>
             </a:pPr>
             <a:r>
-              <a:rPr lang="en-US" sz="2800" dirty="0">
+              <a:rPr lang="en-US" sz="2600" dirty="0">
                 <a:latin typeface="Arial" panose="020B0604020202020204" pitchFamily="34" charset="0"/>
                 <a:cs typeface="Arial" panose="020B0604020202020204" pitchFamily="34" charset="0"/>
               </a:rPr>
@@ -6219,21 +6535,21 @@
               <a:buChar char="•"/>
             </a:pPr>
             <a:r>
-              <a:rPr lang="en-US" sz="2800" dirty="0">
+              <a:rPr lang="en-US" sz="2600" dirty="0">
                 <a:latin typeface="Arial" panose="020B0604020202020204" pitchFamily="34" charset="0"/>
                 <a:cs typeface="Arial" panose="020B0604020202020204" pitchFamily="34" charset="0"/>
               </a:rPr>
               <a:t>[O III] 4636 + [O III] 4959 + [O III] 5007/ H</a:t>
             </a:r>
             <a:r>
-              <a:rPr lang="el-GR" sz="2800" dirty="0">
+              <a:rPr lang="el-GR" sz="2600" dirty="0">
                 <a:latin typeface="Arial" panose="020B0604020202020204" pitchFamily="34" charset="0"/>
                 <a:cs typeface="Arial" panose="020B0604020202020204" pitchFamily="34" charset="0"/>
               </a:rPr>
               <a:t>β</a:t>
             </a:r>
             <a:r>
-              <a:rPr lang="en-US" sz="2800" dirty="0">
+              <a:rPr lang="en-US" sz="2600" dirty="0">
                 <a:latin typeface="Arial" panose="020B0604020202020204" pitchFamily="34" charset="0"/>
                 <a:cs typeface="Arial" panose="020B0604020202020204" pitchFamily="34" charset="0"/>
               </a:rPr>
@@ -6246,7 +6562,7 @@
               <a:buChar char="•"/>
             </a:pPr>
             <a:r>
-              <a:rPr lang="en-US" sz="2800" dirty="0">
+              <a:rPr lang="en-US" sz="2600" dirty="0">
                 <a:latin typeface="Arial" panose="020B0604020202020204" pitchFamily="34" charset="0"/>
                 <a:cs typeface="Arial" panose="020B0604020202020204" pitchFamily="34" charset="0"/>
               </a:rPr>
@@ -6284,7 +6600,7 @@
         </p:blipFill>
         <p:spPr>
           <a:xfrm>
-            <a:off x="4785135" y="24500990"/>
+            <a:off x="4579183" y="24425310"/>
             <a:ext cx="6334125" cy="476250"/>
           </a:xfrm>
           <a:prstGeom prst="rect">
@@ -6330,7 +6646,7 @@
           </p:cNvPicPr>
           <p:nvPr/>
         </p:nvPicPr>
-        <p:blipFill>
+        <p:blipFill rotWithShape="1">
           <a:blip r:embed="rId8">
             <a:extLst>
               <a:ext uri="{28A0092B-C50C-407E-A947-70E740481C1C}">
@@ -6338,14 +6654,13 @@
               </a:ext>
             </a:extLst>
           </a:blip>
-          <a:stretch>
-            <a:fillRect/>
-          </a:stretch>
+          <a:srcRect l="5361" t="7373" r="7371" b="2811"/>
+          <a:stretch/>
         </p:blipFill>
         <p:spPr>
           <a:xfrm>
-            <a:off x="31306677" y="14964998"/>
-            <a:ext cx="11786183" cy="5907823"/>
+            <a:off x="31122338" y="14954236"/>
+            <a:ext cx="11677441" cy="6024160"/>
           </a:xfrm>
           <a:prstGeom prst="rect">
             <a:avLst/>
@@ -6360,7 +6675,7 @@
           </p:cNvPicPr>
           <p:nvPr/>
         </p:nvPicPr>
-        <p:blipFill>
+        <p:blipFill rotWithShape="1">
           <a:blip r:embed="rId9">
             <a:extLst>
               <a:ext uri="{28A0092B-C50C-407E-A947-70E740481C1C}">
@@ -6368,14 +6683,13 @@
               </a:ext>
             </a:extLst>
           </a:blip>
-          <a:stretch>
-            <a:fillRect/>
-          </a:stretch>
+          <a:srcRect l="7304" t="6217" r="6908" b="3388"/>
+          <a:stretch/>
         </p:blipFill>
         <p:spPr>
           <a:xfrm>
-            <a:off x="16914697" y="22783800"/>
-            <a:ext cx="11585912" cy="5807437"/>
+            <a:off x="16807882" y="22174200"/>
+            <a:ext cx="12964993" cy="6847708"/>
           </a:xfrm>
           <a:prstGeom prst="rect">
             <a:avLst/>
@@ -6390,7 +6704,7 @@
           </p:cNvPicPr>
           <p:nvPr/>
         </p:nvPicPr>
-        <p:blipFill>
+        <p:blipFill rotWithShape="1">
           <a:blip r:embed="rId10">
             <a:extLst>
               <a:ext uri="{28A0092B-C50C-407E-A947-70E740481C1C}">
@@ -6398,14 +6712,13 @@
               </a:ext>
             </a:extLst>
           </a:blip>
-          <a:stretch>
-            <a:fillRect/>
-          </a:stretch>
+          <a:srcRect l="7687" t="5694" r="7260" b="3204"/>
+          <a:stretch/>
         </p:blipFill>
         <p:spPr>
           <a:xfrm>
-            <a:off x="16537189" y="8500966"/>
-            <a:ext cx="13030918" cy="6531746"/>
+            <a:off x="16565430" y="10469426"/>
+            <a:ext cx="12804211" cy="6874744"/>
           </a:xfrm>
           <a:prstGeom prst="rect">
             <a:avLst/>
@@ -6420,7 +6733,7 @@
           </p:cNvPicPr>
           <p:nvPr/>
         </p:nvPicPr>
-        <p:blipFill>
+        <p:blipFill rotWithShape="1">
           <a:blip r:embed="rId11">
             <a:extLst>
               <a:ext uri="{28A0092B-C50C-407E-A947-70E740481C1C}">
@@ -6428,14 +6741,13 @@
               </a:ext>
             </a:extLst>
           </a:blip>
-          <a:stretch>
-            <a:fillRect/>
-          </a:stretch>
+          <a:srcRect l="998" t="6788" r="5374" b="3789"/>
+          <a:stretch/>
         </p:blipFill>
         <p:spPr>
           <a:xfrm>
-            <a:off x="31577009" y="3497348"/>
-            <a:ext cx="11197371" cy="5612681"/>
+            <a:off x="30736142" y="3985000"/>
+            <a:ext cx="12656703" cy="6059182"/>
           </a:xfrm>
           <a:prstGeom prst="rect">
             <a:avLst/>

</xml_diff>

<commit_message>
Plots of new diagnostic ratios, one set without filtering for error, one set with
</commit_message>
<xml_diff>
--- a/Presentations/SURE_Poster_Design.pptx
+++ b/Presentations/SURE_Poster_Design.pptx
@@ -263,7 +263,7 @@
           <a:p>
             <a:fld id="{26F4659F-BCAD-4F49-8558-2B5CFF0DE5F8}" type="datetimeFigureOut">
               <a:rPr lang="en-US" smtClean="0"/>
-              <a:t>7/16/2016</a:t>
+              <a:t>7/18/2016</a:t>
             </a:fld>
             <a:endParaRPr lang="en-US"/>
           </a:p>
@@ -433,7 +433,7 @@
           <a:p>
             <a:fld id="{26F4659F-BCAD-4F49-8558-2B5CFF0DE5F8}" type="datetimeFigureOut">
               <a:rPr lang="en-US" smtClean="0"/>
-              <a:t>7/16/2016</a:t>
+              <a:t>7/18/2016</a:t>
             </a:fld>
             <a:endParaRPr lang="en-US"/>
           </a:p>
@@ -613,7 +613,7 @@
           <a:p>
             <a:fld id="{26F4659F-BCAD-4F49-8558-2B5CFF0DE5F8}" type="datetimeFigureOut">
               <a:rPr lang="en-US" smtClean="0"/>
-              <a:t>7/16/2016</a:t>
+              <a:t>7/18/2016</a:t>
             </a:fld>
             <a:endParaRPr lang="en-US"/>
           </a:p>
@@ -783,7 +783,7 @@
           <a:p>
             <a:fld id="{26F4659F-BCAD-4F49-8558-2B5CFF0DE5F8}" type="datetimeFigureOut">
               <a:rPr lang="en-US" smtClean="0"/>
-              <a:t>7/16/2016</a:t>
+              <a:t>7/18/2016</a:t>
             </a:fld>
             <a:endParaRPr lang="en-US"/>
           </a:p>
@@ -1027,7 +1027,7 @@
           <a:p>
             <a:fld id="{26F4659F-BCAD-4F49-8558-2B5CFF0DE5F8}" type="datetimeFigureOut">
               <a:rPr lang="en-US" smtClean="0"/>
-              <a:t>7/16/2016</a:t>
+              <a:t>7/18/2016</a:t>
             </a:fld>
             <a:endParaRPr lang="en-US"/>
           </a:p>
@@ -1259,7 +1259,7 @@
           <a:p>
             <a:fld id="{26F4659F-BCAD-4F49-8558-2B5CFF0DE5F8}" type="datetimeFigureOut">
               <a:rPr lang="en-US" smtClean="0"/>
-              <a:t>7/16/2016</a:t>
+              <a:t>7/18/2016</a:t>
             </a:fld>
             <a:endParaRPr lang="en-US"/>
           </a:p>
@@ -1626,7 +1626,7 @@
           <a:p>
             <a:fld id="{26F4659F-BCAD-4F49-8558-2B5CFF0DE5F8}" type="datetimeFigureOut">
               <a:rPr lang="en-US" smtClean="0"/>
-              <a:t>7/16/2016</a:t>
+              <a:t>7/18/2016</a:t>
             </a:fld>
             <a:endParaRPr lang="en-US"/>
           </a:p>
@@ -1744,7 +1744,7 @@
           <a:p>
             <a:fld id="{26F4659F-BCAD-4F49-8558-2B5CFF0DE5F8}" type="datetimeFigureOut">
               <a:rPr lang="en-US" smtClean="0"/>
-              <a:t>7/16/2016</a:t>
+              <a:t>7/18/2016</a:t>
             </a:fld>
             <a:endParaRPr lang="en-US"/>
           </a:p>
@@ -1839,7 +1839,7 @@
           <a:p>
             <a:fld id="{26F4659F-BCAD-4F49-8558-2B5CFF0DE5F8}" type="datetimeFigureOut">
               <a:rPr lang="en-US" smtClean="0"/>
-              <a:t>7/16/2016</a:t>
+              <a:t>7/18/2016</a:t>
             </a:fld>
             <a:endParaRPr lang="en-US"/>
           </a:p>
@@ -2116,7 +2116,7 @@
           <a:p>
             <a:fld id="{26F4659F-BCAD-4F49-8558-2B5CFF0DE5F8}" type="datetimeFigureOut">
               <a:rPr lang="en-US" smtClean="0"/>
-              <a:t>7/16/2016</a:t>
+              <a:t>7/18/2016</a:t>
             </a:fld>
             <a:endParaRPr lang="en-US"/>
           </a:p>
@@ -2373,7 +2373,7 @@
           <a:p>
             <a:fld id="{26F4659F-BCAD-4F49-8558-2B5CFF0DE5F8}" type="datetimeFigureOut">
               <a:rPr lang="en-US" smtClean="0"/>
-              <a:t>7/16/2016</a:t>
+              <a:t>7/18/2016</a:t>
             </a:fld>
             <a:endParaRPr lang="en-US"/>
           </a:p>
@@ -2586,7 +2586,7 @@
           <a:p>
             <a:fld id="{26F4659F-BCAD-4F49-8558-2B5CFF0DE5F8}" type="datetimeFigureOut">
               <a:rPr lang="en-US" smtClean="0"/>
-              <a:t>7/16/2016</a:t>
+              <a:t>7/18/2016</a:t>
             </a:fld>
             <a:endParaRPr lang="en-US"/>
           </a:p>
@@ -3062,7 +3062,7 @@
         <p:spPr>
           <a:xfrm>
             <a:off x="1156848" y="3619247"/>
-            <a:ext cx="14339454" cy="16096714"/>
+            <a:ext cx="14339454" cy="16496824"/>
           </a:xfrm>
           <a:prstGeom prst="rect">
             <a:avLst/>
@@ -3097,7 +3097,7 @@
                 <a:latin typeface="Arial" panose="020B0604020202020204" pitchFamily="34" charset="0"/>
                 <a:cs typeface="Arial" panose="020B0604020202020204" pitchFamily="34" charset="0"/>
               </a:rPr>
-              <a:t>Active Galactic Nuclei (AGN) are supermassive black holes in the centers of galaxies whose accretion disks and magnetic fields produce more light than all the stars in the galaxy combined. </a:t>
+              <a:t>Active Galactic Nuclei (AGN) are galaxies with supermassive black holes in the centers of galaxies whose accretion disks and interactions with magnetic fields produce more light than all the stars in the galaxy combined. </a:t>
             </a:r>
           </a:p>
           <a:p>
@@ -3264,13 +3264,192 @@
                 <a:latin typeface="Arial" panose="020B0604020202020204" pitchFamily="34" charset="0"/>
                 <a:cs typeface="Arial" panose="020B0604020202020204" pitchFamily="34" charset="0"/>
               </a:rPr>
-              <a:t>Lots of research on the Broad Line Region (BLR), where there are broad emission lines, but not as much on the Narrow Line Region (NLR) (</a:t>
+              <a:t>Lots of research on the Broad Line Region (BLR) (</a:t>
             </a:r>
             <a:r>
               <a:rPr lang="en-US" sz="2600" dirty="0" err="1">
                 <a:latin typeface="Arial" panose="020B0604020202020204" pitchFamily="34" charset="0"/>
                 <a:cs typeface="Arial" panose="020B0604020202020204" pitchFamily="34" charset="0"/>
               </a:rPr>
+              <a:t>Korista</a:t>
+            </a:r>
+            <a:r>
+              <a:rPr lang="en-US" sz="2600" dirty="0">
+                <a:latin typeface="Arial" panose="020B0604020202020204" pitchFamily="34" charset="0"/>
+                <a:cs typeface="Arial" panose="020B0604020202020204" pitchFamily="34" charset="0"/>
+              </a:rPr>
+              <a:t> et al. 1997), where there are broad emission lines, but not as much on the Narrow Line Region (NLR) (Richardson et al. 2014), where there are narrow emission lines. </a:t>
+            </a:r>
+          </a:p>
+          <a:p>
+            <a:pPr marL="457200" indent="-457200">
+              <a:buFont typeface="Arial" panose="020B0604020202020204" pitchFamily="34" charset="0"/>
+              <a:buChar char="•"/>
+            </a:pPr>
+            <a:r>
+              <a:rPr lang="en-US" sz="2600" dirty="0">
+                <a:latin typeface="Arial" panose="020B0604020202020204" pitchFamily="34" charset="0"/>
+                <a:cs typeface="Arial" panose="020B0604020202020204" pitchFamily="34" charset="0"/>
+              </a:rPr>
+              <a:t>Emission lines from the ionization of different elements used to learn about the AGN, through simulations with programs such as CLOUDY (</a:t>
+            </a:r>
+            <a:r>
+              <a:rPr lang="en-US" sz="2600" dirty="0" err="1">
+                <a:latin typeface="Arial" panose="020B0604020202020204" pitchFamily="34" charset="0"/>
+                <a:cs typeface="Arial" panose="020B0604020202020204" pitchFamily="34" charset="0"/>
+              </a:rPr>
+              <a:t>Ferland</a:t>
+            </a:r>
+            <a:r>
+              <a:rPr lang="en-US" sz="2600" dirty="0">
+                <a:latin typeface="Arial" panose="020B0604020202020204" pitchFamily="34" charset="0"/>
+                <a:cs typeface="Arial" panose="020B0604020202020204" pitchFamily="34" charset="0"/>
+              </a:rPr>
+              <a:t> et al. 2013) and MAPPINGSIII (Allen et al. 2008).</a:t>
+            </a:r>
+          </a:p>
+          <a:p>
+            <a:pPr marL="457200" indent="-457200">
+              <a:buFont typeface="Arial" panose="020B0604020202020204" pitchFamily="34" charset="0"/>
+              <a:buChar char="•"/>
+            </a:pPr>
+            <a:r>
+              <a:rPr lang="en-US" sz="2600" dirty="0">
+                <a:latin typeface="Arial" panose="020B0604020202020204" pitchFamily="34" charset="0"/>
+                <a:cs typeface="Arial" panose="020B0604020202020204" pitchFamily="34" charset="0"/>
+              </a:rPr>
+              <a:t>Models of the incident radiation curve from the AGN in CLOUDY are computed from using the spectral slope indices </a:t>
+            </a:r>
+            <a:r>
+              <a:rPr lang="el-GR" sz="2600" dirty="0">
+                <a:latin typeface="Arial" panose="020B0604020202020204" pitchFamily="34" charset="0"/>
+                <a:cs typeface="Arial" panose="020B0604020202020204" pitchFamily="34" charset="0"/>
+              </a:rPr>
+              <a:t>α</a:t>
+            </a:r>
+            <a:r>
+              <a:rPr lang="en-US" sz="2600" baseline="-25000" dirty="0">
+                <a:latin typeface="Arial" panose="020B0604020202020204" pitchFamily="34" charset="0"/>
+                <a:cs typeface="Arial" panose="020B0604020202020204" pitchFamily="34" charset="0"/>
+              </a:rPr>
+              <a:t>x</a:t>
+            </a:r>
+            <a:r>
+              <a:rPr lang="en-US" sz="2600" dirty="0">
+                <a:latin typeface="Arial" panose="020B0604020202020204" pitchFamily="34" charset="0"/>
+                <a:cs typeface="Arial" panose="020B0604020202020204" pitchFamily="34" charset="0"/>
+              </a:rPr>
+              <a:t>, corresponding to the X-ray spectrum (10</a:t>
+            </a:r>
+            <a:r>
+              <a:rPr lang="en-US" sz="2600" baseline="30000" dirty="0">
+                <a:latin typeface="Arial" panose="020B0604020202020204" pitchFamily="34" charset="0"/>
+                <a:cs typeface="Arial" panose="020B0604020202020204" pitchFamily="34" charset="0"/>
+              </a:rPr>
+              <a:t>2</a:t>
+            </a:r>
+            <a:r>
+              <a:rPr lang="en-US" sz="2600" dirty="0">
+                <a:latin typeface="Arial" panose="020B0604020202020204" pitchFamily="34" charset="0"/>
+                <a:cs typeface="Arial" panose="020B0604020202020204" pitchFamily="34" charset="0"/>
+              </a:rPr>
+              <a:t> eV- 10</a:t>
+            </a:r>
+            <a:r>
+              <a:rPr lang="en-US" sz="2600" baseline="30000" dirty="0">
+                <a:latin typeface="Arial" panose="020B0604020202020204" pitchFamily="34" charset="0"/>
+                <a:cs typeface="Arial" panose="020B0604020202020204" pitchFamily="34" charset="0"/>
+              </a:rPr>
+              <a:t>5</a:t>
+            </a:r>
+            <a:r>
+              <a:rPr lang="en-US" sz="2600" dirty="0">
+                <a:latin typeface="Arial" panose="020B0604020202020204" pitchFamily="34" charset="0"/>
+                <a:cs typeface="Arial" panose="020B0604020202020204" pitchFamily="34" charset="0"/>
+              </a:rPr>
+              <a:t> eV), </a:t>
+            </a:r>
+            <a:r>
+              <a:rPr lang="el-GR" sz="2600" dirty="0">
+                <a:latin typeface="Arial" panose="020B0604020202020204" pitchFamily="34" charset="0"/>
+                <a:cs typeface="Arial" panose="020B0604020202020204" pitchFamily="34" charset="0"/>
+              </a:rPr>
+              <a:t>α</a:t>
+            </a:r>
+            <a:r>
+              <a:rPr lang="en-US" sz="2600" baseline="-25000" dirty="0" err="1">
+                <a:latin typeface="Arial" panose="020B0604020202020204" pitchFamily="34" charset="0"/>
+                <a:cs typeface="Arial" panose="020B0604020202020204" pitchFamily="34" charset="0"/>
+              </a:rPr>
+              <a:t>uv</a:t>
+            </a:r>
+            <a:r>
+              <a:rPr lang="en-US" sz="2600" dirty="0">
+                <a:latin typeface="Arial" panose="020B0604020202020204" pitchFamily="34" charset="0"/>
+                <a:cs typeface="Arial" panose="020B0604020202020204" pitchFamily="34" charset="0"/>
+              </a:rPr>
+              <a:t> corresponding to the ultraviolet spectrum (10</a:t>
+            </a:r>
+            <a:r>
+              <a:rPr lang="en-US" sz="2600" baseline="30000" dirty="0">
+                <a:latin typeface="Arial" panose="020B0604020202020204" pitchFamily="34" charset="0"/>
+                <a:cs typeface="Arial" panose="020B0604020202020204" pitchFamily="34" charset="0"/>
+              </a:rPr>
+              <a:t>1</a:t>
+            </a:r>
+            <a:r>
+              <a:rPr lang="en-US" sz="2600" dirty="0">
+                <a:latin typeface="Arial" panose="020B0604020202020204" pitchFamily="34" charset="0"/>
+                <a:cs typeface="Arial" panose="020B0604020202020204" pitchFamily="34" charset="0"/>
+              </a:rPr>
+              <a:t> eV-10</a:t>
+            </a:r>
+            <a:r>
+              <a:rPr lang="en-US" sz="2600" baseline="30000" dirty="0">
+                <a:latin typeface="Arial" panose="020B0604020202020204" pitchFamily="34" charset="0"/>
+                <a:cs typeface="Arial" panose="020B0604020202020204" pitchFamily="34" charset="0"/>
+              </a:rPr>
+              <a:t>2</a:t>
+            </a:r>
+            <a:r>
+              <a:rPr lang="en-US" sz="2600" dirty="0">
+                <a:latin typeface="Arial" panose="020B0604020202020204" pitchFamily="34" charset="0"/>
+                <a:cs typeface="Arial" panose="020B0604020202020204" pitchFamily="34" charset="0"/>
+              </a:rPr>
+              <a:t> eV), and </a:t>
+            </a:r>
+            <a:r>
+              <a:rPr lang="el-GR" sz="2600" dirty="0">
+                <a:latin typeface="Arial" panose="020B0604020202020204" pitchFamily="34" charset="0"/>
+                <a:cs typeface="Arial" panose="020B0604020202020204" pitchFamily="34" charset="0"/>
+              </a:rPr>
+              <a:t>α</a:t>
+            </a:r>
+            <a:r>
+              <a:rPr lang="en-US" sz="2600" baseline="-25000" dirty="0">
+                <a:latin typeface="Arial" panose="020B0604020202020204" pitchFamily="34" charset="0"/>
+                <a:cs typeface="Arial" panose="020B0604020202020204" pitchFamily="34" charset="0"/>
+              </a:rPr>
+              <a:t>ox</a:t>
+            </a:r>
+            <a:r>
+              <a:rPr lang="en-US" sz="2600" dirty="0">
+                <a:latin typeface="Arial" panose="020B0604020202020204" pitchFamily="34" charset="0"/>
+                <a:cs typeface="Arial" panose="020B0604020202020204" pitchFamily="34" charset="0"/>
+              </a:rPr>
+              <a:t> is the ratio of x-rays to optical light.</a:t>
+            </a:r>
+          </a:p>
+          <a:p>
+            <a:pPr marL="457200" indent="-457200">
+              <a:buFont typeface="Arial" panose="020B0604020202020204" pitchFamily="34" charset="0"/>
+              <a:buChar char="•"/>
+            </a:pPr>
+            <a:r>
+              <a:rPr lang="en-US" sz="2600" dirty="0" err="1">
+                <a:latin typeface="Arial" panose="020B0604020202020204" pitchFamily="34" charset="0"/>
+                <a:cs typeface="Arial" panose="020B0604020202020204" pitchFamily="34" charset="0"/>
+              </a:rPr>
               <a:t>Grupe</a:t>
             </a:r>
             <a:r>
@@ -3278,179 +3457,7 @@
                 <a:latin typeface="Arial" panose="020B0604020202020204" pitchFamily="34" charset="0"/>
                 <a:cs typeface="Arial" panose="020B0604020202020204" pitchFamily="34" charset="0"/>
               </a:rPr>
-              <a:t> et al. 2010), where there are narrow emission lines. </a:t>
-            </a:r>
-          </a:p>
-          <a:p>
-            <a:pPr marL="457200" indent="-457200">
-              <a:buFont typeface="Arial" panose="020B0604020202020204" pitchFamily="34" charset="0"/>
-              <a:buChar char="•"/>
-            </a:pPr>
-            <a:r>
-              <a:rPr lang="en-US" sz="2600" dirty="0">
-                <a:latin typeface="Arial" panose="020B0604020202020204" pitchFamily="34" charset="0"/>
-                <a:cs typeface="Arial" panose="020B0604020202020204" pitchFamily="34" charset="0"/>
-              </a:rPr>
-              <a:t>Emission lines from the ionization of different elements used to learn about the AGN, through simulations with programs such as CLOUDY (</a:t>
-            </a:r>
-            <a:r>
-              <a:rPr lang="en-US" sz="2600" dirty="0" err="1">
-                <a:latin typeface="Arial" panose="020B0604020202020204" pitchFamily="34" charset="0"/>
-                <a:cs typeface="Arial" panose="020B0604020202020204" pitchFamily="34" charset="0"/>
-              </a:rPr>
-              <a:t>Ferland</a:t>
-            </a:r>
-            <a:r>
-              <a:rPr lang="en-US" sz="2600" dirty="0">
-                <a:latin typeface="Arial" panose="020B0604020202020204" pitchFamily="34" charset="0"/>
-                <a:cs typeface="Arial" panose="020B0604020202020204" pitchFamily="34" charset="0"/>
-              </a:rPr>
-              <a:t> et al. 2013 )and MAPPINGSIII (Allen et al. 2008).</a:t>
-            </a:r>
-          </a:p>
-          <a:p>
-            <a:pPr marL="457200" indent="-457200">
-              <a:buFont typeface="Arial" panose="020B0604020202020204" pitchFamily="34" charset="0"/>
-              <a:buChar char="•"/>
-            </a:pPr>
-            <a:r>
-              <a:rPr lang="en-US" sz="2600" dirty="0">
-                <a:latin typeface="Arial" panose="020B0604020202020204" pitchFamily="34" charset="0"/>
-                <a:cs typeface="Arial" panose="020B0604020202020204" pitchFamily="34" charset="0"/>
-              </a:rPr>
-              <a:t>Models of the incident radiation curve from the AGN in CLOUDY are computed from using the spectral slope indices </a:t>
-            </a:r>
-            <a:r>
-              <a:rPr lang="el-GR" sz="2600" dirty="0">
-                <a:latin typeface="Arial" panose="020B0604020202020204" pitchFamily="34" charset="0"/>
-                <a:cs typeface="Arial" panose="020B0604020202020204" pitchFamily="34" charset="0"/>
-              </a:rPr>
-              <a:t>α</a:t>
-            </a:r>
-            <a:r>
-              <a:rPr lang="en-US" sz="2600" baseline="-25000" dirty="0">
-                <a:latin typeface="Arial" panose="020B0604020202020204" pitchFamily="34" charset="0"/>
-                <a:cs typeface="Arial" panose="020B0604020202020204" pitchFamily="34" charset="0"/>
-              </a:rPr>
-              <a:t>x</a:t>
-            </a:r>
-            <a:r>
-              <a:rPr lang="en-US" sz="2600" dirty="0">
-                <a:latin typeface="Arial" panose="020B0604020202020204" pitchFamily="34" charset="0"/>
-                <a:cs typeface="Arial" panose="020B0604020202020204" pitchFamily="34" charset="0"/>
-              </a:rPr>
-              <a:t>, corresponding to the X-ray spectrum (10</a:t>
-            </a:r>
-            <a:r>
-              <a:rPr lang="en-US" sz="2600" baseline="30000" dirty="0">
-                <a:latin typeface="Arial" panose="020B0604020202020204" pitchFamily="34" charset="0"/>
-                <a:cs typeface="Arial" panose="020B0604020202020204" pitchFamily="34" charset="0"/>
-              </a:rPr>
-              <a:t>2</a:t>
-            </a:r>
-            <a:r>
-              <a:rPr lang="en-US" sz="2600" dirty="0">
-                <a:latin typeface="Arial" panose="020B0604020202020204" pitchFamily="34" charset="0"/>
-                <a:cs typeface="Arial" panose="020B0604020202020204" pitchFamily="34" charset="0"/>
-              </a:rPr>
-              <a:t> eV- 10</a:t>
-            </a:r>
-            <a:r>
-              <a:rPr lang="en-US" sz="2600" baseline="30000" dirty="0">
-                <a:latin typeface="Arial" panose="020B0604020202020204" pitchFamily="34" charset="0"/>
-                <a:cs typeface="Arial" panose="020B0604020202020204" pitchFamily="34" charset="0"/>
-              </a:rPr>
-              <a:t>5</a:t>
-            </a:r>
-            <a:r>
-              <a:rPr lang="en-US" sz="2600" dirty="0">
-                <a:latin typeface="Arial" panose="020B0604020202020204" pitchFamily="34" charset="0"/>
-                <a:cs typeface="Arial" panose="020B0604020202020204" pitchFamily="34" charset="0"/>
-              </a:rPr>
-              <a:t> eV), </a:t>
-            </a:r>
-            <a:r>
-              <a:rPr lang="el-GR" sz="2600" dirty="0">
-                <a:latin typeface="Arial" panose="020B0604020202020204" pitchFamily="34" charset="0"/>
-                <a:cs typeface="Arial" panose="020B0604020202020204" pitchFamily="34" charset="0"/>
-              </a:rPr>
-              <a:t>α</a:t>
-            </a:r>
-            <a:r>
-              <a:rPr lang="en-US" sz="2600" baseline="-25000" dirty="0" err="1">
-                <a:latin typeface="Arial" panose="020B0604020202020204" pitchFamily="34" charset="0"/>
-                <a:cs typeface="Arial" panose="020B0604020202020204" pitchFamily="34" charset="0"/>
-              </a:rPr>
-              <a:t>uv</a:t>
-            </a:r>
-            <a:r>
-              <a:rPr lang="en-US" sz="2600" dirty="0">
-                <a:latin typeface="Arial" panose="020B0604020202020204" pitchFamily="34" charset="0"/>
-                <a:cs typeface="Arial" panose="020B0604020202020204" pitchFamily="34" charset="0"/>
-              </a:rPr>
-              <a:t> corresponding to the ultraviolet spectrum (10</a:t>
-            </a:r>
-            <a:r>
-              <a:rPr lang="en-US" sz="2600" baseline="30000" dirty="0">
-                <a:latin typeface="Arial" panose="020B0604020202020204" pitchFamily="34" charset="0"/>
-                <a:cs typeface="Arial" panose="020B0604020202020204" pitchFamily="34" charset="0"/>
-              </a:rPr>
-              <a:t>1</a:t>
-            </a:r>
-            <a:r>
-              <a:rPr lang="en-US" sz="2600" dirty="0">
-                <a:latin typeface="Arial" panose="020B0604020202020204" pitchFamily="34" charset="0"/>
-                <a:cs typeface="Arial" panose="020B0604020202020204" pitchFamily="34" charset="0"/>
-              </a:rPr>
-              <a:t> eV-10</a:t>
-            </a:r>
-            <a:r>
-              <a:rPr lang="en-US" sz="2600" baseline="30000" dirty="0">
-                <a:latin typeface="Arial" panose="020B0604020202020204" pitchFamily="34" charset="0"/>
-                <a:cs typeface="Arial" panose="020B0604020202020204" pitchFamily="34" charset="0"/>
-              </a:rPr>
-              <a:t>2</a:t>
-            </a:r>
-            <a:r>
-              <a:rPr lang="en-US" sz="2600" dirty="0">
-                <a:latin typeface="Arial" panose="020B0604020202020204" pitchFamily="34" charset="0"/>
-                <a:cs typeface="Arial" panose="020B0604020202020204" pitchFamily="34" charset="0"/>
-              </a:rPr>
-              <a:t> eV), and </a:t>
-            </a:r>
-            <a:r>
-              <a:rPr lang="el-GR" sz="2600" dirty="0">
-                <a:latin typeface="Arial" panose="020B0604020202020204" pitchFamily="34" charset="0"/>
-                <a:cs typeface="Arial" panose="020B0604020202020204" pitchFamily="34" charset="0"/>
-              </a:rPr>
-              <a:t>α</a:t>
-            </a:r>
-            <a:r>
-              <a:rPr lang="en-US" sz="2600" baseline="-25000" dirty="0">
-                <a:latin typeface="Arial" panose="020B0604020202020204" pitchFamily="34" charset="0"/>
-                <a:cs typeface="Arial" panose="020B0604020202020204" pitchFamily="34" charset="0"/>
-              </a:rPr>
-              <a:t>ox</a:t>
-            </a:r>
-            <a:r>
-              <a:rPr lang="en-US" sz="2600" dirty="0">
-                <a:latin typeface="Arial" panose="020B0604020202020204" pitchFamily="34" charset="0"/>
-                <a:cs typeface="Arial" panose="020B0604020202020204" pitchFamily="34" charset="0"/>
-              </a:rPr>
-              <a:t> is the ratio of x-rays to optical light.</a:t>
-            </a:r>
-          </a:p>
-          <a:p>
-            <a:pPr marL="457200" indent="-457200">
-              <a:buFont typeface="Arial" panose="020B0604020202020204" pitchFamily="34" charset="0"/>
-              <a:buChar char="•"/>
-            </a:pPr>
-            <a:r>
-              <a:rPr lang="en-US" sz="2600" dirty="0">
-                <a:latin typeface="Arial" panose="020B0604020202020204" pitchFamily="34" charset="0"/>
-                <a:cs typeface="Arial" panose="020B0604020202020204" pitchFamily="34" charset="0"/>
-              </a:rPr>
-              <a:t>Research has shown that a correlation exists between </a:t>
+              <a:t> et al. 2010 found a correlation between </a:t>
             </a:r>
             <a:r>
               <a:rPr lang="el-GR" sz="2600" dirty="0">
@@ -3853,7 +3860,7 @@
         <p:spPr>
           <a:xfrm>
             <a:off x="16295068" y="2383679"/>
-            <a:ext cx="14091807" cy="33239869"/>
+            <a:ext cx="14091807" cy="33639978"/>
           </a:xfrm>
           <a:prstGeom prst="rect">
             <a:avLst/>
@@ -3898,7 +3905,7 @@
                 <a:latin typeface="Arial" panose="020B0604020202020204" pitchFamily="34" charset="0"/>
                 <a:cs typeface="Arial" panose="020B0604020202020204" pitchFamily="34" charset="0"/>
               </a:rPr>
-              <a:t>We examine emission line ratios as they allow us to study the effects of AGN density, metallicity, excitation mechanism, ionization parameter, and constrain the SED. </a:t>
+              <a:t>We examine emission line ratios as they allow us to constrain the SED and study the effects of AGN density, elemental abundances, excitation mechanism, and ionization parameter. </a:t>
             </a:r>
           </a:p>
           <a:p>
@@ -4541,7 +4548,7 @@
                 <a:latin typeface="Arial" panose="020B0604020202020204" pitchFamily="34" charset="0"/>
                 <a:cs typeface="Arial" panose="020B0604020202020204" pitchFamily="34" charset="0"/>
               </a:rPr>
-              <a:t> boundary, which may be a result of ionization parameter, and requires more examination.  </a:t>
+              <a:t> boundary.  Lowering the ionization parameter would likely cause these models to cross the boundary.   </a:t>
             </a:r>
           </a:p>
           <a:p>
@@ -4744,7 +4751,7 @@
                 <a:latin typeface="Arial" panose="020B0604020202020204" pitchFamily="34" charset="0"/>
                 <a:cs typeface="Arial" panose="020B0604020202020204" pitchFamily="34" charset="0"/>
               </a:rPr>
-              <a:t> 1989.  </a:t>
+              <a:t> 2006.  </a:t>
             </a:r>
           </a:p>
           <a:p>
@@ -5396,7 +5403,7 @@
         <p:spPr>
           <a:xfrm>
             <a:off x="31065296" y="22972179"/>
-            <a:ext cx="11709083" cy="7078861"/>
+            <a:ext cx="11709083" cy="7879080"/>
           </a:xfrm>
           <a:prstGeom prst="rect">
             <a:avLst/>
@@ -5527,6 +5534,33 @@
                 <a:cs typeface="Arial" panose="020B0604020202020204" pitchFamily="34" charset="0"/>
               </a:rPr>
               <a:t>Examine the effects of ionization parameter variation on our model to determine if we can utilize it in determining LINER galaxies.   </a:t>
+            </a:r>
+          </a:p>
+          <a:p>
+            <a:pPr marL="457200" indent="-457200">
+              <a:buFont typeface="Arial" panose="020B0604020202020204" pitchFamily="34" charset="0"/>
+              <a:buChar char="•"/>
+            </a:pPr>
+            <a:r>
+              <a:rPr lang="en-US" sz="2600" dirty="0">
+                <a:latin typeface="Arial" panose="020B0604020202020204" pitchFamily="34" charset="0"/>
+                <a:cs typeface="Arial" panose="020B0604020202020204" pitchFamily="34" charset="0"/>
+              </a:rPr>
+              <a:t>Analyze the variation of [O I] with regard to ionization parameter and the LINER-</a:t>
+            </a:r>
+            <a:r>
+              <a:rPr lang="en-US" sz="2600" dirty="0" err="1">
+                <a:latin typeface="Arial" panose="020B0604020202020204" pitchFamily="34" charset="0"/>
+                <a:cs typeface="Arial" panose="020B0604020202020204" pitchFamily="34" charset="0"/>
+              </a:rPr>
+              <a:t>Seyfert</a:t>
+            </a:r>
+            <a:r>
+              <a:rPr lang="en-US" sz="2600" dirty="0">
+                <a:latin typeface="Arial" panose="020B0604020202020204" pitchFamily="34" charset="0"/>
+                <a:cs typeface="Arial" panose="020B0604020202020204" pitchFamily="34" charset="0"/>
+              </a:rPr>
+              <a:t> Boundary.  </a:t>
             </a:r>
           </a:p>
           <a:p>
@@ -6136,7 +6170,7 @@
         <p:spPr>
           <a:xfrm>
             <a:off x="31191379" y="29393059"/>
-            <a:ext cx="11456916" cy="1446550"/>
+            <a:ext cx="11456916" cy="2677656"/>
           </a:xfrm>
           <a:prstGeom prst="rect">
             <a:avLst/>
@@ -6169,7 +6203,29 @@
               </a:rPr>
               <a:t>I would like to thank the Elon College Fellows program, my research mentor Dr. Chris Richardson, and the Elon Department of Undergraduate Research.  </a:t>
             </a:r>
-            <a:endParaRPr lang="en-US" sz="2000" dirty="0">
+          </a:p>
+          <a:p>
+            <a:endParaRPr lang="en-US" sz="2400" dirty="0">
+              <a:latin typeface="Arial" panose="020B0604020202020204" pitchFamily="34" charset="0"/>
+              <a:cs typeface="Arial" panose="020B0604020202020204" pitchFamily="34" charset="0"/>
+            </a:endParaRPr>
+          </a:p>
+          <a:p>
+            <a:r>
+              <a:rPr lang="en-US" sz="2800" dirty="0">
+                <a:latin typeface="Arial" panose="020B0604020202020204" pitchFamily="34" charset="0"/>
+                <a:cs typeface="Arial" panose="020B0604020202020204" pitchFamily="34" charset="0"/>
+              </a:rPr>
+              <a:t>This project was conducted as a part of Elon University’s Summer Undergraduate Research Experience</a:t>
+            </a:r>
+            <a:r>
+              <a:rPr lang="en-US" sz="2800">
+                <a:latin typeface="Arial" panose="020B0604020202020204" pitchFamily="34" charset="0"/>
+                <a:cs typeface="Arial" panose="020B0604020202020204" pitchFamily="34" charset="0"/>
+              </a:rPr>
+              <a:t>, 2016.</a:t>
+            </a:r>
+            <a:endParaRPr lang="en-US" sz="2800" dirty="0">
               <a:latin typeface="Arial" panose="020B0604020202020204" pitchFamily="34" charset="0"/>
               <a:cs typeface="Arial" panose="020B0604020202020204" pitchFamily="34" charset="0"/>
             </a:endParaRPr>
@@ -6486,7 +6542,7 @@
                 <a:latin typeface="Arial" panose="020B0604020202020204" pitchFamily="34" charset="0"/>
                 <a:cs typeface="Arial" panose="020B0604020202020204" pitchFamily="34" charset="0"/>
               </a:rPr>
-              <a:t> III] vs [Ne III / H</a:t>
+              <a:t> III] vs [Ne III] / H</a:t>
             </a:r>
             <a:r>
               <a:rPr lang="el-GR" sz="2600" dirty="0">
@@ -6500,7 +6556,21 @@
                 <a:latin typeface="Arial" panose="020B0604020202020204" pitchFamily="34" charset="0"/>
                 <a:cs typeface="Arial" panose="020B0604020202020204" pitchFamily="34" charset="0"/>
               </a:rPr>
-              <a:t>] compares elements with high ionization potentials.  [Ne III] is also sensitive to ionization parameter</a:t>
+              <a:t> compares elements with high ionization potentials.  [Ne III] / H</a:t>
+            </a:r>
+            <a:r>
+              <a:rPr lang="el-GR" sz="2600" dirty="0">
+                <a:latin typeface="Arial" panose="020B0604020202020204" pitchFamily="34" charset="0"/>
+                <a:cs typeface="Arial" panose="020B0604020202020204" pitchFamily="34" charset="0"/>
+              </a:rPr>
+              <a:t>α </a:t>
+            </a:r>
+            <a:r>
+              <a:rPr lang="en-US" sz="2600" dirty="0">
+                <a:latin typeface="Arial" panose="020B0604020202020204" pitchFamily="34" charset="0"/>
+                <a:cs typeface="Arial" panose="020B0604020202020204" pitchFamily="34" charset="0"/>
+              </a:rPr>
+              <a:t>is also sensitive to ionization parameter</a:t>
             </a:r>
           </a:p>
           <a:p>
@@ -6539,7 +6609,7 @@
                 <a:latin typeface="Arial" panose="020B0604020202020204" pitchFamily="34" charset="0"/>
                 <a:cs typeface="Arial" panose="020B0604020202020204" pitchFamily="34" charset="0"/>
               </a:rPr>
-              <a:t>[O III] 4636 + [O III] 4959 + [O III] 5007/ H</a:t>
+              <a:t>[O III] 4363 + [O III] 4959 + [O III] 5007/ H</a:t>
             </a:r>
             <a:r>
               <a:rPr lang="el-GR" sz="2600" dirty="0">
@@ -6688,7 +6758,7 @@
         </p:blipFill>
         <p:spPr>
           <a:xfrm>
-            <a:off x="16807882" y="22174200"/>
+            <a:off x="16805358" y="22643811"/>
             <a:ext cx="12964993" cy="6847708"/>
           </a:xfrm>
           <a:prstGeom prst="rect">
@@ -6717,7 +6787,7 @@
         </p:blipFill>
         <p:spPr>
           <a:xfrm>
-            <a:off x="16565430" y="10469426"/>
+            <a:off x="16544664" y="10744200"/>
             <a:ext cx="12804211" cy="6874744"/>
           </a:xfrm>
           <a:prstGeom prst="rect">

</xml_diff>

<commit_message>
Some changes for new laptop
</commit_message>
<xml_diff>
--- a/Presentations/SURE_Poster_Design.pptx
+++ b/Presentations/SURE_Poster_Design.pptx
@@ -263,7 +263,7 @@
           <a:p>
             <a:fld id="{26F4659F-BCAD-4F49-8558-2B5CFF0DE5F8}" type="datetimeFigureOut">
               <a:rPr lang="en-US" smtClean="0"/>
-              <a:t>7/18/2016</a:t>
+              <a:t>12/19/2016</a:t>
             </a:fld>
             <a:endParaRPr lang="en-US"/>
           </a:p>
@@ -433,7 +433,7 @@
           <a:p>
             <a:fld id="{26F4659F-BCAD-4F49-8558-2B5CFF0DE5F8}" type="datetimeFigureOut">
               <a:rPr lang="en-US" smtClean="0"/>
-              <a:t>7/18/2016</a:t>
+              <a:t>12/19/2016</a:t>
             </a:fld>
             <a:endParaRPr lang="en-US"/>
           </a:p>
@@ -613,7 +613,7 @@
           <a:p>
             <a:fld id="{26F4659F-BCAD-4F49-8558-2B5CFF0DE5F8}" type="datetimeFigureOut">
               <a:rPr lang="en-US" smtClean="0"/>
-              <a:t>7/18/2016</a:t>
+              <a:t>12/19/2016</a:t>
             </a:fld>
             <a:endParaRPr lang="en-US"/>
           </a:p>
@@ -783,7 +783,7 @@
           <a:p>
             <a:fld id="{26F4659F-BCAD-4F49-8558-2B5CFF0DE5F8}" type="datetimeFigureOut">
               <a:rPr lang="en-US" smtClean="0"/>
-              <a:t>7/18/2016</a:t>
+              <a:t>12/19/2016</a:t>
             </a:fld>
             <a:endParaRPr lang="en-US"/>
           </a:p>
@@ -1027,7 +1027,7 @@
           <a:p>
             <a:fld id="{26F4659F-BCAD-4F49-8558-2B5CFF0DE5F8}" type="datetimeFigureOut">
               <a:rPr lang="en-US" smtClean="0"/>
-              <a:t>7/18/2016</a:t>
+              <a:t>12/19/2016</a:t>
             </a:fld>
             <a:endParaRPr lang="en-US"/>
           </a:p>
@@ -1259,7 +1259,7 @@
           <a:p>
             <a:fld id="{26F4659F-BCAD-4F49-8558-2B5CFF0DE5F8}" type="datetimeFigureOut">
               <a:rPr lang="en-US" smtClean="0"/>
-              <a:t>7/18/2016</a:t>
+              <a:t>12/19/2016</a:t>
             </a:fld>
             <a:endParaRPr lang="en-US"/>
           </a:p>
@@ -1626,7 +1626,7 @@
           <a:p>
             <a:fld id="{26F4659F-BCAD-4F49-8558-2B5CFF0DE5F8}" type="datetimeFigureOut">
               <a:rPr lang="en-US" smtClean="0"/>
-              <a:t>7/18/2016</a:t>
+              <a:t>12/19/2016</a:t>
             </a:fld>
             <a:endParaRPr lang="en-US"/>
           </a:p>
@@ -1744,7 +1744,7 @@
           <a:p>
             <a:fld id="{26F4659F-BCAD-4F49-8558-2B5CFF0DE5F8}" type="datetimeFigureOut">
               <a:rPr lang="en-US" smtClean="0"/>
-              <a:t>7/18/2016</a:t>
+              <a:t>12/19/2016</a:t>
             </a:fld>
             <a:endParaRPr lang="en-US"/>
           </a:p>
@@ -1839,7 +1839,7 @@
           <a:p>
             <a:fld id="{26F4659F-BCAD-4F49-8558-2B5CFF0DE5F8}" type="datetimeFigureOut">
               <a:rPr lang="en-US" smtClean="0"/>
-              <a:t>7/18/2016</a:t>
+              <a:t>12/19/2016</a:t>
             </a:fld>
             <a:endParaRPr lang="en-US"/>
           </a:p>
@@ -2116,7 +2116,7 @@
           <a:p>
             <a:fld id="{26F4659F-BCAD-4F49-8558-2B5CFF0DE5F8}" type="datetimeFigureOut">
               <a:rPr lang="en-US" smtClean="0"/>
-              <a:t>7/18/2016</a:t>
+              <a:t>12/19/2016</a:t>
             </a:fld>
             <a:endParaRPr lang="en-US"/>
           </a:p>
@@ -2373,7 +2373,7 @@
           <a:p>
             <a:fld id="{26F4659F-BCAD-4F49-8558-2B5CFF0DE5F8}" type="datetimeFigureOut">
               <a:rPr lang="en-US" smtClean="0"/>
-              <a:t>7/18/2016</a:t>
+              <a:t>12/19/2016</a:t>
             </a:fld>
             <a:endParaRPr lang="en-US"/>
           </a:p>
@@ -2586,7 +2586,7 @@
           <a:p>
             <a:fld id="{26F4659F-BCAD-4F49-8558-2B5CFF0DE5F8}" type="datetimeFigureOut">
               <a:rPr lang="en-US" smtClean="0"/>
-              <a:t>7/18/2016</a:t>
+              <a:t>12/19/2016</a:t>
             </a:fld>
             <a:endParaRPr lang="en-US"/>
           </a:p>
@@ -3022,11 +3022,18 @@
                 <a:latin typeface="Arial" panose="020B0604020202020204" pitchFamily="34" charset="0"/>
                 <a:cs typeface="Arial" panose="020B0604020202020204" pitchFamily="34" charset="0"/>
               </a:rPr>
-              <a:t>Simulations of Emission Lines from the Narrow Line Region in Active Galaxies</a:t>
-            </a:r>
-          </a:p>
-          <a:p>
-            <a:pPr algn="ctr"/>
+              <a:t>Investigating Simulations of Emission Lines from the Narrow Line Region of </a:t>
+            </a:r>
+            <a:r>
+              <a:rPr lang="en-US" sz="4400" b="1" dirty="0" err="1">
+                <a:solidFill>
+                  <a:srgbClr val="73000A"/>
+                </a:solidFill>
+                <a:latin typeface="Arial" panose="020B0604020202020204" pitchFamily="34" charset="0"/>
+                <a:cs typeface="Arial" panose="020B0604020202020204" pitchFamily="34" charset="0"/>
+              </a:rPr>
+              <a:t>Seyferts</a:t>
+            </a:r>
             <a:r>
               <a:rPr lang="en-US" sz="4400" b="1" dirty="0">
                 <a:solidFill>
@@ -3035,7 +3042,7 @@
                 <a:latin typeface="Arial" panose="020B0604020202020204" pitchFamily="34" charset="0"/>
                 <a:cs typeface="Arial" panose="020B0604020202020204" pitchFamily="34" charset="0"/>
               </a:rPr>
-              <a:t>Christopher Greene (Faculty Mentor: Dr. Chris Richardson)</a:t>
+              <a:t> and LINERS</a:t>
             </a:r>
           </a:p>
           <a:p>
@@ -3048,561 +3055,21 @@
                 <a:latin typeface="Arial" panose="020B0604020202020204" pitchFamily="34" charset="0"/>
                 <a:cs typeface="Arial" panose="020B0604020202020204" pitchFamily="34" charset="0"/>
               </a:rPr>
-              <a:t>Department of Physics</a:t>
-            </a:r>
-          </a:p>
-        </p:txBody>
-      </p:sp>
-      <p:sp>
-        <p:nvSpPr>
-          <p:cNvPr id="8" name="TextBox 7"/>
-          <p:cNvSpPr txBox="1"/>
-          <p:nvPr/>
-        </p:nvSpPr>
-        <p:spPr>
-          <a:xfrm>
-            <a:off x="1156848" y="3619247"/>
-            <a:ext cx="14339454" cy="16496824"/>
-          </a:xfrm>
-          <a:prstGeom prst="rect">
-            <a:avLst/>
-          </a:prstGeom>
-          <a:noFill/>
-        </p:spPr>
-        <p:txBody>
-          <a:bodyPr wrap="square" rtlCol="0">
-            <a:spAutoFit/>
-          </a:bodyPr>
-          <a:lstStyle/>
+              <a:t>Christopher Greene (Faculty Mentor: Dr. Chris Richardson)</a:t>
+            </a:r>
+          </a:p>
           <a:p>
             <a:pPr algn="ctr"/>
             <a:r>
-              <a:rPr lang="en-US" sz="4000" b="1" u="sng" dirty="0">
+              <a:rPr lang="en-US" sz="4400" b="1" dirty="0">
                 <a:solidFill>
                   <a:srgbClr val="73000A"/>
                 </a:solidFill>
                 <a:latin typeface="Arial" panose="020B0604020202020204" pitchFamily="34" charset="0"/>
                 <a:cs typeface="Arial" panose="020B0604020202020204" pitchFamily="34" charset="0"/>
               </a:rPr>
-              <a:t>Background</a:t>
-            </a:r>
-          </a:p>
-          <a:p>
-            <a:pPr marL="457200" indent="-457200">
-              <a:buFont typeface="Arial" panose="020B0604020202020204" pitchFamily="34" charset="0"/>
-              <a:buChar char="•"/>
-            </a:pPr>
-            <a:r>
-              <a:rPr lang="en-US" sz="2600" dirty="0">
-                <a:latin typeface="Arial" panose="020B0604020202020204" pitchFamily="34" charset="0"/>
-                <a:cs typeface="Arial" panose="020B0604020202020204" pitchFamily="34" charset="0"/>
-              </a:rPr>
-              <a:t>Active Galactic Nuclei (AGN) are galaxies with supermassive black holes in the centers of galaxies whose accretion disks and interactions with magnetic fields produce more light than all the stars in the galaxy combined. </a:t>
-            </a:r>
-          </a:p>
-          <a:p>
-            <a:pPr marL="457200" indent="-457200">
-              <a:buFont typeface="Arial" panose="020B0604020202020204" pitchFamily="34" charset="0"/>
-              <a:buChar char="•"/>
-            </a:pPr>
-            <a:r>
-              <a:rPr lang="en-US" sz="2600" dirty="0">
-                <a:latin typeface="Arial" panose="020B0604020202020204" pitchFamily="34" charset="0"/>
-                <a:cs typeface="Arial" panose="020B0604020202020204" pitchFamily="34" charset="0"/>
-              </a:rPr>
-              <a:t>Study of AGN allows us to understand more fully the processes involved in galaxy evolution. </a:t>
-            </a:r>
-          </a:p>
-          <a:p>
-            <a:pPr marL="457200" indent="-457200">
-              <a:buFont typeface="Arial" panose="020B0604020202020204" pitchFamily="34" charset="0"/>
-              <a:buChar char="•"/>
-            </a:pPr>
-            <a:r>
-              <a:rPr lang="en-US" sz="2600" dirty="0">
-                <a:latin typeface="Arial" panose="020B0604020202020204" pitchFamily="34" charset="0"/>
-                <a:cs typeface="Arial" panose="020B0604020202020204" pitchFamily="34" charset="0"/>
-              </a:rPr>
-              <a:t>Many researchers believe that some AGN are formed when two galaxies merge.</a:t>
-            </a:r>
-          </a:p>
-          <a:p>
-            <a:pPr marL="457200" indent="-457200">
-              <a:buFont typeface="Arial" panose="020B0604020202020204" pitchFamily="34" charset="0"/>
-              <a:buChar char="•"/>
-            </a:pPr>
-            <a:r>
-              <a:rPr lang="en-US" sz="2600" dirty="0">
-                <a:latin typeface="Arial" panose="020B0604020202020204" pitchFamily="34" charset="0"/>
-                <a:cs typeface="Arial" panose="020B0604020202020204" pitchFamily="34" charset="0"/>
-              </a:rPr>
-              <a:t>In about 4 billion years the Milky Way galaxy and the Andromeda galaxy will begin merging, studying AGN may tell us what will happen after the merger. </a:t>
-            </a:r>
-          </a:p>
-          <a:p>
-            <a:pPr marL="457200" indent="-457200">
-              <a:buFont typeface="Arial" panose="020B0604020202020204" pitchFamily="34" charset="0"/>
-              <a:buChar char="•"/>
-            </a:pPr>
-            <a:r>
-              <a:rPr lang="en-US" sz="2600" dirty="0">
-                <a:latin typeface="Arial" panose="020B0604020202020204" pitchFamily="34" charset="0"/>
-                <a:cs typeface="Arial" panose="020B0604020202020204" pitchFamily="34" charset="0"/>
-              </a:rPr>
-              <a:t>AGN are generally structured according to the width of the emission lines observed in each region.  </a:t>
-            </a:r>
-          </a:p>
-          <a:p>
-            <a:pPr marL="457200" indent="-457200">
-              <a:buFont typeface="Arial" panose="020B0604020202020204" pitchFamily="34" charset="0"/>
-              <a:buChar char="•"/>
-            </a:pPr>
-            <a:endParaRPr lang="en-US" sz="2600" dirty="0">
-              <a:latin typeface="Arial" panose="020B0604020202020204" pitchFamily="34" charset="0"/>
-              <a:cs typeface="Arial" panose="020B0604020202020204" pitchFamily="34" charset="0"/>
-            </a:endParaRPr>
-          </a:p>
-          <a:p>
-            <a:pPr marL="457200" indent="-457200">
-              <a:buFont typeface="Arial" panose="020B0604020202020204" pitchFamily="34" charset="0"/>
-              <a:buChar char="•"/>
-            </a:pPr>
-            <a:endParaRPr lang="en-US" sz="2600" dirty="0">
-              <a:latin typeface="Arial" panose="020B0604020202020204" pitchFamily="34" charset="0"/>
-              <a:cs typeface="Arial" panose="020B0604020202020204" pitchFamily="34" charset="0"/>
-            </a:endParaRPr>
-          </a:p>
-          <a:p>
-            <a:pPr marL="457200" indent="-457200">
-              <a:buFont typeface="Arial" panose="020B0604020202020204" pitchFamily="34" charset="0"/>
-              <a:buChar char="•"/>
-            </a:pPr>
-            <a:endParaRPr lang="en-US" sz="2600" dirty="0">
-              <a:latin typeface="Arial" panose="020B0604020202020204" pitchFamily="34" charset="0"/>
-              <a:cs typeface="Arial" panose="020B0604020202020204" pitchFamily="34" charset="0"/>
-            </a:endParaRPr>
-          </a:p>
-          <a:p>
-            <a:pPr marL="457200" indent="-457200">
-              <a:buFont typeface="Arial" panose="020B0604020202020204" pitchFamily="34" charset="0"/>
-              <a:buChar char="•"/>
-            </a:pPr>
-            <a:endParaRPr lang="en-US" sz="2600" dirty="0">
-              <a:latin typeface="Arial" panose="020B0604020202020204" pitchFamily="34" charset="0"/>
-              <a:cs typeface="Arial" panose="020B0604020202020204" pitchFamily="34" charset="0"/>
-            </a:endParaRPr>
-          </a:p>
-          <a:p>
-            <a:pPr marL="457200" indent="-457200">
-              <a:buFont typeface="Arial" panose="020B0604020202020204" pitchFamily="34" charset="0"/>
-              <a:buChar char="•"/>
-            </a:pPr>
-            <a:endParaRPr lang="en-US" sz="2600" dirty="0">
-              <a:latin typeface="Arial" panose="020B0604020202020204" pitchFamily="34" charset="0"/>
-              <a:cs typeface="Arial" panose="020B0604020202020204" pitchFamily="34" charset="0"/>
-            </a:endParaRPr>
-          </a:p>
-          <a:p>
-            <a:pPr marL="457200" indent="-457200">
-              <a:buFont typeface="Arial" panose="020B0604020202020204" pitchFamily="34" charset="0"/>
-              <a:buChar char="•"/>
-            </a:pPr>
-            <a:endParaRPr lang="en-US" sz="2600" dirty="0">
-              <a:latin typeface="Arial" panose="020B0604020202020204" pitchFamily="34" charset="0"/>
-              <a:cs typeface="Arial" panose="020B0604020202020204" pitchFamily="34" charset="0"/>
-            </a:endParaRPr>
-          </a:p>
-          <a:p>
-            <a:pPr marL="457200" indent="-457200">
-              <a:buFont typeface="Arial" panose="020B0604020202020204" pitchFamily="34" charset="0"/>
-              <a:buChar char="•"/>
-            </a:pPr>
-            <a:endParaRPr lang="en-US" sz="2600" dirty="0">
-              <a:latin typeface="Arial" panose="020B0604020202020204" pitchFamily="34" charset="0"/>
-              <a:cs typeface="Arial" panose="020B0604020202020204" pitchFamily="34" charset="0"/>
-            </a:endParaRPr>
-          </a:p>
-          <a:p>
-            <a:pPr marL="457200" indent="-457200">
-              <a:buFont typeface="Arial" panose="020B0604020202020204" pitchFamily="34" charset="0"/>
-              <a:buChar char="•"/>
-            </a:pPr>
-            <a:endParaRPr lang="en-US" sz="2600" dirty="0">
-              <a:latin typeface="Arial" panose="020B0604020202020204" pitchFamily="34" charset="0"/>
-              <a:cs typeface="Arial" panose="020B0604020202020204" pitchFamily="34" charset="0"/>
-            </a:endParaRPr>
-          </a:p>
-          <a:p>
-            <a:pPr marL="457200" indent="-457200">
-              <a:buFont typeface="Arial" panose="020B0604020202020204" pitchFamily="34" charset="0"/>
-              <a:buChar char="•"/>
-            </a:pPr>
-            <a:endParaRPr lang="en-US" sz="2600" dirty="0">
-              <a:latin typeface="Arial" panose="020B0604020202020204" pitchFamily="34" charset="0"/>
-              <a:cs typeface="Arial" panose="020B0604020202020204" pitchFamily="34" charset="0"/>
-            </a:endParaRPr>
-          </a:p>
-          <a:p>
-            <a:endParaRPr lang="en-US" sz="2600" dirty="0">
-              <a:latin typeface="Arial" panose="020B0604020202020204" pitchFamily="34" charset="0"/>
-              <a:cs typeface="Arial" panose="020B0604020202020204" pitchFamily="34" charset="0"/>
-            </a:endParaRPr>
-          </a:p>
-          <a:p>
-            <a:endParaRPr lang="en-US" sz="2600" dirty="0">
-              <a:latin typeface="Arial" panose="020B0604020202020204" pitchFamily="34" charset="0"/>
-              <a:cs typeface="Arial" panose="020B0604020202020204" pitchFamily="34" charset="0"/>
-            </a:endParaRPr>
-          </a:p>
-          <a:p>
-            <a:pPr marL="457200" indent="-457200">
-              <a:buFont typeface="Arial" panose="020B0604020202020204" pitchFamily="34" charset="0"/>
-              <a:buChar char="•"/>
-            </a:pPr>
-            <a:r>
-              <a:rPr lang="en-US" sz="2600" dirty="0">
-                <a:latin typeface="Arial" panose="020B0604020202020204" pitchFamily="34" charset="0"/>
-                <a:cs typeface="Arial" panose="020B0604020202020204" pitchFamily="34" charset="0"/>
-              </a:rPr>
-              <a:t>Lots of research on the Broad Line Region (BLR) (</a:t>
-            </a:r>
-            <a:r>
-              <a:rPr lang="en-US" sz="2600" dirty="0" err="1">
-                <a:latin typeface="Arial" panose="020B0604020202020204" pitchFamily="34" charset="0"/>
-                <a:cs typeface="Arial" panose="020B0604020202020204" pitchFamily="34" charset="0"/>
-              </a:rPr>
-              <a:t>Korista</a:t>
-            </a:r>
-            <a:r>
-              <a:rPr lang="en-US" sz="2600" dirty="0">
-                <a:latin typeface="Arial" panose="020B0604020202020204" pitchFamily="34" charset="0"/>
-                <a:cs typeface="Arial" panose="020B0604020202020204" pitchFamily="34" charset="0"/>
-              </a:rPr>
-              <a:t> et al. 1997), where there are broad emission lines, but not as much on the Narrow Line Region (NLR) (Richardson et al. 2014), where there are narrow emission lines. </a:t>
-            </a:r>
-          </a:p>
-          <a:p>
-            <a:pPr marL="457200" indent="-457200">
-              <a:buFont typeface="Arial" panose="020B0604020202020204" pitchFamily="34" charset="0"/>
-              <a:buChar char="•"/>
-            </a:pPr>
-            <a:r>
-              <a:rPr lang="en-US" sz="2600" dirty="0">
-                <a:latin typeface="Arial" panose="020B0604020202020204" pitchFamily="34" charset="0"/>
-                <a:cs typeface="Arial" panose="020B0604020202020204" pitchFamily="34" charset="0"/>
-              </a:rPr>
-              <a:t>Emission lines from the ionization of different elements used to learn about the AGN, through simulations with programs such as CLOUDY (</a:t>
-            </a:r>
-            <a:r>
-              <a:rPr lang="en-US" sz="2600" dirty="0" err="1">
-                <a:latin typeface="Arial" panose="020B0604020202020204" pitchFamily="34" charset="0"/>
-                <a:cs typeface="Arial" panose="020B0604020202020204" pitchFamily="34" charset="0"/>
-              </a:rPr>
-              <a:t>Ferland</a:t>
-            </a:r>
-            <a:r>
-              <a:rPr lang="en-US" sz="2600" dirty="0">
-                <a:latin typeface="Arial" panose="020B0604020202020204" pitchFamily="34" charset="0"/>
-                <a:cs typeface="Arial" panose="020B0604020202020204" pitchFamily="34" charset="0"/>
-              </a:rPr>
-              <a:t> et al. 2013) and MAPPINGSIII (Allen et al. 2008).</a:t>
-            </a:r>
-          </a:p>
-          <a:p>
-            <a:pPr marL="457200" indent="-457200">
-              <a:buFont typeface="Arial" panose="020B0604020202020204" pitchFamily="34" charset="0"/>
-              <a:buChar char="•"/>
-            </a:pPr>
-            <a:r>
-              <a:rPr lang="en-US" sz="2600" dirty="0">
-                <a:latin typeface="Arial" panose="020B0604020202020204" pitchFamily="34" charset="0"/>
-                <a:cs typeface="Arial" panose="020B0604020202020204" pitchFamily="34" charset="0"/>
-              </a:rPr>
-              <a:t>Models of the incident radiation curve from the AGN in CLOUDY are computed from using the spectral slope indices </a:t>
-            </a:r>
-            <a:r>
-              <a:rPr lang="el-GR" sz="2600" dirty="0">
-                <a:latin typeface="Arial" panose="020B0604020202020204" pitchFamily="34" charset="0"/>
-                <a:cs typeface="Arial" panose="020B0604020202020204" pitchFamily="34" charset="0"/>
-              </a:rPr>
-              <a:t>α</a:t>
-            </a:r>
-            <a:r>
-              <a:rPr lang="en-US" sz="2600" baseline="-25000" dirty="0">
-                <a:latin typeface="Arial" panose="020B0604020202020204" pitchFamily="34" charset="0"/>
-                <a:cs typeface="Arial" panose="020B0604020202020204" pitchFamily="34" charset="0"/>
-              </a:rPr>
-              <a:t>x</a:t>
-            </a:r>
-            <a:r>
-              <a:rPr lang="en-US" sz="2600" dirty="0">
-                <a:latin typeface="Arial" panose="020B0604020202020204" pitchFamily="34" charset="0"/>
-                <a:cs typeface="Arial" panose="020B0604020202020204" pitchFamily="34" charset="0"/>
-              </a:rPr>
-              <a:t>, corresponding to the X-ray spectrum (10</a:t>
-            </a:r>
-            <a:r>
-              <a:rPr lang="en-US" sz="2600" baseline="30000" dirty="0">
-                <a:latin typeface="Arial" panose="020B0604020202020204" pitchFamily="34" charset="0"/>
-                <a:cs typeface="Arial" panose="020B0604020202020204" pitchFamily="34" charset="0"/>
-              </a:rPr>
-              <a:t>2</a:t>
-            </a:r>
-            <a:r>
-              <a:rPr lang="en-US" sz="2600" dirty="0">
-                <a:latin typeface="Arial" panose="020B0604020202020204" pitchFamily="34" charset="0"/>
-                <a:cs typeface="Arial" panose="020B0604020202020204" pitchFamily="34" charset="0"/>
-              </a:rPr>
-              <a:t> eV- 10</a:t>
-            </a:r>
-            <a:r>
-              <a:rPr lang="en-US" sz="2600" baseline="30000" dirty="0">
-                <a:latin typeface="Arial" panose="020B0604020202020204" pitchFamily="34" charset="0"/>
-                <a:cs typeface="Arial" panose="020B0604020202020204" pitchFamily="34" charset="0"/>
-              </a:rPr>
-              <a:t>5</a:t>
-            </a:r>
-            <a:r>
-              <a:rPr lang="en-US" sz="2600" dirty="0">
-                <a:latin typeface="Arial" panose="020B0604020202020204" pitchFamily="34" charset="0"/>
-                <a:cs typeface="Arial" panose="020B0604020202020204" pitchFamily="34" charset="0"/>
-              </a:rPr>
-              <a:t> eV), </a:t>
-            </a:r>
-            <a:r>
-              <a:rPr lang="el-GR" sz="2600" dirty="0">
-                <a:latin typeface="Arial" panose="020B0604020202020204" pitchFamily="34" charset="0"/>
-                <a:cs typeface="Arial" panose="020B0604020202020204" pitchFamily="34" charset="0"/>
-              </a:rPr>
-              <a:t>α</a:t>
-            </a:r>
-            <a:r>
-              <a:rPr lang="en-US" sz="2600" baseline="-25000" dirty="0" err="1">
-                <a:latin typeface="Arial" panose="020B0604020202020204" pitchFamily="34" charset="0"/>
-                <a:cs typeface="Arial" panose="020B0604020202020204" pitchFamily="34" charset="0"/>
-              </a:rPr>
-              <a:t>uv</a:t>
-            </a:r>
-            <a:r>
-              <a:rPr lang="en-US" sz="2600" dirty="0">
-                <a:latin typeface="Arial" panose="020B0604020202020204" pitchFamily="34" charset="0"/>
-                <a:cs typeface="Arial" panose="020B0604020202020204" pitchFamily="34" charset="0"/>
-              </a:rPr>
-              <a:t> corresponding to the ultraviolet spectrum (10</a:t>
-            </a:r>
-            <a:r>
-              <a:rPr lang="en-US" sz="2600" baseline="30000" dirty="0">
-                <a:latin typeface="Arial" panose="020B0604020202020204" pitchFamily="34" charset="0"/>
-                <a:cs typeface="Arial" panose="020B0604020202020204" pitchFamily="34" charset="0"/>
-              </a:rPr>
-              <a:t>1</a:t>
-            </a:r>
-            <a:r>
-              <a:rPr lang="en-US" sz="2600" dirty="0">
-                <a:latin typeface="Arial" panose="020B0604020202020204" pitchFamily="34" charset="0"/>
-                <a:cs typeface="Arial" panose="020B0604020202020204" pitchFamily="34" charset="0"/>
-              </a:rPr>
-              <a:t> eV-10</a:t>
-            </a:r>
-            <a:r>
-              <a:rPr lang="en-US" sz="2600" baseline="30000" dirty="0">
-                <a:latin typeface="Arial" panose="020B0604020202020204" pitchFamily="34" charset="0"/>
-                <a:cs typeface="Arial" panose="020B0604020202020204" pitchFamily="34" charset="0"/>
-              </a:rPr>
-              <a:t>2</a:t>
-            </a:r>
-            <a:r>
-              <a:rPr lang="en-US" sz="2600" dirty="0">
-                <a:latin typeface="Arial" panose="020B0604020202020204" pitchFamily="34" charset="0"/>
-                <a:cs typeface="Arial" panose="020B0604020202020204" pitchFamily="34" charset="0"/>
-              </a:rPr>
-              <a:t> eV), and </a:t>
-            </a:r>
-            <a:r>
-              <a:rPr lang="el-GR" sz="2600" dirty="0">
-                <a:latin typeface="Arial" panose="020B0604020202020204" pitchFamily="34" charset="0"/>
-                <a:cs typeface="Arial" panose="020B0604020202020204" pitchFamily="34" charset="0"/>
-              </a:rPr>
-              <a:t>α</a:t>
-            </a:r>
-            <a:r>
-              <a:rPr lang="en-US" sz="2600" baseline="-25000" dirty="0">
-                <a:latin typeface="Arial" panose="020B0604020202020204" pitchFamily="34" charset="0"/>
-                <a:cs typeface="Arial" panose="020B0604020202020204" pitchFamily="34" charset="0"/>
-              </a:rPr>
-              <a:t>ox</a:t>
-            </a:r>
-            <a:r>
-              <a:rPr lang="en-US" sz="2600" dirty="0">
-                <a:latin typeface="Arial" panose="020B0604020202020204" pitchFamily="34" charset="0"/>
-                <a:cs typeface="Arial" panose="020B0604020202020204" pitchFamily="34" charset="0"/>
-              </a:rPr>
-              <a:t> is the ratio of x-rays to optical light.</a:t>
-            </a:r>
-          </a:p>
-          <a:p>
-            <a:pPr marL="457200" indent="-457200">
-              <a:buFont typeface="Arial" panose="020B0604020202020204" pitchFamily="34" charset="0"/>
-              <a:buChar char="•"/>
-            </a:pPr>
-            <a:r>
-              <a:rPr lang="en-US" sz="2600" dirty="0" err="1">
-                <a:latin typeface="Arial" panose="020B0604020202020204" pitchFamily="34" charset="0"/>
-                <a:cs typeface="Arial" panose="020B0604020202020204" pitchFamily="34" charset="0"/>
-              </a:rPr>
-              <a:t>Grupe</a:t>
-            </a:r>
-            <a:r>
-              <a:rPr lang="en-US" sz="2600" dirty="0">
-                <a:latin typeface="Arial" panose="020B0604020202020204" pitchFamily="34" charset="0"/>
-                <a:cs typeface="Arial" panose="020B0604020202020204" pitchFamily="34" charset="0"/>
-              </a:rPr>
-              <a:t> et al. 2010 found a correlation between </a:t>
-            </a:r>
-            <a:r>
-              <a:rPr lang="el-GR" sz="2600" dirty="0">
-                <a:latin typeface="Arial" panose="020B0604020202020204" pitchFamily="34" charset="0"/>
-                <a:cs typeface="Arial" panose="020B0604020202020204" pitchFamily="34" charset="0"/>
-              </a:rPr>
-              <a:t>α</a:t>
-            </a:r>
-            <a:r>
-              <a:rPr lang="en-US" sz="2600" baseline="-25000" dirty="0">
-                <a:latin typeface="Arial" panose="020B0604020202020204" pitchFamily="34" charset="0"/>
-                <a:cs typeface="Arial" panose="020B0604020202020204" pitchFamily="34" charset="0"/>
-              </a:rPr>
-              <a:t>x</a:t>
-            </a:r>
-            <a:r>
-              <a:rPr lang="en-US" sz="2600" dirty="0">
-                <a:latin typeface="Arial" panose="020B0604020202020204" pitchFamily="34" charset="0"/>
-                <a:cs typeface="Arial" panose="020B0604020202020204" pitchFamily="34" charset="0"/>
-              </a:rPr>
-              <a:t> and </a:t>
-            </a:r>
-            <a:r>
-              <a:rPr lang="el-GR" sz="2600" dirty="0">
-                <a:latin typeface="Arial" panose="020B0604020202020204" pitchFamily="34" charset="0"/>
-                <a:cs typeface="Arial" panose="020B0604020202020204" pitchFamily="34" charset="0"/>
-              </a:rPr>
-              <a:t>α</a:t>
-            </a:r>
-            <a:r>
-              <a:rPr lang="en-US" sz="2600" baseline="-25000" dirty="0" err="1">
-                <a:latin typeface="Arial" panose="020B0604020202020204" pitchFamily="34" charset="0"/>
-                <a:cs typeface="Arial" panose="020B0604020202020204" pitchFamily="34" charset="0"/>
-              </a:rPr>
-              <a:t>uv</a:t>
-            </a:r>
-            <a:r>
-              <a:rPr lang="en-US" sz="2600" dirty="0">
-                <a:latin typeface="Arial" panose="020B0604020202020204" pitchFamily="34" charset="0"/>
-                <a:cs typeface="Arial" panose="020B0604020202020204" pitchFamily="34" charset="0"/>
-              </a:rPr>
-              <a:t> and between </a:t>
-            </a:r>
-            <a:r>
-              <a:rPr lang="el-GR" sz="2600" dirty="0">
-                <a:latin typeface="Arial" panose="020B0604020202020204" pitchFamily="34" charset="0"/>
-                <a:cs typeface="Arial" panose="020B0604020202020204" pitchFamily="34" charset="0"/>
-              </a:rPr>
-              <a:t>α</a:t>
-            </a:r>
-            <a:r>
-              <a:rPr lang="en-US" sz="2600" baseline="-25000" dirty="0">
-                <a:latin typeface="Arial" panose="020B0604020202020204" pitchFamily="34" charset="0"/>
-                <a:cs typeface="Arial" panose="020B0604020202020204" pitchFamily="34" charset="0"/>
-              </a:rPr>
-              <a:t>x</a:t>
-            </a:r>
-            <a:r>
-              <a:rPr lang="en-US" sz="2600" dirty="0">
-                <a:latin typeface="Arial" panose="020B0604020202020204" pitchFamily="34" charset="0"/>
-                <a:cs typeface="Arial" panose="020B0604020202020204" pitchFamily="34" charset="0"/>
-              </a:rPr>
-              <a:t> and </a:t>
-            </a:r>
-            <a:r>
-              <a:rPr lang="el-GR" sz="2600" dirty="0">
-                <a:latin typeface="Arial" panose="020B0604020202020204" pitchFamily="34" charset="0"/>
-                <a:cs typeface="Arial" panose="020B0604020202020204" pitchFamily="34" charset="0"/>
-              </a:rPr>
-              <a:t>α</a:t>
-            </a:r>
-            <a:r>
-              <a:rPr lang="en-US" sz="2600" baseline="-25000" dirty="0">
-                <a:latin typeface="Arial" panose="020B0604020202020204" pitchFamily="34" charset="0"/>
-                <a:cs typeface="Arial" panose="020B0604020202020204" pitchFamily="34" charset="0"/>
-              </a:rPr>
-              <a:t>ox</a:t>
-            </a:r>
-            <a:r>
-              <a:rPr lang="en-US" sz="2600" baseline="30000" dirty="0">
-                <a:latin typeface="Arial" panose="020B0604020202020204" pitchFamily="34" charset="0"/>
-                <a:cs typeface="Arial" panose="020B0604020202020204" pitchFamily="34" charset="0"/>
-              </a:rPr>
-              <a:t>.</a:t>
-            </a:r>
-            <a:r>
-              <a:rPr lang="en-US" sz="2600" dirty="0">
-                <a:latin typeface="Arial" panose="020B0604020202020204" pitchFamily="34" charset="0"/>
-                <a:cs typeface="Arial" panose="020B0604020202020204" pitchFamily="34" charset="0"/>
-              </a:rPr>
-              <a:t> </a:t>
-            </a:r>
-          </a:p>
-          <a:p>
-            <a:pPr marL="457200" indent="-457200">
-              <a:buFont typeface="Arial" panose="020B0604020202020204" pitchFamily="34" charset="0"/>
-              <a:buChar char="•"/>
-            </a:pPr>
-            <a:r>
-              <a:rPr lang="en-US" sz="2600" dirty="0">
-                <a:latin typeface="Arial" panose="020B0604020202020204" pitchFamily="34" charset="0"/>
-                <a:cs typeface="Arial" panose="020B0604020202020204" pitchFamily="34" charset="0"/>
-              </a:rPr>
-              <a:t>This leads to the question:</a:t>
-            </a:r>
-          </a:p>
-          <a:p>
-            <a:pPr lvl="1"/>
-            <a:r>
-              <a:rPr lang="en-US" sz="3200" b="1" dirty="0">
-                <a:latin typeface="Arial" panose="020B0604020202020204" pitchFamily="34" charset="0"/>
-                <a:cs typeface="Arial" panose="020B0604020202020204" pitchFamily="34" charset="0"/>
-              </a:rPr>
-              <a:t>How does constraining the spectral indices with regression models of past data affect simulations of Emission Lines of the Narrow Line Region of an Active Galactic Nuclei?</a:t>
-            </a:r>
-          </a:p>
-          <a:p>
-            <a:pPr marL="342900" indent="-342900">
-              <a:buFont typeface="Arial" panose="020B0604020202020204" pitchFamily="34" charset="0"/>
-              <a:buChar char="•"/>
-            </a:pPr>
-            <a:endParaRPr lang="en-US" sz="2400" dirty="0">
-              <a:latin typeface="Arial" panose="020B0604020202020204" pitchFamily="34" charset="0"/>
-              <a:cs typeface="Arial" panose="020B0604020202020204" pitchFamily="34" charset="0"/>
-            </a:endParaRPr>
-          </a:p>
-          <a:p>
-            <a:pPr marL="342900" indent="-342900">
-              <a:buFont typeface="Arial" panose="020B0604020202020204" pitchFamily="34" charset="0"/>
-              <a:buChar char="•"/>
-            </a:pPr>
-            <a:endParaRPr lang="en-US" sz="2400" dirty="0">
-              <a:latin typeface="Arial" panose="020B0604020202020204" pitchFamily="34" charset="0"/>
-              <a:cs typeface="Arial" panose="020B0604020202020204" pitchFamily="34" charset="0"/>
-            </a:endParaRPr>
-          </a:p>
-          <a:p>
-            <a:pPr marL="342900" indent="-342900">
-              <a:buFont typeface="Arial" panose="020B0604020202020204" pitchFamily="34" charset="0"/>
-              <a:buChar char="•"/>
-            </a:pPr>
-            <a:endParaRPr lang="en-US" sz="2400" dirty="0">
-              <a:latin typeface="Arial" panose="020B0604020202020204" pitchFamily="34" charset="0"/>
-              <a:cs typeface="Arial" panose="020B0604020202020204" pitchFamily="34" charset="0"/>
-            </a:endParaRPr>
+              <a:t>Department of Physics</a:t>
+            </a:r>
           </a:p>
         </p:txBody>
       </p:sp>
@@ -3860,7 +3327,7 @@
         <p:spPr>
           <a:xfrm>
             <a:off x="16295068" y="2383679"/>
-            <a:ext cx="14091807" cy="33639978"/>
+            <a:ext cx="14091807" cy="16804600"/>
           </a:xfrm>
           <a:prstGeom prst="rect">
             <a:avLst/>
@@ -3873,255 +3340,64 @@
           </a:bodyPr>
           <a:lstStyle/>
           <a:p>
-            <a:pPr algn="ctr"/>
-            <a:endParaRPr lang="en-US" sz="4000" b="1" u="sng" dirty="0">
-              <a:solidFill>
-                <a:srgbClr val="73000A"/>
-              </a:solidFill>
-              <a:latin typeface="Arial" panose="020B0604020202020204" pitchFamily="34" charset="0"/>
-              <a:cs typeface="Arial" panose="020B0604020202020204" pitchFamily="34" charset="0"/>
-            </a:endParaRPr>
-          </a:p>
-          <a:p>
-            <a:pPr algn="ctr"/>
-            <a:r>
-              <a:rPr lang="en-US" sz="4000" b="1" u="sng" dirty="0">
-                <a:solidFill>
-                  <a:srgbClr val="73000A"/>
-                </a:solidFill>
-                <a:latin typeface="Arial" panose="020B0604020202020204" pitchFamily="34" charset="0"/>
-                <a:cs typeface="Arial" panose="020B0604020202020204" pitchFamily="34" charset="0"/>
-              </a:rPr>
-              <a:t>Results</a:t>
-            </a:r>
-          </a:p>
-          <a:p>
             <a:pPr marL="571500" indent="-571500">
               <a:buFont typeface="Arial" panose="020B0604020202020204" pitchFamily="34" charset="0"/>
               <a:buChar char="•"/>
             </a:pPr>
-            <a:r>
-              <a:rPr lang="en-US" sz="2600" dirty="0">
-                <a:latin typeface="Arial" panose="020B0604020202020204" pitchFamily="34" charset="0"/>
-                <a:cs typeface="Arial" panose="020B0604020202020204" pitchFamily="34" charset="0"/>
-              </a:rPr>
-              <a:t>We examine emission line ratios as they allow us to constrain the SED and study the effects of AGN density, elemental abundances, excitation mechanism, and ionization parameter. </a:t>
-            </a:r>
+            <a:endParaRPr lang="en-US" sz="2600" dirty="0">
+              <a:latin typeface="Arial" panose="020B0604020202020204" pitchFamily="34" charset="0"/>
+              <a:cs typeface="Arial" panose="020B0604020202020204" pitchFamily="34" charset="0"/>
+            </a:endParaRPr>
           </a:p>
           <a:p>
             <a:pPr marL="571500" indent="-571500">
               <a:buFont typeface="Arial" panose="020B0604020202020204" pitchFamily="34" charset="0"/>
               <a:buChar char="•"/>
             </a:pPr>
-            <a:r>
-              <a:rPr lang="en-US" sz="2600" dirty="0">
-                <a:latin typeface="Arial" panose="020B0604020202020204" pitchFamily="34" charset="0"/>
-                <a:cs typeface="Arial" panose="020B0604020202020204" pitchFamily="34" charset="0"/>
-              </a:rPr>
-              <a:t>The first plot is known as the Baldwin-Phillip-</a:t>
-            </a:r>
-            <a:r>
-              <a:rPr lang="en-US" sz="2600" dirty="0" err="1">
-                <a:latin typeface="Arial" panose="020B0604020202020204" pitchFamily="34" charset="0"/>
-                <a:cs typeface="Arial" panose="020B0604020202020204" pitchFamily="34" charset="0"/>
-              </a:rPr>
-              <a:t>Terlevich</a:t>
-            </a:r>
-            <a:r>
-              <a:rPr lang="en-US" sz="2600" dirty="0">
-                <a:latin typeface="Arial" panose="020B0604020202020204" pitchFamily="34" charset="0"/>
-                <a:cs typeface="Arial" panose="020B0604020202020204" pitchFamily="34" charset="0"/>
-              </a:rPr>
-              <a:t> (BPT) diagram. </a:t>
-            </a:r>
+            <a:endParaRPr lang="en-US" sz="2600" dirty="0">
+              <a:latin typeface="Arial" panose="020B0604020202020204" pitchFamily="34" charset="0"/>
+              <a:cs typeface="Arial" panose="020B0604020202020204" pitchFamily="34" charset="0"/>
+            </a:endParaRPr>
           </a:p>
           <a:p>
             <a:pPr marL="571500" indent="-571500">
               <a:buFont typeface="Arial" panose="020B0604020202020204" pitchFamily="34" charset="0"/>
               <a:buChar char="•"/>
             </a:pPr>
-            <a:r>
-              <a:rPr lang="en-US" sz="2600" dirty="0">
-                <a:latin typeface="Arial" panose="020B0604020202020204" pitchFamily="34" charset="0"/>
-                <a:cs typeface="Arial" panose="020B0604020202020204" pitchFamily="34" charset="0"/>
-              </a:rPr>
-              <a:t>The top three plots were introduced in </a:t>
-            </a:r>
-            <a:r>
-              <a:rPr lang="en-US" sz="2600" dirty="0" err="1">
-                <a:latin typeface="Arial" panose="020B0604020202020204" pitchFamily="34" charset="0"/>
-                <a:cs typeface="Arial" panose="020B0604020202020204" pitchFamily="34" charset="0"/>
-              </a:rPr>
-              <a:t>Osterbrock</a:t>
-            </a:r>
-            <a:r>
-              <a:rPr lang="en-US" sz="2600" dirty="0">
-                <a:latin typeface="Arial" panose="020B0604020202020204" pitchFamily="34" charset="0"/>
-                <a:cs typeface="Arial" panose="020B0604020202020204" pitchFamily="34" charset="0"/>
-              </a:rPr>
-              <a:t> &amp; </a:t>
-            </a:r>
-            <a:r>
-              <a:rPr lang="en-US" sz="2600" dirty="0" err="1">
-                <a:latin typeface="Arial" panose="020B0604020202020204" pitchFamily="34" charset="0"/>
-                <a:cs typeface="Arial" panose="020B0604020202020204" pitchFamily="34" charset="0"/>
-              </a:rPr>
-              <a:t>Veilleux</a:t>
-            </a:r>
-            <a:r>
-              <a:rPr lang="en-US" sz="2600" dirty="0">
-                <a:latin typeface="Arial" panose="020B0604020202020204" pitchFamily="34" charset="0"/>
-                <a:cs typeface="Arial" panose="020B0604020202020204" pitchFamily="34" charset="0"/>
-              </a:rPr>
-              <a:t> 1983 to categorize galaxies by atomic excitation mechanism which are empirically derived. </a:t>
-            </a:r>
-          </a:p>
-          <a:p>
-            <a:pPr marL="1028700" lvl="1" indent="-571500">
-              <a:buFont typeface="Arial" panose="020B0604020202020204" pitchFamily="34" charset="0"/>
-              <a:buChar char="•"/>
-            </a:pPr>
-            <a:r>
-              <a:rPr lang="en-US" sz="2600" dirty="0">
-                <a:latin typeface="Arial" panose="020B0604020202020204" pitchFamily="34" charset="0"/>
-                <a:cs typeface="Arial" panose="020B0604020202020204" pitchFamily="34" charset="0"/>
-              </a:rPr>
-              <a:t>Bottom three plots come from </a:t>
-            </a:r>
-            <a:r>
-              <a:rPr lang="en-US" sz="2600" dirty="0" err="1">
-                <a:latin typeface="Arial" panose="020B0604020202020204" pitchFamily="34" charset="0"/>
-                <a:cs typeface="Arial" panose="020B0604020202020204" pitchFamily="34" charset="0"/>
-              </a:rPr>
-              <a:t>Lamareille</a:t>
-            </a:r>
-            <a:r>
-              <a:rPr lang="en-US" sz="2600" dirty="0">
-                <a:latin typeface="Arial" panose="020B0604020202020204" pitchFamily="34" charset="0"/>
-                <a:cs typeface="Arial" panose="020B0604020202020204" pitchFamily="34" charset="0"/>
-              </a:rPr>
-              <a:t> 2010, </a:t>
-            </a:r>
-            <a:r>
-              <a:rPr lang="en-US" sz="2600" dirty="0" err="1">
-                <a:latin typeface="Arial" panose="020B0604020202020204" pitchFamily="34" charset="0"/>
-                <a:cs typeface="Arial" panose="020B0604020202020204" pitchFamily="34" charset="0"/>
-              </a:rPr>
-              <a:t>Shirazi</a:t>
-            </a:r>
-            <a:r>
-              <a:rPr lang="en-US" sz="2600" dirty="0">
-                <a:latin typeface="Arial" panose="020B0604020202020204" pitchFamily="34" charset="0"/>
-                <a:cs typeface="Arial" panose="020B0604020202020204" pitchFamily="34" charset="0"/>
-              </a:rPr>
-              <a:t> et al. 2012, and </a:t>
-            </a:r>
-            <a:r>
-              <a:rPr lang="en-US" sz="2600" dirty="0" err="1">
-                <a:latin typeface="Arial" panose="020B0604020202020204" pitchFamily="34" charset="0"/>
-                <a:cs typeface="Arial" panose="020B0604020202020204" pitchFamily="34" charset="0"/>
-              </a:rPr>
-              <a:t>Kewley</a:t>
-            </a:r>
-            <a:r>
-              <a:rPr lang="en-US" sz="2600" dirty="0">
-                <a:latin typeface="Arial" panose="020B0604020202020204" pitchFamily="34" charset="0"/>
-                <a:cs typeface="Arial" panose="020B0604020202020204" pitchFamily="34" charset="0"/>
-              </a:rPr>
-              <a:t> et al. 2006 respectively. </a:t>
-            </a:r>
+            <a:endParaRPr lang="en-US" sz="2600" dirty="0">
+              <a:latin typeface="Arial" panose="020B0604020202020204" pitchFamily="34" charset="0"/>
+              <a:cs typeface="Arial" panose="020B0604020202020204" pitchFamily="34" charset="0"/>
+            </a:endParaRPr>
           </a:p>
           <a:p>
             <a:pPr marL="571500" indent="-571500">
               <a:buFont typeface="Arial" panose="020B0604020202020204" pitchFamily="34" charset="0"/>
               <a:buChar char="•"/>
             </a:pPr>
-            <a:r>
-              <a:rPr lang="en-US" sz="2600" dirty="0">
-                <a:latin typeface="Arial" panose="020B0604020202020204" pitchFamily="34" charset="0"/>
-                <a:cs typeface="Arial" panose="020B0604020202020204" pitchFamily="34" charset="0"/>
-              </a:rPr>
-              <a:t>The black lines act as boundaries between the type of galaxy.  </a:t>
-            </a:r>
-          </a:p>
-          <a:p>
-            <a:pPr marL="1028700" lvl="1" indent="-571500">
-              <a:buFont typeface="Arial" panose="020B0604020202020204" pitchFamily="34" charset="0"/>
-              <a:buChar char="•"/>
-            </a:pPr>
-            <a:r>
-              <a:rPr lang="en-US" sz="2600" dirty="0">
-                <a:latin typeface="Arial" panose="020B0604020202020204" pitchFamily="34" charset="0"/>
-                <a:cs typeface="Arial" panose="020B0604020202020204" pitchFamily="34" charset="0"/>
-              </a:rPr>
-              <a:t>Star-Forming/Starburst galaxies are galaxies with high rates of star formation. </a:t>
-            </a:r>
-          </a:p>
-          <a:p>
-            <a:pPr marL="1028700" lvl="1" indent="-571500">
-              <a:buFont typeface="Arial" panose="020B0604020202020204" pitchFamily="34" charset="0"/>
-              <a:buChar char="•"/>
-            </a:pPr>
-            <a:r>
-              <a:rPr lang="en-US" sz="2600" dirty="0">
-                <a:latin typeface="Arial" panose="020B0604020202020204" pitchFamily="34" charset="0"/>
-                <a:cs typeface="Arial" panose="020B0604020202020204" pitchFamily="34" charset="0"/>
-              </a:rPr>
-              <a:t>Composite galaxies exhibit characteristics of both active galaxies and star-forming galaxies. </a:t>
-            </a:r>
-          </a:p>
-          <a:p>
-            <a:pPr marL="1028700" lvl="1" indent="-571500">
-              <a:buFont typeface="Arial" panose="020B0604020202020204" pitchFamily="34" charset="0"/>
-              <a:buChar char="•"/>
-            </a:pPr>
-            <a:r>
-              <a:rPr lang="en-US" sz="2600" dirty="0">
-                <a:latin typeface="Arial" panose="020B0604020202020204" pitchFamily="34" charset="0"/>
-                <a:cs typeface="Arial" panose="020B0604020202020204" pitchFamily="34" charset="0"/>
-              </a:rPr>
-              <a:t>Low Ionization Nuclear Emission Region (LINER) galaxies are characterized by emission lines of weakly ionized or neutral atoms.  </a:t>
-            </a:r>
+            <a:endParaRPr lang="en-US" sz="2600" dirty="0">
+              <a:latin typeface="Arial" panose="020B0604020202020204" pitchFamily="34" charset="0"/>
+              <a:cs typeface="Arial" panose="020B0604020202020204" pitchFamily="34" charset="0"/>
+            </a:endParaRPr>
           </a:p>
           <a:p>
             <a:pPr marL="571500" indent="-571500">
               <a:buFont typeface="Arial" panose="020B0604020202020204" pitchFamily="34" charset="0"/>
               <a:buChar char="•"/>
             </a:pPr>
-            <a:r>
-              <a:rPr lang="en-US" sz="2600" dirty="0">
-                <a:latin typeface="Arial" panose="020B0604020202020204" pitchFamily="34" charset="0"/>
-                <a:cs typeface="Arial" panose="020B0604020202020204" pitchFamily="34" charset="0"/>
-              </a:rPr>
-              <a:t>Red indicates that the galaxy is a </a:t>
-            </a:r>
-            <a:r>
-              <a:rPr lang="en-US" sz="2600" dirty="0" err="1">
-                <a:latin typeface="Arial" panose="020B0604020202020204" pitchFamily="34" charset="0"/>
-                <a:cs typeface="Arial" panose="020B0604020202020204" pitchFamily="34" charset="0"/>
-              </a:rPr>
-              <a:t>Seyfert</a:t>
-            </a:r>
-            <a:r>
-              <a:rPr lang="en-US" sz="2600" dirty="0">
-                <a:latin typeface="Arial" panose="020B0604020202020204" pitchFamily="34" charset="0"/>
-                <a:cs typeface="Arial" panose="020B0604020202020204" pitchFamily="34" charset="0"/>
-              </a:rPr>
-              <a:t>, while blue indicates star-forming galaxies, composite galaxies, and LINERS.  </a:t>
-            </a:r>
+            <a:endParaRPr lang="en-US" sz="2600" dirty="0">
+              <a:latin typeface="Arial" panose="020B0604020202020204" pitchFamily="34" charset="0"/>
+              <a:cs typeface="Arial" panose="020B0604020202020204" pitchFamily="34" charset="0"/>
+            </a:endParaRPr>
           </a:p>
           <a:p>
             <a:pPr marL="571500" indent="-571500">
               <a:buFont typeface="Arial" panose="020B0604020202020204" pitchFamily="34" charset="0"/>
               <a:buChar char="•"/>
             </a:pPr>
-            <a:r>
-              <a:rPr lang="en-US" sz="2600" dirty="0">
-                <a:latin typeface="Arial" panose="020B0604020202020204" pitchFamily="34" charset="0"/>
-                <a:cs typeface="Arial" panose="020B0604020202020204" pitchFamily="34" charset="0"/>
-              </a:rPr>
-              <a:t>Galaxies are separated based on the equations that set the boundary lines. </a:t>
-            </a:r>
+            <a:endParaRPr lang="en-US" sz="2600" dirty="0">
+              <a:latin typeface="Arial" panose="020B0604020202020204" pitchFamily="34" charset="0"/>
+              <a:cs typeface="Arial" panose="020B0604020202020204" pitchFamily="34" charset="0"/>
+            </a:endParaRPr>
           </a:p>
           <a:p>
             <a:pPr marL="571500" indent="-571500">
@@ -4204,11 +3480,185 @@
             </a:endParaRPr>
           </a:p>
           <a:p>
+            <a:endParaRPr lang="en-US" sz="2600" dirty="0">
+              <a:latin typeface="Arial" panose="020B0604020202020204" pitchFamily="34" charset="0"/>
+              <a:cs typeface="Arial" panose="020B0604020202020204" pitchFamily="34" charset="0"/>
+            </a:endParaRPr>
+          </a:p>
+          <a:p>
+            <a:pPr marL="457200" indent="-457200">
+              <a:buFont typeface="Arial" panose="020B0604020202020204" pitchFamily="34" charset="0"/>
+              <a:buChar char="•"/>
+            </a:pPr>
+            <a:endParaRPr lang="en-US" sz="2600" dirty="0">
+              <a:latin typeface="Arial" panose="020B0604020202020204" pitchFamily="34" charset="0"/>
+              <a:cs typeface="Arial" panose="020B0604020202020204" pitchFamily="34" charset="0"/>
+            </a:endParaRPr>
+          </a:p>
+          <a:p>
+            <a:pPr marL="457200" indent="-457200">
+              <a:buFont typeface="Arial" panose="020B0604020202020204" pitchFamily="34" charset="0"/>
+              <a:buChar char="•"/>
+            </a:pPr>
+            <a:endParaRPr lang="en-US" sz="2600" dirty="0">
+              <a:latin typeface="Arial" panose="020B0604020202020204" pitchFamily="34" charset="0"/>
+              <a:cs typeface="Arial" panose="020B0604020202020204" pitchFamily="34" charset="0"/>
+            </a:endParaRPr>
+          </a:p>
+          <a:p>
+            <a:pPr marL="457200" indent="-457200">
+              <a:buFont typeface="Arial" panose="020B0604020202020204" pitchFamily="34" charset="0"/>
+              <a:buChar char="•"/>
+            </a:pPr>
+            <a:endParaRPr lang="en-US" sz="2800" dirty="0">
+              <a:latin typeface="Arial" panose="020B0604020202020204" pitchFamily="34" charset="0"/>
+              <a:cs typeface="Arial" panose="020B0604020202020204" pitchFamily="34" charset="0"/>
+            </a:endParaRPr>
+          </a:p>
+          <a:p>
+            <a:pPr marL="914400" lvl="1" indent="-457200">
+              <a:buFont typeface="Arial" panose="020B0604020202020204" pitchFamily="34" charset="0"/>
+              <a:buChar char="•"/>
+            </a:pPr>
+            <a:endParaRPr lang="en-US" sz="2800" dirty="0">
+              <a:latin typeface="Arial" panose="020B0604020202020204" pitchFamily="34" charset="0"/>
+              <a:cs typeface="Arial" panose="020B0604020202020204" pitchFamily="34" charset="0"/>
+            </a:endParaRPr>
+          </a:p>
+          <a:p>
+            <a:pPr marL="914400" lvl="1" indent="-457200">
+              <a:buFont typeface="Arial" panose="020B0604020202020204" pitchFamily="34" charset="0"/>
+              <a:buChar char="•"/>
+            </a:pPr>
+            <a:endParaRPr lang="en-US" sz="2800" dirty="0">
+              <a:latin typeface="Arial" panose="020B0604020202020204" pitchFamily="34" charset="0"/>
+              <a:cs typeface="Arial" panose="020B0604020202020204" pitchFamily="34" charset="0"/>
+            </a:endParaRPr>
+          </a:p>
+          <a:p>
+            <a:pPr marL="914400" lvl="1" indent="-457200">
+              <a:buFont typeface="Arial" panose="020B0604020202020204" pitchFamily="34" charset="0"/>
+              <a:buChar char="•"/>
+            </a:pPr>
+            <a:endParaRPr lang="en-US" sz="2800" dirty="0">
+              <a:latin typeface="Arial" panose="020B0604020202020204" pitchFamily="34" charset="0"/>
+              <a:cs typeface="Arial" panose="020B0604020202020204" pitchFamily="34" charset="0"/>
+            </a:endParaRPr>
+          </a:p>
+          <a:p>
+            <a:pPr marL="914400" lvl="1" indent="-457200">
+              <a:buFont typeface="Arial" panose="020B0604020202020204" pitchFamily="34" charset="0"/>
+              <a:buChar char="•"/>
+            </a:pPr>
+            <a:endParaRPr lang="en-US" sz="2800" dirty="0">
+              <a:latin typeface="Arial" panose="020B0604020202020204" pitchFamily="34" charset="0"/>
+              <a:cs typeface="Arial" panose="020B0604020202020204" pitchFamily="34" charset="0"/>
+            </a:endParaRPr>
+          </a:p>
+          <a:p>
+            <a:pPr marL="914400" lvl="1" indent="-457200">
+              <a:buFont typeface="Arial" panose="020B0604020202020204" pitchFamily="34" charset="0"/>
+              <a:buChar char="•"/>
+            </a:pPr>
+            <a:endParaRPr lang="en-US" sz="2800" dirty="0">
+              <a:latin typeface="Arial" panose="020B0604020202020204" pitchFamily="34" charset="0"/>
+              <a:cs typeface="Arial" panose="020B0604020202020204" pitchFamily="34" charset="0"/>
+            </a:endParaRPr>
+          </a:p>
+          <a:p>
+            <a:pPr marL="914400" lvl="1" indent="-457200">
+              <a:buFont typeface="Arial" panose="020B0604020202020204" pitchFamily="34" charset="0"/>
+              <a:buChar char="•"/>
+            </a:pPr>
+            <a:endParaRPr lang="en-US" sz="2800" dirty="0">
+              <a:latin typeface="Arial" panose="020B0604020202020204" pitchFamily="34" charset="0"/>
+              <a:cs typeface="Arial" panose="020B0604020202020204" pitchFamily="34" charset="0"/>
+            </a:endParaRPr>
+          </a:p>
+          <a:p>
+            <a:pPr marL="914400" lvl="1" indent="-457200">
+              <a:buFont typeface="Arial" panose="020B0604020202020204" pitchFamily="34" charset="0"/>
+              <a:buChar char="•"/>
+            </a:pPr>
+            <a:endParaRPr lang="en-US" sz="2800" dirty="0">
+              <a:latin typeface="Arial" panose="020B0604020202020204" pitchFamily="34" charset="0"/>
+              <a:cs typeface="Arial" panose="020B0604020202020204" pitchFamily="34" charset="0"/>
+            </a:endParaRPr>
+          </a:p>
+          <a:p>
+            <a:pPr marL="914400" lvl="1" indent="-457200">
+              <a:buFont typeface="Arial" panose="020B0604020202020204" pitchFamily="34" charset="0"/>
+              <a:buChar char="•"/>
+            </a:pPr>
+            <a:endParaRPr lang="en-US" sz="2800" dirty="0">
+              <a:latin typeface="Arial" panose="020B0604020202020204" pitchFamily="34" charset="0"/>
+              <a:cs typeface="Arial" panose="020B0604020202020204" pitchFamily="34" charset="0"/>
+            </a:endParaRPr>
+          </a:p>
+          <a:p>
+            <a:pPr marL="914400" lvl="1" indent="-457200">
+              <a:buFont typeface="Arial" panose="020B0604020202020204" pitchFamily="34" charset="0"/>
+              <a:buChar char="•"/>
+            </a:pPr>
+            <a:endParaRPr lang="en-US" sz="2800" dirty="0">
+              <a:latin typeface="Arial" panose="020B0604020202020204" pitchFamily="34" charset="0"/>
+              <a:cs typeface="Arial" panose="020B0604020202020204" pitchFamily="34" charset="0"/>
+            </a:endParaRPr>
+          </a:p>
+          <a:p>
+            <a:pPr marL="914400" lvl="1" indent="-457200">
+              <a:buFont typeface="Arial" panose="020B0604020202020204" pitchFamily="34" charset="0"/>
+              <a:buChar char="•"/>
+            </a:pPr>
+            <a:endParaRPr lang="en-US" sz="2800" dirty="0">
+              <a:latin typeface="Arial" panose="020B0604020202020204" pitchFamily="34" charset="0"/>
+              <a:cs typeface="Arial" panose="020B0604020202020204" pitchFamily="34" charset="0"/>
+            </a:endParaRPr>
+          </a:p>
+          <a:p>
+            <a:pPr marL="914400" lvl="1" indent="-457200">
+              <a:buFont typeface="Arial" panose="020B0604020202020204" pitchFamily="34" charset="0"/>
+              <a:buChar char="•"/>
+            </a:pPr>
+            <a:endParaRPr lang="en-US" sz="2800" dirty="0">
+              <a:latin typeface="Arial" panose="020B0604020202020204" pitchFamily="34" charset="0"/>
+              <a:cs typeface="Arial" panose="020B0604020202020204" pitchFamily="34" charset="0"/>
+            </a:endParaRPr>
+          </a:p>
+          <a:p>
+            <a:pPr marL="914400" lvl="1" indent="-457200">
+              <a:buFont typeface="Arial" panose="020B0604020202020204" pitchFamily="34" charset="0"/>
+              <a:buChar char="•"/>
+            </a:pPr>
+            <a:endParaRPr lang="en-US" sz="2800" dirty="0">
+              <a:latin typeface="Arial" panose="020B0604020202020204" pitchFamily="34" charset="0"/>
+              <a:cs typeface="Arial" panose="020B0604020202020204" pitchFamily="34" charset="0"/>
+            </a:endParaRPr>
+          </a:p>
+          <a:p>
+            <a:endParaRPr lang="en-US" sz="2800" dirty="0">
+              <a:latin typeface="Arial" panose="020B0604020202020204" pitchFamily="34" charset="0"/>
+              <a:cs typeface="Arial" panose="020B0604020202020204" pitchFamily="34" charset="0"/>
+            </a:endParaRPr>
+          </a:p>
+          <a:p>
+            <a:endParaRPr lang="en-US" sz="2800" dirty="0">
+              <a:latin typeface="Arial" panose="020B0604020202020204" pitchFamily="34" charset="0"/>
+              <a:cs typeface="Arial" panose="020B0604020202020204" pitchFamily="34" charset="0"/>
+            </a:endParaRPr>
+          </a:p>
+          <a:p>
+            <a:endParaRPr lang="en-US" sz="2800" dirty="0">
+              <a:latin typeface="Arial" panose="020B0604020202020204" pitchFamily="34" charset="0"/>
+              <a:cs typeface="Arial" panose="020B0604020202020204" pitchFamily="34" charset="0"/>
+            </a:endParaRPr>
+          </a:p>
+          <a:p>
             <a:pPr marL="571500" indent="-571500">
               <a:buFont typeface="Arial" panose="020B0604020202020204" pitchFamily="34" charset="0"/>
               <a:buChar char="•"/>
             </a:pPr>
-            <a:endParaRPr lang="en-US" sz="2600" dirty="0">
+            <a:endParaRPr lang="en-US" sz="2800" dirty="0">
               <a:latin typeface="Arial" panose="020B0604020202020204" pitchFamily="34" charset="0"/>
               <a:cs typeface="Arial" panose="020B0604020202020204" pitchFamily="34" charset="0"/>
             </a:endParaRPr>
@@ -4218,7 +3668,7 @@
               <a:buFont typeface="Arial" panose="020B0604020202020204" pitchFamily="34" charset="0"/>
               <a:buChar char="•"/>
             </a:pPr>
-            <a:endParaRPr lang="en-US" sz="2600" dirty="0">
+            <a:endParaRPr lang="en-US" sz="2800" dirty="0">
               <a:latin typeface="Arial" panose="020B0604020202020204" pitchFamily="34" charset="0"/>
               <a:cs typeface="Arial" panose="020B0604020202020204" pitchFamily="34" charset="0"/>
             </a:endParaRPr>
@@ -4228,7 +3678,7 @@
               <a:buFont typeface="Arial" panose="020B0604020202020204" pitchFamily="34" charset="0"/>
               <a:buChar char="•"/>
             </a:pPr>
-            <a:endParaRPr lang="en-US" sz="2600" dirty="0">
+            <a:endParaRPr lang="en-US" sz="2800" dirty="0">
               <a:latin typeface="Arial" panose="020B0604020202020204" pitchFamily="34" charset="0"/>
               <a:cs typeface="Arial" panose="020B0604020202020204" pitchFamily="34" charset="0"/>
             </a:endParaRPr>
@@ -4238,7 +3688,7 @@
               <a:buFont typeface="Arial" panose="020B0604020202020204" pitchFamily="34" charset="0"/>
               <a:buChar char="•"/>
             </a:pPr>
-            <a:endParaRPr lang="en-US" sz="2600" dirty="0">
+            <a:endParaRPr lang="en-US" sz="2800" dirty="0">
               <a:latin typeface="Arial" panose="020B0604020202020204" pitchFamily="34" charset="0"/>
               <a:cs typeface="Arial" panose="020B0604020202020204" pitchFamily="34" charset="0"/>
             </a:endParaRPr>
@@ -4248,7 +3698,7 @@
               <a:buFont typeface="Arial" panose="020B0604020202020204" pitchFamily="34" charset="0"/>
               <a:buChar char="•"/>
             </a:pPr>
-            <a:endParaRPr lang="en-US" sz="2600" dirty="0">
+            <a:endParaRPr lang="en-US" sz="2800" dirty="0">
               <a:latin typeface="Arial" panose="020B0604020202020204" pitchFamily="34" charset="0"/>
               <a:cs typeface="Arial" panose="020B0604020202020204" pitchFamily="34" charset="0"/>
             </a:endParaRPr>
@@ -4258,7 +3708,7 @@
               <a:buFont typeface="Arial" panose="020B0604020202020204" pitchFamily="34" charset="0"/>
               <a:buChar char="•"/>
             </a:pPr>
-            <a:endParaRPr lang="en-US" sz="2600" dirty="0">
+            <a:endParaRPr lang="en-US" sz="2800" dirty="0">
               <a:latin typeface="Arial" panose="020B0604020202020204" pitchFamily="34" charset="0"/>
               <a:cs typeface="Arial" panose="020B0604020202020204" pitchFamily="34" charset="0"/>
             </a:endParaRPr>
@@ -4268,656 +3718,13 @@
               <a:buFont typeface="Arial" panose="020B0604020202020204" pitchFamily="34" charset="0"/>
               <a:buChar char="•"/>
             </a:pPr>
-            <a:endParaRPr lang="en-US" sz="2600" dirty="0">
-              <a:latin typeface="Arial" panose="020B0604020202020204" pitchFamily="34" charset="0"/>
-              <a:cs typeface="Arial" panose="020B0604020202020204" pitchFamily="34" charset="0"/>
-            </a:endParaRPr>
-          </a:p>
-          <a:p>
-            <a:endParaRPr lang="en-US" sz="2600" dirty="0">
-              <a:latin typeface="Arial" panose="020B0604020202020204" pitchFamily="34" charset="0"/>
-              <a:cs typeface="Arial" panose="020B0604020202020204" pitchFamily="34" charset="0"/>
-            </a:endParaRPr>
-          </a:p>
-          <a:p>
-            <a:pPr marL="457200" indent="-457200">
-              <a:buFont typeface="Arial" panose="020B0604020202020204" pitchFamily="34" charset="0"/>
-              <a:buChar char="•"/>
-            </a:pPr>
-            <a:endParaRPr lang="en-US" sz="2600" dirty="0">
-              <a:latin typeface="Arial" panose="020B0604020202020204" pitchFamily="34" charset="0"/>
-              <a:cs typeface="Arial" panose="020B0604020202020204" pitchFamily="34" charset="0"/>
-            </a:endParaRPr>
-          </a:p>
-          <a:p>
-            <a:pPr marL="457200" indent="-457200">
-              <a:buFont typeface="Arial" panose="020B0604020202020204" pitchFamily="34" charset="0"/>
-              <a:buChar char="•"/>
-            </a:pPr>
-            <a:endParaRPr lang="en-US" sz="2600" dirty="0">
-              <a:latin typeface="Arial" panose="020B0604020202020204" pitchFamily="34" charset="0"/>
-              <a:cs typeface="Arial" panose="020B0604020202020204" pitchFamily="34" charset="0"/>
-            </a:endParaRPr>
-          </a:p>
-          <a:p>
-            <a:pPr marL="457200" indent="-457200">
-              <a:buFont typeface="Arial" panose="020B0604020202020204" pitchFamily="34" charset="0"/>
-              <a:buChar char="•"/>
-            </a:pPr>
-            <a:endParaRPr lang="en-US" sz="2600" dirty="0">
-              <a:latin typeface="Arial" panose="020B0604020202020204" pitchFamily="34" charset="0"/>
-              <a:cs typeface="Arial" panose="020B0604020202020204" pitchFamily="34" charset="0"/>
-            </a:endParaRPr>
-          </a:p>
-          <a:p>
-            <a:pPr marL="457200" indent="-457200">
-              <a:buFont typeface="Arial" panose="020B0604020202020204" pitchFamily="34" charset="0"/>
-              <a:buChar char="•"/>
-            </a:pPr>
-            <a:endParaRPr lang="en-US" sz="2600" dirty="0">
-              <a:latin typeface="Arial" panose="020B0604020202020204" pitchFamily="34" charset="0"/>
-              <a:cs typeface="Arial" panose="020B0604020202020204" pitchFamily="34" charset="0"/>
-            </a:endParaRPr>
-          </a:p>
-          <a:p>
-            <a:pPr marL="457200" indent="-457200">
-              <a:buFont typeface="Arial" panose="020B0604020202020204" pitchFamily="34" charset="0"/>
-              <a:buChar char="•"/>
-            </a:pPr>
-            <a:r>
-              <a:rPr lang="en-US" sz="2600" dirty="0">
-                <a:latin typeface="Arial" panose="020B0604020202020204" pitchFamily="34" charset="0"/>
-                <a:cs typeface="Arial" panose="020B0604020202020204" pitchFamily="34" charset="0"/>
-              </a:rPr>
-              <a:t>Markers indicate the model used.  </a:t>
-            </a:r>
-          </a:p>
-          <a:p>
-            <a:pPr marL="914400" lvl="1" indent="-457200">
-              <a:buFont typeface="Arial" panose="020B0604020202020204" pitchFamily="34" charset="0"/>
-              <a:buChar char="•"/>
-            </a:pPr>
-            <a:r>
-              <a:rPr lang="en-US" sz="2600" dirty="0">
-                <a:latin typeface="Arial" panose="020B0604020202020204" pitchFamily="34" charset="0"/>
-                <a:cs typeface="Arial" panose="020B0604020202020204" pitchFamily="34" charset="0"/>
-              </a:rPr>
-              <a:t>Red markers indicate our baseline SED, with lighter shades representing lower temperatures.</a:t>
-            </a:r>
-          </a:p>
-          <a:p>
-            <a:pPr marL="914400" lvl="1" indent="-457200">
-              <a:buFont typeface="Arial" panose="020B0604020202020204" pitchFamily="34" charset="0"/>
-              <a:buChar char="•"/>
-            </a:pPr>
-            <a:r>
-              <a:rPr lang="en-US" sz="2600" dirty="0">
-                <a:latin typeface="Arial" panose="020B0604020202020204" pitchFamily="34" charset="0"/>
-                <a:cs typeface="Arial" panose="020B0604020202020204" pitchFamily="34" charset="0"/>
-              </a:rPr>
-              <a:t>Blue markers indicate a SED with </a:t>
-            </a:r>
-            <a:r>
-              <a:rPr lang="el-GR" sz="2600" dirty="0">
-                <a:latin typeface="Arial" panose="020B0604020202020204" pitchFamily="34" charset="0"/>
-                <a:cs typeface="Arial" panose="020B0604020202020204" pitchFamily="34" charset="0"/>
-              </a:rPr>
-              <a:t>α</a:t>
-            </a:r>
-            <a:r>
-              <a:rPr lang="en-US" sz="2600" baseline="-25000" dirty="0">
-                <a:latin typeface="Arial" panose="020B0604020202020204" pitchFamily="34" charset="0"/>
-                <a:cs typeface="Arial" panose="020B0604020202020204" pitchFamily="34" charset="0"/>
-              </a:rPr>
-              <a:t>x </a:t>
-            </a:r>
-            <a:r>
-              <a:rPr lang="en-US" sz="2600" dirty="0">
-                <a:latin typeface="Arial" panose="020B0604020202020204" pitchFamily="34" charset="0"/>
-                <a:cs typeface="Arial" panose="020B0604020202020204" pitchFamily="34" charset="0"/>
-              </a:rPr>
-              <a:t>= -2.19, </a:t>
-            </a:r>
-            <a:r>
-              <a:rPr lang="el-GR" sz="2600" dirty="0">
-                <a:latin typeface="Arial" panose="020B0604020202020204" pitchFamily="34" charset="0"/>
-                <a:cs typeface="Arial" panose="020B0604020202020204" pitchFamily="34" charset="0"/>
-              </a:rPr>
-              <a:t>α</a:t>
-            </a:r>
-            <a:r>
-              <a:rPr lang="en-US" sz="2600" baseline="-25000" dirty="0" err="1">
-                <a:latin typeface="Arial" panose="020B0604020202020204" pitchFamily="34" charset="0"/>
-                <a:cs typeface="Arial" panose="020B0604020202020204" pitchFamily="34" charset="0"/>
-              </a:rPr>
-              <a:t>uv</a:t>
-            </a:r>
-            <a:r>
-              <a:rPr lang="en-US" sz="2600" baseline="-25000" dirty="0">
-                <a:latin typeface="Arial" panose="020B0604020202020204" pitchFamily="34" charset="0"/>
-                <a:cs typeface="Arial" panose="020B0604020202020204" pitchFamily="34" charset="0"/>
-              </a:rPr>
-              <a:t> </a:t>
-            </a:r>
-            <a:r>
-              <a:rPr lang="en-US" sz="2600" dirty="0">
-                <a:latin typeface="Arial" panose="020B0604020202020204" pitchFamily="34" charset="0"/>
-                <a:cs typeface="Arial" panose="020B0604020202020204" pitchFamily="34" charset="0"/>
-              </a:rPr>
-              <a:t>= -0.38, </a:t>
-            </a:r>
-            <a:r>
-              <a:rPr lang="el-GR" sz="2600" dirty="0">
-                <a:latin typeface="Arial" panose="020B0604020202020204" pitchFamily="34" charset="0"/>
-                <a:cs typeface="Arial" panose="020B0604020202020204" pitchFamily="34" charset="0"/>
-              </a:rPr>
-              <a:t>α</a:t>
-            </a:r>
-            <a:r>
-              <a:rPr lang="en-US" sz="2600" baseline="-25000" dirty="0">
-                <a:latin typeface="Arial" panose="020B0604020202020204" pitchFamily="34" charset="0"/>
-                <a:cs typeface="Arial" panose="020B0604020202020204" pitchFamily="34" charset="0"/>
-              </a:rPr>
-              <a:t>ox </a:t>
-            </a:r>
-            <a:r>
-              <a:rPr lang="en-US" sz="2600" dirty="0">
-                <a:latin typeface="Arial" panose="020B0604020202020204" pitchFamily="34" charset="0"/>
-                <a:cs typeface="Arial" panose="020B0604020202020204" pitchFamily="34" charset="0"/>
-              </a:rPr>
-              <a:t>=-1.42</a:t>
-            </a:r>
-          </a:p>
-          <a:p>
-            <a:pPr marL="914400" lvl="1" indent="-457200">
-              <a:buFont typeface="Arial" panose="020B0604020202020204" pitchFamily="34" charset="0"/>
-              <a:buChar char="•"/>
-            </a:pPr>
-            <a:r>
-              <a:rPr lang="en-US" sz="2600" dirty="0">
-                <a:latin typeface="Arial" panose="020B0604020202020204" pitchFamily="34" charset="0"/>
-                <a:cs typeface="Arial" panose="020B0604020202020204" pitchFamily="34" charset="0"/>
-              </a:rPr>
-              <a:t>Green markers indicate a SED with </a:t>
-            </a:r>
-            <a:r>
-              <a:rPr lang="el-GR" sz="2600" dirty="0">
-                <a:latin typeface="Arial" panose="020B0604020202020204" pitchFamily="34" charset="0"/>
-                <a:cs typeface="Arial" panose="020B0604020202020204" pitchFamily="34" charset="0"/>
-              </a:rPr>
-              <a:t>α</a:t>
-            </a:r>
-            <a:r>
-              <a:rPr lang="en-US" sz="2600" baseline="-25000" dirty="0">
-                <a:latin typeface="Arial" panose="020B0604020202020204" pitchFamily="34" charset="0"/>
-                <a:cs typeface="Arial" panose="020B0604020202020204" pitchFamily="34" charset="0"/>
-              </a:rPr>
-              <a:t>x </a:t>
-            </a:r>
-            <a:r>
-              <a:rPr lang="en-US" sz="2600" dirty="0">
-                <a:latin typeface="Arial" panose="020B0604020202020204" pitchFamily="34" charset="0"/>
-                <a:cs typeface="Arial" panose="020B0604020202020204" pitchFamily="34" charset="0"/>
-              </a:rPr>
-              <a:t>= -1.17 , </a:t>
-            </a:r>
-            <a:r>
-              <a:rPr lang="el-GR" sz="2600" dirty="0">
-                <a:latin typeface="Arial" panose="020B0604020202020204" pitchFamily="34" charset="0"/>
-                <a:cs typeface="Arial" panose="020B0604020202020204" pitchFamily="34" charset="0"/>
-              </a:rPr>
-              <a:t>α</a:t>
-            </a:r>
-            <a:r>
-              <a:rPr lang="en-US" sz="2600" baseline="-25000" dirty="0" err="1">
-                <a:latin typeface="Arial" panose="020B0604020202020204" pitchFamily="34" charset="0"/>
-                <a:cs typeface="Arial" panose="020B0604020202020204" pitchFamily="34" charset="0"/>
-              </a:rPr>
-              <a:t>uv</a:t>
-            </a:r>
-            <a:r>
-              <a:rPr lang="en-US" sz="2600" baseline="-25000" dirty="0">
-                <a:latin typeface="Arial" panose="020B0604020202020204" pitchFamily="34" charset="0"/>
-                <a:cs typeface="Arial" panose="020B0604020202020204" pitchFamily="34" charset="0"/>
-              </a:rPr>
-              <a:t> </a:t>
-            </a:r>
-            <a:r>
-              <a:rPr lang="en-US" sz="2600" dirty="0">
-                <a:latin typeface="Arial" panose="020B0604020202020204" pitchFamily="34" charset="0"/>
-                <a:cs typeface="Arial" panose="020B0604020202020204" pitchFamily="34" charset="0"/>
-              </a:rPr>
-              <a:t>= -0.73, </a:t>
-            </a:r>
-            <a:r>
-              <a:rPr lang="el-GR" sz="2600" dirty="0">
-                <a:latin typeface="Arial" panose="020B0604020202020204" pitchFamily="34" charset="0"/>
-                <a:cs typeface="Arial" panose="020B0604020202020204" pitchFamily="34" charset="0"/>
-              </a:rPr>
-              <a:t>α</a:t>
-            </a:r>
-            <a:r>
-              <a:rPr lang="en-US" sz="2600" baseline="-25000" dirty="0">
-                <a:latin typeface="Arial" panose="020B0604020202020204" pitchFamily="34" charset="0"/>
-                <a:cs typeface="Arial" panose="020B0604020202020204" pitchFamily="34" charset="0"/>
-              </a:rPr>
-              <a:t>ox </a:t>
-            </a:r>
-            <a:r>
-              <a:rPr lang="en-US" sz="2600" dirty="0">
-                <a:latin typeface="Arial" panose="020B0604020202020204" pitchFamily="34" charset="0"/>
-                <a:cs typeface="Arial" panose="020B0604020202020204" pitchFamily="34" charset="0"/>
-              </a:rPr>
-              <a:t>=-1.42</a:t>
-            </a:r>
-          </a:p>
-          <a:p>
-            <a:pPr marL="457200" indent="-457200">
-              <a:buFont typeface="Arial" panose="020B0604020202020204" pitchFamily="34" charset="0"/>
-              <a:buChar char="•"/>
-            </a:pPr>
-            <a:r>
-              <a:rPr lang="en-US" sz="2600" dirty="0">
-                <a:latin typeface="Arial" panose="020B0604020202020204" pitchFamily="34" charset="0"/>
-                <a:cs typeface="Arial" panose="020B0604020202020204" pitchFamily="34" charset="0"/>
-              </a:rPr>
-              <a:t>Most plots have little variation between models.  An interesting result is the zig-zag pattern based on temperature that shows up in many of the plots.</a:t>
-            </a:r>
-          </a:p>
-          <a:p>
-            <a:pPr marL="457200" indent="-457200">
-              <a:buFont typeface="Arial" panose="020B0604020202020204" pitchFamily="34" charset="0"/>
-              <a:buChar char="•"/>
-            </a:pPr>
-            <a:r>
-              <a:rPr lang="en-US" sz="2600" dirty="0">
-                <a:latin typeface="Arial" panose="020B0604020202020204" pitchFamily="34" charset="0"/>
-                <a:cs typeface="Arial" panose="020B0604020202020204" pitchFamily="34" charset="0"/>
-              </a:rPr>
-              <a:t>[O I] plots show largest variation, with higher temperature models coming close to crossing the LINER-</a:t>
-            </a:r>
-            <a:r>
-              <a:rPr lang="en-US" sz="2600" dirty="0" err="1">
-                <a:latin typeface="Arial" panose="020B0604020202020204" pitchFamily="34" charset="0"/>
-                <a:cs typeface="Arial" panose="020B0604020202020204" pitchFamily="34" charset="0"/>
-              </a:rPr>
-              <a:t>Seyfert</a:t>
-            </a:r>
-            <a:r>
-              <a:rPr lang="en-US" sz="2600" dirty="0">
-                <a:latin typeface="Arial" panose="020B0604020202020204" pitchFamily="34" charset="0"/>
-                <a:cs typeface="Arial" panose="020B0604020202020204" pitchFamily="34" charset="0"/>
-              </a:rPr>
-              <a:t> boundary.  Lowering the ionization parameter would likely cause these models to cross the boundary.   </a:t>
-            </a:r>
-          </a:p>
-          <a:p>
-            <a:pPr marL="457200" indent="-457200">
-              <a:buFont typeface="Arial" panose="020B0604020202020204" pitchFamily="34" charset="0"/>
-              <a:buChar char="•"/>
-            </a:pPr>
             <a:endParaRPr lang="en-US" sz="2800" dirty="0">
               <a:latin typeface="Arial" panose="020B0604020202020204" pitchFamily="34" charset="0"/>
               <a:cs typeface="Arial" panose="020B0604020202020204" pitchFamily="34" charset="0"/>
             </a:endParaRPr>
           </a:p>
-          <a:p>
-            <a:pPr marL="914400" lvl="1" indent="-457200">
-              <a:buFont typeface="Arial" panose="020B0604020202020204" pitchFamily="34" charset="0"/>
-              <a:buChar char="•"/>
-            </a:pPr>
-            <a:endParaRPr lang="en-US" sz="2800" dirty="0">
-              <a:latin typeface="Arial" panose="020B0604020202020204" pitchFamily="34" charset="0"/>
-              <a:cs typeface="Arial" panose="020B0604020202020204" pitchFamily="34" charset="0"/>
-            </a:endParaRPr>
-          </a:p>
-          <a:p>
-            <a:pPr marL="914400" lvl="1" indent="-457200">
-              <a:buFont typeface="Arial" panose="020B0604020202020204" pitchFamily="34" charset="0"/>
-              <a:buChar char="•"/>
-            </a:pPr>
-            <a:endParaRPr lang="en-US" sz="2800" dirty="0">
-              <a:latin typeface="Arial" panose="020B0604020202020204" pitchFamily="34" charset="0"/>
-              <a:cs typeface="Arial" panose="020B0604020202020204" pitchFamily="34" charset="0"/>
-            </a:endParaRPr>
-          </a:p>
-          <a:p>
-            <a:pPr marL="914400" lvl="1" indent="-457200">
-              <a:buFont typeface="Arial" panose="020B0604020202020204" pitchFamily="34" charset="0"/>
-              <a:buChar char="•"/>
-            </a:pPr>
-            <a:endParaRPr lang="en-US" sz="2800" dirty="0">
-              <a:latin typeface="Arial" panose="020B0604020202020204" pitchFamily="34" charset="0"/>
-              <a:cs typeface="Arial" panose="020B0604020202020204" pitchFamily="34" charset="0"/>
-            </a:endParaRPr>
-          </a:p>
-          <a:p>
-            <a:pPr marL="914400" lvl="1" indent="-457200">
-              <a:buFont typeface="Arial" panose="020B0604020202020204" pitchFamily="34" charset="0"/>
-              <a:buChar char="•"/>
-            </a:pPr>
-            <a:endParaRPr lang="en-US" sz="2800" dirty="0">
-              <a:latin typeface="Arial" panose="020B0604020202020204" pitchFamily="34" charset="0"/>
-              <a:cs typeface="Arial" panose="020B0604020202020204" pitchFamily="34" charset="0"/>
-            </a:endParaRPr>
-          </a:p>
-          <a:p>
-            <a:pPr marL="914400" lvl="1" indent="-457200">
-              <a:buFont typeface="Arial" panose="020B0604020202020204" pitchFamily="34" charset="0"/>
-              <a:buChar char="•"/>
-            </a:pPr>
-            <a:endParaRPr lang="en-US" sz="2800" dirty="0">
-              <a:latin typeface="Arial" panose="020B0604020202020204" pitchFamily="34" charset="0"/>
-              <a:cs typeface="Arial" panose="020B0604020202020204" pitchFamily="34" charset="0"/>
-            </a:endParaRPr>
-          </a:p>
-          <a:p>
-            <a:pPr marL="914400" lvl="1" indent="-457200">
-              <a:buFont typeface="Arial" panose="020B0604020202020204" pitchFamily="34" charset="0"/>
-              <a:buChar char="•"/>
-            </a:pPr>
-            <a:endParaRPr lang="en-US" sz="2800" dirty="0">
-              <a:latin typeface="Arial" panose="020B0604020202020204" pitchFamily="34" charset="0"/>
-              <a:cs typeface="Arial" panose="020B0604020202020204" pitchFamily="34" charset="0"/>
-            </a:endParaRPr>
-          </a:p>
-          <a:p>
-            <a:pPr marL="914400" lvl="1" indent="-457200">
-              <a:buFont typeface="Arial" panose="020B0604020202020204" pitchFamily="34" charset="0"/>
-              <a:buChar char="•"/>
-            </a:pPr>
-            <a:endParaRPr lang="en-US" sz="2800" dirty="0">
-              <a:latin typeface="Arial" panose="020B0604020202020204" pitchFamily="34" charset="0"/>
-              <a:cs typeface="Arial" panose="020B0604020202020204" pitchFamily="34" charset="0"/>
-            </a:endParaRPr>
-          </a:p>
-          <a:p>
-            <a:pPr marL="914400" lvl="1" indent="-457200">
-              <a:buFont typeface="Arial" panose="020B0604020202020204" pitchFamily="34" charset="0"/>
-              <a:buChar char="•"/>
-            </a:pPr>
-            <a:endParaRPr lang="en-US" sz="2800" dirty="0">
-              <a:latin typeface="Arial" panose="020B0604020202020204" pitchFamily="34" charset="0"/>
-              <a:cs typeface="Arial" panose="020B0604020202020204" pitchFamily="34" charset="0"/>
-            </a:endParaRPr>
-          </a:p>
-          <a:p>
-            <a:pPr marL="914400" lvl="1" indent="-457200">
-              <a:buFont typeface="Arial" panose="020B0604020202020204" pitchFamily="34" charset="0"/>
-              <a:buChar char="•"/>
-            </a:pPr>
-            <a:endParaRPr lang="en-US" sz="2800" dirty="0">
-              <a:latin typeface="Arial" panose="020B0604020202020204" pitchFamily="34" charset="0"/>
-              <a:cs typeface="Arial" panose="020B0604020202020204" pitchFamily="34" charset="0"/>
-            </a:endParaRPr>
-          </a:p>
-          <a:p>
-            <a:pPr marL="914400" lvl="1" indent="-457200">
-              <a:buFont typeface="Arial" panose="020B0604020202020204" pitchFamily="34" charset="0"/>
-              <a:buChar char="•"/>
-            </a:pPr>
-            <a:endParaRPr lang="en-US" sz="2800" dirty="0">
-              <a:latin typeface="Arial" panose="020B0604020202020204" pitchFamily="34" charset="0"/>
-              <a:cs typeface="Arial" panose="020B0604020202020204" pitchFamily="34" charset="0"/>
-            </a:endParaRPr>
-          </a:p>
-          <a:p>
-            <a:pPr marL="914400" lvl="1" indent="-457200">
-              <a:buFont typeface="Arial" panose="020B0604020202020204" pitchFamily="34" charset="0"/>
-              <a:buChar char="•"/>
-            </a:pPr>
-            <a:endParaRPr lang="en-US" sz="2800" dirty="0">
-              <a:latin typeface="Arial" panose="020B0604020202020204" pitchFamily="34" charset="0"/>
-              <a:cs typeface="Arial" panose="020B0604020202020204" pitchFamily="34" charset="0"/>
-            </a:endParaRPr>
-          </a:p>
-          <a:p>
-            <a:pPr marL="914400" lvl="1" indent="-457200">
-              <a:buFont typeface="Arial" panose="020B0604020202020204" pitchFamily="34" charset="0"/>
-              <a:buChar char="•"/>
-            </a:pPr>
-            <a:endParaRPr lang="en-US" sz="2800" dirty="0">
-              <a:latin typeface="Arial" panose="020B0604020202020204" pitchFamily="34" charset="0"/>
-              <a:cs typeface="Arial" panose="020B0604020202020204" pitchFamily="34" charset="0"/>
-            </a:endParaRPr>
-          </a:p>
-          <a:p>
-            <a:endParaRPr lang="en-US" sz="2800" dirty="0">
-              <a:latin typeface="Arial" panose="020B0604020202020204" pitchFamily="34" charset="0"/>
-              <a:cs typeface="Arial" panose="020B0604020202020204" pitchFamily="34" charset="0"/>
-            </a:endParaRPr>
-          </a:p>
-          <a:p>
-            <a:endParaRPr lang="en-US" sz="2800" dirty="0">
-              <a:latin typeface="Arial" panose="020B0604020202020204" pitchFamily="34" charset="0"/>
-              <a:cs typeface="Arial" panose="020B0604020202020204" pitchFamily="34" charset="0"/>
-            </a:endParaRPr>
-          </a:p>
-          <a:p>
-            <a:pPr marL="457200" indent="-457200">
-              <a:buFont typeface="Arial" panose="020B0604020202020204" pitchFamily="34" charset="0"/>
-              <a:buChar char="•"/>
-            </a:pPr>
-            <a:endParaRPr lang="en-US" sz="2600" dirty="0">
-              <a:latin typeface="Arial" panose="020B0604020202020204" pitchFamily="34" charset="0"/>
-              <a:cs typeface="Arial" panose="020B0604020202020204" pitchFamily="34" charset="0"/>
-            </a:endParaRPr>
-          </a:p>
-          <a:p>
-            <a:pPr marL="457200" indent="-457200">
-              <a:buFont typeface="Arial" panose="020B0604020202020204" pitchFamily="34" charset="0"/>
-              <a:buChar char="•"/>
-            </a:pPr>
-            <a:endParaRPr lang="en-US" sz="2600" dirty="0">
-              <a:latin typeface="Arial" panose="020B0604020202020204" pitchFamily="34" charset="0"/>
-              <a:cs typeface="Arial" panose="020B0604020202020204" pitchFamily="34" charset="0"/>
-            </a:endParaRPr>
-          </a:p>
-          <a:p>
-            <a:pPr marL="457200" indent="-457200">
-              <a:buFont typeface="Arial" panose="020B0604020202020204" pitchFamily="34" charset="0"/>
-              <a:buChar char="•"/>
-            </a:pPr>
-            <a:r>
-              <a:rPr lang="en-US" sz="2600" dirty="0">
-                <a:latin typeface="Arial" panose="020B0604020202020204" pitchFamily="34" charset="0"/>
-                <a:cs typeface="Arial" panose="020B0604020202020204" pitchFamily="34" charset="0"/>
-              </a:rPr>
-              <a:t>Density diagnostic from </a:t>
-            </a:r>
-            <a:r>
-              <a:rPr lang="en-US" sz="2600" dirty="0" err="1">
-                <a:latin typeface="Arial" panose="020B0604020202020204" pitchFamily="34" charset="0"/>
-                <a:cs typeface="Arial" panose="020B0604020202020204" pitchFamily="34" charset="0"/>
-              </a:rPr>
-              <a:t>Ferland</a:t>
-            </a:r>
-            <a:r>
-              <a:rPr lang="en-US" sz="2600" dirty="0">
-                <a:latin typeface="Arial" panose="020B0604020202020204" pitchFamily="34" charset="0"/>
-                <a:cs typeface="Arial" panose="020B0604020202020204" pitchFamily="34" charset="0"/>
-              </a:rPr>
-              <a:t> &amp; </a:t>
-            </a:r>
-            <a:r>
-              <a:rPr lang="en-US" sz="2600" dirty="0" err="1">
-                <a:latin typeface="Arial" panose="020B0604020202020204" pitchFamily="34" charset="0"/>
-                <a:cs typeface="Arial" panose="020B0604020202020204" pitchFamily="34" charset="0"/>
-              </a:rPr>
-              <a:t>Osterbrock</a:t>
-            </a:r>
-            <a:r>
-              <a:rPr lang="en-US" sz="2600" dirty="0">
-                <a:latin typeface="Arial" panose="020B0604020202020204" pitchFamily="34" charset="0"/>
-                <a:cs typeface="Arial" panose="020B0604020202020204" pitchFamily="34" charset="0"/>
-              </a:rPr>
-              <a:t> 2006.  </a:t>
-            </a:r>
-          </a:p>
-          <a:p>
-            <a:pPr marL="457200" indent="-457200">
-              <a:buFont typeface="Arial" panose="020B0604020202020204" pitchFamily="34" charset="0"/>
-              <a:buChar char="•"/>
-            </a:pPr>
-            <a:r>
-              <a:rPr lang="en-US" sz="2600" dirty="0">
-                <a:latin typeface="Arial" panose="020B0604020202020204" pitchFamily="34" charset="0"/>
-                <a:cs typeface="Arial" panose="020B0604020202020204" pitchFamily="34" charset="0"/>
-              </a:rPr>
-              <a:t>Emissions from elements at the same ionization level, but different wavelengths act as indicators of density. </a:t>
-            </a:r>
-          </a:p>
-          <a:p>
-            <a:pPr marL="457200" indent="-457200">
-              <a:buFont typeface="Arial" panose="020B0604020202020204" pitchFamily="34" charset="0"/>
-              <a:buChar char="•"/>
-            </a:pPr>
-            <a:r>
-              <a:rPr lang="en-US" sz="2600" dirty="0">
-                <a:latin typeface="Arial" panose="020B0604020202020204" pitchFamily="34" charset="0"/>
-                <a:cs typeface="Arial" panose="020B0604020202020204" pitchFamily="34" charset="0"/>
-              </a:rPr>
-              <a:t>[O III] 4363 / [O III] 5007 is sensitive to electron temperature.  </a:t>
-            </a:r>
-          </a:p>
-          <a:p>
-            <a:pPr marL="457200" indent="-457200">
-              <a:buFont typeface="Arial" panose="020B0604020202020204" pitchFamily="34" charset="0"/>
-              <a:buChar char="•"/>
-            </a:pPr>
-            <a:r>
-              <a:rPr lang="en-US" sz="2600" dirty="0">
-                <a:latin typeface="Arial" panose="020B0604020202020204" pitchFamily="34" charset="0"/>
-                <a:cs typeface="Arial" panose="020B0604020202020204" pitchFamily="34" charset="0"/>
-              </a:rPr>
-              <a:t>[S II] 6716 / [S II] 6731 is insensitive to other factors and acts as a strong indicator of density. </a:t>
-            </a:r>
-          </a:p>
-          <a:p>
-            <a:pPr marL="457200" indent="-457200">
-              <a:buFont typeface="Arial" panose="020B0604020202020204" pitchFamily="34" charset="0"/>
-              <a:buChar char="•"/>
-            </a:pPr>
-            <a:r>
-              <a:rPr lang="en-US" sz="2600" dirty="0">
-                <a:latin typeface="Arial" panose="020B0604020202020204" pitchFamily="34" charset="0"/>
-                <a:cs typeface="Arial" panose="020B0604020202020204" pitchFamily="34" charset="0"/>
-              </a:rPr>
-              <a:t>Models show little variation outside of temperature.  </a:t>
-            </a:r>
-          </a:p>
-          <a:p>
-            <a:pPr marL="457200" indent="-457200">
-              <a:buFont typeface="Arial" panose="020B0604020202020204" pitchFamily="34" charset="0"/>
-              <a:buChar char="•"/>
-            </a:pPr>
-            <a:endParaRPr lang="en-US" sz="2800" dirty="0">
-              <a:latin typeface="Arial" panose="020B0604020202020204" pitchFamily="34" charset="0"/>
-              <a:cs typeface="Arial" panose="020B0604020202020204" pitchFamily="34" charset="0"/>
-            </a:endParaRPr>
-          </a:p>
-          <a:p>
-            <a:pPr marL="571500" indent="-571500">
-              <a:buFont typeface="Arial" panose="020B0604020202020204" pitchFamily="34" charset="0"/>
-              <a:buChar char="•"/>
-            </a:pPr>
-            <a:endParaRPr lang="en-US" sz="2800" dirty="0">
-              <a:latin typeface="Arial" panose="020B0604020202020204" pitchFamily="34" charset="0"/>
-              <a:cs typeface="Arial" panose="020B0604020202020204" pitchFamily="34" charset="0"/>
-            </a:endParaRPr>
-          </a:p>
-          <a:p>
-            <a:pPr marL="571500" indent="-571500">
-              <a:buFont typeface="Arial" panose="020B0604020202020204" pitchFamily="34" charset="0"/>
-              <a:buChar char="•"/>
-            </a:pPr>
-            <a:endParaRPr lang="en-US" sz="2800" dirty="0">
-              <a:latin typeface="Arial" panose="020B0604020202020204" pitchFamily="34" charset="0"/>
-              <a:cs typeface="Arial" panose="020B0604020202020204" pitchFamily="34" charset="0"/>
-            </a:endParaRPr>
-          </a:p>
-          <a:p>
-            <a:pPr marL="571500" indent="-571500">
-              <a:buFont typeface="Arial" panose="020B0604020202020204" pitchFamily="34" charset="0"/>
-              <a:buChar char="•"/>
-            </a:pPr>
-            <a:endParaRPr lang="en-US" sz="2800" dirty="0">
-              <a:latin typeface="Arial" panose="020B0604020202020204" pitchFamily="34" charset="0"/>
-              <a:cs typeface="Arial" panose="020B0604020202020204" pitchFamily="34" charset="0"/>
-            </a:endParaRPr>
-          </a:p>
-          <a:p>
-            <a:pPr marL="571500" indent="-571500">
-              <a:buFont typeface="Arial" panose="020B0604020202020204" pitchFamily="34" charset="0"/>
-              <a:buChar char="•"/>
-            </a:pPr>
-            <a:endParaRPr lang="en-US" sz="2800" dirty="0">
-              <a:latin typeface="Arial" panose="020B0604020202020204" pitchFamily="34" charset="0"/>
-              <a:cs typeface="Arial" panose="020B0604020202020204" pitchFamily="34" charset="0"/>
-            </a:endParaRPr>
-          </a:p>
-          <a:p>
-            <a:pPr marL="571500" indent="-571500">
-              <a:buFont typeface="Arial" panose="020B0604020202020204" pitchFamily="34" charset="0"/>
-              <a:buChar char="•"/>
-            </a:pPr>
-            <a:endParaRPr lang="en-US" sz="2800" dirty="0">
-              <a:latin typeface="Arial" panose="020B0604020202020204" pitchFamily="34" charset="0"/>
-              <a:cs typeface="Arial" panose="020B0604020202020204" pitchFamily="34" charset="0"/>
-            </a:endParaRPr>
-          </a:p>
-          <a:p>
-            <a:pPr marL="571500" indent="-571500">
-              <a:buFont typeface="Arial" panose="020B0604020202020204" pitchFamily="34" charset="0"/>
-              <a:buChar char="•"/>
-            </a:pPr>
-            <a:endParaRPr lang="en-US" sz="2800" dirty="0">
-              <a:latin typeface="Arial" panose="020B0604020202020204" pitchFamily="34" charset="0"/>
-              <a:cs typeface="Arial" panose="020B0604020202020204" pitchFamily="34" charset="0"/>
-            </a:endParaRPr>
-          </a:p>
-          <a:p>
-            <a:pPr marL="571500" indent="-571500">
-              <a:buFont typeface="Arial" panose="020B0604020202020204" pitchFamily="34" charset="0"/>
-              <a:buChar char="•"/>
-            </a:pPr>
-            <a:endParaRPr lang="en-US" sz="2800" dirty="0">
-              <a:latin typeface="Arial" panose="020B0604020202020204" pitchFamily="34" charset="0"/>
-              <a:cs typeface="Arial" panose="020B0604020202020204" pitchFamily="34" charset="0"/>
-            </a:endParaRPr>
-          </a:p>
-        </p:txBody>
-      </p:sp>
-      <p:pic>
-        <p:nvPicPr>
-          <p:cNvPr id="3" name="Picture 2"/>
-          <p:cNvPicPr>
-            <a:picLocks noChangeAspect="1"/>
-          </p:cNvPicPr>
-          <p:nvPr/>
-        </p:nvPicPr>
-        <p:blipFill>
-          <a:blip r:embed="rId2">
-            <a:extLst>
-              <a:ext uri="{28A0092B-C50C-407E-A947-70E740481C1C}">
-                <a14:useLocalDpi xmlns:a14="http://schemas.microsoft.com/office/drawing/2010/main" val="0"/>
-              </a:ext>
-            </a:extLst>
-          </a:blip>
-          <a:stretch>
-            <a:fillRect/>
-          </a:stretch>
-        </p:blipFill>
-        <p:spPr>
-          <a:xfrm>
-            <a:off x="4579183" y="7527742"/>
-            <a:ext cx="6602199" cy="4183267"/>
-          </a:xfrm>
-          <a:prstGeom prst="rect">
-            <a:avLst/>
-          </a:prstGeom>
-        </p:spPr>
-      </p:pic>
+        </p:txBody>
+      </p:sp>
       <p:sp>
         <p:nvSpPr>
           <p:cNvPr id="21" name="TextBox 20"/>
@@ -5403,7 +4210,7 @@
         <p:spPr>
           <a:xfrm>
             <a:off x="31065296" y="22972179"/>
-            <a:ext cx="11709083" cy="7879080"/>
+            <a:ext cx="11709083" cy="7078861"/>
           </a:xfrm>
           <a:prstGeom prst="rect">
             <a:avLst/>
@@ -5451,7 +4258,7 @@
                 <a:latin typeface="Arial" panose="020B0604020202020204" pitchFamily="34" charset="0"/>
                 <a:cs typeface="Arial" panose="020B0604020202020204" pitchFamily="34" charset="0"/>
               </a:rPr>
-              <a:t>This model does not act as a strong indicator of diagnostic ratios for emissions in the infrared spectrum.</a:t>
+              <a:t>This model acts as an accurate predictor of LINER galaxy emission ratios</a:t>
             </a:r>
           </a:p>
           <a:p>
@@ -5464,7 +4271,7 @@
                 <a:latin typeface="Arial" panose="020B0604020202020204" pitchFamily="34" charset="0"/>
                 <a:cs typeface="Arial" panose="020B0604020202020204" pitchFamily="34" charset="0"/>
               </a:rPr>
-              <a:t>The under-prediction of the IR plots may be a result of simulation parameters preventing enough of each element from being produced. </a:t>
+              <a:t> </a:t>
             </a:r>
           </a:p>
           <a:p>
@@ -5632,34 +4439,6 @@
       </p:sp>
       <p:sp>
         <p:nvSpPr>
-          <p:cNvPr id="25" name="Rectangle 24"/>
-          <p:cNvSpPr/>
-          <p:nvPr/>
-        </p:nvSpPr>
-        <p:spPr>
-          <a:xfrm>
-            <a:off x="4708874" y="11754815"/>
-            <a:ext cx="6734664" cy="369332"/>
-          </a:xfrm>
-          <a:prstGeom prst="rect">
-            <a:avLst/>
-          </a:prstGeom>
-        </p:spPr>
-        <p:txBody>
-          <a:bodyPr wrap="none">
-            <a:spAutoFit/>
-          </a:bodyPr>
-          <a:lstStyle/>
-          <a:p>
-            <a:r>
-              <a:rPr lang="en-US" dirty="0"/>
-              <a:t>http://www.isdc.unige.ch/~ricci/Website/Active_Galactic_Nuclei.html</a:t>
-            </a:r>
-          </a:p>
-        </p:txBody>
-      </p:sp>
-      <p:sp>
-        <p:nvSpPr>
           <p:cNvPr id="28" name="Rectangle 27"/>
           <p:cNvSpPr/>
           <p:nvPr/>
@@ -5698,7 +4477,7 @@
         </p:nvSpPr>
         <p:spPr>
           <a:xfrm>
-            <a:off x="1156848" y="18831109"/>
+            <a:off x="964543" y="15457330"/>
             <a:ext cx="14334536" cy="8340745"/>
           </a:xfrm>
           <a:prstGeom prst="rect">
@@ -6216,19 +4995,8 @@
                 <a:latin typeface="Arial" panose="020B0604020202020204" pitchFamily="34" charset="0"/>
                 <a:cs typeface="Arial" panose="020B0604020202020204" pitchFamily="34" charset="0"/>
               </a:rPr>
-              <a:t>This project was conducted as a part of Elon University’s Summer Undergraduate Research Experience</a:t>
-            </a:r>
-            <a:r>
-              <a:rPr lang="en-US" sz="2800">
-                <a:latin typeface="Arial" panose="020B0604020202020204" pitchFamily="34" charset="0"/>
-                <a:cs typeface="Arial" panose="020B0604020202020204" pitchFamily="34" charset="0"/>
-              </a:rPr>
-              <a:t>, 2016.</a:t>
-            </a:r>
-            <a:endParaRPr lang="en-US" sz="2800" dirty="0">
-              <a:latin typeface="Arial" panose="020B0604020202020204" pitchFamily="34" charset="0"/>
-              <a:cs typeface="Arial" panose="020B0604020202020204" pitchFamily="34" charset="0"/>
-            </a:endParaRPr>
+              <a:t>This project was conducted as a part of Elon University’s Summer Undergraduate Research Experience, 2016.</a:t>
+            </a:r>
           </a:p>
         </p:txBody>
       </p:sp>
@@ -6311,6 +5079,36 @@
           <p:nvPr/>
         </p:nvPicPr>
         <p:blipFill>
+          <a:blip r:embed="rId2">
+            <a:extLst>
+              <a:ext uri="{28A0092B-C50C-407E-A947-70E740481C1C}">
+                <a14:useLocalDpi xmlns:a14="http://schemas.microsoft.com/office/drawing/2010/main" val="0"/>
+              </a:ext>
+            </a:extLst>
+          </a:blip>
+          <a:stretch>
+            <a:fillRect/>
+          </a:stretch>
+        </p:blipFill>
+        <p:spPr>
+          <a:xfrm>
+            <a:off x="898290" y="596454"/>
+            <a:ext cx="7483710" cy="1971670"/>
+          </a:xfrm>
+          <a:prstGeom prst="rect">
+            <a:avLst/>
+          </a:prstGeom>
+        </p:spPr>
+      </p:pic>
+      <p:pic>
+        <p:nvPicPr>
+          <p:cNvPr id="16" name="Picture 15"/>
+          <p:cNvPicPr>
+            <a:picLocks noChangeAspect="1"/>
+          </p:cNvPicPr>
+          <p:nvPr/>
+        </p:nvPicPr>
+        <p:blipFill>
           <a:blip r:embed="rId3">
             <a:extLst>
               <a:ext uri="{28A0092B-C50C-407E-A947-70E740481C1C}">
@@ -6324,8 +5122,8 @@
         </p:blipFill>
         <p:spPr>
           <a:xfrm>
-            <a:off x="1736558" y="616233"/>
-            <a:ext cx="8638536" cy="2275922"/>
+            <a:off x="36204553" y="805190"/>
+            <a:ext cx="3213566" cy="1807631"/>
           </a:xfrm>
           <a:prstGeom prst="rect">
             <a:avLst/>
@@ -6334,7 +5132,7 @@
       </p:pic>
       <p:pic>
         <p:nvPicPr>
-          <p:cNvPr id="16" name="Picture 15"/>
+          <p:cNvPr id="23" name="Picture 22"/>
           <p:cNvPicPr>
             <a:picLocks noChangeAspect="1"/>
           </p:cNvPicPr>
@@ -6354,8 +5152,8 @@
         </p:blipFill>
         <p:spPr>
           <a:xfrm>
-            <a:off x="33523989" y="1130951"/>
-            <a:ext cx="4047744" cy="2276856"/>
+            <a:off x="39369354" y="805189"/>
+            <a:ext cx="3193018" cy="1807632"/>
           </a:xfrm>
           <a:prstGeom prst="rect">
             <a:avLst/>
@@ -6364,7 +5162,7 @@
       </p:pic>
       <p:pic>
         <p:nvPicPr>
-          <p:cNvPr id="23" name="Picture 22"/>
+          <p:cNvPr id="13" name="Picture 12"/>
           <p:cNvPicPr>
             <a:picLocks noChangeAspect="1"/>
           </p:cNvPicPr>
@@ -6384,273 +5182,17 @@
         </p:blipFill>
         <p:spPr>
           <a:xfrm>
-            <a:off x="37571733" y="1130951"/>
-            <a:ext cx="4021861" cy="2276857"/>
+            <a:off x="3895972" y="16867920"/>
+            <a:ext cx="6334125" cy="476250"/>
           </a:xfrm>
           <a:prstGeom prst="rect">
             <a:avLst/>
           </a:prstGeom>
         </p:spPr>
       </p:pic>
-      <p:sp>
-        <p:nvSpPr>
-          <p:cNvPr id="5" name="TextBox 4"/>
-          <p:cNvSpPr txBox="1"/>
-          <p:nvPr/>
-        </p:nvSpPr>
-        <p:spPr>
-          <a:xfrm>
-            <a:off x="31065296" y="21214114"/>
-            <a:ext cx="10735097" cy="1692771"/>
-          </a:xfrm>
-          <a:prstGeom prst="rect">
-            <a:avLst/>
-          </a:prstGeom>
-          <a:noFill/>
-        </p:spPr>
-        <p:txBody>
-          <a:bodyPr wrap="square" rtlCol="0">
-            <a:spAutoFit/>
-          </a:bodyPr>
-          <a:lstStyle/>
-          <a:p>
-            <a:pPr marL="457200" indent="-457200">
-              <a:buFont typeface="Arial" panose="020B0604020202020204" pitchFamily="34" charset="0"/>
-              <a:buChar char="•"/>
-            </a:pPr>
-            <a:r>
-              <a:rPr lang="en-US" sz="2600" dirty="0">
-                <a:latin typeface="Arial" panose="020B0604020202020204" pitchFamily="34" charset="0"/>
-                <a:cs typeface="Arial" panose="020B0604020202020204" pitchFamily="34" charset="0"/>
-              </a:rPr>
-              <a:t>Abundance diagnostic plots for Infrared emissions.</a:t>
-            </a:r>
-          </a:p>
-          <a:p>
-            <a:pPr marL="457200" indent="-457200">
-              <a:buFont typeface="Arial" panose="020B0604020202020204" pitchFamily="34" charset="0"/>
-              <a:buChar char="•"/>
-            </a:pPr>
-            <a:r>
-              <a:rPr lang="en-US" sz="2600" dirty="0">
-                <a:latin typeface="Arial" panose="020B0604020202020204" pitchFamily="34" charset="0"/>
-                <a:cs typeface="Arial" panose="020B0604020202020204" pitchFamily="34" charset="0"/>
-              </a:rPr>
-              <a:t>Both ratios act as a strong abundance indicator and have strong ionization potentials  </a:t>
-            </a:r>
-          </a:p>
-          <a:p>
-            <a:pPr marL="457200" indent="-457200">
-              <a:buFont typeface="Arial" panose="020B0604020202020204" pitchFamily="34" charset="0"/>
-              <a:buChar char="•"/>
-            </a:pPr>
-            <a:r>
-              <a:rPr lang="en-US" sz="2600" dirty="0">
-                <a:latin typeface="Arial" panose="020B0604020202020204" pitchFamily="34" charset="0"/>
-                <a:cs typeface="Arial" panose="020B0604020202020204" pitchFamily="34" charset="0"/>
-              </a:rPr>
-              <a:t>Models seem to under predict the data.   </a:t>
-            </a:r>
-          </a:p>
-        </p:txBody>
-      </p:sp>
-      <p:sp>
-        <p:nvSpPr>
-          <p:cNvPr id="6" name="TextBox 5"/>
-          <p:cNvSpPr txBox="1"/>
-          <p:nvPr/>
-        </p:nvSpPr>
-        <p:spPr>
-          <a:xfrm>
-            <a:off x="30963009" y="9619376"/>
-            <a:ext cx="11811371" cy="5724644"/>
-          </a:xfrm>
-          <a:prstGeom prst="rect">
-            <a:avLst/>
-          </a:prstGeom>
-          <a:noFill/>
-        </p:spPr>
-        <p:txBody>
-          <a:bodyPr wrap="square" rtlCol="0">
-            <a:spAutoFit/>
-          </a:bodyPr>
-          <a:lstStyle/>
-          <a:p>
-            <a:pPr marL="457200" indent="-457200">
-              <a:buFont typeface="Arial" panose="020B0604020202020204" pitchFamily="34" charset="0"/>
-              <a:buChar char="•"/>
-            </a:pPr>
-            <a:endParaRPr lang="en-US" sz="2600" dirty="0">
-              <a:latin typeface="Arial" panose="020B0604020202020204" pitchFamily="34" charset="0"/>
-              <a:cs typeface="Arial" panose="020B0604020202020204" pitchFamily="34" charset="0"/>
-            </a:endParaRPr>
-          </a:p>
-          <a:p>
-            <a:pPr marL="457200" indent="-457200">
-              <a:buFont typeface="Arial" panose="020B0604020202020204" pitchFamily="34" charset="0"/>
-              <a:buChar char="•"/>
-            </a:pPr>
-            <a:endParaRPr lang="en-US" sz="2600" dirty="0">
-              <a:latin typeface="Arial" panose="020B0604020202020204" pitchFamily="34" charset="0"/>
-              <a:cs typeface="Arial" panose="020B0604020202020204" pitchFamily="34" charset="0"/>
-            </a:endParaRPr>
-          </a:p>
-          <a:p>
-            <a:pPr marL="457200" indent="-457200">
-              <a:buFont typeface="Arial" panose="020B0604020202020204" pitchFamily="34" charset="0"/>
-              <a:buChar char="•"/>
-            </a:pPr>
-            <a:endParaRPr lang="en-US" sz="2600" dirty="0">
-              <a:latin typeface="Arial" panose="020B0604020202020204" pitchFamily="34" charset="0"/>
-              <a:cs typeface="Arial" panose="020B0604020202020204" pitchFamily="34" charset="0"/>
-            </a:endParaRPr>
-          </a:p>
-          <a:p>
-            <a:pPr marL="457200" indent="-457200">
-              <a:buFont typeface="Arial" panose="020B0604020202020204" pitchFamily="34" charset="0"/>
-              <a:buChar char="•"/>
-            </a:pPr>
-            <a:r>
-              <a:rPr lang="en-US" sz="2600" dirty="0">
-                <a:latin typeface="Arial" panose="020B0604020202020204" pitchFamily="34" charset="0"/>
-                <a:cs typeface="Arial" panose="020B0604020202020204" pitchFamily="34" charset="0"/>
-              </a:rPr>
-              <a:t>Diagnostic plots for elemental abundances in the optical spectrum derived from different elements at the same ionization level.  </a:t>
-            </a:r>
-          </a:p>
-          <a:p>
-            <a:pPr marL="457200" indent="-457200">
-              <a:buFont typeface="Arial" panose="020B0604020202020204" pitchFamily="34" charset="0"/>
-              <a:buChar char="•"/>
-            </a:pPr>
-            <a:r>
-              <a:rPr lang="en-US" sz="2600" dirty="0">
-                <a:latin typeface="Arial" panose="020B0604020202020204" pitchFamily="34" charset="0"/>
-                <a:cs typeface="Arial" panose="020B0604020202020204" pitchFamily="34" charset="0"/>
-              </a:rPr>
-              <a:t>[O III]/[</a:t>
-            </a:r>
-            <a:r>
-              <a:rPr lang="en-US" sz="2600" dirty="0" err="1">
-                <a:latin typeface="Arial" panose="020B0604020202020204" pitchFamily="34" charset="0"/>
-                <a:cs typeface="Arial" panose="020B0604020202020204" pitchFamily="34" charset="0"/>
-              </a:rPr>
-              <a:t>Ar</a:t>
-            </a:r>
-            <a:r>
-              <a:rPr lang="en-US" sz="2600" dirty="0">
-                <a:latin typeface="Arial" panose="020B0604020202020204" pitchFamily="34" charset="0"/>
-                <a:cs typeface="Arial" panose="020B0604020202020204" pitchFamily="34" charset="0"/>
-              </a:rPr>
-              <a:t> III] vs [Ne III] / H</a:t>
-            </a:r>
-            <a:r>
-              <a:rPr lang="el-GR" sz="2600" dirty="0">
-                <a:latin typeface="Arial" panose="020B0604020202020204" pitchFamily="34" charset="0"/>
-                <a:cs typeface="Arial" panose="020B0604020202020204" pitchFamily="34" charset="0"/>
-              </a:rPr>
-              <a:t>α</a:t>
-            </a:r>
-            <a:r>
-              <a:rPr lang="en-US" sz="2600" dirty="0">
-                <a:latin typeface="Arial" panose="020B0604020202020204" pitchFamily="34" charset="0"/>
-                <a:cs typeface="Arial" panose="020B0604020202020204" pitchFamily="34" charset="0"/>
-              </a:rPr>
-              <a:t> compares elements with high ionization potentials.  [Ne III] / H</a:t>
-            </a:r>
-            <a:r>
-              <a:rPr lang="el-GR" sz="2600" dirty="0">
-                <a:latin typeface="Arial" panose="020B0604020202020204" pitchFamily="34" charset="0"/>
-                <a:cs typeface="Arial" panose="020B0604020202020204" pitchFamily="34" charset="0"/>
-              </a:rPr>
-              <a:t>α </a:t>
-            </a:r>
-            <a:r>
-              <a:rPr lang="en-US" sz="2600" dirty="0">
-                <a:latin typeface="Arial" panose="020B0604020202020204" pitchFamily="34" charset="0"/>
-                <a:cs typeface="Arial" panose="020B0604020202020204" pitchFamily="34" charset="0"/>
-              </a:rPr>
-              <a:t>is also sensitive to ionization parameter</a:t>
-            </a:r>
-          </a:p>
-          <a:p>
-            <a:pPr marL="457200" indent="-457200">
-              <a:buFont typeface="Arial" panose="020B0604020202020204" pitchFamily="34" charset="0"/>
-              <a:buChar char="•"/>
-            </a:pPr>
-            <a:r>
-              <a:rPr lang="en-US" sz="2600" dirty="0">
-                <a:latin typeface="Arial" panose="020B0604020202020204" pitchFamily="34" charset="0"/>
-                <a:cs typeface="Arial" panose="020B0604020202020204" pitchFamily="34" charset="0"/>
-              </a:rPr>
-              <a:t>[He I] / H-beta depends linearly on Helium abundance.  </a:t>
-            </a:r>
-          </a:p>
-          <a:p>
-            <a:pPr marL="457200" indent="-457200">
-              <a:buFont typeface="Arial" panose="020B0604020202020204" pitchFamily="34" charset="0"/>
-              <a:buChar char="•"/>
-            </a:pPr>
-            <a:r>
-              <a:rPr lang="en-US" sz="2600" dirty="0">
-                <a:latin typeface="Arial" panose="020B0604020202020204" pitchFamily="34" charset="0"/>
-                <a:cs typeface="Arial" panose="020B0604020202020204" pitchFamily="34" charset="0"/>
-              </a:rPr>
-              <a:t>[O II] / [N II] affected weakly by ionization parameter and density, allowing it to act as a strong abundance diagnostic. </a:t>
-            </a:r>
-          </a:p>
-          <a:p>
-            <a:pPr marL="457200" indent="-457200">
-              <a:buFont typeface="Arial" panose="020B0604020202020204" pitchFamily="34" charset="0"/>
-              <a:buChar char="•"/>
-            </a:pPr>
-            <a:r>
-              <a:rPr lang="en-US" sz="2600" dirty="0">
-                <a:latin typeface="Arial" panose="020B0604020202020204" pitchFamily="34" charset="0"/>
-                <a:cs typeface="Arial" panose="020B0604020202020204" pitchFamily="34" charset="0"/>
-              </a:rPr>
-              <a:t>[O III] 4363 + [O III] 4959 + [O III] 5007/ H</a:t>
-            </a:r>
-            <a:r>
-              <a:rPr lang="el-GR" sz="2600" dirty="0">
-                <a:latin typeface="Arial" panose="020B0604020202020204" pitchFamily="34" charset="0"/>
-                <a:cs typeface="Arial" panose="020B0604020202020204" pitchFamily="34" charset="0"/>
-              </a:rPr>
-              <a:t>β</a:t>
-            </a:r>
-            <a:r>
-              <a:rPr lang="en-US" sz="2600" dirty="0">
-                <a:latin typeface="Arial" panose="020B0604020202020204" pitchFamily="34" charset="0"/>
-                <a:cs typeface="Arial" panose="020B0604020202020204" pitchFamily="34" charset="0"/>
-              </a:rPr>
-              <a:t> is insensitive to ionization and geometrical factors and increases with decreasing oxygen abundance</a:t>
-            </a:r>
-          </a:p>
-          <a:p>
-            <a:pPr marL="457200" indent="-457200">
-              <a:buFont typeface="Arial" panose="020B0604020202020204" pitchFamily="34" charset="0"/>
-              <a:buChar char="•"/>
-            </a:pPr>
-            <a:r>
-              <a:rPr lang="en-US" sz="2600" dirty="0">
-                <a:latin typeface="Arial" panose="020B0604020202020204" pitchFamily="34" charset="0"/>
-                <a:cs typeface="Arial" panose="020B0604020202020204" pitchFamily="34" charset="0"/>
-              </a:rPr>
-              <a:t>Our simulations show little variation between models.</a:t>
-            </a:r>
-          </a:p>
-          <a:p>
-            <a:pPr marL="457200" indent="-457200">
-              <a:buFont typeface="Arial" panose="020B0604020202020204" pitchFamily="34" charset="0"/>
-              <a:buChar char="•"/>
-            </a:pPr>
-            <a:endParaRPr lang="en-US" sz="2800" dirty="0"/>
-          </a:p>
-        </p:txBody>
-      </p:sp>
       <p:pic>
         <p:nvPicPr>
-          <p:cNvPr id="13" name="Picture 12"/>
+          <p:cNvPr id="19" name="Picture 18"/>
           <p:cNvPicPr>
             <a:picLocks noChangeAspect="1"/>
           </p:cNvPicPr>
@@ -6670,37 +5212,7 @@
         </p:blipFill>
         <p:spPr>
           <a:xfrm>
-            <a:off x="4579183" y="24425310"/>
-            <a:ext cx="6334125" cy="476250"/>
-          </a:xfrm>
-          <a:prstGeom prst="rect">
-            <a:avLst/>
-          </a:prstGeom>
-        </p:spPr>
-      </p:pic>
-      <p:pic>
-        <p:nvPicPr>
-          <p:cNvPr id="19" name="Picture 18"/>
-          <p:cNvPicPr>
-            <a:picLocks noChangeAspect="1"/>
-          </p:cNvPicPr>
-          <p:nvPr/>
-        </p:nvPicPr>
-        <p:blipFill>
-          <a:blip r:embed="rId7">
-            <a:extLst>
-              <a:ext uri="{28A0092B-C50C-407E-A947-70E740481C1C}">
-                <a14:useLocalDpi xmlns:a14="http://schemas.microsoft.com/office/drawing/2010/main" val="0"/>
-              </a:ext>
-            </a:extLst>
-          </a:blip>
-          <a:stretch>
-            <a:fillRect/>
-          </a:stretch>
-        </p:blipFill>
-        <p:spPr>
-          <a:xfrm>
-            <a:off x="3295166" y="20140016"/>
+            <a:off x="3520795" y="20955000"/>
             <a:ext cx="8858250" cy="676275"/>
           </a:xfrm>
           <a:prstGeom prst="rect">
@@ -6710,7 +5222,36 @@
       </p:pic>
       <p:pic>
         <p:nvPicPr>
-          <p:cNvPr id="36" name="Picture 35"/>
+          <p:cNvPr id="2" name="Picture 1"/>
+          <p:cNvPicPr>
+            <a:picLocks noChangeAspect="1"/>
+          </p:cNvPicPr>
+          <p:nvPr/>
+        </p:nvPicPr>
+        <p:blipFill rotWithShape="1">
+          <a:blip r:embed="rId7">
+            <a:extLst>
+              <a:ext uri="{28A0092B-C50C-407E-A947-70E740481C1C}">
+                <a14:useLocalDpi xmlns:a14="http://schemas.microsoft.com/office/drawing/2010/main" val="0"/>
+              </a:ext>
+            </a:extLst>
+          </a:blip>
+          <a:srcRect l="4564" t="-1" r="7575" b="2085"/>
+          <a:stretch/>
+        </p:blipFill>
+        <p:spPr>
+          <a:xfrm>
+            <a:off x="31089132" y="5306842"/>
+            <a:ext cx="11663476" cy="6532692"/>
+          </a:xfrm>
+          <a:prstGeom prst="rect">
+            <a:avLst/>
+          </a:prstGeom>
+        </p:spPr>
+      </p:pic>
+      <p:pic>
+        <p:nvPicPr>
+          <p:cNvPr id="12" name="Picture 11"/>
           <p:cNvPicPr>
             <a:picLocks noChangeAspect="1"/>
           </p:cNvPicPr>
@@ -6724,13 +5265,13 @@
               </a:ext>
             </a:extLst>
           </a:blip>
-          <a:srcRect l="5361" t="7373" r="7371" b="2811"/>
+          <a:srcRect r="5903" b="2005"/>
           <a:stretch/>
         </p:blipFill>
         <p:spPr>
           <a:xfrm>
-            <a:off x="31122338" y="14954236"/>
-            <a:ext cx="11677441" cy="6024160"/>
+            <a:off x="16836757" y="22446393"/>
+            <a:ext cx="12725400" cy="6660447"/>
           </a:xfrm>
           <a:prstGeom prst="rect">
             <a:avLst/>
@@ -6739,7 +5280,7 @@
       </p:pic>
       <p:pic>
         <p:nvPicPr>
-          <p:cNvPr id="38" name="Picture 37"/>
+          <p:cNvPr id="14" name="Picture 13"/>
           <p:cNvPicPr>
             <a:picLocks noChangeAspect="1"/>
           </p:cNvPicPr>
@@ -6753,22 +5294,267 @@
               </a:ext>
             </a:extLst>
           </a:blip>
-          <a:srcRect l="7304" t="6217" r="6908" b="3388"/>
+          <a:srcRect l="3472" r="7870" b="2005"/>
           <a:stretch/>
         </p:blipFill>
         <p:spPr>
           <a:xfrm>
-            <a:off x="16805358" y="22643811"/>
-            <a:ext cx="12964993" cy="6847708"/>
+            <a:off x="31444068" y="13471131"/>
+            <a:ext cx="11031227" cy="6127933"/>
           </a:xfrm>
           <a:prstGeom prst="rect">
             <a:avLst/>
           </a:prstGeom>
         </p:spPr>
       </p:pic>
+      <p:sp>
+        <p:nvSpPr>
+          <p:cNvPr id="15" name="Rectangle 14"/>
+          <p:cNvSpPr/>
+          <p:nvPr/>
+        </p:nvSpPr>
+        <p:spPr>
+          <a:xfrm>
+            <a:off x="16328808" y="2810742"/>
+            <a:ext cx="13437476" cy="6124754"/>
+          </a:xfrm>
+          <a:prstGeom prst="rect">
+            <a:avLst/>
+          </a:prstGeom>
+        </p:spPr>
+        <p:txBody>
+          <a:bodyPr wrap="square">
+            <a:spAutoFit/>
+          </a:bodyPr>
+          <a:lstStyle/>
+          <a:p>
+            <a:pPr algn="ctr"/>
+            <a:endParaRPr lang="en-US" sz="4000" b="1" u="sng" dirty="0">
+              <a:solidFill>
+                <a:srgbClr val="73000A"/>
+              </a:solidFill>
+              <a:latin typeface="Arial" panose="020B0604020202020204" pitchFamily="34" charset="0"/>
+              <a:cs typeface="Arial" panose="020B0604020202020204" pitchFamily="34" charset="0"/>
+            </a:endParaRPr>
+          </a:p>
+          <a:p>
+            <a:pPr algn="ctr"/>
+            <a:r>
+              <a:rPr lang="en-US" sz="4000" b="1" u="sng" dirty="0">
+                <a:solidFill>
+                  <a:srgbClr val="73000A"/>
+                </a:solidFill>
+                <a:latin typeface="Arial" panose="020B0604020202020204" pitchFamily="34" charset="0"/>
+                <a:cs typeface="Arial" panose="020B0604020202020204" pitchFamily="34" charset="0"/>
+              </a:rPr>
+              <a:t>Results</a:t>
+            </a:r>
+          </a:p>
+          <a:p>
+            <a:pPr marL="571500" indent="-571500">
+              <a:buFont typeface="Arial" panose="020B0604020202020204" pitchFamily="34" charset="0"/>
+              <a:buChar char="•"/>
+            </a:pPr>
+            <a:r>
+              <a:rPr lang="en-US" sz="2600" dirty="0">
+                <a:latin typeface="Arial" panose="020B0604020202020204" pitchFamily="34" charset="0"/>
+                <a:cs typeface="Arial" panose="020B0604020202020204" pitchFamily="34" charset="0"/>
+              </a:rPr>
+              <a:t>We examine emission line ratios as they allow us to constrain the SED and study the effects of AGN density, elemental abundances, excitation mechanism, and ionization parameter. </a:t>
+            </a:r>
+          </a:p>
+          <a:p>
+            <a:pPr marL="571500" indent="-571500">
+              <a:buFont typeface="Arial" panose="020B0604020202020204" pitchFamily="34" charset="0"/>
+              <a:buChar char="•"/>
+            </a:pPr>
+            <a:r>
+              <a:rPr lang="en-US" sz="2600" dirty="0">
+                <a:latin typeface="Arial" panose="020B0604020202020204" pitchFamily="34" charset="0"/>
+                <a:cs typeface="Arial" panose="020B0604020202020204" pitchFamily="34" charset="0"/>
+              </a:rPr>
+              <a:t>The first plot is known as the Baldwin-Phillip-</a:t>
+            </a:r>
+            <a:r>
+              <a:rPr lang="en-US" sz="2600" dirty="0" err="1">
+                <a:latin typeface="Arial" panose="020B0604020202020204" pitchFamily="34" charset="0"/>
+                <a:cs typeface="Arial" panose="020B0604020202020204" pitchFamily="34" charset="0"/>
+              </a:rPr>
+              <a:t>Terlevich</a:t>
+            </a:r>
+            <a:r>
+              <a:rPr lang="en-US" sz="2600" dirty="0">
+                <a:latin typeface="Arial" panose="020B0604020202020204" pitchFamily="34" charset="0"/>
+                <a:cs typeface="Arial" panose="020B0604020202020204" pitchFamily="34" charset="0"/>
+              </a:rPr>
+              <a:t> (BPT) diagram. </a:t>
+            </a:r>
+          </a:p>
+          <a:p>
+            <a:pPr marL="571500" indent="-571500">
+              <a:buFont typeface="Arial" panose="020B0604020202020204" pitchFamily="34" charset="0"/>
+              <a:buChar char="•"/>
+            </a:pPr>
+            <a:r>
+              <a:rPr lang="en-US" sz="2600" dirty="0">
+                <a:latin typeface="Arial" panose="020B0604020202020204" pitchFamily="34" charset="0"/>
+                <a:cs typeface="Arial" panose="020B0604020202020204" pitchFamily="34" charset="0"/>
+              </a:rPr>
+              <a:t>The top three plots were introduced in </a:t>
+            </a:r>
+            <a:r>
+              <a:rPr lang="en-US" sz="2600" dirty="0" err="1">
+                <a:latin typeface="Arial" panose="020B0604020202020204" pitchFamily="34" charset="0"/>
+                <a:cs typeface="Arial" panose="020B0604020202020204" pitchFamily="34" charset="0"/>
+              </a:rPr>
+              <a:t>Osterbrock</a:t>
+            </a:r>
+            <a:r>
+              <a:rPr lang="en-US" sz="2600" dirty="0">
+                <a:latin typeface="Arial" panose="020B0604020202020204" pitchFamily="34" charset="0"/>
+                <a:cs typeface="Arial" panose="020B0604020202020204" pitchFamily="34" charset="0"/>
+              </a:rPr>
+              <a:t> &amp; </a:t>
+            </a:r>
+            <a:r>
+              <a:rPr lang="en-US" sz="2600" dirty="0" err="1">
+                <a:latin typeface="Arial" panose="020B0604020202020204" pitchFamily="34" charset="0"/>
+                <a:cs typeface="Arial" panose="020B0604020202020204" pitchFamily="34" charset="0"/>
+              </a:rPr>
+              <a:t>Veilleux</a:t>
+            </a:r>
+            <a:r>
+              <a:rPr lang="en-US" sz="2600" dirty="0">
+                <a:latin typeface="Arial" panose="020B0604020202020204" pitchFamily="34" charset="0"/>
+                <a:cs typeface="Arial" panose="020B0604020202020204" pitchFamily="34" charset="0"/>
+              </a:rPr>
+              <a:t> 1983 to categorize galaxies by atomic excitation mechanism which are empirically derived. </a:t>
+            </a:r>
+          </a:p>
+          <a:p>
+            <a:pPr marL="1028700" lvl="1" indent="-571500">
+              <a:buFont typeface="Arial" panose="020B0604020202020204" pitchFamily="34" charset="0"/>
+              <a:buChar char="•"/>
+            </a:pPr>
+            <a:r>
+              <a:rPr lang="en-US" sz="2600" dirty="0">
+                <a:latin typeface="Arial" panose="020B0604020202020204" pitchFamily="34" charset="0"/>
+                <a:cs typeface="Arial" panose="020B0604020202020204" pitchFamily="34" charset="0"/>
+              </a:rPr>
+              <a:t>Bottom three plots come from </a:t>
+            </a:r>
+            <a:r>
+              <a:rPr lang="en-US" sz="2600" dirty="0" err="1">
+                <a:latin typeface="Arial" panose="020B0604020202020204" pitchFamily="34" charset="0"/>
+                <a:cs typeface="Arial" panose="020B0604020202020204" pitchFamily="34" charset="0"/>
+              </a:rPr>
+              <a:t>Lamareille</a:t>
+            </a:r>
+            <a:r>
+              <a:rPr lang="en-US" sz="2600" dirty="0">
+                <a:latin typeface="Arial" panose="020B0604020202020204" pitchFamily="34" charset="0"/>
+                <a:cs typeface="Arial" panose="020B0604020202020204" pitchFamily="34" charset="0"/>
+              </a:rPr>
+              <a:t> 2010, </a:t>
+            </a:r>
+            <a:r>
+              <a:rPr lang="en-US" sz="2600" dirty="0" err="1">
+                <a:latin typeface="Arial" panose="020B0604020202020204" pitchFamily="34" charset="0"/>
+                <a:cs typeface="Arial" panose="020B0604020202020204" pitchFamily="34" charset="0"/>
+              </a:rPr>
+              <a:t>Shirazi</a:t>
+            </a:r>
+            <a:r>
+              <a:rPr lang="en-US" sz="2600" dirty="0">
+                <a:latin typeface="Arial" panose="020B0604020202020204" pitchFamily="34" charset="0"/>
+                <a:cs typeface="Arial" panose="020B0604020202020204" pitchFamily="34" charset="0"/>
+              </a:rPr>
+              <a:t> et al. 2012, and </a:t>
+            </a:r>
+            <a:r>
+              <a:rPr lang="en-US" sz="2600" dirty="0" err="1">
+                <a:latin typeface="Arial" panose="020B0604020202020204" pitchFamily="34" charset="0"/>
+                <a:cs typeface="Arial" panose="020B0604020202020204" pitchFamily="34" charset="0"/>
+              </a:rPr>
+              <a:t>Kewley</a:t>
+            </a:r>
+            <a:r>
+              <a:rPr lang="en-US" sz="2600" dirty="0">
+                <a:latin typeface="Arial" panose="020B0604020202020204" pitchFamily="34" charset="0"/>
+                <a:cs typeface="Arial" panose="020B0604020202020204" pitchFamily="34" charset="0"/>
+              </a:rPr>
+              <a:t> et al. 2006 respectively. </a:t>
+            </a:r>
+          </a:p>
+          <a:p>
+            <a:pPr marL="571500" indent="-571500">
+              <a:buFont typeface="Arial" panose="020B0604020202020204" pitchFamily="34" charset="0"/>
+              <a:buChar char="•"/>
+            </a:pPr>
+            <a:r>
+              <a:rPr lang="en-US" sz="2600" dirty="0">
+                <a:latin typeface="Arial" panose="020B0604020202020204" pitchFamily="34" charset="0"/>
+                <a:cs typeface="Arial" panose="020B0604020202020204" pitchFamily="34" charset="0"/>
+              </a:rPr>
+              <a:t>Red indicates that the galaxy is a </a:t>
+            </a:r>
+            <a:r>
+              <a:rPr lang="en-US" sz="2600" dirty="0" err="1">
+                <a:latin typeface="Arial" panose="020B0604020202020204" pitchFamily="34" charset="0"/>
+                <a:cs typeface="Arial" panose="020B0604020202020204" pitchFamily="34" charset="0"/>
+              </a:rPr>
+              <a:t>Seyfert</a:t>
+            </a:r>
+            <a:r>
+              <a:rPr lang="en-US" sz="2600" dirty="0">
+                <a:latin typeface="Arial" panose="020B0604020202020204" pitchFamily="34" charset="0"/>
+                <a:cs typeface="Arial" panose="020B0604020202020204" pitchFamily="34" charset="0"/>
+              </a:rPr>
+              <a:t>, blue indicates AGN-</a:t>
+            </a:r>
+            <a:r>
+              <a:rPr lang="en-US" sz="2600" dirty="0" err="1">
+                <a:latin typeface="Arial" panose="020B0604020202020204" pitchFamily="34" charset="0"/>
+                <a:cs typeface="Arial" panose="020B0604020202020204" pitchFamily="34" charset="0"/>
+              </a:rPr>
+              <a:t>Starwhile</a:t>
+            </a:r>
+            <a:r>
+              <a:rPr lang="en-US" sz="2600" dirty="0">
+                <a:latin typeface="Arial" panose="020B0604020202020204" pitchFamily="34" charset="0"/>
+                <a:cs typeface="Arial" panose="020B0604020202020204" pitchFamily="34" charset="0"/>
+              </a:rPr>
+              <a:t> blue indicates star-forming galaxies, composite galaxies, and LINERS.  </a:t>
+            </a:r>
+          </a:p>
+          <a:p>
+            <a:pPr marL="571500" indent="-571500">
+              <a:buFont typeface="Arial" panose="020B0604020202020204" pitchFamily="34" charset="0"/>
+              <a:buChar char="•"/>
+            </a:pPr>
+            <a:r>
+              <a:rPr lang="en-US" sz="2600" dirty="0">
+                <a:latin typeface="Arial" panose="020B0604020202020204" pitchFamily="34" charset="0"/>
+                <a:cs typeface="Arial" panose="020B0604020202020204" pitchFamily="34" charset="0"/>
+              </a:rPr>
+              <a:t>Galaxies are separated based on the equations that set the boundary lines. </a:t>
+            </a:r>
+          </a:p>
+          <a:p>
+            <a:pPr marL="571500" indent="-571500">
+              <a:buFont typeface="Arial" panose="020B0604020202020204" pitchFamily="34" charset="0"/>
+              <a:buChar char="•"/>
+            </a:pPr>
+            <a:endParaRPr lang="en-US" sz="2600" dirty="0">
+              <a:latin typeface="Arial" panose="020B0604020202020204" pitchFamily="34" charset="0"/>
+              <a:cs typeface="Arial" panose="020B0604020202020204" pitchFamily="34" charset="0"/>
+            </a:endParaRPr>
+          </a:p>
+        </p:txBody>
+      </p:sp>
       <p:pic>
         <p:nvPicPr>
-          <p:cNvPr id="39" name="Picture 38"/>
+          <p:cNvPr id="17" name="Picture 16"/>
           <p:cNvPicPr>
             <a:picLocks noChangeAspect="1"/>
           </p:cNvPicPr>
@@ -6782,48 +5568,78 @@
               </a:ext>
             </a:extLst>
           </a:blip>
-          <a:srcRect l="7687" t="5694" r="7260" b="3204"/>
+          <a:srcRect l="5480" t="4907" r="6879" b="2006"/>
           <a:stretch/>
         </p:blipFill>
         <p:spPr>
           <a:xfrm>
-            <a:off x="16544664" y="10744200"/>
-            <a:ext cx="12804211" cy="6874744"/>
+            <a:off x="16012039" y="8861680"/>
+            <a:ext cx="14374836" cy="7673418"/>
           </a:xfrm>
           <a:prstGeom prst="rect">
             <a:avLst/>
           </a:prstGeom>
         </p:spPr>
       </p:pic>
-      <p:pic>
-        <p:nvPicPr>
-          <p:cNvPr id="40" name="Picture 39"/>
-          <p:cNvPicPr>
-            <a:picLocks noChangeAspect="1"/>
-          </p:cNvPicPr>
+      <p:sp>
+        <p:nvSpPr>
+          <p:cNvPr id="18" name="TextBox 17"/>
+          <p:cNvSpPr txBox="1"/>
           <p:nvPr/>
-        </p:nvPicPr>
-        <p:blipFill rotWithShape="1">
-          <a:blip r:embed="rId11">
-            <a:extLst>
-              <a:ext uri="{28A0092B-C50C-407E-A947-70E740481C1C}">
-                <a14:useLocalDpi xmlns:a14="http://schemas.microsoft.com/office/drawing/2010/main" val="0"/>
-              </a:ext>
-            </a:extLst>
-          </a:blip>
-          <a:srcRect l="998" t="6788" r="5374" b="3789"/>
-          <a:stretch/>
-        </p:blipFill>
+        </p:nvSpPr>
         <p:spPr>
           <a:xfrm>
-            <a:off x="30736142" y="3985000"/>
-            <a:ext cx="12656703" cy="6059182"/>
+            <a:off x="1020901" y="4038236"/>
+            <a:ext cx="14334536" cy="1908215"/>
           </a:xfrm>
           <a:prstGeom prst="rect">
             <a:avLst/>
           </a:prstGeom>
+          <a:noFill/>
         </p:spPr>
-      </p:pic>
+        <p:txBody>
+          <a:bodyPr wrap="square" rtlCol="0">
+            <a:spAutoFit/>
+          </a:bodyPr>
+          <a:lstStyle/>
+          <a:p>
+            <a:pPr algn="ctr"/>
+            <a:r>
+              <a:rPr lang="en-US" sz="4000" b="1" u="sng" dirty="0">
+                <a:solidFill>
+                  <a:srgbClr val="73000A"/>
+                </a:solidFill>
+                <a:latin typeface="Arial" panose="020B0604020202020204" pitchFamily="34" charset="0"/>
+                <a:cs typeface="Arial" panose="020B0604020202020204" pitchFamily="34" charset="0"/>
+              </a:rPr>
+              <a:t>Background Information</a:t>
+            </a:r>
+          </a:p>
+          <a:p>
+            <a:pPr marL="571500" indent="-571500">
+              <a:buFont typeface="Arial" panose="020B0604020202020204" pitchFamily="34" charset="0"/>
+              <a:buChar char="•"/>
+            </a:pPr>
+            <a:r>
+              <a:rPr lang="en-US" sz="2600" dirty="0">
+                <a:latin typeface="Arial" panose="020B0604020202020204" pitchFamily="34" charset="0"/>
+                <a:cs typeface="Arial" panose="020B0604020202020204" pitchFamily="34" charset="0"/>
+              </a:rPr>
+              <a:t>Photoionization models act as excellent predictors of emission lines from Active Galactic Nuclei (AGN).</a:t>
+            </a:r>
+          </a:p>
+          <a:p>
+            <a:pPr marL="571500" indent="-571500">
+              <a:buFont typeface="Arial" panose="020B0604020202020204" pitchFamily="34" charset="0"/>
+              <a:buChar char="•"/>
+            </a:pPr>
+            <a:endParaRPr lang="en-US" sz="2600" dirty="0">
+              <a:latin typeface="Arial" panose="020B0604020202020204" pitchFamily="34" charset="0"/>
+              <a:cs typeface="Arial" panose="020B0604020202020204" pitchFamily="34" charset="0"/>
+            </a:endParaRPr>
+          </a:p>
+        </p:txBody>
+      </p:sp>
     </p:spTree>
     <p:extLst>
       <p:ext uri="{BB962C8B-B14F-4D97-AF65-F5344CB8AC3E}">

</xml_diff>